<commit_message>
update java sets sound code ppt
</commit_message>
<xml_diff>
--- a/常用集合源码分析.pptx
+++ b/常用集合源码分析.pptx
@@ -5,7 +5,7 @@
     <p:sldMasterId id="2147483660" r:id="rId1"/>
   </p:sldMasterIdLst>
   <p:notesMasterIdLst>
-    <p:notesMasterId r:id="rId20"/>
+    <p:notesMasterId r:id="rId24"/>
   </p:notesMasterIdLst>
   <p:sldIdLst>
     <p:sldId id="267" r:id="rId2"/>
@@ -23,9 +23,13 @@
     <p:sldId id="279" r:id="rId14"/>
     <p:sldId id="276" r:id="rId15"/>
     <p:sldId id="280" r:id="rId16"/>
-    <p:sldId id="281" r:id="rId17"/>
+    <p:sldId id="285" r:id="rId17"/>
     <p:sldId id="282" r:id="rId18"/>
-    <p:sldId id="277" r:id="rId19"/>
+    <p:sldId id="281" r:id="rId19"/>
+    <p:sldId id="286" r:id="rId20"/>
+    <p:sldId id="277" r:id="rId21"/>
+    <p:sldId id="288" r:id="rId22"/>
+    <p:sldId id="287" r:id="rId23"/>
   </p:sldIdLst>
   <p:sldSz cx="12192000" cy="6858000"/>
   <p:notesSz cx="6858000" cy="9144000"/>
@@ -217,7 +221,7 @@
           <a:p>
             <a:fld id="{7A220C89-F741-4A60-8725-24F669448BA8}" type="datetimeFigureOut">
               <a:rPr lang="zh-CN" altLang="en-US" smtClean="0"/>
-              <a:t>2018/8/12</a:t>
+              <a:t>2018/8/19</a:t>
             </a:fld>
             <a:endParaRPr lang="zh-CN" altLang="en-US"/>
           </a:p>
@@ -692,7 +696,7 @@
           <a:p>
             <a:fld id="{E13947ED-5EF2-47D5-99F5-5EE8E4B8CE26}" type="datetimeFigureOut">
               <a:rPr lang="zh-CN" altLang="en-US" smtClean="0"/>
-              <a:t>2018/8/12</a:t>
+              <a:t>2018/8/19</a:t>
             </a:fld>
             <a:endParaRPr lang="zh-CN" altLang="en-US"/>
           </a:p>
@@ -943,7 +947,7 @@
           <a:p>
             <a:fld id="{E13947ED-5EF2-47D5-99F5-5EE8E4B8CE26}" type="datetimeFigureOut">
               <a:rPr lang="zh-CN" altLang="en-US" smtClean="0"/>
-              <a:t>2018/8/12</a:t>
+              <a:t>2018/8/19</a:t>
             </a:fld>
             <a:endParaRPr lang="zh-CN" altLang="en-US"/>
           </a:p>
@@ -1151,7 +1155,7 @@
           <a:p>
             <a:fld id="{E13947ED-5EF2-47D5-99F5-5EE8E4B8CE26}" type="datetimeFigureOut">
               <a:rPr lang="zh-CN" altLang="en-US" smtClean="0"/>
-              <a:t>2018/8/12</a:t>
+              <a:t>2018/8/19</a:t>
             </a:fld>
             <a:endParaRPr lang="zh-CN" altLang="en-US"/>
           </a:p>
@@ -1349,7 +1353,7 @@
           <a:p>
             <a:fld id="{E13947ED-5EF2-47D5-99F5-5EE8E4B8CE26}" type="datetimeFigureOut">
               <a:rPr lang="zh-CN" altLang="en-US" smtClean="0"/>
-              <a:t>2018/8/12</a:t>
+              <a:t>2018/8/19</a:t>
             </a:fld>
             <a:endParaRPr lang="zh-CN" altLang="en-US"/>
           </a:p>
@@ -1624,7 +1628,7 @@
           <a:p>
             <a:fld id="{E13947ED-5EF2-47D5-99F5-5EE8E4B8CE26}" type="datetimeFigureOut">
               <a:rPr lang="zh-CN" altLang="en-US" smtClean="0"/>
-              <a:t>2018/8/12</a:t>
+              <a:t>2018/8/19</a:t>
             </a:fld>
             <a:endParaRPr lang="zh-CN" altLang="en-US"/>
           </a:p>
@@ -1889,7 +1893,7 @@
           <a:p>
             <a:fld id="{E13947ED-5EF2-47D5-99F5-5EE8E4B8CE26}" type="datetimeFigureOut">
               <a:rPr lang="zh-CN" altLang="en-US" smtClean="0"/>
-              <a:t>2018/8/12</a:t>
+              <a:t>2018/8/19</a:t>
             </a:fld>
             <a:endParaRPr lang="zh-CN" altLang="en-US"/>
           </a:p>
@@ -2301,7 +2305,7 @@
           <a:p>
             <a:fld id="{E13947ED-5EF2-47D5-99F5-5EE8E4B8CE26}" type="datetimeFigureOut">
               <a:rPr lang="zh-CN" altLang="en-US" smtClean="0"/>
-              <a:t>2018/8/12</a:t>
+              <a:t>2018/8/19</a:t>
             </a:fld>
             <a:endParaRPr lang="zh-CN" altLang="en-US"/>
           </a:p>
@@ -2442,7 +2446,7 @@
           <a:p>
             <a:fld id="{E13947ED-5EF2-47D5-99F5-5EE8E4B8CE26}" type="datetimeFigureOut">
               <a:rPr lang="zh-CN" altLang="en-US" smtClean="0"/>
-              <a:t>2018/8/12</a:t>
+              <a:t>2018/8/19</a:t>
             </a:fld>
             <a:endParaRPr lang="zh-CN" altLang="en-US"/>
           </a:p>
@@ -2555,7 +2559,7 @@
           <a:p>
             <a:fld id="{E13947ED-5EF2-47D5-99F5-5EE8E4B8CE26}" type="datetimeFigureOut">
               <a:rPr lang="zh-CN" altLang="en-US" smtClean="0"/>
-              <a:t>2018/8/12</a:t>
+              <a:t>2018/8/19</a:t>
             </a:fld>
             <a:endParaRPr lang="zh-CN" altLang="en-US"/>
           </a:p>
@@ -2866,7 +2870,7 @@
           <a:p>
             <a:fld id="{E13947ED-5EF2-47D5-99F5-5EE8E4B8CE26}" type="datetimeFigureOut">
               <a:rPr lang="zh-CN" altLang="en-US" smtClean="0"/>
-              <a:t>2018/8/12</a:t>
+              <a:t>2018/8/19</a:t>
             </a:fld>
             <a:endParaRPr lang="zh-CN" altLang="en-US"/>
           </a:p>
@@ -3157,7 +3161,7 @@
           <a:p>
             <a:fld id="{E13947ED-5EF2-47D5-99F5-5EE8E4B8CE26}" type="datetimeFigureOut">
               <a:rPr lang="zh-CN" altLang="en-US" smtClean="0"/>
-              <a:t>2018/8/12</a:t>
+              <a:t>2018/8/19</a:t>
             </a:fld>
             <a:endParaRPr lang="zh-CN" altLang="en-US"/>
           </a:p>
@@ -3398,7 +3402,7 @@
           <a:p>
             <a:fld id="{E13947ED-5EF2-47D5-99F5-5EE8E4B8CE26}" type="datetimeFigureOut">
               <a:rPr lang="zh-CN" altLang="en-US" smtClean="0"/>
-              <a:t>2018/8/12</a:t>
+              <a:t>2018/8/19</a:t>
             </a:fld>
             <a:endParaRPr lang="zh-CN" altLang="en-US"/>
           </a:p>
@@ -4675,6 +4679,66 @@
           <a:chExt cx="0" cy="0"/>
         </a:xfrm>
       </p:grpSpPr>
+      <p:pic>
+        <p:nvPicPr>
+          <p:cNvPr id="21" name="图片 20">
+            <a:extLst>
+              <a:ext uri="{FF2B5EF4-FFF2-40B4-BE49-F238E27FC236}">
+                <a16:creationId xmlns:a16="http://schemas.microsoft.com/office/drawing/2014/main" id="{8541D66C-F8B9-4365-A941-3D0ED71A687C}"/>
+              </a:ext>
+            </a:extLst>
+          </p:cNvPr>
+          <p:cNvPicPr>
+            <a:picLocks noChangeAspect="1"/>
+          </p:cNvPicPr>
+          <p:nvPr/>
+        </p:nvPicPr>
+        <p:blipFill>
+          <a:blip r:embed="rId2"/>
+          <a:stretch>
+            <a:fillRect/>
+          </a:stretch>
+        </p:blipFill>
+        <p:spPr>
+          <a:xfrm>
+            <a:off x="6215449" y="1425107"/>
+            <a:ext cx="3477010" cy="5153567"/>
+          </a:xfrm>
+          <a:prstGeom prst="rect">
+            <a:avLst/>
+          </a:prstGeom>
+        </p:spPr>
+      </p:pic>
+      <p:pic>
+        <p:nvPicPr>
+          <p:cNvPr id="26" name="图片 25">
+            <a:extLst>
+              <a:ext uri="{FF2B5EF4-FFF2-40B4-BE49-F238E27FC236}">
+                <a16:creationId xmlns:a16="http://schemas.microsoft.com/office/drawing/2014/main" id="{9B6054CF-A77E-4E7F-AA2D-C9C8EF028FA0}"/>
+              </a:ext>
+            </a:extLst>
+          </p:cNvPr>
+          <p:cNvPicPr>
+            <a:picLocks noChangeAspect="1"/>
+          </p:cNvPicPr>
+          <p:nvPr/>
+        </p:nvPicPr>
+        <p:blipFill>
+          <a:blip r:embed="rId3"/>
+          <a:stretch>
+            <a:fillRect/>
+          </a:stretch>
+        </p:blipFill>
+        <p:spPr>
+          <a:xfrm>
+            <a:off x="415637" y="1591572"/>
+            <a:ext cx="4236357" cy="3332950"/>
+          </a:xfrm>
+          <a:prstGeom prst="rect">
+            <a:avLst/>
+          </a:prstGeom>
+        </p:spPr>
+      </p:pic>
       <p:sp>
         <p:nvSpPr>
           <p:cNvPr id="2" name="矩形 1">
@@ -4710,6 +4774,158 @@
           </a:p>
         </p:txBody>
       </p:sp>
+      <p:cxnSp>
+        <p:nvCxnSpPr>
+          <p:cNvPr id="10" name="直接箭头连接符 9">
+            <a:extLst>
+              <a:ext uri="{FF2B5EF4-FFF2-40B4-BE49-F238E27FC236}">
+                <a16:creationId xmlns:a16="http://schemas.microsoft.com/office/drawing/2014/main" id="{0C4371D2-F3DF-4F01-90B6-3477DAA91942}"/>
+              </a:ext>
+            </a:extLst>
+          </p:cNvPr>
+          <p:cNvCxnSpPr>
+            <a:cxnSpLocks/>
+          </p:cNvCxnSpPr>
+          <p:nvPr/>
+        </p:nvCxnSpPr>
+        <p:spPr>
+          <a:xfrm flipV="1">
+            <a:off x="1953732" y="2267363"/>
+            <a:ext cx="4142268" cy="1"/>
+          </a:xfrm>
+          <a:prstGeom prst="straightConnector1">
+            <a:avLst/>
+          </a:prstGeom>
+          <a:ln>
+            <a:tailEnd type="triangle"/>
+          </a:ln>
+        </p:spPr>
+        <p:style>
+          <a:lnRef idx="1">
+            <a:schemeClr val="accent1"/>
+          </a:lnRef>
+          <a:fillRef idx="0">
+            <a:schemeClr val="accent1"/>
+          </a:fillRef>
+          <a:effectRef idx="0">
+            <a:schemeClr val="accent1"/>
+          </a:effectRef>
+          <a:fontRef idx="minor">
+            <a:schemeClr val="tx1"/>
+          </a:fontRef>
+        </p:style>
+      </p:cxnSp>
+      <p:pic>
+        <p:nvPicPr>
+          <p:cNvPr id="3" name="图片 2">
+            <a:extLst>
+              <a:ext uri="{FF2B5EF4-FFF2-40B4-BE49-F238E27FC236}">
+                <a16:creationId xmlns:a16="http://schemas.microsoft.com/office/drawing/2014/main" id="{9E25F210-4A83-4C9A-B699-E753E4584248}"/>
+              </a:ext>
+            </a:extLst>
+          </p:cNvPr>
+          <p:cNvPicPr>
+            <a:picLocks noChangeAspect="1"/>
+          </p:cNvPicPr>
+          <p:nvPr/>
+        </p:nvPicPr>
+        <p:blipFill>
+          <a:blip r:embed="rId4"/>
+          <a:stretch>
+            <a:fillRect/>
+          </a:stretch>
+        </p:blipFill>
+        <p:spPr>
+          <a:xfrm>
+            <a:off x="4784515" y="525097"/>
+            <a:ext cx="4619048" cy="304762"/>
+          </a:xfrm>
+          <a:prstGeom prst="rect">
+            <a:avLst/>
+          </a:prstGeom>
+        </p:spPr>
+      </p:pic>
+      <p:sp>
+        <p:nvSpPr>
+          <p:cNvPr id="4" name="文本框 3">
+            <a:extLst>
+              <a:ext uri="{FF2B5EF4-FFF2-40B4-BE49-F238E27FC236}">
+                <a16:creationId xmlns:a16="http://schemas.microsoft.com/office/drawing/2014/main" id="{5A5055F5-2C11-4670-9021-E6FF25D8C017}"/>
+              </a:ext>
+            </a:extLst>
+          </p:cNvPr>
+          <p:cNvSpPr txBox="1"/>
+          <p:nvPr/>
+        </p:nvSpPr>
+        <p:spPr>
+          <a:xfrm>
+            <a:off x="7780469" y="1669058"/>
+            <a:ext cx="607859" cy="261610"/>
+          </a:xfrm>
+          <a:prstGeom prst="rect">
+            <a:avLst/>
+          </a:prstGeom>
+          <a:noFill/>
+        </p:spPr>
+        <p:txBody>
+          <a:bodyPr wrap="none" rtlCol="0">
+            <a:spAutoFit/>
+          </a:bodyPr>
+          <a:lstStyle/>
+          <a:p>
+            <a:r>
+              <a:rPr lang="zh-CN" altLang="en-US" sz="1100">
+                <a:solidFill>
+                  <a:srgbClr val="FF0000"/>
+                </a:solidFill>
+              </a:rPr>
+              <a:t>内部类</a:t>
+            </a:r>
+          </a:p>
+        </p:txBody>
+      </p:sp>
+      <p:cxnSp>
+        <p:nvCxnSpPr>
+          <p:cNvPr id="8" name="直接箭头连接符 7">
+            <a:extLst>
+              <a:ext uri="{FF2B5EF4-FFF2-40B4-BE49-F238E27FC236}">
+                <a16:creationId xmlns:a16="http://schemas.microsoft.com/office/drawing/2014/main" id="{FE0AB037-F91F-47A5-B6CA-774630B70B09}"/>
+              </a:ext>
+            </a:extLst>
+          </p:cNvPr>
+          <p:cNvCxnSpPr>
+            <a:cxnSpLocks/>
+            <a:endCxn id="3" idx="1"/>
+          </p:cNvCxnSpPr>
+          <p:nvPr/>
+        </p:nvCxnSpPr>
+        <p:spPr>
+          <a:xfrm flipV="1">
+            <a:off x="2533815" y="677478"/>
+            <a:ext cx="2250700" cy="1253190"/>
+          </a:xfrm>
+          <a:prstGeom prst="straightConnector1">
+            <a:avLst/>
+          </a:prstGeom>
+          <a:ln>
+            <a:tailEnd type="triangle"/>
+          </a:ln>
+        </p:spPr>
+        <p:style>
+          <a:lnRef idx="1">
+            <a:schemeClr val="accent1"/>
+          </a:lnRef>
+          <a:fillRef idx="0">
+            <a:schemeClr val="accent1"/>
+          </a:fillRef>
+          <a:effectRef idx="0">
+            <a:schemeClr val="accent1"/>
+          </a:effectRef>
+          <a:fontRef idx="minor">
+            <a:schemeClr val="tx1"/>
+          </a:fontRef>
+        </p:style>
+      </p:cxnSp>
     </p:spTree>
     <p:extLst>
       <p:ext uri="{BB962C8B-B14F-4D97-AF65-F5344CB8AC3E}">
@@ -4740,12 +4956,132 @@
           <a:chExt cx="0" cy="0"/>
         </a:xfrm>
       </p:grpSpPr>
-      <p:sp>
-        <p:nvSpPr>
-          <p:cNvPr id="2" name="矩形 1">
-            <a:extLst>
-              <a:ext uri="{FF2B5EF4-FFF2-40B4-BE49-F238E27FC236}">
-                <a16:creationId xmlns:a16="http://schemas.microsoft.com/office/drawing/2014/main" id="{EFF0B3DD-FEBF-41CB-97FE-76C2D7E317D6}"/>
+      <p:pic>
+        <p:nvPicPr>
+          <p:cNvPr id="14" name="图片 1">
+            <a:extLst>
+              <a:ext uri="{FF2B5EF4-FFF2-40B4-BE49-F238E27FC236}">
+                <a16:creationId xmlns:a16="http://schemas.microsoft.com/office/drawing/2014/main" id="{F4130D34-576C-4F7A-9021-79D21F13B043}"/>
+              </a:ext>
+            </a:extLst>
+          </p:cNvPr>
+          <p:cNvPicPr>
+            <a:picLocks noChangeAspect="1"/>
+          </p:cNvPicPr>
+          <p:nvPr/>
+        </p:nvPicPr>
+        <p:blipFill>
+          <a:blip r:embed="rId2"/>
+          <a:stretch>
+            <a:fillRect/>
+          </a:stretch>
+        </p:blipFill>
+        <p:spPr>
+          <a:xfrm>
+            <a:off x="311647" y="842415"/>
+            <a:ext cx="6209524" cy="2533333"/>
+          </a:xfrm>
+          <a:prstGeom prst="rect">
+            <a:avLst/>
+          </a:prstGeom>
+        </p:spPr>
+      </p:pic>
+      <p:pic>
+        <p:nvPicPr>
+          <p:cNvPr id="12" name="Picture 11">
+            <a:extLst>
+              <a:ext uri="{FF2B5EF4-FFF2-40B4-BE49-F238E27FC236}">
+                <a16:creationId xmlns:a16="http://schemas.microsoft.com/office/drawing/2014/main" id="{8A5D0982-D20C-40ED-8519-739F2B028923}"/>
+              </a:ext>
+            </a:extLst>
+          </p:cNvPr>
+          <p:cNvPicPr>
+            <a:picLocks noChangeAspect="1"/>
+          </p:cNvPicPr>
+          <p:nvPr/>
+        </p:nvPicPr>
+        <p:blipFill>
+          <a:blip r:embed="rId3"/>
+          <a:stretch>
+            <a:fillRect/>
+          </a:stretch>
+        </p:blipFill>
+        <p:spPr>
+          <a:xfrm>
+            <a:off x="5811211" y="58643"/>
+            <a:ext cx="6362747" cy="6634211"/>
+          </a:xfrm>
+          <a:prstGeom prst="rect">
+            <a:avLst/>
+          </a:prstGeom>
+        </p:spPr>
+      </p:pic>
+      <p:pic>
+        <p:nvPicPr>
+          <p:cNvPr id="2" name="图片 1">
+            <a:extLst>
+              <a:ext uri="{FF2B5EF4-FFF2-40B4-BE49-F238E27FC236}">
+                <a16:creationId xmlns:a16="http://schemas.microsoft.com/office/drawing/2014/main" id="{1D638218-ADE2-4AD2-AD25-176E53A67F02}"/>
+              </a:ext>
+            </a:extLst>
+          </p:cNvPr>
+          <p:cNvPicPr>
+            <a:picLocks noChangeAspect="1"/>
+          </p:cNvPicPr>
+          <p:nvPr/>
+        </p:nvPicPr>
+        <p:blipFill>
+          <a:blip r:embed="rId2"/>
+          <a:stretch>
+            <a:fillRect/>
+          </a:stretch>
+        </p:blipFill>
+        <p:spPr>
+          <a:xfrm>
+            <a:off x="311648" y="842417"/>
+            <a:ext cx="6209524" cy="2533333"/>
+          </a:xfrm>
+          <a:prstGeom prst="rect">
+            <a:avLst/>
+          </a:prstGeom>
+        </p:spPr>
+      </p:pic>
+      <p:pic>
+        <p:nvPicPr>
+          <p:cNvPr id="3" name="图片 2">
+            <a:extLst>
+              <a:ext uri="{FF2B5EF4-FFF2-40B4-BE49-F238E27FC236}">
+                <a16:creationId xmlns:a16="http://schemas.microsoft.com/office/drawing/2014/main" id="{BA504C82-5F9E-48C3-8986-62A677426930}"/>
+              </a:ext>
+            </a:extLst>
+          </p:cNvPr>
+          <p:cNvPicPr>
+            <a:picLocks noChangeAspect="1"/>
+          </p:cNvPicPr>
+          <p:nvPr/>
+        </p:nvPicPr>
+        <p:blipFill>
+          <a:blip r:embed="rId4"/>
+          <a:stretch>
+            <a:fillRect/>
+          </a:stretch>
+        </p:blipFill>
+        <p:spPr>
+          <a:xfrm>
+            <a:off x="291716" y="3649200"/>
+            <a:ext cx="5239019" cy="1847945"/>
+          </a:xfrm>
+          <a:prstGeom prst="rect">
+            <a:avLst/>
+          </a:prstGeom>
+        </p:spPr>
+      </p:pic>
+      <p:sp>
+        <p:nvSpPr>
+          <p:cNvPr id="4" name="矩形 3">
+            <a:extLst>
+              <a:ext uri="{FF2B5EF4-FFF2-40B4-BE49-F238E27FC236}">
+                <a16:creationId xmlns:a16="http://schemas.microsoft.com/office/drawing/2014/main" id="{8A3FAE2A-727D-45E3-B4D5-53945535E49C}"/>
               </a:ext>
             </a:extLst>
           </p:cNvPr>
@@ -4754,8 +5090,8 @@
         </p:nvSpPr>
         <p:spPr>
           <a:xfrm>
-            <a:off x="0" y="0"/>
-            <a:ext cx="1911101" cy="584775"/>
+            <a:off x="1685892" y="3963314"/>
+            <a:ext cx="2751074" cy="261610"/>
           </a:xfrm>
           <a:prstGeom prst="rect">
             <a:avLst/>
@@ -4768,17 +5104,638 @@
           <a:lstStyle/>
           <a:p>
             <a:r>
+              <a:rPr lang="zh-CN" altLang="en-US" sz="1100" dirty="0">
+                <a:solidFill>
+                  <a:srgbClr val="FF0000"/>
+                </a:solidFill>
+                <a:latin typeface="-apple-system"/>
+              </a:rPr>
+              <a:t>找到大于等于</a:t>
+            </a:r>
+            <a:r>
+              <a:rPr lang="en-US" altLang="zh-CN" sz="1100" dirty="0" err="1">
+                <a:solidFill>
+                  <a:srgbClr val="FF0000"/>
+                </a:solidFill>
+                <a:latin typeface="-apple-system"/>
+              </a:rPr>
+              <a:t>initialCapacity</a:t>
+            </a:r>
+            <a:r>
+              <a:rPr lang="zh-CN" altLang="en-US" sz="1100" dirty="0">
+                <a:solidFill>
+                  <a:srgbClr val="FF0000"/>
+                </a:solidFill>
+                <a:latin typeface="-apple-system"/>
+              </a:rPr>
+              <a:t>的最小的</a:t>
+            </a:r>
+            <a:r>
+              <a:rPr lang="en-US" altLang="zh-CN" sz="1100" dirty="0">
+                <a:solidFill>
+                  <a:srgbClr val="FF0000"/>
+                </a:solidFill>
+                <a:latin typeface="-apple-system"/>
+              </a:rPr>
+              <a:t>2</a:t>
+            </a:r>
+            <a:r>
+              <a:rPr lang="zh-CN" altLang="en-US" sz="1100" dirty="0">
+                <a:solidFill>
+                  <a:srgbClr val="FF0000"/>
+                </a:solidFill>
+                <a:latin typeface="-apple-system"/>
+              </a:rPr>
+              <a:t>的幂</a:t>
+            </a:r>
+            <a:endParaRPr lang="zh-CN" altLang="en-US" sz="1100" dirty="0">
+              <a:solidFill>
+                <a:srgbClr val="FF0000"/>
+              </a:solidFill>
+            </a:endParaRPr>
+          </a:p>
+        </p:txBody>
+      </p:sp>
+      <p:sp>
+        <p:nvSpPr>
+          <p:cNvPr id="5" name="矩形 4">
+            <a:extLst>
+              <a:ext uri="{FF2B5EF4-FFF2-40B4-BE49-F238E27FC236}">
+                <a16:creationId xmlns:a16="http://schemas.microsoft.com/office/drawing/2014/main" id="{A56A558E-151A-4372-994F-DEAD1A4F127A}"/>
+              </a:ext>
+            </a:extLst>
+          </p:cNvPr>
+          <p:cNvSpPr/>
+          <p:nvPr/>
+        </p:nvSpPr>
+        <p:spPr>
+          <a:xfrm>
+            <a:off x="0" y="0"/>
+            <a:ext cx="1864613" cy="584775"/>
+          </a:xfrm>
+          <a:prstGeom prst="rect">
+            <a:avLst/>
+          </a:prstGeom>
+        </p:spPr>
+        <p:txBody>
+          <a:bodyPr wrap="none">
+            <a:spAutoFit/>
+          </a:bodyPr>
+          <a:lstStyle/>
+          <a:p>
+            <a:r>
               <a:rPr lang="en-US" altLang="zh-CN" sz="3200"/>
-              <a:t>LinkedList</a:t>
+              <a:t>HashMap</a:t>
             </a:r>
             <a:endParaRPr lang="zh-CN" altLang="en-US" sz="3200"/>
+          </a:p>
+        </p:txBody>
+      </p:sp>
+      <p:cxnSp>
+        <p:nvCxnSpPr>
+          <p:cNvPr id="7" name="直接箭头连接符 6">
+            <a:extLst>
+              <a:ext uri="{FF2B5EF4-FFF2-40B4-BE49-F238E27FC236}">
+                <a16:creationId xmlns:a16="http://schemas.microsoft.com/office/drawing/2014/main" id="{45615441-D71E-42F9-BCBE-834C64F42E3F}"/>
+              </a:ext>
+            </a:extLst>
+          </p:cNvPr>
+          <p:cNvCxnSpPr/>
+          <p:nvPr/>
+        </p:nvCxnSpPr>
+        <p:spPr>
+          <a:xfrm flipH="1">
+            <a:off x="1240403" y="421419"/>
+            <a:ext cx="1260282" cy="608275"/>
+          </a:xfrm>
+          <a:prstGeom prst="straightConnector1">
+            <a:avLst/>
+          </a:prstGeom>
+          <a:ln>
+            <a:tailEnd type="triangle"/>
+          </a:ln>
+        </p:spPr>
+        <p:style>
+          <a:lnRef idx="1">
+            <a:schemeClr val="accent1"/>
+          </a:lnRef>
+          <a:fillRef idx="0">
+            <a:schemeClr val="accent1"/>
+          </a:fillRef>
+          <a:effectRef idx="0">
+            <a:schemeClr val="accent1"/>
+          </a:effectRef>
+          <a:fontRef idx="minor">
+            <a:schemeClr val="tx1"/>
+          </a:fontRef>
+        </p:style>
+      </p:cxnSp>
+      <p:sp>
+        <p:nvSpPr>
+          <p:cNvPr id="8" name="文本框 7">
+            <a:extLst>
+              <a:ext uri="{FF2B5EF4-FFF2-40B4-BE49-F238E27FC236}">
+                <a16:creationId xmlns:a16="http://schemas.microsoft.com/office/drawing/2014/main" id="{CEA168E1-BFB3-41CD-BFF5-2EE638AF794F}"/>
+              </a:ext>
+            </a:extLst>
+          </p:cNvPr>
+          <p:cNvSpPr txBox="1"/>
+          <p:nvPr/>
+        </p:nvSpPr>
+        <p:spPr>
+          <a:xfrm>
+            <a:off x="2454974" y="262376"/>
+            <a:ext cx="676788" cy="369332"/>
+          </a:xfrm>
+          <a:prstGeom prst="rect">
+            <a:avLst/>
+          </a:prstGeom>
+          <a:noFill/>
+        </p:spPr>
+        <p:txBody>
+          <a:bodyPr wrap="none" rtlCol="0">
+            <a:spAutoFit/>
+          </a:bodyPr>
+          <a:lstStyle/>
+          <a:p>
+            <a:r>
+              <a:rPr lang="en-US" altLang="zh-CN">
+                <a:solidFill>
+                  <a:srgbClr val="FF0000"/>
+                </a:solidFill>
+              </a:rPr>
+              <a:t>table</a:t>
+            </a:r>
+            <a:endParaRPr lang="zh-CN" altLang="en-US">
+              <a:solidFill>
+                <a:srgbClr val="FF0000"/>
+              </a:solidFill>
+            </a:endParaRPr>
+          </a:p>
+        </p:txBody>
+      </p:sp>
+      <p:cxnSp>
+        <p:nvCxnSpPr>
+          <p:cNvPr id="10" name="直接箭头连接符 9">
+            <a:extLst>
+              <a:ext uri="{FF2B5EF4-FFF2-40B4-BE49-F238E27FC236}">
+                <a16:creationId xmlns:a16="http://schemas.microsoft.com/office/drawing/2014/main" id="{CBFD6EC9-0FB8-43A9-8B79-E85A26123A71}"/>
+              </a:ext>
+            </a:extLst>
+          </p:cNvPr>
+          <p:cNvCxnSpPr>
+            <a:cxnSpLocks/>
+            <a:stCxn id="11" idx="0"/>
+          </p:cNvCxnSpPr>
+          <p:nvPr/>
+        </p:nvCxnSpPr>
+        <p:spPr>
+          <a:xfrm flipH="1" flipV="1">
+            <a:off x="932308" y="2079267"/>
+            <a:ext cx="348010" cy="674074"/>
+          </a:xfrm>
+          <a:prstGeom prst="straightConnector1">
+            <a:avLst/>
+          </a:prstGeom>
+          <a:ln>
+            <a:tailEnd type="triangle"/>
+          </a:ln>
+        </p:spPr>
+        <p:style>
+          <a:lnRef idx="1">
+            <a:schemeClr val="accent1"/>
+          </a:lnRef>
+          <a:fillRef idx="0">
+            <a:schemeClr val="accent1"/>
+          </a:fillRef>
+          <a:effectRef idx="0">
+            <a:schemeClr val="accent1"/>
+          </a:effectRef>
+          <a:fontRef idx="minor">
+            <a:schemeClr val="tx1"/>
+          </a:fontRef>
+        </p:style>
+      </p:cxnSp>
+      <p:sp>
+        <p:nvSpPr>
+          <p:cNvPr id="11" name="文本框 10">
+            <a:extLst>
+              <a:ext uri="{FF2B5EF4-FFF2-40B4-BE49-F238E27FC236}">
+                <a16:creationId xmlns:a16="http://schemas.microsoft.com/office/drawing/2014/main" id="{86F08652-CE8E-4229-ABEF-F8328B3ED002}"/>
+              </a:ext>
+            </a:extLst>
+          </p:cNvPr>
+          <p:cNvSpPr txBox="1"/>
+          <p:nvPr/>
+        </p:nvSpPr>
+        <p:spPr>
+          <a:xfrm>
+            <a:off x="932306" y="2753341"/>
+            <a:ext cx="696024" cy="369332"/>
+          </a:xfrm>
+          <a:prstGeom prst="rect">
+            <a:avLst/>
+          </a:prstGeom>
+          <a:noFill/>
+        </p:spPr>
+        <p:txBody>
+          <a:bodyPr wrap="none" rtlCol="0">
+            <a:spAutoFit/>
+          </a:bodyPr>
+          <a:lstStyle/>
+          <a:p>
+            <a:r>
+              <a:rPr lang="en-US" altLang="zh-CN" dirty="0">
+                <a:solidFill>
+                  <a:srgbClr val="FF0000"/>
+                </a:solidFill>
+              </a:rPr>
+              <a:t>node</a:t>
+            </a:r>
+            <a:endParaRPr lang="zh-CN" altLang="en-US" dirty="0">
+              <a:solidFill>
+                <a:srgbClr val="FF0000"/>
+              </a:solidFill>
+            </a:endParaRPr>
+          </a:p>
+        </p:txBody>
+      </p:sp>
+      <p:sp>
+        <p:nvSpPr>
+          <p:cNvPr id="6" name="Rectangle 1">
+            <a:extLst>
+              <a:ext uri="{FF2B5EF4-FFF2-40B4-BE49-F238E27FC236}">
+                <a16:creationId xmlns:a16="http://schemas.microsoft.com/office/drawing/2014/main" id="{F3B81E4C-EF02-4349-B146-868B06C4B76D}"/>
+              </a:ext>
+            </a:extLst>
+          </p:cNvPr>
+          <p:cNvSpPr>
+            <a:spLocks noChangeArrowheads="1"/>
+          </p:cNvSpPr>
+          <p:nvPr/>
+        </p:nvSpPr>
+        <p:spPr bwMode="auto">
+          <a:xfrm>
+            <a:off x="540206" y="5497145"/>
+            <a:ext cx="4976553" cy="738664"/>
+          </a:xfrm>
+          <a:prstGeom prst="rect">
+            <a:avLst/>
+          </a:prstGeom>
+          <a:solidFill>
+            <a:srgbClr val="FFFFFF"/>
+          </a:solidFill>
+          <a:ln>
+            <a:noFill/>
+          </a:ln>
+          <a:effectLst/>
+          <a:extLst>
+            <a:ext uri="{91240B29-F687-4F45-9708-019B960494DF}">
+              <a14:hiddenLine xmlns:a14="http://schemas.microsoft.com/office/drawing/2010/main" w="9525">
+                <a:solidFill>
+                  <a:schemeClr val="tx1"/>
+                </a:solidFill>
+                <a:miter lim="800000"/>
+                <a:headEnd/>
+                <a:tailEnd/>
+              </a14:hiddenLine>
+            </a:ext>
+            <a:ext uri="{AF507438-7753-43E0-B8FC-AC1667EBCBE1}">
+              <a14:hiddenEffects xmlns:a14="http://schemas.microsoft.com/office/drawing/2010/main">
+                <a:effectLst>
+                  <a:outerShdw dist="35921" dir="2700000" algn="ctr" rotWithShape="0">
+                    <a:schemeClr val="bg2"/>
+                  </a:outerShdw>
+                </a:effectLst>
+              </a14:hiddenEffects>
+            </a:ext>
+          </a:extLst>
+        </p:spPr>
+        <p:txBody>
+          <a:bodyPr vert="horz" wrap="square" lIns="91440" tIns="45720" rIns="91440" bIns="45720" numCol="1" anchor="ctr" anchorCtr="0" compatLnSpc="1">
+            <a:prstTxWarp prst="textNoShape">
+              <a:avLst/>
+            </a:prstTxWarp>
+            <a:spAutoFit/>
+          </a:bodyPr>
+          <a:lstStyle/>
+          <a:p>
+            <a:pPr marL="0" marR="0" lvl="0" indent="0" algn="l" defTabSz="914400" rtl="0" eaLnBrk="0" fontAlgn="base" latinLnBrk="0" hangingPunct="0">
+              <a:lnSpc>
+                <a:spcPct val="100000"/>
+              </a:lnSpc>
+              <a:spcBef>
+                <a:spcPct val="0"/>
+              </a:spcBef>
+              <a:spcAft>
+                <a:spcPct val="0"/>
+              </a:spcAft>
+              <a:buClrTx/>
+              <a:buSzTx/>
+              <a:buFontTx/>
+              <a:buNone/>
+              <a:tabLst/>
+            </a:pPr>
+            <a:r>
+              <a:rPr kumimoji="0" lang="zh-CN" altLang="zh-CN" sz="1050" b="1" i="0" u="none" strike="noStrike" cap="none" normalizeH="0" baseline="0">
+                <a:ln>
+                  <a:noFill/>
+                </a:ln>
+                <a:solidFill>
+                  <a:srgbClr val="000080"/>
+                </a:solidFill>
+                <a:effectLst/>
+                <a:latin typeface="宋体" panose="02010600030101010101" pitchFamily="2" charset="-122"/>
+                <a:ea typeface="宋体" panose="02010600030101010101" pitchFamily="2" charset="-122"/>
+              </a:rPr>
+              <a:t>static final int </a:t>
+            </a:r>
+            <a:r>
+              <a:rPr kumimoji="0" lang="zh-CN" altLang="zh-CN" sz="1050" b="0" i="0" u="none" strike="noStrike" cap="none" normalizeH="0" baseline="0">
+                <a:ln>
+                  <a:noFill/>
+                </a:ln>
+                <a:solidFill>
+                  <a:srgbClr val="000000"/>
+                </a:solidFill>
+                <a:effectLst/>
+                <a:latin typeface="宋体" panose="02010600030101010101" pitchFamily="2" charset="-122"/>
+                <a:ea typeface="宋体" panose="02010600030101010101" pitchFamily="2" charset="-122"/>
+              </a:rPr>
+              <a:t>hash(Object key) {</a:t>
+            </a:r>
+            <a:br>
+              <a:rPr kumimoji="0" lang="zh-CN" altLang="zh-CN" sz="1050" b="0" i="0" u="none" strike="noStrike" cap="none" normalizeH="0" baseline="0">
+                <a:ln>
+                  <a:noFill/>
+                </a:ln>
+                <a:solidFill>
+                  <a:srgbClr val="000000"/>
+                </a:solidFill>
+                <a:effectLst/>
+                <a:latin typeface="宋体" panose="02010600030101010101" pitchFamily="2" charset="-122"/>
+                <a:ea typeface="宋体" panose="02010600030101010101" pitchFamily="2" charset="-122"/>
+              </a:rPr>
+            </a:br>
+            <a:r>
+              <a:rPr kumimoji="0" lang="zh-CN" altLang="zh-CN" sz="1050" b="0" i="0" u="none" strike="noStrike" cap="none" normalizeH="0" baseline="0">
+                <a:ln>
+                  <a:noFill/>
+                </a:ln>
+                <a:solidFill>
+                  <a:srgbClr val="000000"/>
+                </a:solidFill>
+                <a:effectLst/>
+                <a:latin typeface="宋体" panose="02010600030101010101" pitchFamily="2" charset="-122"/>
+                <a:ea typeface="宋体" panose="02010600030101010101" pitchFamily="2" charset="-122"/>
+              </a:rPr>
+              <a:t>    </a:t>
+            </a:r>
+            <a:r>
+              <a:rPr kumimoji="0" lang="zh-CN" altLang="zh-CN" sz="1050" b="1" i="0" u="none" strike="noStrike" cap="none" normalizeH="0" baseline="0">
+                <a:ln>
+                  <a:noFill/>
+                </a:ln>
+                <a:solidFill>
+                  <a:srgbClr val="000080"/>
+                </a:solidFill>
+                <a:effectLst/>
+                <a:latin typeface="宋体" panose="02010600030101010101" pitchFamily="2" charset="-122"/>
+                <a:ea typeface="宋体" panose="02010600030101010101" pitchFamily="2" charset="-122"/>
+              </a:rPr>
+              <a:t>int </a:t>
+            </a:r>
+            <a:r>
+              <a:rPr kumimoji="0" lang="zh-CN" altLang="zh-CN" sz="1050" b="0" i="0" u="none" strike="noStrike" cap="none" normalizeH="0" baseline="0">
+                <a:ln>
+                  <a:noFill/>
+                </a:ln>
+                <a:solidFill>
+                  <a:srgbClr val="000000"/>
+                </a:solidFill>
+                <a:effectLst/>
+                <a:latin typeface="宋体" panose="02010600030101010101" pitchFamily="2" charset="-122"/>
+                <a:ea typeface="宋体" panose="02010600030101010101" pitchFamily="2" charset="-122"/>
+              </a:rPr>
+              <a:t>h;</a:t>
+            </a:r>
+            <a:br>
+              <a:rPr kumimoji="0" lang="zh-CN" altLang="zh-CN" sz="1050" b="0" i="0" u="none" strike="noStrike" cap="none" normalizeH="0" baseline="0">
+                <a:ln>
+                  <a:noFill/>
+                </a:ln>
+                <a:solidFill>
+                  <a:srgbClr val="000000"/>
+                </a:solidFill>
+                <a:effectLst/>
+                <a:latin typeface="宋体" panose="02010600030101010101" pitchFamily="2" charset="-122"/>
+                <a:ea typeface="宋体" panose="02010600030101010101" pitchFamily="2" charset="-122"/>
+              </a:rPr>
+            </a:br>
+            <a:r>
+              <a:rPr kumimoji="0" lang="zh-CN" altLang="zh-CN" sz="1050" b="0" i="0" u="none" strike="noStrike" cap="none" normalizeH="0" baseline="0">
+                <a:ln>
+                  <a:noFill/>
+                </a:ln>
+                <a:solidFill>
+                  <a:srgbClr val="000000"/>
+                </a:solidFill>
+                <a:effectLst/>
+                <a:latin typeface="宋体" panose="02010600030101010101" pitchFamily="2" charset="-122"/>
+                <a:ea typeface="宋体" panose="02010600030101010101" pitchFamily="2" charset="-122"/>
+              </a:rPr>
+              <a:t>    </a:t>
+            </a:r>
+            <a:r>
+              <a:rPr kumimoji="0" lang="zh-CN" altLang="zh-CN" sz="1050" b="1" i="0" u="none" strike="noStrike" cap="none" normalizeH="0" baseline="0">
+                <a:ln>
+                  <a:noFill/>
+                </a:ln>
+                <a:solidFill>
+                  <a:srgbClr val="000080"/>
+                </a:solidFill>
+                <a:effectLst/>
+                <a:latin typeface="宋体" panose="02010600030101010101" pitchFamily="2" charset="-122"/>
+                <a:ea typeface="宋体" panose="02010600030101010101" pitchFamily="2" charset="-122"/>
+              </a:rPr>
+              <a:t>return </a:t>
+            </a:r>
+            <a:r>
+              <a:rPr kumimoji="0" lang="zh-CN" altLang="zh-CN" sz="1050" b="0" i="0" u="none" strike="noStrike" cap="none" normalizeH="0" baseline="0">
+                <a:ln>
+                  <a:noFill/>
+                </a:ln>
+                <a:solidFill>
+                  <a:srgbClr val="000000"/>
+                </a:solidFill>
+                <a:effectLst/>
+                <a:latin typeface="宋体" panose="02010600030101010101" pitchFamily="2" charset="-122"/>
+                <a:ea typeface="宋体" panose="02010600030101010101" pitchFamily="2" charset="-122"/>
+              </a:rPr>
+              <a:t>(key == </a:t>
+            </a:r>
+            <a:r>
+              <a:rPr kumimoji="0" lang="zh-CN" altLang="zh-CN" sz="1050" b="1" i="0" u="none" strike="noStrike" cap="none" normalizeH="0" baseline="0">
+                <a:ln>
+                  <a:noFill/>
+                </a:ln>
+                <a:solidFill>
+                  <a:srgbClr val="000080"/>
+                </a:solidFill>
+                <a:effectLst/>
+                <a:latin typeface="宋体" panose="02010600030101010101" pitchFamily="2" charset="-122"/>
+                <a:ea typeface="宋体" panose="02010600030101010101" pitchFamily="2" charset="-122"/>
+              </a:rPr>
+              <a:t>null</a:t>
+            </a:r>
+            <a:r>
+              <a:rPr kumimoji="0" lang="zh-CN" altLang="zh-CN" sz="1050" b="0" i="0" u="none" strike="noStrike" cap="none" normalizeH="0" baseline="0">
+                <a:ln>
+                  <a:noFill/>
+                </a:ln>
+                <a:solidFill>
+                  <a:srgbClr val="000000"/>
+                </a:solidFill>
+                <a:effectLst/>
+                <a:latin typeface="宋体" panose="02010600030101010101" pitchFamily="2" charset="-122"/>
+                <a:ea typeface="宋体" panose="02010600030101010101" pitchFamily="2" charset="-122"/>
+              </a:rPr>
+              <a:t>) ? </a:t>
+            </a:r>
+            <a:r>
+              <a:rPr kumimoji="0" lang="zh-CN" altLang="zh-CN" sz="1050" b="0" i="0" u="none" strike="noStrike" cap="none" normalizeH="0" baseline="0">
+                <a:ln>
+                  <a:noFill/>
+                </a:ln>
+                <a:solidFill>
+                  <a:srgbClr val="0000FF"/>
+                </a:solidFill>
+                <a:effectLst/>
+                <a:latin typeface="宋体" panose="02010600030101010101" pitchFamily="2" charset="-122"/>
+                <a:ea typeface="宋体" panose="02010600030101010101" pitchFamily="2" charset="-122"/>
+              </a:rPr>
+              <a:t>0 </a:t>
+            </a:r>
+            <a:r>
+              <a:rPr kumimoji="0" lang="zh-CN" altLang="zh-CN" sz="1050" b="0" i="0" u="none" strike="noStrike" cap="none" normalizeH="0" baseline="0">
+                <a:ln>
+                  <a:noFill/>
+                </a:ln>
+                <a:solidFill>
+                  <a:srgbClr val="000000"/>
+                </a:solidFill>
+                <a:effectLst/>
+                <a:latin typeface="宋体" panose="02010600030101010101" pitchFamily="2" charset="-122"/>
+                <a:ea typeface="宋体" panose="02010600030101010101" pitchFamily="2" charset="-122"/>
+              </a:rPr>
+              <a:t>: (h = key.hashCode()) ^ (h &gt;&gt;&gt; </a:t>
+            </a:r>
+            <a:r>
+              <a:rPr kumimoji="0" lang="zh-CN" altLang="zh-CN" sz="1050" b="0" i="0" u="none" strike="noStrike" cap="none" normalizeH="0" baseline="0">
+                <a:ln>
+                  <a:noFill/>
+                </a:ln>
+                <a:solidFill>
+                  <a:srgbClr val="0000FF"/>
+                </a:solidFill>
+                <a:effectLst/>
+                <a:latin typeface="宋体" panose="02010600030101010101" pitchFamily="2" charset="-122"/>
+                <a:ea typeface="宋体" panose="02010600030101010101" pitchFamily="2" charset="-122"/>
+              </a:rPr>
+              <a:t>16</a:t>
+            </a:r>
+            <a:r>
+              <a:rPr kumimoji="0" lang="zh-CN" altLang="zh-CN" sz="1050" b="0" i="0" u="none" strike="noStrike" cap="none" normalizeH="0" baseline="0">
+                <a:ln>
+                  <a:noFill/>
+                </a:ln>
+                <a:solidFill>
+                  <a:srgbClr val="000000"/>
+                </a:solidFill>
+                <a:effectLst/>
+                <a:latin typeface="宋体" panose="02010600030101010101" pitchFamily="2" charset="-122"/>
+                <a:ea typeface="宋体" panose="02010600030101010101" pitchFamily="2" charset="-122"/>
+              </a:rPr>
+              <a:t>);</a:t>
+            </a:r>
+            <a:br>
+              <a:rPr kumimoji="0" lang="zh-CN" altLang="zh-CN" sz="1050" b="0" i="0" u="none" strike="noStrike" cap="none" normalizeH="0" baseline="0">
+                <a:ln>
+                  <a:noFill/>
+                </a:ln>
+                <a:solidFill>
+                  <a:srgbClr val="000000"/>
+                </a:solidFill>
+                <a:effectLst/>
+                <a:latin typeface="宋体" panose="02010600030101010101" pitchFamily="2" charset="-122"/>
+                <a:ea typeface="宋体" panose="02010600030101010101" pitchFamily="2" charset="-122"/>
+              </a:rPr>
+            </a:br>
+            <a:r>
+              <a:rPr kumimoji="0" lang="zh-CN" altLang="zh-CN" sz="1050" b="0" i="0" u="none" strike="noStrike" cap="none" normalizeH="0" baseline="0">
+                <a:ln>
+                  <a:noFill/>
+                </a:ln>
+                <a:solidFill>
+                  <a:srgbClr val="000000"/>
+                </a:solidFill>
+                <a:effectLst/>
+                <a:latin typeface="宋体" panose="02010600030101010101" pitchFamily="2" charset="-122"/>
+                <a:ea typeface="宋体" panose="02010600030101010101" pitchFamily="2" charset="-122"/>
+              </a:rPr>
+              <a:t>}</a:t>
+            </a:r>
+            <a:endParaRPr kumimoji="0" lang="zh-CN" altLang="zh-CN" sz="4400" b="0" i="0" u="none" strike="noStrike" cap="none" normalizeH="0" baseline="0" dirty="0">
+              <a:ln>
+                <a:noFill/>
+              </a:ln>
+              <a:solidFill>
+                <a:schemeClr val="tx1"/>
+              </a:solidFill>
+              <a:effectLst/>
+              <a:latin typeface="Arial" panose="020B0604020202020204" pitchFamily="34" charset="0"/>
+            </a:endParaRPr>
+          </a:p>
+        </p:txBody>
+      </p:sp>
+      <p:sp>
+        <p:nvSpPr>
+          <p:cNvPr id="15" name="Rectangle 14">
+            <a:extLst>
+              <a:ext uri="{FF2B5EF4-FFF2-40B4-BE49-F238E27FC236}">
+                <a16:creationId xmlns:a16="http://schemas.microsoft.com/office/drawing/2014/main" id="{F7936145-19B8-43F1-861E-7ABDFCB52FFF}"/>
+              </a:ext>
+            </a:extLst>
+          </p:cNvPr>
+          <p:cNvSpPr/>
+          <p:nvPr/>
+        </p:nvSpPr>
+        <p:spPr>
+          <a:xfrm>
+            <a:off x="418519" y="6283907"/>
+            <a:ext cx="5426486" cy="369332"/>
+          </a:xfrm>
+          <a:prstGeom prst="rect">
+            <a:avLst/>
+          </a:prstGeom>
+        </p:spPr>
+        <p:txBody>
+          <a:bodyPr wrap="none">
+            <a:spAutoFit/>
+          </a:bodyPr>
+          <a:lstStyle/>
+          <a:p>
+            <a:r>
+              <a:rPr lang="zh-CN" altLang="en-US" dirty="0"/>
+              <a:t>https://www.cnblogs.com/liujinhong/p/6576543.html</a:t>
+            </a:r>
           </a:p>
         </p:txBody>
       </p:sp>
     </p:spTree>
     <p:extLst>
       <p:ext uri="{BB962C8B-B14F-4D97-AF65-F5344CB8AC3E}">
-        <p14:creationId xmlns:p14="http://schemas.microsoft.com/office/powerpoint/2010/main" val="488242476"/>
+        <p14:creationId xmlns:p14="http://schemas.microsoft.com/office/powerpoint/2010/main" val="3158561063"/>
       </p:ext>
     </p:extLst>
   </p:cSld>
@@ -4807,10 +5764,10 @@
       </p:grpSpPr>
       <p:sp>
         <p:nvSpPr>
-          <p:cNvPr id="2" name="矩形 1">
-            <a:extLst>
-              <a:ext uri="{FF2B5EF4-FFF2-40B4-BE49-F238E27FC236}">
-                <a16:creationId xmlns:a16="http://schemas.microsoft.com/office/drawing/2014/main" id="{90AEC7BA-5FD7-4DED-8301-34722EF34E3A}"/>
+          <p:cNvPr id="3" name="矩形 2">
+            <a:extLst>
+              <a:ext uri="{FF2B5EF4-FFF2-40B4-BE49-F238E27FC236}">
+                <a16:creationId xmlns:a16="http://schemas.microsoft.com/office/drawing/2014/main" id="{DE9DD378-45A5-4001-A3B8-50837D02A6DF}"/>
               </a:ext>
             </a:extLst>
           </p:cNvPr>
@@ -4820,7 +5777,7 @@
         <p:spPr>
           <a:xfrm>
             <a:off x="0" y="0"/>
-            <a:ext cx="1911101" cy="584775"/>
+            <a:ext cx="1864613" cy="584775"/>
           </a:xfrm>
           <a:prstGeom prst="rect">
             <a:avLst/>
@@ -4834,9 +5791,315 @@
           <a:p>
             <a:r>
               <a:rPr lang="en-US" altLang="zh-CN" sz="3200"/>
-              <a:t>LinkedList</a:t>
+              <a:t>HashMap</a:t>
             </a:r>
             <a:endParaRPr lang="zh-CN" altLang="en-US" sz="3200"/>
+          </a:p>
+        </p:txBody>
+      </p:sp>
+      <p:pic>
+        <p:nvPicPr>
+          <p:cNvPr id="4" name="图片 3">
+            <a:extLst>
+              <a:ext uri="{FF2B5EF4-FFF2-40B4-BE49-F238E27FC236}">
+                <a16:creationId xmlns:a16="http://schemas.microsoft.com/office/drawing/2014/main" id="{11B5C592-F94A-4DCC-8C7F-82B4A2592932}"/>
+              </a:ext>
+            </a:extLst>
+          </p:cNvPr>
+          <p:cNvPicPr>
+            <a:picLocks noChangeAspect="1"/>
+          </p:cNvPicPr>
+          <p:nvPr/>
+        </p:nvPicPr>
+        <p:blipFill>
+          <a:blip r:embed="rId2"/>
+          <a:stretch>
+            <a:fillRect/>
+          </a:stretch>
+        </p:blipFill>
+        <p:spPr>
+          <a:xfrm>
+            <a:off x="850330" y="749654"/>
+            <a:ext cx="5458163" cy="1128433"/>
+          </a:xfrm>
+          <a:prstGeom prst="rect">
+            <a:avLst/>
+          </a:prstGeom>
+        </p:spPr>
+      </p:pic>
+      <p:pic>
+        <p:nvPicPr>
+          <p:cNvPr id="5" name="图片 4">
+            <a:extLst>
+              <a:ext uri="{FF2B5EF4-FFF2-40B4-BE49-F238E27FC236}">
+                <a16:creationId xmlns:a16="http://schemas.microsoft.com/office/drawing/2014/main" id="{D75AA593-31A2-4DA7-BAB4-56D218C8DE9B}"/>
+              </a:ext>
+            </a:extLst>
+          </p:cNvPr>
+          <p:cNvPicPr>
+            <a:picLocks noChangeAspect="1"/>
+          </p:cNvPicPr>
+          <p:nvPr/>
+        </p:nvPicPr>
+        <p:blipFill>
+          <a:blip r:embed="rId3"/>
+          <a:stretch>
+            <a:fillRect/>
+          </a:stretch>
+        </p:blipFill>
+        <p:spPr>
+          <a:xfrm>
+            <a:off x="850330" y="2832280"/>
+            <a:ext cx="3762478" cy="1128433"/>
+          </a:xfrm>
+          <a:prstGeom prst="rect">
+            <a:avLst/>
+          </a:prstGeom>
+        </p:spPr>
+      </p:pic>
+      <p:pic>
+        <p:nvPicPr>
+          <p:cNvPr id="6" name="图片 5">
+            <a:extLst>
+              <a:ext uri="{FF2B5EF4-FFF2-40B4-BE49-F238E27FC236}">
+                <a16:creationId xmlns:a16="http://schemas.microsoft.com/office/drawing/2014/main" id="{9CD33F91-7DBB-4FCC-98DD-7050367D98F2}"/>
+              </a:ext>
+            </a:extLst>
+          </p:cNvPr>
+          <p:cNvPicPr>
+            <a:picLocks noChangeAspect="1"/>
+          </p:cNvPicPr>
+          <p:nvPr/>
+        </p:nvPicPr>
+        <p:blipFill>
+          <a:blip r:embed="rId4"/>
+          <a:stretch>
+            <a:fillRect/>
+          </a:stretch>
+        </p:blipFill>
+        <p:spPr>
+          <a:xfrm>
+            <a:off x="6793984" y="704894"/>
+            <a:ext cx="4114286" cy="3600000"/>
+          </a:xfrm>
+          <a:prstGeom prst="rect">
+            <a:avLst/>
+          </a:prstGeom>
+        </p:spPr>
+      </p:pic>
+      <p:sp>
+        <p:nvSpPr>
+          <p:cNvPr id="7" name="矩形 6">
+            <a:extLst>
+              <a:ext uri="{FF2B5EF4-FFF2-40B4-BE49-F238E27FC236}">
+                <a16:creationId xmlns:a16="http://schemas.microsoft.com/office/drawing/2014/main" id="{C6007EA4-99C6-4F05-877E-E89C6C3AE256}"/>
+              </a:ext>
+            </a:extLst>
+          </p:cNvPr>
+          <p:cNvSpPr/>
+          <p:nvPr/>
+        </p:nvSpPr>
+        <p:spPr>
+          <a:xfrm>
+            <a:off x="145774" y="4748427"/>
+            <a:ext cx="6314660" cy="646331"/>
+          </a:xfrm>
+          <a:prstGeom prst="rect">
+            <a:avLst/>
+          </a:prstGeom>
+        </p:spPr>
+        <p:txBody>
+          <a:bodyPr wrap="square">
+            <a:spAutoFit/>
+          </a:bodyPr>
+          <a:lstStyle/>
+          <a:p>
+            <a:r>
+              <a:rPr lang="zh-CN" altLang="en-US">
+                <a:solidFill>
+                  <a:srgbClr val="000000"/>
+                </a:solidFill>
+                <a:latin typeface="Verdana" panose="020B0604030504040204" pitchFamily="34" charset="0"/>
+              </a:rPr>
+              <a:t>如果移动的位数超过了该类型的最大位数，那么编译器会对移动的位数取模。如对</a:t>
+            </a:r>
+            <a:r>
+              <a:rPr lang="en-US" altLang="zh-CN">
+                <a:solidFill>
+                  <a:srgbClr val="000000"/>
+                </a:solidFill>
+                <a:latin typeface="Verdana" panose="020B0604030504040204" pitchFamily="34" charset="0"/>
+              </a:rPr>
+              <a:t>int</a:t>
+            </a:r>
+            <a:r>
+              <a:rPr lang="zh-CN" altLang="en-US">
+                <a:solidFill>
+                  <a:srgbClr val="000000"/>
+                </a:solidFill>
+                <a:latin typeface="Verdana" panose="020B0604030504040204" pitchFamily="34" charset="0"/>
+              </a:rPr>
+              <a:t>型移动</a:t>
+            </a:r>
+            <a:r>
+              <a:rPr lang="en-US" altLang="zh-CN">
+                <a:solidFill>
+                  <a:srgbClr val="000000"/>
+                </a:solidFill>
+                <a:latin typeface="Verdana" panose="020B0604030504040204" pitchFamily="34" charset="0"/>
+              </a:rPr>
+              <a:t>33</a:t>
+            </a:r>
+            <a:r>
+              <a:rPr lang="zh-CN" altLang="en-US">
+                <a:solidFill>
+                  <a:srgbClr val="000000"/>
+                </a:solidFill>
+                <a:latin typeface="Verdana" panose="020B0604030504040204" pitchFamily="34" charset="0"/>
+              </a:rPr>
+              <a:t>位，实际上只移动了</a:t>
+            </a:r>
+            <a:r>
+              <a:rPr lang="en-US" altLang="zh-CN">
+                <a:solidFill>
+                  <a:srgbClr val="000000"/>
+                </a:solidFill>
+                <a:latin typeface="Verdana" panose="020B0604030504040204" pitchFamily="34" charset="0"/>
+              </a:rPr>
+              <a:t>1</a:t>
+            </a:r>
+            <a:r>
+              <a:rPr lang="zh-CN" altLang="en-US">
+                <a:solidFill>
+                  <a:srgbClr val="000000"/>
+                </a:solidFill>
+                <a:latin typeface="Verdana" panose="020B0604030504040204" pitchFamily="34" charset="0"/>
+              </a:rPr>
+              <a:t>位。</a:t>
+            </a:r>
+            <a:endParaRPr lang="zh-CN" altLang="en-US"/>
+          </a:p>
+        </p:txBody>
+      </p:sp>
+      <p:sp>
+        <p:nvSpPr>
+          <p:cNvPr id="8" name="矩形 7">
+            <a:extLst>
+              <a:ext uri="{FF2B5EF4-FFF2-40B4-BE49-F238E27FC236}">
+                <a16:creationId xmlns:a16="http://schemas.microsoft.com/office/drawing/2014/main" id="{B8F22018-0A85-4270-A4AA-46C72219303D}"/>
+              </a:ext>
+            </a:extLst>
+          </p:cNvPr>
+          <p:cNvSpPr/>
+          <p:nvPr/>
+        </p:nvSpPr>
+        <p:spPr>
+          <a:xfrm>
+            <a:off x="7321826" y="4334715"/>
+            <a:ext cx="1957346" cy="2308324"/>
+          </a:xfrm>
+          <a:prstGeom prst="rect">
+            <a:avLst/>
+          </a:prstGeom>
+        </p:spPr>
+        <p:txBody>
+          <a:bodyPr wrap="square">
+            <a:spAutoFit/>
+          </a:bodyPr>
+          <a:lstStyle/>
+          <a:p>
+            <a:r>
+              <a:rPr lang="zh-CN" altLang="en-US"/>
+              <a:t>100&gt;&gt;32:   100</a:t>
+            </a:r>
+          </a:p>
+          <a:p>
+            <a:r>
+              <a:rPr lang="zh-CN" altLang="en-US"/>
+              <a:t>100&gt;&gt;0:   100</a:t>
+            </a:r>
+          </a:p>
+          <a:p>
+            <a:r>
+              <a:rPr lang="zh-CN" altLang="en-US"/>
+              <a:t>100&gt;&gt;33:   50</a:t>
+            </a:r>
+          </a:p>
+          <a:p>
+            <a:r>
+              <a:rPr lang="zh-CN" altLang="en-US"/>
+              <a:t>100&gt;&gt;1:   50</a:t>
+            </a:r>
+          </a:p>
+          <a:p>
+            <a:r>
+              <a:rPr lang="zh-CN" altLang="en-US"/>
+              <a:t>100&gt;&gt;34:   25</a:t>
+            </a:r>
+          </a:p>
+          <a:p>
+            <a:r>
+              <a:rPr lang="zh-CN" altLang="en-US"/>
+              <a:t>100&gt;&gt;2:   25</a:t>
+            </a:r>
+          </a:p>
+          <a:p>
+            <a:r>
+              <a:rPr lang="zh-CN" altLang="en-US"/>
+              <a:t>100&gt;&gt;35:   12</a:t>
+            </a:r>
+          </a:p>
+          <a:p>
+            <a:r>
+              <a:rPr lang="zh-CN" altLang="en-US"/>
+              <a:t>100&gt;&gt;3:   12</a:t>
+            </a:r>
+          </a:p>
+        </p:txBody>
+      </p:sp>
+      <p:sp>
+        <p:nvSpPr>
+          <p:cNvPr id="9" name="箭头: 右 8">
+            <a:extLst>
+              <a:ext uri="{FF2B5EF4-FFF2-40B4-BE49-F238E27FC236}">
+                <a16:creationId xmlns:a16="http://schemas.microsoft.com/office/drawing/2014/main" id="{AF9B2D61-EE29-4DFA-96C5-0664D2DD9A49}"/>
+              </a:ext>
+            </a:extLst>
+          </p:cNvPr>
+          <p:cNvSpPr/>
+          <p:nvPr/>
+        </p:nvSpPr>
+        <p:spPr>
+          <a:xfrm>
+            <a:off x="6627412" y="4902626"/>
+            <a:ext cx="659958" cy="337931"/>
+          </a:xfrm>
+          <a:prstGeom prst="rightArrow">
+            <a:avLst/>
+          </a:prstGeom>
+        </p:spPr>
+        <p:style>
+          <a:lnRef idx="2">
+            <a:schemeClr val="accent1">
+              <a:shade val="50000"/>
+            </a:schemeClr>
+          </a:lnRef>
+          <a:fillRef idx="1">
+            <a:schemeClr val="accent1"/>
+          </a:fillRef>
+          <a:effectRef idx="0">
+            <a:schemeClr val="accent1"/>
+          </a:effectRef>
+          <a:fontRef idx="minor">
+            <a:schemeClr val="lt1"/>
+          </a:fontRef>
+        </p:style>
+        <p:txBody>
+          <a:bodyPr rtlCol="0" anchor="ctr"/>
+          <a:lstStyle/>
+          <a:p>
+            <a:pPr algn="ctr"/>
+            <a:endParaRPr lang="zh-CN" altLang="en-US"/>
           </a:p>
         </p:txBody>
       </p:sp>
@@ -4870,10 +6133,503 @@
           <a:chExt cx="0" cy="0"/>
         </a:xfrm>
       </p:grpSpPr>
+      <p:pic>
+        <p:nvPicPr>
+          <p:cNvPr id="13" name="图片 12">
+            <a:extLst>
+              <a:ext uri="{FF2B5EF4-FFF2-40B4-BE49-F238E27FC236}">
+                <a16:creationId xmlns:a16="http://schemas.microsoft.com/office/drawing/2014/main" id="{69131F11-8A89-4879-8859-AA1827890F1C}"/>
+              </a:ext>
+            </a:extLst>
+          </p:cNvPr>
+          <p:cNvPicPr>
+            <a:picLocks noChangeAspect="1"/>
+          </p:cNvPicPr>
+          <p:nvPr/>
+        </p:nvPicPr>
+        <p:blipFill>
+          <a:blip r:embed="rId2"/>
+          <a:stretch>
+            <a:fillRect/>
+          </a:stretch>
+        </p:blipFill>
+        <p:spPr>
+          <a:xfrm>
+            <a:off x="6372970" y="4777089"/>
+            <a:ext cx="4099332" cy="1384367"/>
+          </a:xfrm>
+          <a:prstGeom prst="rect">
+            <a:avLst/>
+          </a:prstGeom>
+        </p:spPr>
+      </p:pic>
+      <p:sp>
+        <p:nvSpPr>
+          <p:cNvPr id="4" name="矩形 3">
+            <a:extLst>
+              <a:ext uri="{FF2B5EF4-FFF2-40B4-BE49-F238E27FC236}">
+                <a16:creationId xmlns:a16="http://schemas.microsoft.com/office/drawing/2014/main" id="{AE8A2B54-3F30-41F0-ABB8-0D815726FD82}"/>
+              </a:ext>
+            </a:extLst>
+          </p:cNvPr>
+          <p:cNvSpPr/>
+          <p:nvPr/>
+        </p:nvSpPr>
+        <p:spPr>
+          <a:xfrm>
+            <a:off x="0" y="0"/>
+            <a:ext cx="1864613" cy="584775"/>
+          </a:xfrm>
+          <a:prstGeom prst="rect">
+            <a:avLst/>
+          </a:prstGeom>
+        </p:spPr>
+        <p:txBody>
+          <a:bodyPr wrap="none">
+            <a:spAutoFit/>
+          </a:bodyPr>
+          <a:lstStyle/>
+          <a:p>
+            <a:r>
+              <a:rPr lang="en-US" altLang="zh-CN" sz="3200" dirty="0"/>
+              <a:t>HashMap</a:t>
+            </a:r>
+            <a:endParaRPr lang="zh-CN" altLang="en-US" sz="3200" dirty="0"/>
+          </a:p>
+        </p:txBody>
+      </p:sp>
+      <p:pic>
+        <p:nvPicPr>
+          <p:cNvPr id="6" name="图片 5">
+            <a:extLst>
+              <a:ext uri="{FF2B5EF4-FFF2-40B4-BE49-F238E27FC236}">
+                <a16:creationId xmlns:a16="http://schemas.microsoft.com/office/drawing/2014/main" id="{E3A46FB1-2489-4F34-A991-A0A72082FEBB}"/>
+              </a:ext>
+            </a:extLst>
+          </p:cNvPr>
+          <p:cNvPicPr>
+            <a:picLocks noChangeAspect="1"/>
+          </p:cNvPicPr>
+          <p:nvPr/>
+        </p:nvPicPr>
+        <p:blipFill>
+          <a:blip r:embed="rId3"/>
+          <a:stretch>
+            <a:fillRect/>
+          </a:stretch>
+        </p:blipFill>
+        <p:spPr>
+          <a:xfrm>
+            <a:off x="65423" y="974638"/>
+            <a:ext cx="5024250" cy="599117"/>
+          </a:xfrm>
+          <a:prstGeom prst="rect">
+            <a:avLst/>
+          </a:prstGeom>
+        </p:spPr>
+      </p:pic>
+      <p:pic>
+        <p:nvPicPr>
+          <p:cNvPr id="7" name="图片 6">
+            <a:extLst>
+              <a:ext uri="{FF2B5EF4-FFF2-40B4-BE49-F238E27FC236}">
+                <a16:creationId xmlns:a16="http://schemas.microsoft.com/office/drawing/2014/main" id="{F3E6B8C9-09C7-44EA-8D22-DF87F7FCD483}"/>
+              </a:ext>
+            </a:extLst>
+          </p:cNvPr>
+          <p:cNvPicPr>
+            <a:picLocks noChangeAspect="1"/>
+          </p:cNvPicPr>
+          <p:nvPr/>
+        </p:nvPicPr>
+        <p:blipFill>
+          <a:blip r:embed="rId4"/>
+          <a:stretch>
+            <a:fillRect/>
+          </a:stretch>
+        </p:blipFill>
+        <p:spPr>
+          <a:xfrm>
+            <a:off x="65423" y="1795251"/>
+            <a:ext cx="3534103" cy="761983"/>
+          </a:xfrm>
+          <a:prstGeom prst="rect">
+            <a:avLst/>
+          </a:prstGeom>
+        </p:spPr>
+      </p:pic>
+      <p:pic>
+        <p:nvPicPr>
+          <p:cNvPr id="8" name="图片 7">
+            <a:extLst>
+              <a:ext uri="{FF2B5EF4-FFF2-40B4-BE49-F238E27FC236}">
+                <a16:creationId xmlns:a16="http://schemas.microsoft.com/office/drawing/2014/main" id="{F0B77830-B77C-4C47-A968-B1DFFE8BC45D}"/>
+              </a:ext>
+            </a:extLst>
+          </p:cNvPr>
+          <p:cNvPicPr>
+            <a:picLocks noChangeAspect="1"/>
+          </p:cNvPicPr>
+          <p:nvPr/>
+        </p:nvPicPr>
+        <p:blipFill>
+          <a:blip r:embed="rId5"/>
+          <a:stretch>
+            <a:fillRect/>
+          </a:stretch>
+        </p:blipFill>
+        <p:spPr>
+          <a:xfrm>
+            <a:off x="84092" y="2972470"/>
+            <a:ext cx="4379091" cy="2082367"/>
+          </a:xfrm>
+          <a:prstGeom prst="rect">
+            <a:avLst/>
+          </a:prstGeom>
+        </p:spPr>
+      </p:pic>
+      <p:pic>
+        <p:nvPicPr>
+          <p:cNvPr id="9" name="图片 8">
+            <a:extLst>
+              <a:ext uri="{FF2B5EF4-FFF2-40B4-BE49-F238E27FC236}">
+                <a16:creationId xmlns:a16="http://schemas.microsoft.com/office/drawing/2014/main" id="{CFF1A19B-DB4F-42C8-955D-43BC1C10E355}"/>
+              </a:ext>
+            </a:extLst>
+          </p:cNvPr>
+          <p:cNvPicPr>
+            <a:picLocks noChangeAspect="1"/>
+          </p:cNvPicPr>
+          <p:nvPr/>
+        </p:nvPicPr>
+        <p:blipFill>
+          <a:blip r:embed="rId6"/>
+          <a:stretch>
+            <a:fillRect/>
+          </a:stretch>
+        </p:blipFill>
+        <p:spPr>
+          <a:xfrm>
+            <a:off x="7151078" y="926411"/>
+            <a:ext cx="3105900" cy="657283"/>
+          </a:xfrm>
+          <a:prstGeom prst="rect">
+            <a:avLst/>
+          </a:prstGeom>
+        </p:spPr>
+      </p:pic>
+      <p:sp>
+        <p:nvSpPr>
+          <p:cNvPr id="10" name="矩形 9">
+            <a:extLst>
+              <a:ext uri="{FF2B5EF4-FFF2-40B4-BE49-F238E27FC236}">
+                <a16:creationId xmlns:a16="http://schemas.microsoft.com/office/drawing/2014/main" id="{26472812-F516-4BFF-9A49-CAF487E417F0}"/>
+              </a:ext>
+            </a:extLst>
+          </p:cNvPr>
+          <p:cNvSpPr/>
+          <p:nvPr/>
+        </p:nvSpPr>
+        <p:spPr>
+          <a:xfrm>
+            <a:off x="2970069" y="3722501"/>
+            <a:ext cx="1521570" cy="369332"/>
+          </a:xfrm>
+          <a:prstGeom prst="rect">
+            <a:avLst/>
+          </a:prstGeom>
+        </p:spPr>
+        <p:txBody>
+          <a:bodyPr wrap="none">
+            <a:spAutoFit/>
+          </a:bodyPr>
+          <a:lstStyle/>
+          <a:p>
+            <a:r>
+              <a:rPr lang="en-US" altLang="zh-CN">
+                <a:solidFill>
+                  <a:srgbClr val="4F4F4F"/>
+                </a:solidFill>
+                <a:latin typeface="-apple-system"/>
+              </a:rPr>
+              <a:t>Not a Number</a:t>
+            </a:r>
+            <a:endParaRPr lang="zh-CN" altLang="en-US"/>
+          </a:p>
+        </p:txBody>
+      </p:sp>
+      <p:cxnSp>
+        <p:nvCxnSpPr>
+          <p:cNvPr id="12" name="直接箭头连接符 11">
+            <a:extLst>
+              <a:ext uri="{FF2B5EF4-FFF2-40B4-BE49-F238E27FC236}">
+                <a16:creationId xmlns:a16="http://schemas.microsoft.com/office/drawing/2014/main" id="{1EF3CA87-29D4-4F1C-9BA8-C8125E1848CA}"/>
+              </a:ext>
+            </a:extLst>
+          </p:cNvPr>
+          <p:cNvCxnSpPr>
+            <a:cxnSpLocks/>
+          </p:cNvCxnSpPr>
+          <p:nvPr/>
+        </p:nvCxnSpPr>
+        <p:spPr>
+          <a:xfrm flipH="1">
+            <a:off x="2695492" y="3848665"/>
+            <a:ext cx="303033" cy="197418"/>
+          </a:xfrm>
+          <a:prstGeom prst="straightConnector1">
+            <a:avLst/>
+          </a:prstGeom>
+          <a:ln>
+            <a:tailEnd type="triangle"/>
+          </a:ln>
+        </p:spPr>
+        <p:style>
+          <a:lnRef idx="1">
+            <a:schemeClr val="accent1"/>
+          </a:lnRef>
+          <a:fillRef idx="0">
+            <a:schemeClr val="accent1"/>
+          </a:fillRef>
+          <a:effectRef idx="0">
+            <a:schemeClr val="accent1"/>
+          </a:effectRef>
+          <a:fontRef idx="minor">
+            <a:schemeClr val="tx1"/>
+          </a:fontRef>
+        </p:style>
+      </p:cxnSp>
+      <p:cxnSp>
+        <p:nvCxnSpPr>
+          <p:cNvPr id="15" name="直接箭头连接符 14">
+            <a:extLst>
+              <a:ext uri="{FF2B5EF4-FFF2-40B4-BE49-F238E27FC236}">
+                <a16:creationId xmlns:a16="http://schemas.microsoft.com/office/drawing/2014/main" id="{10D33DDD-0297-4161-929F-3B28878A0A07}"/>
+              </a:ext>
+            </a:extLst>
+          </p:cNvPr>
+          <p:cNvCxnSpPr>
+            <a:cxnSpLocks/>
+            <a:endCxn id="13" idx="1"/>
+          </p:cNvCxnSpPr>
+          <p:nvPr/>
+        </p:nvCxnSpPr>
+        <p:spPr>
+          <a:xfrm>
+            <a:off x="2889194" y="4837424"/>
+            <a:ext cx="3483776" cy="631849"/>
+          </a:xfrm>
+          <a:prstGeom prst="straightConnector1">
+            <a:avLst/>
+          </a:prstGeom>
+          <a:ln>
+            <a:tailEnd type="triangle"/>
+          </a:ln>
+        </p:spPr>
+        <p:style>
+          <a:lnRef idx="1">
+            <a:schemeClr val="accent1"/>
+          </a:lnRef>
+          <a:fillRef idx="0">
+            <a:schemeClr val="accent1"/>
+          </a:fillRef>
+          <a:effectRef idx="0">
+            <a:schemeClr val="accent1"/>
+          </a:effectRef>
+          <a:fontRef idx="minor">
+            <a:schemeClr val="tx1"/>
+          </a:fontRef>
+        </p:style>
+      </p:cxnSp>
     </p:spTree>
     <p:extLst>
       <p:ext uri="{BB962C8B-B14F-4D97-AF65-F5344CB8AC3E}">
-        <p14:creationId xmlns:p14="http://schemas.microsoft.com/office/powerpoint/2010/main" val="276244095"/>
+        <p14:creationId xmlns:p14="http://schemas.microsoft.com/office/powerpoint/2010/main" val="488242476"/>
+      </p:ext>
+    </p:extLst>
+  </p:cSld>
+  <p:clrMapOvr>
+    <a:masterClrMapping/>
+  </p:clrMapOvr>
+</p:sld>
+</file>
+
+<file path=ppt/slides/slide19.xml><?xml version="1.0" encoding="utf-8"?>
+<p:sld xmlns:a="http://schemas.openxmlformats.org/drawingml/2006/main" xmlns:r="http://schemas.openxmlformats.org/officeDocument/2006/relationships" xmlns:p="http://schemas.openxmlformats.org/presentationml/2006/main">
+  <p:cSld>
+    <p:spTree>
+      <p:nvGrpSpPr>
+        <p:cNvPr id="1" name=""/>
+        <p:cNvGrpSpPr/>
+        <p:nvPr/>
+      </p:nvGrpSpPr>
+      <p:grpSpPr>
+        <a:xfrm>
+          <a:off x="0" y="0"/>
+          <a:ext cx="0" cy="0"/>
+          <a:chOff x="0" y="0"/>
+          <a:chExt cx="0" cy="0"/>
+        </a:xfrm>
+      </p:grpSpPr>
+      <p:pic>
+        <p:nvPicPr>
+          <p:cNvPr id="2" name="图片 1">
+            <a:extLst>
+              <a:ext uri="{FF2B5EF4-FFF2-40B4-BE49-F238E27FC236}">
+                <a16:creationId xmlns:a16="http://schemas.microsoft.com/office/drawing/2014/main" id="{4BB2E5F0-37A9-4C2A-84E5-B14E551B770B}"/>
+              </a:ext>
+            </a:extLst>
+          </p:cNvPr>
+          <p:cNvPicPr>
+            <a:picLocks noChangeAspect="1"/>
+          </p:cNvPicPr>
+          <p:nvPr/>
+        </p:nvPicPr>
+        <p:blipFill>
+          <a:blip r:embed="rId2"/>
+          <a:stretch>
+            <a:fillRect/>
+          </a:stretch>
+        </p:blipFill>
+        <p:spPr>
+          <a:xfrm>
+            <a:off x="328274" y="687246"/>
+            <a:ext cx="6209524" cy="2533333"/>
+          </a:xfrm>
+          <a:prstGeom prst="rect">
+            <a:avLst/>
+          </a:prstGeom>
+        </p:spPr>
+      </p:pic>
+      <p:pic>
+        <p:nvPicPr>
+          <p:cNvPr id="4" name="图片 2">
+            <a:extLst>
+              <a:ext uri="{FF2B5EF4-FFF2-40B4-BE49-F238E27FC236}">
+                <a16:creationId xmlns:a16="http://schemas.microsoft.com/office/drawing/2014/main" id="{AF7FB1F2-9F38-4A20-874E-05F240D81077}"/>
+              </a:ext>
+            </a:extLst>
+          </p:cNvPr>
+          <p:cNvPicPr>
+            <a:picLocks noChangeAspect="1"/>
+          </p:cNvPicPr>
+          <p:nvPr/>
+        </p:nvPicPr>
+        <p:blipFill>
+          <a:blip r:embed="rId3"/>
+          <a:stretch>
+            <a:fillRect/>
+          </a:stretch>
+        </p:blipFill>
+        <p:spPr>
+          <a:xfrm>
+            <a:off x="2470015" y="0"/>
+            <a:ext cx="2957456" cy="628200"/>
+          </a:xfrm>
+          <a:prstGeom prst="rect">
+            <a:avLst/>
+          </a:prstGeom>
+        </p:spPr>
+      </p:pic>
+      <p:sp>
+        <p:nvSpPr>
+          <p:cNvPr id="5" name="矩形 3">
+            <a:extLst>
+              <a:ext uri="{FF2B5EF4-FFF2-40B4-BE49-F238E27FC236}">
+                <a16:creationId xmlns:a16="http://schemas.microsoft.com/office/drawing/2014/main" id="{234C32AB-7B6F-45D5-AE3E-46DE252921D1}"/>
+              </a:ext>
+            </a:extLst>
+          </p:cNvPr>
+          <p:cNvSpPr/>
+          <p:nvPr/>
+        </p:nvSpPr>
+        <p:spPr>
+          <a:xfrm>
+            <a:off x="0" y="0"/>
+            <a:ext cx="1864613" cy="584775"/>
+          </a:xfrm>
+          <a:prstGeom prst="rect">
+            <a:avLst/>
+          </a:prstGeom>
+        </p:spPr>
+        <p:txBody>
+          <a:bodyPr wrap="none">
+            <a:spAutoFit/>
+          </a:bodyPr>
+          <a:lstStyle/>
+          <a:p>
+            <a:r>
+              <a:rPr lang="en-US" altLang="zh-CN" sz="3200" dirty="0"/>
+              <a:t>HashMap</a:t>
+            </a:r>
+            <a:endParaRPr lang="zh-CN" altLang="en-US" sz="3200" dirty="0"/>
+          </a:p>
+        </p:txBody>
+      </p:sp>
+      <p:pic>
+        <p:nvPicPr>
+          <p:cNvPr id="8" name="Picture 7">
+            <a:extLst>
+              <a:ext uri="{FF2B5EF4-FFF2-40B4-BE49-F238E27FC236}">
+                <a16:creationId xmlns:a16="http://schemas.microsoft.com/office/drawing/2014/main" id="{C19391FE-D974-4DD3-9FB3-5C8CD095A216}"/>
+              </a:ext>
+            </a:extLst>
+          </p:cNvPr>
+          <p:cNvPicPr>
+            <a:picLocks noChangeAspect="1"/>
+          </p:cNvPicPr>
+          <p:nvPr/>
+        </p:nvPicPr>
+        <p:blipFill>
+          <a:blip r:embed="rId4"/>
+          <a:stretch>
+            <a:fillRect/>
+          </a:stretch>
+        </p:blipFill>
+        <p:spPr>
+          <a:xfrm>
+            <a:off x="652007" y="3355833"/>
+            <a:ext cx="5665666" cy="3385789"/>
+          </a:xfrm>
+          <a:prstGeom prst="rect">
+            <a:avLst/>
+          </a:prstGeom>
+        </p:spPr>
+      </p:pic>
+      <p:pic>
+        <p:nvPicPr>
+          <p:cNvPr id="6" name="图片 5">
+            <a:extLst>
+              <a:ext uri="{FF2B5EF4-FFF2-40B4-BE49-F238E27FC236}">
+                <a16:creationId xmlns:a16="http://schemas.microsoft.com/office/drawing/2014/main" id="{5CE207F1-47EC-4DDF-8CE9-D1A639366FC3}"/>
+              </a:ext>
+            </a:extLst>
+          </p:cNvPr>
+          <p:cNvPicPr>
+            <a:picLocks noChangeAspect="1"/>
+          </p:cNvPicPr>
+          <p:nvPr/>
+        </p:nvPicPr>
+        <p:blipFill>
+          <a:blip r:embed="rId5"/>
+          <a:stretch>
+            <a:fillRect/>
+          </a:stretch>
+        </p:blipFill>
+        <p:spPr>
+          <a:xfrm>
+            <a:off x="7143200" y="0"/>
+            <a:ext cx="3541216" cy="6858000"/>
+          </a:xfrm>
+          <a:prstGeom prst="rect">
+            <a:avLst/>
+          </a:prstGeom>
+        </p:spPr>
+      </p:pic>
+    </p:spTree>
+    <p:extLst>
+      <p:ext uri="{BB962C8B-B14F-4D97-AF65-F5344CB8AC3E}">
+        <p14:creationId xmlns:p14="http://schemas.microsoft.com/office/powerpoint/2010/main" val="4137416933"/>
       </p:ext>
     </p:extLst>
   </p:cSld>
@@ -5200,6 +6956,2283 @@
     <p:extLst>
       <p:ext uri="{BB962C8B-B14F-4D97-AF65-F5344CB8AC3E}">
         <p14:creationId xmlns:p14="http://schemas.microsoft.com/office/powerpoint/2010/main" val="2892870497"/>
+      </p:ext>
+    </p:extLst>
+  </p:cSld>
+  <p:clrMapOvr>
+    <a:masterClrMapping/>
+  </p:clrMapOvr>
+</p:sld>
+</file>
+
+<file path=ppt/slides/slide20.xml><?xml version="1.0" encoding="utf-8"?>
+<p:sld xmlns:a="http://schemas.openxmlformats.org/drawingml/2006/main" xmlns:r="http://schemas.openxmlformats.org/officeDocument/2006/relationships" xmlns:p="http://schemas.openxmlformats.org/presentationml/2006/main">
+  <p:cSld>
+    <p:spTree>
+      <p:nvGrpSpPr>
+        <p:cNvPr id="1" name=""/>
+        <p:cNvGrpSpPr/>
+        <p:nvPr/>
+      </p:nvGrpSpPr>
+      <p:grpSpPr>
+        <a:xfrm>
+          <a:off x="0" y="0"/>
+          <a:ext cx="0" cy="0"/>
+          <a:chOff x="0" y="0"/>
+          <a:chExt cx="0" cy="0"/>
+        </a:xfrm>
+      </p:grpSpPr>
+      <p:sp>
+        <p:nvSpPr>
+          <p:cNvPr id="2" name="矩形 1">
+            <a:extLst>
+              <a:ext uri="{FF2B5EF4-FFF2-40B4-BE49-F238E27FC236}">
+                <a16:creationId xmlns:a16="http://schemas.microsoft.com/office/drawing/2014/main" id="{35113C7A-21DA-4269-8292-5B50F2C36C1F}"/>
+              </a:ext>
+            </a:extLst>
+          </p:cNvPr>
+          <p:cNvSpPr/>
+          <p:nvPr/>
+        </p:nvSpPr>
+        <p:spPr>
+          <a:xfrm>
+            <a:off x="0" y="3976"/>
+            <a:ext cx="1864613" cy="584775"/>
+          </a:xfrm>
+          <a:prstGeom prst="rect">
+            <a:avLst/>
+          </a:prstGeom>
+        </p:spPr>
+        <p:txBody>
+          <a:bodyPr wrap="none">
+            <a:spAutoFit/>
+          </a:bodyPr>
+          <a:lstStyle/>
+          <a:p>
+            <a:r>
+              <a:rPr lang="en-US" altLang="zh-CN" sz="3200"/>
+              <a:t>HashMap</a:t>
+            </a:r>
+            <a:endParaRPr lang="zh-CN" altLang="en-US" sz="3200"/>
+          </a:p>
+        </p:txBody>
+      </p:sp>
+      <p:sp>
+        <p:nvSpPr>
+          <p:cNvPr id="4" name="Rectangle 2">
+            <a:extLst>
+              <a:ext uri="{FF2B5EF4-FFF2-40B4-BE49-F238E27FC236}">
+                <a16:creationId xmlns:a16="http://schemas.microsoft.com/office/drawing/2014/main" id="{6C233EB1-2B8A-4B5C-8B6A-90947D46BE9B}"/>
+              </a:ext>
+            </a:extLst>
+          </p:cNvPr>
+          <p:cNvSpPr>
+            <a:spLocks noChangeArrowheads="1"/>
+          </p:cNvSpPr>
+          <p:nvPr/>
+        </p:nvSpPr>
+        <p:spPr bwMode="auto">
+          <a:xfrm>
+            <a:off x="119269" y="1331846"/>
+            <a:ext cx="5198828" cy="338554"/>
+          </a:xfrm>
+          <a:prstGeom prst="rect">
+            <a:avLst/>
+          </a:prstGeom>
+          <a:solidFill>
+            <a:srgbClr val="FFFFFF"/>
+          </a:solidFill>
+          <a:ln>
+            <a:noFill/>
+          </a:ln>
+          <a:effectLst/>
+          <a:extLst>
+            <a:ext uri="{91240B29-F687-4F45-9708-019B960494DF}">
+              <a14:hiddenLine xmlns:a14="http://schemas.microsoft.com/office/drawing/2010/main" w="9525">
+                <a:solidFill>
+                  <a:schemeClr val="tx1"/>
+                </a:solidFill>
+                <a:miter lim="800000"/>
+                <a:headEnd/>
+                <a:tailEnd/>
+              </a14:hiddenLine>
+            </a:ext>
+            <a:ext uri="{AF507438-7753-43E0-B8FC-AC1667EBCBE1}">
+              <a14:hiddenEffects xmlns:a14="http://schemas.microsoft.com/office/drawing/2010/main">
+                <a:effectLst>
+                  <a:outerShdw dist="35921" dir="2700000" algn="ctr" rotWithShape="0">
+                    <a:schemeClr val="bg2"/>
+                  </a:outerShdw>
+                </a:effectLst>
+              </a14:hiddenEffects>
+            </a:ext>
+          </a:extLst>
+        </p:spPr>
+        <p:txBody>
+          <a:bodyPr vert="horz" wrap="square" lIns="91440" tIns="45720" rIns="91440" bIns="45720" numCol="1" anchor="ctr" anchorCtr="0" compatLnSpc="1">
+            <a:prstTxWarp prst="textNoShape">
+              <a:avLst/>
+            </a:prstTxWarp>
+            <a:spAutoFit/>
+          </a:bodyPr>
+          <a:lstStyle/>
+          <a:p>
+            <a:pPr marL="0" marR="0" lvl="0" indent="0" algn="l" defTabSz="914400" rtl="0" eaLnBrk="0" fontAlgn="base" latinLnBrk="0" hangingPunct="0">
+              <a:lnSpc>
+                <a:spcPct val="100000"/>
+              </a:lnSpc>
+              <a:spcBef>
+                <a:spcPct val="0"/>
+              </a:spcBef>
+              <a:spcAft>
+                <a:spcPct val="0"/>
+              </a:spcAft>
+              <a:buClrTx/>
+              <a:buSzTx/>
+              <a:buFontTx/>
+              <a:buNone/>
+              <a:tabLst/>
+            </a:pPr>
+            <a:r>
+              <a:rPr kumimoji="0" lang="en-US" altLang="zh-CN" sz="800" b="0" i="0" u="none" strike="noStrike" cap="none" normalizeH="0" baseline="0">
+                <a:ln>
+                  <a:noFill/>
+                </a:ln>
+                <a:solidFill>
+                  <a:srgbClr val="000000"/>
+                </a:solidFill>
+                <a:effectLst/>
+                <a:latin typeface="宋体" panose="02010600030101010101" pitchFamily="2" charset="-122"/>
+                <a:ea typeface="宋体" panose="02010600030101010101" pitchFamily="2" charset="-122"/>
+              </a:rPr>
+              <a:t>//this:</a:t>
+            </a:r>
+            <a:r>
+              <a:rPr kumimoji="0" lang="zh-CN" altLang="en-US" sz="800" b="0" i="0" u="none" strike="noStrike" cap="none" normalizeH="0" baseline="0">
+                <a:ln>
+                  <a:noFill/>
+                </a:ln>
+                <a:solidFill>
+                  <a:srgbClr val="000000"/>
+                </a:solidFill>
+                <a:effectLst/>
+                <a:latin typeface="宋体" panose="02010600030101010101" pitchFamily="2" charset="-122"/>
+                <a:ea typeface="宋体" panose="02010600030101010101" pitchFamily="2" charset="-122"/>
+              </a:rPr>
+              <a:t>当前</a:t>
+            </a:r>
+            <a:r>
+              <a:rPr kumimoji="0" lang="en-US" altLang="zh-CN" sz="800" b="0" i="0" u="none" strike="noStrike" cap="none" normalizeH="0" baseline="0">
+                <a:ln>
+                  <a:noFill/>
+                </a:ln>
+                <a:solidFill>
+                  <a:srgbClr val="000000"/>
+                </a:solidFill>
+                <a:effectLst/>
+                <a:latin typeface="宋体" panose="02010600030101010101" pitchFamily="2" charset="-122"/>
+                <a:ea typeface="宋体" panose="02010600030101010101" pitchFamily="2" charset="-122"/>
+              </a:rPr>
+              <a:t>hashMap</a:t>
+            </a:r>
+            <a:r>
+              <a:rPr kumimoji="0" lang="zh-CN" altLang="en-US" sz="800" b="0" i="0" u="none" strike="noStrike" cap="none" normalizeH="0" baseline="0">
+                <a:ln>
+                  <a:noFill/>
+                </a:ln>
+                <a:solidFill>
+                  <a:srgbClr val="000000"/>
+                </a:solidFill>
+                <a:effectLst/>
+                <a:latin typeface="宋体" panose="02010600030101010101" pitchFamily="2" charset="-122"/>
+                <a:ea typeface="宋体" panose="02010600030101010101" pitchFamily="2" charset="-122"/>
+              </a:rPr>
+              <a:t>实例，</a:t>
+            </a:r>
+            <a:r>
+              <a:rPr kumimoji="0" lang="en-US" altLang="zh-CN" sz="800" b="0" i="0" u="none" strike="noStrike" cap="none" normalizeH="0" baseline="0">
+                <a:ln>
+                  <a:noFill/>
+                </a:ln>
+                <a:solidFill>
+                  <a:srgbClr val="000000"/>
+                </a:solidFill>
+                <a:effectLst/>
+                <a:latin typeface="宋体" panose="02010600030101010101" pitchFamily="2" charset="-122"/>
+                <a:ea typeface="宋体" panose="02010600030101010101" pitchFamily="2" charset="-122"/>
+              </a:rPr>
+              <a:t>tab:</a:t>
+            </a:r>
+            <a:r>
+              <a:rPr lang="zh-CN" altLang="en-US" sz="800">
+                <a:solidFill>
+                  <a:srgbClr val="000000"/>
+                </a:solidFill>
+                <a:latin typeface="宋体" panose="02010600030101010101" pitchFamily="2" charset="-122"/>
+                <a:ea typeface="宋体" panose="02010600030101010101" pitchFamily="2" charset="-122"/>
+              </a:rPr>
+              <a:t>主容器数组，</a:t>
+            </a:r>
+            <a:r>
+              <a:rPr lang="en-US" altLang="zh-CN" sz="800">
+                <a:solidFill>
+                  <a:srgbClr val="000000"/>
+                </a:solidFill>
+                <a:latin typeface="宋体" panose="02010600030101010101" pitchFamily="2" charset="-122"/>
+                <a:ea typeface="宋体" panose="02010600030101010101" pitchFamily="2" charset="-122"/>
+              </a:rPr>
+              <a:t>hash</a:t>
+            </a:r>
+            <a:r>
+              <a:rPr lang="zh-CN" altLang="en-US" sz="800">
+                <a:solidFill>
+                  <a:srgbClr val="000000"/>
+                </a:solidFill>
+                <a:latin typeface="宋体" panose="02010600030101010101" pitchFamily="2" charset="-122"/>
+                <a:ea typeface="宋体" panose="02010600030101010101" pitchFamily="2" charset="-122"/>
+              </a:rPr>
+              <a:t>：新元素的</a:t>
+            </a:r>
+            <a:r>
+              <a:rPr lang="en-US" altLang="zh-CN" sz="800">
+                <a:solidFill>
+                  <a:srgbClr val="000000"/>
+                </a:solidFill>
+                <a:latin typeface="宋体" panose="02010600030101010101" pitchFamily="2" charset="-122"/>
+                <a:ea typeface="宋体" panose="02010600030101010101" pitchFamily="2" charset="-122"/>
+              </a:rPr>
+              <a:t>key</a:t>
+            </a:r>
+            <a:r>
+              <a:rPr lang="zh-CN" altLang="en-US" sz="800">
+                <a:solidFill>
+                  <a:srgbClr val="000000"/>
+                </a:solidFill>
+                <a:latin typeface="宋体" panose="02010600030101010101" pitchFamily="2" charset="-122"/>
+                <a:ea typeface="宋体" panose="02010600030101010101" pitchFamily="2" charset="-122"/>
+              </a:rPr>
+              <a:t>的</a:t>
+            </a:r>
+            <a:r>
+              <a:rPr lang="en-US" altLang="zh-CN" sz="800">
+                <a:solidFill>
+                  <a:srgbClr val="000000"/>
+                </a:solidFill>
+                <a:latin typeface="宋体" panose="02010600030101010101" pitchFamily="2" charset="-122"/>
+                <a:ea typeface="宋体" panose="02010600030101010101" pitchFamily="2" charset="-122"/>
+              </a:rPr>
+              <a:t>hash</a:t>
+            </a:r>
+            <a:r>
+              <a:rPr lang="zh-CN" altLang="en-US" sz="800">
+                <a:solidFill>
+                  <a:srgbClr val="000000"/>
+                </a:solidFill>
+                <a:latin typeface="宋体" panose="02010600030101010101" pitchFamily="2" charset="-122"/>
+                <a:ea typeface="宋体" panose="02010600030101010101" pitchFamily="2" charset="-122"/>
+              </a:rPr>
+              <a:t>值</a:t>
+            </a:r>
+            <a:endParaRPr kumimoji="0" lang="en-US" altLang="zh-CN" sz="800" b="0" i="0" u="none" strike="noStrike" cap="none" normalizeH="0" baseline="0">
+              <a:ln>
+                <a:noFill/>
+              </a:ln>
+              <a:solidFill>
+                <a:srgbClr val="000000"/>
+              </a:solidFill>
+              <a:effectLst/>
+              <a:latin typeface="宋体" panose="02010600030101010101" pitchFamily="2" charset="-122"/>
+              <a:ea typeface="宋体" panose="02010600030101010101" pitchFamily="2" charset="-122"/>
+            </a:endParaRPr>
+          </a:p>
+          <a:p>
+            <a:pPr marL="0" marR="0" lvl="0" indent="0" algn="l" defTabSz="914400" rtl="0" eaLnBrk="0" fontAlgn="base" latinLnBrk="0" hangingPunct="0">
+              <a:lnSpc>
+                <a:spcPct val="100000"/>
+              </a:lnSpc>
+              <a:spcBef>
+                <a:spcPct val="0"/>
+              </a:spcBef>
+              <a:spcAft>
+                <a:spcPct val="0"/>
+              </a:spcAft>
+              <a:buClrTx/>
+              <a:buSzTx/>
+              <a:buFontTx/>
+              <a:buNone/>
+              <a:tabLst/>
+            </a:pPr>
+            <a:r>
+              <a:rPr kumimoji="0" lang="zh-CN" altLang="zh-CN" sz="800" b="0" i="0" u="none" strike="noStrike" cap="none" normalizeH="0" baseline="0">
+                <a:ln>
+                  <a:noFill/>
+                </a:ln>
+                <a:solidFill>
+                  <a:srgbClr val="000000"/>
+                </a:solidFill>
+                <a:effectLst/>
+                <a:latin typeface="宋体" panose="02010600030101010101" pitchFamily="2" charset="-122"/>
+                <a:ea typeface="宋体" panose="02010600030101010101" pitchFamily="2" charset="-122"/>
+              </a:rPr>
+              <a:t>e = ((TreeNode&lt;</a:t>
+            </a:r>
+            <a:r>
+              <a:rPr kumimoji="0" lang="zh-CN" altLang="zh-CN" sz="800" b="0" i="0" u="none" strike="noStrike" cap="none" normalizeH="0" baseline="0">
+                <a:ln>
+                  <a:noFill/>
+                </a:ln>
+                <a:solidFill>
+                  <a:srgbClr val="20999D"/>
+                </a:solidFill>
+                <a:effectLst/>
+                <a:latin typeface="宋体" panose="02010600030101010101" pitchFamily="2" charset="-122"/>
+                <a:ea typeface="宋体" panose="02010600030101010101" pitchFamily="2" charset="-122"/>
+              </a:rPr>
+              <a:t>K</a:t>
+            </a:r>
+            <a:r>
+              <a:rPr kumimoji="0" lang="zh-CN" altLang="zh-CN" sz="800" b="0" i="0" u="none" strike="noStrike" cap="none" normalizeH="0" baseline="0">
+                <a:ln>
+                  <a:noFill/>
+                </a:ln>
+                <a:solidFill>
+                  <a:srgbClr val="000000"/>
+                </a:solidFill>
+                <a:effectLst/>
+                <a:latin typeface="宋体" panose="02010600030101010101" pitchFamily="2" charset="-122"/>
+                <a:ea typeface="宋体" panose="02010600030101010101" pitchFamily="2" charset="-122"/>
+              </a:rPr>
+              <a:t>,</a:t>
+            </a:r>
+            <a:r>
+              <a:rPr kumimoji="0" lang="zh-CN" altLang="zh-CN" sz="800" b="0" i="0" u="none" strike="noStrike" cap="none" normalizeH="0" baseline="0">
+                <a:ln>
+                  <a:noFill/>
+                </a:ln>
+                <a:solidFill>
+                  <a:srgbClr val="20999D"/>
+                </a:solidFill>
+                <a:effectLst/>
+                <a:latin typeface="宋体" panose="02010600030101010101" pitchFamily="2" charset="-122"/>
+                <a:ea typeface="宋体" panose="02010600030101010101" pitchFamily="2" charset="-122"/>
+              </a:rPr>
+              <a:t>V</a:t>
+            </a:r>
+            <a:r>
+              <a:rPr kumimoji="0" lang="zh-CN" altLang="zh-CN" sz="800" b="0" i="0" u="none" strike="noStrike" cap="none" normalizeH="0" baseline="0">
+                <a:ln>
+                  <a:noFill/>
+                </a:ln>
+                <a:solidFill>
+                  <a:srgbClr val="000000"/>
+                </a:solidFill>
+                <a:effectLst/>
+                <a:latin typeface="宋体" panose="02010600030101010101" pitchFamily="2" charset="-122"/>
+                <a:ea typeface="宋体" panose="02010600030101010101" pitchFamily="2" charset="-122"/>
+              </a:rPr>
+              <a:t>&gt;)p).putTreeVal(</a:t>
+            </a:r>
+            <a:r>
+              <a:rPr kumimoji="0" lang="zh-CN" altLang="zh-CN" sz="800" b="1" i="0" u="none" strike="noStrike" cap="none" normalizeH="0" baseline="0">
+                <a:ln>
+                  <a:noFill/>
+                </a:ln>
+                <a:solidFill>
+                  <a:srgbClr val="000080"/>
+                </a:solidFill>
+                <a:effectLst/>
+                <a:latin typeface="宋体" panose="02010600030101010101" pitchFamily="2" charset="-122"/>
+                <a:ea typeface="宋体" panose="02010600030101010101" pitchFamily="2" charset="-122"/>
+              </a:rPr>
+              <a:t>this</a:t>
+            </a:r>
+            <a:r>
+              <a:rPr kumimoji="0" lang="zh-CN" altLang="zh-CN" sz="800" b="0" i="0" u="none" strike="noStrike" cap="none" normalizeH="0" baseline="0">
+                <a:ln>
+                  <a:noFill/>
+                </a:ln>
+                <a:solidFill>
+                  <a:srgbClr val="000000"/>
+                </a:solidFill>
+                <a:effectLst/>
+                <a:latin typeface="宋体" panose="02010600030101010101" pitchFamily="2" charset="-122"/>
+                <a:ea typeface="宋体" panose="02010600030101010101" pitchFamily="2" charset="-122"/>
+              </a:rPr>
+              <a:t>, tab, hash, key, value);</a:t>
+            </a:r>
+            <a:endParaRPr kumimoji="0" lang="zh-CN" altLang="zh-CN" sz="2400" b="0" i="0" u="none" strike="noStrike" cap="none" normalizeH="0" baseline="0">
+              <a:ln>
+                <a:noFill/>
+              </a:ln>
+              <a:solidFill>
+                <a:schemeClr val="tx1"/>
+              </a:solidFill>
+              <a:effectLst/>
+              <a:latin typeface="Arial" panose="020B0604020202020204" pitchFamily="34" charset="0"/>
+            </a:endParaRPr>
+          </a:p>
+        </p:txBody>
+      </p:sp>
+      <p:sp>
+        <p:nvSpPr>
+          <p:cNvPr id="5" name="Rectangle 3">
+            <a:extLst>
+              <a:ext uri="{FF2B5EF4-FFF2-40B4-BE49-F238E27FC236}">
+                <a16:creationId xmlns:a16="http://schemas.microsoft.com/office/drawing/2014/main" id="{BCF492BE-A8D7-4B74-BF6C-7CE81E1F10A8}"/>
+              </a:ext>
+            </a:extLst>
+          </p:cNvPr>
+          <p:cNvSpPr>
+            <a:spLocks noChangeArrowheads="1"/>
+          </p:cNvSpPr>
+          <p:nvPr/>
+        </p:nvSpPr>
+        <p:spPr bwMode="auto">
+          <a:xfrm>
+            <a:off x="119269" y="564956"/>
+            <a:ext cx="5361830" cy="646331"/>
+          </a:xfrm>
+          <a:prstGeom prst="rect">
+            <a:avLst/>
+          </a:prstGeom>
+          <a:solidFill>
+            <a:srgbClr val="FFFFFF"/>
+          </a:solidFill>
+          <a:ln>
+            <a:noFill/>
+          </a:ln>
+          <a:effectLst/>
+          <a:extLst>
+            <a:ext uri="{91240B29-F687-4F45-9708-019B960494DF}">
+              <a14:hiddenLine xmlns:a14="http://schemas.microsoft.com/office/drawing/2010/main" w="9525">
+                <a:solidFill>
+                  <a:schemeClr val="tx1"/>
+                </a:solidFill>
+                <a:miter lim="800000"/>
+                <a:headEnd/>
+                <a:tailEnd/>
+              </a14:hiddenLine>
+            </a:ext>
+            <a:ext uri="{AF507438-7753-43E0-B8FC-AC1667EBCBE1}">
+              <a14:hiddenEffects xmlns:a14="http://schemas.microsoft.com/office/drawing/2010/main">
+                <a:effectLst>
+                  <a:outerShdw dist="35921" dir="2700000" algn="ctr" rotWithShape="0">
+                    <a:schemeClr val="bg2"/>
+                  </a:outerShdw>
+                </a:effectLst>
+              </a14:hiddenEffects>
+            </a:ext>
+          </a:extLst>
+        </p:spPr>
+        <p:txBody>
+          <a:bodyPr vert="horz" wrap="square" lIns="91440" tIns="45720" rIns="91440" bIns="45720" numCol="1" anchor="ctr" anchorCtr="0" compatLnSpc="1">
+            <a:prstTxWarp prst="textNoShape">
+              <a:avLst/>
+            </a:prstTxWarp>
+            <a:spAutoFit/>
+          </a:bodyPr>
+          <a:lstStyle/>
+          <a:p>
+            <a:pPr marL="0" marR="0" lvl="0" indent="0" algn="l" defTabSz="914400" rtl="0" eaLnBrk="0" fontAlgn="base" latinLnBrk="0" hangingPunct="0">
+              <a:lnSpc>
+                <a:spcPct val="100000"/>
+              </a:lnSpc>
+              <a:spcBef>
+                <a:spcPct val="0"/>
+              </a:spcBef>
+              <a:spcAft>
+                <a:spcPct val="0"/>
+              </a:spcAft>
+              <a:buClrTx/>
+              <a:buSzTx/>
+              <a:buFontTx/>
+              <a:buNone/>
+              <a:tabLst/>
+            </a:pPr>
+            <a:r>
+              <a:rPr kumimoji="0" lang="zh-CN" altLang="zh-CN" sz="600" b="1" i="0" u="none" strike="noStrike" cap="none" normalizeH="0" baseline="0">
+                <a:ln>
+                  <a:noFill/>
+                </a:ln>
+                <a:solidFill>
+                  <a:srgbClr val="000080"/>
+                </a:solidFill>
+                <a:effectLst/>
+                <a:latin typeface="宋体" panose="02010600030101010101" pitchFamily="2" charset="-122"/>
+                <a:ea typeface="宋体" panose="02010600030101010101" pitchFamily="2" charset="-122"/>
+              </a:rPr>
+              <a:t>static final class </a:t>
+            </a:r>
+            <a:r>
+              <a:rPr kumimoji="0" lang="zh-CN" altLang="zh-CN" sz="600" b="0" i="0" u="none" strike="noStrike" cap="none" normalizeH="0" baseline="0">
+                <a:ln>
+                  <a:noFill/>
+                </a:ln>
+                <a:solidFill>
+                  <a:srgbClr val="000000"/>
+                </a:solidFill>
+                <a:effectLst/>
+                <a:latin typeface="宋体" panose="02010600030101010101" pitchFamily="2" charset="-122"/>
+                <a:ea typeface="宋体" panose="02010600030101010101" pitchFamily="2" charset="-122"/>
+              </a:rPr>
+              <a:t>TreeNode&lt;</a:t>
+            </a:r>
+            <a:r>
+              <a:rPr kumimoji="0" lang="zh-CN" altLang="zh-CN" sz="600" b="0" i="0" u="none" strike="noStrike" cap="none" normalizeH="0" baseline="0">
+                <a:ln>
+                  <a:noFill/>
+                </a:ln>
+                <a:solidFill>
+                  <a:srgbClr val="20999D"/>
+                </a:solidFill>
+                <a:effectLst/>
+                <a:latin typeface="宋体" panose="02010600030101010101" pitchFamily="2" charset="-122"/>
+                <a:ea typeface="宋体" panose="02010600030101010101" pitchFamily="2" charset="-122"/>
+              </a:rPr>
+              <a:t>K</a:t>
+            </a:r>
+            <a:r>
+              <a:rPr kumimoji="0" lang="zh-CN" altLang="zh-CN" sz="600" b="0" i="0" u="none" strike="noStrike" cap="none" normalizeH="0" baseline="0">
+                <a:ln>
+                  <a:noFill/>
+                </a:ln>
+                <a:solidFill>
+                  <a:srgbClr val="000000"/>
+                </a:solidFill>
+                <a:effectLst/>
+                <a:latin typeface="宋体" panose="02010600030101010101" pitchFamily="2" charset="-122"/>
+                <a:ea typeface="宋体" panose="02010600030101010101" pitchFamily="2" charset="-122"/>
+              </a:rPr>
+              <a:t>,</a:t>
+            </a:r>
+            <a:r>
+              <a:rPr kumimoji="0" lang="zh-CN" altLang="zh-CN" sz="600" b="0" i="0" u="none" strike="noStrike" cap="none" normalizeH="0" baseline="0">
+                <a:ln>
+                  <a:noFill/>
+                </a:ln>
+                <a:solidFill>
+                  <a:srgbClr val="20999D"/>
+                </a:solidFill>
+                <a:effectLst/>
+                <a:latin typeface="宋体" panose="02010600030101010101" pitchFamily="2" charset="-122"/>
+                <a:ea typeface="宋体" panose="02010600030101010101" pitchFamily="2" charset="-122"/>
+              </a:rPr>
+              <a:t>V</a:t>
+            </a:r>
+            <a:r>
+              <a:rPr kumimoji="0" lang="zh-CN" altLang="zh-CN" sz="600" b="0" i="0" u="none" strike="noStrike" cap="none" normalizeH="0" baseline="0">
+                <a:ln>
+                  <a:noFill/>
+                </a:ln>
+                <a:solidFill>
+                  <a:srgbClr val="000000"/>
+                </a:solidFill>
+                <a:effectLst/>
+                <a:latin typeface="宋体" panose="02010600030101010101" pitchFamily="2" charset="-122"/>
+                <a:ea typeface="宋体" panose="02010600030101010101" pitchFamily="2" charset="-122"/>
+              </a:rPr>
+              <a:t>&gt; </a:t>
+            </a:r>
+            <a:r>
+              <a:rPr kumimoji="0" lang="zh-CN" altLang="zh-CN" sz="600" b="1" i="0" u="none" strike="noStrike" cap="none" normalizeH="0" baseline="0">
+                <a:ln>
+                  <a:noFill/>
+                </a:ln>
+                <a:solidFill>
+                  <a:srgbClr val="000080"/>
+                </a:solidFill>
+                <a:effectLst/>
+                <a:latin typeface="宋体" panose="02010600030101010101" pitchFamily="2" charset="-122"/>
+                <a:ea typeface="宋体" panose="02010600030101010101" pitchFamily="2" charset="-122"/>
+              </a:rPr>
+              <a:t>extends </a:t>
+            </a:r>
+            <a:r>
+              <a:rPr kumimoji="0" lang="zh-CN" altLang="zh-CN" sz="600" b="0" i="0" u="none" strike="noStrike" cap="none" normalizeH="0" baseline="0">
+                <a:ln>
+                  <a:noFill/>
+                </a:ln>
+                <a:solidFill>
+                  <a:srgbClr val="000000"/>
+                </a:solidFill>
+                <a:effectLst/>
+                <a:latin typeface="宋体" panose="02010600030101010101" pitchFamily="2" charset="-122"/>
+                <a:ea typeface="宋体" panose="02010600030101010101" pitchFamily="2" charset="-122"/>
+              </a:rPr>
+              <a:t>LinkedHashMap.Entry&lt;</a:t>
+            </a:r>
+            <a:r>
+              <a:rPr kumimoji="0" lang="zh-CN" altLang="zh-CN" sz="600" b="0" i="0" u="none" strike="noStrike" cap="none" normalizeH="0" baseline="0">
+                <a:ln>
+                  <a:noFill/>
+                </a:ln>
+                <a:solidFill>
+                  <a:srgbClr val="20999D"/>
+                </a:solidFill>
+                <a:effectLst/>
+                <a:latin typeface="宋体" panose="02010600030101010101" pitchFamily="2" charset="-122"/>
+                <a:ea typeface="宋体" panose="02010600030101010101" pitchFamily="2" charset="-122"/>
+              </a:rPr>
+              <a:t>K</a:t>
+            </a:r>
+            <a:r>
+              <a:rPr kumimoji="0" lang="zh-CN" altLang="zh-CN" sz="600" b="0" i="0" u="none" strike="noStrike" cap="none" normalizeH="0" baseline="0">
+                <a:ln>
+                  <a:noFill/>
+                </a:ln>
+                <a:solidFill>
+                  <a:srgbClr val="000000"/>
+                </a:solidFill>
+                <a:effectLst/>
+                <a:latin typeface="宋体" panose="02010600030101010101" pitchFamily="2" charset="-122"/>
+                <a:ea typeface="宋体" panose="02010600030101010101" pitchFamily="2" charset="-122"/>
+              </a:rPr>
+              <a:t>,</a:t>
+            </a:r>
+            <a:r>
+              <a:rPr kumimoji="0" lang="zh-CN" altLang="zh-CN" sz="600" b="0" i="0" u="none" strike="noStrike" cap="none" normalizeH="0" baseline="0">
+                <a:ln>
+                  <a:noFill/>
+                </a:ln>
+                <a:solidFill>
+                  <a:srgbClr val="20999D"/>
+                </a:solidFill>
+                <a:effectLst/>
+                <a:latin typeface="宋体" panose="02010600030101010101" pitchFamily="2" charset="-122"/>
+                <a:ea typeface="宋体" panose="02010600030101010101" pitchFamily="2" charset="-122"/>
+              </a:rPr>
+              <a:t>V</a:t>
+            </a:r>
+            <a:r>
+              <a:rPr kumimoji="0" lang="zh-CN" altLang="zh-CN" sz="600" b="0" i="0" u="none" strike="noStrike" cap="none" normalizeH="0" baseline="0">
+                <a:ln>
+                  <a:noFill/>
+                </a:ln>
+                <a:solidFill>
+                  <a:srgbClr val="000000"/>
+                </a:solidFill>
+                <a:effectLst/>
+                <a:latin typeface="宋体" panose="02010600030101010101" pitchFamily="2" charset="-122"/>
+                <a:ea typeface="宋体" panose="02010600030101010101" pitchFamily="2" charset="-122"/>
+              </a:rPr>
+              <a:t>&gt; {</a:t>
+            </a:r>
+            <a:br>
+              <a:rPr kumimoji="0" lang="zh-CN" altLang="zh-CN" sz="600" b="0" i="0" u="none" strike="noStrike" cap="none" normalizeH="0" baseline="0">
+                <a:ln>
+                  <a:noFill/>
+                </a:ln>
+                <a:solidFill>
+                  <a:srgbClr val="000000"/>
+                </a:solidFill>
+                <a:effectLst/>
+                <a:latin typeface="宋体" panose="02010600030101010101" pitchFamily="2" charset="-122"/>
+                <a:ea typeface="宋体" panose="02010600030101010101" pitchFamily="2" charset="-122"/>
+              </a:rPr>
+            </a:br>
+            <a:r>
+              <a:rPr kumimoji="0" lang="zh-CN" altLang="zh-CN" sz="600" b="0" i="0" u="none" strike="noStrike" cap="none" normalizeH="0" baseline="0">
+                <a:ln>
+                  <a:noFill/>
+                </a:ln>
+                <a:solidFill>
+                  <a:srgbClr val="000000"/>
+                </a:solidFill>
+                <a:effectLst/>
+                <a:latin typeface="宋体" panose="02010600030101010101" pitchFamily="2" charset="-122"/>
+                <a:ea typeface="宋体" panose="02010600030101010101" pitchFamily="2" charset="-122"/>
+              </a:rPr>
+              <a:t>    TreeNode&lt;</a:t>
+            </a:r>
+            <a:r>
+              <a:rPr kumimoji="0" lang="zh-CN" altLang="zh-CN" sz="600" b="0" i="0" u="none" strike="noStrike" cap="none" normalizeH="0" baseline="0">
+                <a:ln>
+                  <a:noFill/>
+                </a:ln>
+                <a:solidFill>
+                  <a:srgbClr val="20999D"/>
+                </a:solidFill>
+                <a:effectLst/>
+                <a:latin typeface="宋体" panose="02010600030101010101" pitchFamily="2" charset="-122"/>
+                <a:ea typeface="宋体" panose="02010600030101010101" pitchFamily="2" charset="-122"/>
+              </a:rPr>
+              <a:t>K</a:t>
+            </a:r>
+            <a:r>
+              <a:rPr kumimoji="0" lang="zh-CN" altLang="zh-CN" sz="600" b="0" i="0" u="none" strike="noStrike" cap="none" normalizeH="0" baseline="0">
+                <a:ln>
+                  <a:noFill/>
+                </a:ln>
+                <a:solidFill>
+                  <a:srgbClr val="000000"/>
+                </a:solidFill>
+                <a:effectLst/>
+                <a:latin typeface="宋体" panose="02010600030101010101" pitchFamily="2" charset="-122"/>
+                <a:ea typeface="宋体" panose="02010600030101010101" pitchFamily="2" charset="-122"/>
+              </a:rPr>
+              <a:t>,</a:t>
+            </a:r>
+            <a:r>
+              <a:rPr kumimoji="0" lang="zh-CN" altLang="zh-CN" sz="600" b="0" i="0" u="none" strike="noStrike" cap="none" normalizeH="0" baseline="0">
+                <a:ln>
+                  <a:noFill/>
+                </a:ln>
+                <a:solidFill>
+                  <a:srgbClr val="20999D"/>
+                </a:solidFill>
+                <a:effectLst/>
+                <a:latin typeface="宋体" panose="02010600030101010101" pitchFamily="2" charset="-122"/>
+                <a:ea typeface="宋体" panose="02010600030101010101" pitchFamily="2" charset="-122"/>
+              </a:rPr>
+              <a:t>V</a:t>
+            </a:r>
+            <a:r>
+              <a:rPr kumimoji="0" lang="zh-CN" altLang="zh-CN" sz="600" b="0" i="0" u="none" strike="noStrike" cap="none" normalizeH="0" baseline="0">
+                <a:ln>
+                  <a:noFill/>
+                </a:ln>
+                <a:solidFill>
+                  <a:srgbClr val="000000"/>
+                </a:solidFill>
+                <a:effectLst/>
+                <a:latin typeface="宋体" panose="02010600030101010101" pitchFamily="2" charset="-122"/>
+                <a:ea typeface="宋体" panose="02010600030101010101" pitchFamily="2" charset="-122"/>
+              </a:rPr>
+              <a:t>&gt; </a:t>
+            </a:r>
+            <a:r>
+              <a:rPr kumimoji="0" lang="zh-CN" altLang="zh-CN" sz="600" b="1" i="0" u="none" strike="noStrike" cap="none" normalizeH="0" baseline="0">
+                <a:ln>
+                  <a:noFill/>
+                </a:ln>
+                <a:solidFill>
+                  <a:srgbClr val="660E7A"/>
+                </a:solidFill>
+                <a:effectLst/>
+                <a:latin typeface="宋体" panose="02010600030101010101" pitchFamily="2" charset="-122"/>
+                <a:ea typeface="宋体" panose="02010600030101010101" pitchFamily="2" charset="-122"/>
+              </a:rPr>
+              <a:t>parent</a:t>
+            </a:r>
+            <a:r>
+              <a:rPr kumimoji="0" lang="zh-CN" altLang="zh-CN" sz="600" b="0" i="0" u="none" strike="noStrike" cap="none" normalizeH="0" baseline="0">
+                <a:ln>
+                  <a:noFill/>
+                </a:ln>
+                <a:solidFill>
+                  <a:srgbClr val="000000"/>
+                </a:solidFill>
+                <a:effectLst/>
+                <a:latin typeface="宋体" panose="02010600030101010101" pitchFamily="2" charset="-122"/>
+                <a:ea typeface="宋体" panose="02010600030101010101" pitchFamily="2" charset="-122"/>
+              </a:rPr>
+              <a:t>;  </a:t>
+            </a:r>
+            <a:r>
+              <a:rPr kumimoji="0" lang="zh-CN" altLang="zh-CN" sz="600" b="0" i="1" u="none" strike="noStrike" cap="none" normalizeH="0" baseline="0">
+                <a:ln>
+                  <a:noFill/>
+                </a:ln>
+                <a:solidFill>
+                  <a:srgbClr val="808080"/>
+                </a:solidFill>
+                <a:effectLst/>
+                <a:latin typeface="宋体" panose="02010600030101010101" pitchFamily="2" charset="-122"/>
+                <a:ea typeface="宋体" panose="02010600030101010101" pitchFamily="2" charset="-122"/>
+              </a:rPr>
+              <a:t>// red-black tree links</a:t>
+            </a:r>
+            <a:br>
+              <a:rPr kumimoji="0" lang="zh-CN" altLang="zh-CN" sz="600" b="0" i="1" u="none" strike="noStrike" cap="none" normalizeH="0" baseline="0">
+                <a:ln>
+                  <a:noFill/>
+                </a:ln>
+                <a:solidFill>
+                  <a:srgbClr val="808080"/>
+                </a:solidFill>
+                <a:effectLst/>
+                <a:latin typeface="宋体" panose="02010600030101010101" pitchFamily="2" charset="-122"/>
+                <a:ea typeface="宋体" panose="02010600030101010101" pitchFamily="2" charset="-122"/>
+              </a:rPr>
+            </a:br>
+            <a:r>
+              <a:rPr kumimoji="0" lang="zh-CN" altLang="zh-CN" sz="600" b="0" i="1" u="none" strike="noStrike" cap="none" normalizeH="0" baseline="0">
+                <a:ln>
+                  <a:noFill/>
+                </a:ln>
+                <a:solidFill>
+                  <a:srgbClr val="808080"/>
+                </a:solidFill>
+                <a:effectLst/>
+                <a:latin typeface="宋体" panose="02010600030101010101" pitchFamily="2" charset="-122"/>
+                <a:ea typeface="宋体" panose="02010600030101010101" pitchFamily="2" charset="-122"/>
+              </a:rPr>
+              <a:t>    </a:t>
+            </a:r>
+            <a:r>
+              <a:rPr kumimoji="0" lang="zh-CN" altLang="zh-CN" sz="600" b="0" i="0" u="none" strike="noStrike" cap="none" normalizeH="0" baseline="0">
+                <a:ln>
+                  <a:noFill/>
+                </a:ln>
+                <a:solidFill>
+                  <a:srgbClr val="000000"/>
+                </a:solidFill>
+                <a:effectLst/>
+                <a:latin typeface="宋体" panose="02010600030101010101" pitchFamily="2" charset="-122"/>
+                <a:ea typeface="宋体" panose="02010600030101010101" pitchFamily="2" charset="-122"/>
+              </a:rPr>
+              <a:t>TreeNode&lt;</a:t>
+            </a:r>
+            <a:r>
+              <a:rPr kumimoji="0" lang="zh-CN" altLang="zh-CN" sz="600" b="0" i="0" u="none" strike="noStrike" cap="none" normalizeH="0" baseline="0">
+                <a:ln>
+                  <a:noFill/>
+                </a:ln>
+                <a:solidFill>
+                  <a:srgbClr val="20999D"/>
+                </a:solidFill>
+                <a:effectLst/>
+                <a:latin typeface="宋体" panose="02010600030101010101" pitchFamily="2" charset="-122"/>
+                <a:ea typeface="宋体" panose="02010600030101010101" pitchFamily="2" charset="-122"/>
+              </a:rPr>
+              <a:t>K</a:t>
+            </a:r>
+            <a:r>
+              <a:rPr kumimoji="0" lang="zh-CN" altLang="zh-CN" sz="600" b="0" i="0" u="none" strike="noStrike" cap="none" normalizeH="0" baseline="0">
+                <a:ln>
+                  <a:noFill/>
+                </a:ln>
+                <a:solidFill>
+                  <a:srgbClr val="000000"/>
+                </a:solidFill>
+                <a:effectLst/>
+                <a:latin typeface="宋体" panose="02010600030101010101" pitchFamily="2" charset="-122"/>
+                <a:ea typeface="宋体" panose="02010600030101010101" pitchFamily="2" charset="-122"/>
+              </a:rPr>
+              <a:t>,</a:t>
+            </a:r>
+            <a:r>
+              <a:rPr kumimoji="0" lang="zh-CN" altLang="zh-CN" sz="600" b="0" i="0" u="none" strike="noStrike" cap="none" normalizeH="0" baseline="0">
+                <a:ln>
+                  <a:noFill/>
+                </a:ln>
+                <a:solidFill>
+                  <a:srgbClr val="20999D"/>
+                </a:solidFill>
+                <a:effectLst/>
+                <a:latin typeface="宋体" panose="02010600030101010101" pitchFamily="2" charset="-122"/>
+                <a:ea typeface="宋体" panose="02010600030101010101" pitchFamily="2" charset="-122"/>
+              </a:rPr>
+              <a:t>V</a:t>
+            </a:r>
+            <a:r>
+              <a:rPr kumimoji="0" lang="zh-CN" altLang="zh-CN" sz="600" b="0" i="0" u="none" strike="noStrike" cap="none" normalizeH="0" baseline="0">
+                <a:ln>
+                  <a:noFill/>
+                </a:ln>
+                <a:solidFill>
+                  <a:srgbClr val="000000"/>
+                </a:solidFill>
+                <a:effectLst/>
+                <a:latin typeface="宋体" panose="02010600030101010101" pitchFamily="2" charset="-122"/>
+                <a:ea typeface="宋体" panose="02010600030101010101" pitchFamily="2" charset="-122"/>
+              </a:rPr>
+              <a:t>&gt; </a:t>
+            </a:r>
+            <a:r>
+              <a:rPr kumimoji="0" lang="zh-CN" altLang="zh-CN" sz="600" b="1" i="0" u="none" strike="noStrike" cap="none" normalizeH="0" baseline="0">
+                <a:ln>
+                  <a:noFill/>
+                </a:ln>
+                <a:solidFill>
+                  <a:srgbClr val="660E7A"/>
+                </a:solidFill>
+                <a:effectLst/>
+                <a:latin typeface="宋体" panose="02010600030101010101" pitchFamily="2" charset="-122"/>
+                <a:ea typeface="宋体" panose="02010600030101010101" pitchFamily="2" charset="-122"/>
+              </a:rPr>
+              <a:t>left</a:t>
+            </a:r>
+            <a:r>
+              <a:rPr kumimoji="0" lang="zh-CN" altLang="zh-CN" sz="600" b="0" i="0" u="none" strike="noStrike" cap="none" normalizeH="0" baseline="0">
+                <a:ln>
+                  <a:noFill/>
+                </a:ln>
+                <a:solidFill>
+                  <a:srgbClr val="000000"/>
+                </a:solidFill>
+                <a:effectLst/>
+                <a:latin typeface="宋体" panose="02010600030101010101" pitchFamily="2" charset="-122"/>
+                <a:ea typeface="宋体" panose="02010600030101010101" pitchFamily="2" charset="-122"/>
+              </a:rPr>
+              <a:t>;</a:t>
+            </a:r>
+            <a:br>
+              <a:rPr kumimoji="0" lang="zh-CN" altLang="zh-CN" sz="600" b="0" i="0" u="none" strike="noStrike" cap="none" normalizeH="0" baseline="0">
+                <a:ln>
+                  <a:noFill/>
+                </a:ln>
+                <a:solidFill>
+                  <a:srgbClr val="000000"/>
+                </a:solidFill>
+                <a:effectLst/>
+                <a:latin typeface="宋体" panose="02010600030101010101" pitchFamily="2" charset="-122"/>
+                <a:ea typeface="宋体" panose="02010600030101010101" pitchFamily="2" charset="-122"/>
+              </a:rPr>
+            </a:br>
+            <a:r>
+              <a:rPr kumimoji="0" lang="zh-CN" altLang="zh-CN" sz="600" b="0" i="0" u="none" strike="noStrike" cap="none" normalizeH="0" baseline="0">
+                <a:ln>
+                  <a:noFill/>
+                </a:ln>
+                <a:solidFill>
+                  <a:srgbClr val="000000"/>
+                </a:solidFill>
+                <a:effectLst/>
+                <a:latin typeface="宋体" panose="02010600030101010101" pitchFamily="2" charset="-122"/>
+                <a:ea typeface="宋体" panose="02010600030101010101" pitchFamily="2" charset="-122"/>
+              </a:rPr>
+              <a:t>    TreeNode&lt;</a:t>
+            </a:r>
+            <a:r>
+              <a:rPr kumimoji="0" lang="zh-CN" altLang="zh-CN" sz="600" b="0" i="0" u="none" strike="noStrike" cap="none" normalizeH="0" baseline="0">
+                <a:ln>
+                  <a:noFill/>
+                </a:ln>
+                <a:solidFill>
+                  <a:srgbClr val="20999D"/>
+                </a:solidFill>
+                <a:effectLst/>
+                <a:latin typeface="宋体" panose="02010600030101010101" pitchFamily="2" charset="-122"/>
+                <a:ea typeface="宋体" panose="02010600030101010101" pitchFamily="2" charset="-122"/>
+              </a:rPr>
+              <a:t>K</a:t>
+            </a:r>
+            <a:r>
+              <a:rPr kumimoji="0" lang="zh-CN" altLang="zh-CN" sz="600" b="0" i="0" u="none" strike="noStrike" cap="none" normalizeH="0" baseline="0">
+                <a:ln>
+                  <a:noFill/>
+                </a:ln>
+                <a:solidFill>
+                  <a:srgbClr val="000000"/>
+                </a:solidFill>
+                <a:effectLst/>
+                <a:latin typeface="宋体" panose="02010600030101010101" pitchFamily="2" charset="-122"/>
+                <a:ea typeface="宋体" panose="02010600030101010101" pitchFamily="2" charset="-122"/>
+              </a:rPr>
+              <a:t>,</a:t>
+            </a:r>
+            <a:r>
+              <a:rPr kumimoji="0" lang="zh-CN" altLang="zh-CN" sz="600" b="0" i="0" u="none" strike="noStrike" cap="none" normalizeH="0" baseline="0">
+                <a:ln>
+                  <a:noFill/>
+                </a:ln>
+                <a:solidFill>
+                  <a:srgbClr val="20999D"/>
+                </a:solidFill>
+                <a:effectLst/>
+                <a:latin typeface="宋体" panose="02010600030101010101" pitchFamily="2" charset="-122"/>
+                <a:ea typeface="宋体" panose="02010600030101010101" pitchFamily="2" charset="-122"/>
+              </a:rPr>
+              <a:t>V</a:t>
+            </a:r>
+            <a:r>
+              <a:rPr kumimoji="0" lang="zh-CN" altLang="zh-CN" sz="600" b="0" i="0" u="none" strike="noStrike" cap="none" normalizeH="0" baseline="0">
+                <a:ln>
+                  <a:noFill/>
+                </a:ln>
+                <a:solidFill>
+                  <a:srgbClr val="000000"/>
+                </a:solidFill>
+                <a:effectLst/>
+                <a:latin typeface="宋体" panose="02010600030101010101" pitchFamily="2" charset="-122"/>
+                <a:ea typeface="宋体" panose="02010600030101010101" pitchFamily="2" charset="-122"/>
+              </a:rPr>
+              <a:t>&gt; </a:t>
+            </a:r>
+            <a:r>
+              <a:rPr kumimoji="0" lang="zh-CN" altLang="zh-CN" sz="600" b="1" i="0" u="none" strike="noStrike" cap="none" normalizeH="0" baseline="0">
+                <a:ln>
+                  <a:noFill/>
+                </a:ln>
+                <a:solidFill>
+                  <a:srgbClr val="660E7A"/>
+                </a:solidFill>
+                <a:effectLst/>
+                <a:latin typeface="宋体" panose="02010600030101010101" pitchFamily="2" charset="-122"/>
+                <a:ea typeface="宋体" panose="02010600030101010101" pitchFamily="2" charset="-122"/>
+              </a:rPr>
+              <a:t>right</a:t>
+            </a:r>
+            <a:r>
+              <a:rPr kumimoji="0" lang="zh-CN" altLang="zh-CN" sz="600" b="0" i="0" u="none" strike="noStrike" cap="none" normalizeH="0" baseline="0">
+                <a:ln>
+                  <a:noFill/>
+                </a:ln>
+                <a:solidFill>
+                  <a:srgbClr val="000000"/>
+                </a:solidFill>
+                <a:effectLst/>
+                <a:latin typeface="宋体" panose="02010600030101010101" pitchFamily="2" charset="-122"/>
+                <a:ea typeface="宋体" panose="02010600030101010101" pitchFamily="2" charset="-122"/>
+              </a:rPr>
+              <a:t>;</a:t>
+            </a:r>
+            <a:br>
+              <a:rPr kumimoji="0" lang="zh-CN" altLang="zh-CN" sz="600" b="0" i="0" u="none" strike="noStrike" cap="none" normalizeH="0" baseline="0">
+                <a:ln>
+                  <a:noFill/>
+                </a:ln>
+                <a:solidFill>
+                  <a:srgbClr val="000000"/>
+                </a:solidFill>
+                <a:effectLst/>
+                <a:latin typeface="宋体" panose="02010600030101010101" pitchFamily="2" charset="-122"/>
+                <a:ea typeface="宋体" panose="02010600030101010101" pitchFamily="2" charset="-122"/>
+              </a:rPr>
+            </a:br>
+            <a:r>
+              <a:rPr kumimoji="0" lang="zh-CN" altLang="zh-CN" sz="600" b="0" i="0" u="none" strike="noStrike" cap="none" normalizeH="0" baseline="0">
+                <a:ln>
+                  <a:noFill/>
+                </a:ln>
+                <a:solidFill>
+                  <a:srgbClr val="000000"/>
+                </a:solidFill>
+                <a:effectLst/>
+                <a:latin typeface="宋体" panose="02010600030101010101" pitchFamily="2" charset="-122"/>
+                <a:ea typeface="宋体" panose="02010600030101010101" pitchFamily="2" charset="-122"/>
+              </a:rPr>
+              <a:t>    TreeNode&lt;</a:t>
+            </a:r>
+            <a:r>
+              <a:rPr kumimoji="0" lang="zh-CN" altLang="zh-CN" sz="600" b="0" i="0" u="none" strike="noStrike" cap="none" normalizeH="0" baseline="0">
+                <a:ln>
+                  <a:noFill/>
+                </a:ln>
+                <a:solidFill>
+                  <a:srgbClr val="20999D"/>
+                </a:solidFill>
+                <a:effectLst/>
+                <a:latin typeface="宋体" panose="02010600030101010101" pitchFamily="2" charset="-122"/>
+                <a:ea typeface="宋体" panose="02010600030101010101" pitchFamily="2" charset="-122"/>
+              </a:rPr>
+              <a:t>K</a:t>
+            </a:r>
+            <a:r>
+              <a:rPr kumimoji="0" lang="zh-CN" altLang="zh-CN" sz="600" b="0" i="0" u="none" strike="noStrike" cap="none" normalizeH="0" baseline="0">
+                <a:ln>
+                  <a:noFill/>
+                </a:ln>
+                <a:solidFill>
+                  <a:srgbClr val="000000"/>
+                </a:solidFill>
+                <a:effectLst/>
+                <a:latin typeface="宋体" panose="02010600030101010101" pitchFamily="2" charset="-122"/>
+                <a:ea typeface="宋体" panose="02010600030101010101" pitchFamily="2" charset="-122"/>
+              </a:rPr>
+              <a:t>,</a:t>
+            </a:r>
+            <a:r>
+              <a:rPr kumimoji="0" lang="zh-CN" altLang="zh-CN" sz="600" b="0" i="0" u="none" strike="noStrike" cap="none" normalizeH="0" baseline="0">
+                <a:ln>
+                  <a:noFill/>
+                </a:ln>
+                <a:solidFill>
+                  <a:srgbClr val="20999D"/>
+                </a:solidFill>
+                <a:effectLst/>
+                <a:latin typeface="宋体" panose="02010600030101010101" pitchFamily="2" charset="-122"/>
+                <a:ea typeface="宋体" panose="02010600030101010101" pitchFamily="2" charset="-122"/>
+              </a:rPr>
+              <a:t>V</a:t>
+            </a:r>
+            <a:r>
+              <a:rPr kumimoji="0" lang="zh-CN" altLang="zh-CN" sz="600" b="0" i="0" u="none" strike="noStrike" cap="none" normalizeH="0" baseline="0">
+                <a:ln>
+                  <a:noFill/>
+                </a:ln>
+                <a:solidFill>
+                  <a:srgbClr val="000000"/>
+                </a:solidFill>
+                <a:effectLst/>
+                <a:latin typeface="宋体" panose="02010600030101010101" pitchFamily="2" charset="-122"/>
+                <a:ea typeface="宋体" panose="02010600030101010101" pitchFamily="2" charset="-122"/>
+              </a:rPr>
+              <a:t>&gt; </a:t>
+            </a:r>
+            <a:r>
+              <a:rPr kumimoji="0" lang="zh-CN" altLang="zh-CN" sz="600" b="1" i="0" u="none" strike="noStrike" cap="none" normalizeH="0" baseline="0">
+                <a:ln>
+                  <a:noFill/>
+                </a:ln>
+                <a:solidFill>
+                  <a:srgbClr val="660E7A"/>
+                </a:solidFill>
+                <a:effectLst/>
+                <a:latin typeface="宋体" panose="02010600030101010101" pitchFamily="2" charset="-122"/>
+                <a:ea typeface="宋体" panose="02010600030101010101" pitchFamily="2" charset="-122"/>
+              </a:rPr>
+              <a:t>prev</a:t>
+            </a:r>
+            <a:r>
+              <a:rPr kumimoji="0" lang="zh-CN" altLang="zh-CN" sz="600" b="0" i="0" u="none" strike="noStrike" cap="none" normalizeH="0" baseline="0">
+                <a:ln>
+                  <a:noFill/>
+                </a:ln>
+                <a:solidFill>
+                  <a:srgbClr val="000000"/>
+                </a:solidFill>
+                <a:effectLst/>
+                <a:latin typeface="宋体" panose="02010600030101010101" pitchFamily="2" charset="-122"/>
+                <a:ea typeface="宋体" panose="02010600030101010101" pitchFamily="2" charset="-122"/>
+              </a:rPr>
+              <a:t>;    </a:t>
+            </a:r>
+            <a:r>
+              <a:rPr kumimoji="0" lang="zh-CN" altLang="zh-CN" sz="600" b="0" i="1" u="none" strike="noStrike" cap="none" normalizeH="0" baseline="0">
+                <a:ln>
+                  <a:noFill/>
+                </a:ln>
+                <a:solidFill>
+                  <a:srgbClr val="808080"/>
+                </a:solidFill>
+                <a:effectLst/>
+                <a:latin typeface="宋体" panose="02010600030101010101" pitchFamily="2" charset="-122"/>
+                <a:ea typeface="宋体" panose="02010600030101010101" pitchFamily="2" charset="-122"/>
+              </a:rPr>
+              <a:t>// needed to unlink next upon deletion</a:t>
+            </a:r>
+            <a:br>
+              <a:rPr kumimoji="0" lang="zh-CN" altLang="zh-CN" sz="600" b="0" i="1" u="none" strike="noStrike" cap="none" normalizeH="0" baseline="0">
+                <a:ln>
+                  <a:noFill/>
+                </a:ln>
+                <a:solidFill>
+                  <a:srgbClr val="808080"/>
+                </a:solidFill>
+                <a:effectLst/>
+                <a:latin typeface="宋体" panose="02010600030101010101" pitchFamily="2" charset="-122"/>
+                <a:ea typeface="宋体" panose="02010600030101010101" pitchFamily="2" charset="-122"/>
+              </a:rPr>
+            </a:br>
+            <a:r>
+              <a:rPr kumimoji="0" lang="zh-CN" altLang="zh-CN" sz="600" b="0" i="1" u="none" strike="noStrike" cap="none" normalizeH="0" baseline="0">
+                <a:ln>
+                  <a:noFill/>
+                </a:ln>
+                <a:solidFill>
+                  <a:srgbClr val="808080"/>
+                </a:solidFill>
+                <a:effectLst/>
+                <a:latin typeface="宋体" panose="02010600030101010101" pitchFamily="2" charset="-122"/>
+                <a:ea typeface="宋体" panose="02010600030101010101" pitchFamily="2" charset="-122"/>
+              </a:rPr>
+              <a:t>    </a:t>
+            </a:r>
+            <a:r>
+              <a:rPr kumimoji="0" lang="zh-CN" altLang="zh-CN" sz="600" b="1" i="0" u="none" strike="noStrike" cap="none" normalizeH="0" baseline="0">
+                <a:ln>
+                  <a:noFill/>
+                </a:ln>
+                <a:solidFill>
+                  <a:srgbClr val="000080"/>
+                </a:solidFill>
+                <a:effectLst/>
+                <a:latin typeface="宋体" panose="02010600030101010101" pitchFamily="2" charset="-122"/>
+                <a:ea typeface="宋体" panose="02010600030101010101" pitchFamily="2" charset="-122"/>
+              </a:rPr>
+              <a:t>boolean </a:t>
+            </a:r>
+            <a:r>
+              <a:rPr kumimoji="0" lang="zh-CN" altLang="zh-CN" sz="600" b="1" i="0" u="none" strike="noStrike" cap="none" normalizeH="0" baseline="0">
+                <a:ln>
+                  <a:noFill/>
+                </a:ln>
+                <a:solidFill>
+                  <a:srgbClr val="660E7A"/>
+                </a:solidFill>
+                <a:effectLst/>
+                <a:latin typeface="宋体" panose="02010600030101010101" pitchFamily="2" charset="-122"/>
+                <a:ea typeface="宋体" panose="02010600030101010101" pitchFamily="2" charset="-122"/>
+              </a:rPr>
+              <a:t>red</a:t>
+            </a:r>
+            <a:r>
+              <a:rPr kumimoji="0" lang="zh-CN" altLang="zh-CN" sz="600" b="0" i="0" u="none" strike="noStrike" cap="none" normalizeH="0" baseline="0">
+                <a:ln>
+                  <a:noFill/>
+                </a:ln>
+                <a:solidFill>
+                  <a:srgbClr val="000000"/>
+                </a:solidFill>
+                <a:effectLst/>
+                <a:latin typeface="宋体" panose="02010600030101010101" pitchFamily="2" charset="-122"/>
+                <a:ea typeface="宋体" panose="02010600030101010101" pitchFamily="2" charset="-122"/>
+              </a:rPr>
+              <a:t>;</a:t>
+            </a:r>
+            <a:endParaRPr kumimoji="0" lang="zh-CN" altLang="zh-CN" sz="1800" b="0" i="0" u="none" strike="noStrike" cap="none" normalizeH="0" baseline="0">
+              <a:ln>
+                <a:noFill/>
+              </a:ln>
+              <a:solidFill>
+                <a:schemeClr val="tx1"/>
+              </a:solidFill>
+              <a:effectLst/>
+              <a:latin typeface="Arial" panose="020B0604020202020204" pitchFamily="34" charset="0"/>
+            </a:endParaRPr>
+          </a:p>
+        </p:txBody>
+      </p:sp>
+      <p:sp>
+        <p:nvSpPr>
+          <p:cNvPr id="7" name="Rectangle 4">
+            <a:extLst>
+              <a:ext uri="{FF2B5EF4-FFF2-40B4-BE49-F238E27FC236}">
+                <a16:creationId xmlns:a16="http://schemas.microsoft.com/office/drawing/2014/main" id="{8A63C07C-0AD4-43C5-9A21-13C237FD8AAA}"/>
+              </a:ext>
+            </a:extLst>
+          </p:cNvPr>
+          <p:cNvSpPr>
+            <a:spLocks noChangeArrowheads="1"/>
+          </p:cNvSpPr>
+          <p:nvPr/>
+        </p:nvSpPr>
+        <p:spPr bwMode="auto">
+          <a:xfrm>
+            <a:off x="145806" y="1738509"/>
+            <a:ext cx="3437614" cy="830997"/>
+          </a:xfrm>
+          <a:prstGeom prst="rect">
+            <a:avLst/>
+          </a:prstGeom>
+          <a:solidFill>
+            <a:srgbClr val="FFFFFF"/>
+          </a:solidFill>
+          <a:ln>
+            <a:noFill/>
+          </a:ln>
+          <a:effectLst/>
+          <a:extLst>
+            <a:ext uri="{91240B29-F687-4F45-9708-019B960494DF}">
+              <a14:hiddenLine xmlns:a14="http://schemas.microsoft.com/office/drawing/2010/main" w="9525">
+                <a:solidFill>
+                  <a:schemeClr val="tx1"/>
+                </a:solidFill>
+                <a:miter lim="800000"/>
+                <a:headEnd/>
+                <a:tailEnd/>
+              </a14:hiddenLine>
+            </a:ext>
+            <a:ext uri="{AF507438-7753-43E0-B8FC-AC1667EBCBE1}">
+              <a14:hiddenEffects xmlns:a14="http://schemas.microsoft.com/office/drawing/2010/main">
+                <a:effectLst>
+                  <a:outerShdw dist="35921" dir="2700000" algn="ctr" rotWithShape="0">
+                    <a:schemeClr val="bg2"/>
+                  </a:outerShdw>
+                </a:effectLst>
+              </a14:hiddenEffects>
+            </a:ext>
+          </a:extLst>
+        </p:spPr>
+        <p:txBody>
+          <a:bodyPr vert="horz" wrap="square" lIns="91440" tIns="45720" rIns="91440" bIns="45720" numCol="1" anchor="ctr" anchorCtr="0" compatLnSpc="1">
+            <a:prstTxWarp prst="textNoShape">
+              <a:avLst/>
+            </a:prstTxWarp>
+            <a:spAutoFit/>
+          </a:bodyPr>
+          <a:lstStyle/>
+          <a:p>
+            <a:pPr marL="0" marR="0" lvl="0" indent="0" algn="l" defTabSz="914400" rtl="0" eaLnBrk="0" fontAlgn="base" latinLnBrk="0" hangingPunct="0">
+              <a:lnSpc>
+                <a:spcPct val="100000"/>
+              </a:lnSpc>
+              <a:spcBef>
+                <a:spcPct val="0"/>
+              </a:spcBef>
+              <a:spcAft>
+                <a:spcPct val="0"/>
+              </a:spcAft>
+              <a:buClrTx/>
+              <a:buSzTx/>
+              <a:buFontTx/>
+              <a:buNone/>
+              <a:tabLst/>
+            </a:pPr>
+            <a:r>
+              <a:rPr kumimoji="0" lang="zh-CN" altLang="zh-CN" sz="600" b="1" i="0" u="none" strike="noStrike" cap="none" normalizeH="0" baseline="0">
+                <a:ln>
+                  <a:noFill/>
+                </a:ln>
+                <a:solidFill>
+                  <a:srgbClr val="000080"/>
+                </a:solidFill>
+                <a:effectLst/>
+                <a:latin typeface="宋体" panose="02010600030101010101" pitchFamily="2" charset="-122"/>
+                <a:ea typeface="宋体" panose="02010600030101010101" pitchFamily="2" charset="-122"/>
+              </a:rPr>
+              <a:t>final </a:t>
+            </a:r>
+            <a:r>
+              <a:rPr kumimoji="0" lang="zh-CN" altLang="zh-CN" sz="600" b="0" i="0" u="none" strike="noStrike" cap="none" normalizeH="0" baseline="0">
+                <a:ln>
+                  <a:noFill/>
+                </a:ln>
+                <a:solidFill>
+                  <a:srgbClr val="000000"/>
+                </a:solidFill>
+                <a:effectLst/>
+                <a:latin typeface="宋体" panose="02010600030101010101" pitchFamily="2" charset="-122"/>
+                <a:ea typeface="宋体" panose="02010600030101010101" pitchFamily="2" charset="-122"/>
+              </a:rPr>
+              <a:t>TreeNode&lt;</a:t>
+            </a:r>
+            <a:r>
+              <a:rPr kumimoji="0" lang="zh-CN" altLang="zh-CN" sz="600" b="0" i="0" u="none" strike="noStrike" cap="none" normalizeH="0" baseline="0">
+                <a:ln>
+                  <a:noFill/>
+                </a:ln>
+                <a:solidFill>
+                  <a:srgbClr val="20999D"/>
+                </a:solidFill>
+                <a:effectLst/>
+                <a:latin typeface="宋体" panose="02010600030101010101" pitchFamily="2" charset="-122"/>
+                <a:ea typeface="宋体" panose="02010600030101010101" pitchFamily="2" charset="-122"/>
+              </a:rPr>
+              <a:t>K</a:t>
+            </a:r>
+            <a:r>
+              <a:rPr kumimoji="0" lang="zh-CN" altLang="zh-CN" sz="600" b="0" i="0" u="none" strike="noStrike" cap="none" normalizeH="0" baseline="0">
+                <a:ln>
+                  <a:noFill/>
+                </a:ln>
+                <a:solidFill>
+                  <a:srgbClr val="000000"/>
+                </a:solidFill>
+                <a:effectLst/>
+                <a:latin typeface="宋体" panose="02010600030101010101" pitchFamily="2" charset="-122"/>
+                <a:ea typeface="宋体" panose="02010600030101010101" pitchFamily="2" charset="-122"/>
+              </a:rPr>
+              <a:t>,</a:t>
+            </a:r>
+            <a:r>
+              <a:rPr kumimoji="0" lang="zh-CN" altLang="zh-CN" sz="600" b="0" i="0" u="none" strike="noStrike" cap="none" normalizeH="0" baseline="0">
+                <a:ln>
+                  <a:noFill/>
+                </a:ln>
+                <a:solidFill>
+                  <a:srgbClr val="20999D"/>
+                </a:solidFill>
+                <a:effectLst/>
+                <a:latin typeface="宋体" panose="02010600030101010101" pitchFamily="2" charset="-122"/>
+                <a:ea typeface="宋体" panose="02010600030101010101" pitchFamily="2" charset="-122"/>
+              </a:rPr>
+              <a:t>V</a:t>
+            </a:r>
+            <a:r>
+              <a:rPr kumimoji="0" lang="zh-CN" altLang="zh-CN" sz="600" b="0" i="0" u="none" strike="noStrike" cap="none" normalizeH="0" baseline="0">
+                <a:ln>
+                  <a:noFill/>
+                </a:ln>
+                <a:solidFill>
+                  <a:srgbClr val="000000"/>
+                </a:solidFill>
+                <a:effectLst/>
+                <a:latin typeface="宋体" panose="02010600030101010101" pitchFamily="2" charset="-122"/>
+                <a:ea typeface="宋体" panose="02010600030101010101" pitchFamily="2" charset="-122"/>
+              </a:rPr>
+              <a:t>&gt; root() {</a:t>
+            </a:r>
+            <a:endParaRPr kumimoji="0" lang="en-US" altLang="zh-CN" sz="600" b="0" i="0" u="none" strike="noStrike" cap="none" normalizeH="0" baseline="0">
+              <a:ln>
+                <a:noFill/>
+              </a:ln>
+              <a:solidFill>
+                <a:srgbClr val="000000"/>
+              </a:solidFill>
+              <a:effectLst/>
+              <a:latin typeface="宋体" panose="02010600030101010101" pitchFamily="2" charset="-122"/>
+              <a:ea typeface="宋体" panose="02010600030101010101" pitchFamily="2" charset="-122"/>
+            </a:endParaRPr>
+          </a:p>
+          <a:p>
+            <a:pPr marL="0" marR="0" lvl="0" indent="0" algn="l" defTabSz="914400" rtl="0" eaLnBrk="0" fontAlgn="base" latinLnBrk="0" hangingPunct="0">
+              <a:lnSpc>
+                <a:spcPct val="100000"/>
+              </a:lnSpc>
+              <a:spcBef>
+                <a:spcPct val="0"/>
+              </a:spcBef>
+              <a:spcAft>
+                <a:spcPct val="0"/>
+              </a:spcAft>
+              <a:buClrTx/>
+              <a:buSzTx/>
+              <a:buFontTx/>
+              <a:buNone/>
+              <a:tabLst/>
+            </a:pPr>
+            <a:r>
+              <a:rPr kumimoji="0" lang="en-US" altLang="zh-CN" sz="600" b="0" i="0" u="none" strike="noStrike" cap="none" normalizeH="0" baseline="0">
+                <a:ln>
+                  <a:noFill/>
+                </a:ln>
+                <a:solidFill>
+                  <a:srgbClr val="000000"/>
+                </a:solidFill>
+                <a:effectLst/>
+                <a:latin typeface="宋体" panose="02010600030101010101" pitchFamily="2" charset="-122"/>
+                <a:ea typeface="宋体" panose="02010600030101010101" pitchFamily="2" charset="-122"/>
+              </a:rPr>
+              <a:t>    //</a:t>
+            </a:r>
+            <a:r>
+              <a:rPr kumimoji="0" lang="zh-CN" altLang="en-US" sz="600" b="0" i="0" u="none" strike="noStrike" cap="none" normalizeH="0" baseline="0">
+                <a:ln>
+                  <a:noFill/>
+                </a:ln>
+                <a:solidFill>
+                  <a:srgbClr val="000000"/>
+                </a:solidFill>
+                <a:effectLst/>
+                <a:latin typeface="宋体" panose="02010600030101010101" pitchFamily="2" charset="-122"/>
+                <a:ea typeface="宋体" panose="02010600030101010101" pitchFamily="2" charset="-122"/>
+              </a:rPr>
+              <a:t>从当前节点，逐步向上遍历，如果父节点为空，则将当前节点设置为</a:t>
+            </a:r>
+            <a:r>
+              <a:rPr kumimoji="0" lang="en-US" altLang="zh-CN" sz="600" b="0" i="0" u="none" strike="noStrike" cap="none" normalizeH="0" baseline="0">
+                <a:ln>
+                  <a:noFill/>
+                </a:ln>
+                <a:solidFill>
+                  <a:srgbClr val="000000"/>
+                </a:solidFill>
+                <a:effectLst/>
+                <a:latin typeface="宋体" panose="02010600030101010101" pitchFamily="2" charset="-122"/>
+                <a:ea typeface="宋体" panose="02010600030101010101" pitchFamily="2" charset="-122"/>
+              </a:rPr>
+              <a:t>root</a:t>
+            </a:r>
+            <a:r>
+              <a:rPr kumimoji="0" lang="zh-CN" altLang="en-US" sz="600" b="0" i="0" u="none" strike="noStrike" cap="none" normalizeH="0" baseline="0">
+                <a:ln>
+                  <a:noFill/>
+                </a:ln>
+                <a:solidFill>
+                  <a:srgbClr val="000000"/>
+                </a:solidFill>
+                <a:effectLst/>
+                <a:latin typeface="宋体" panose="02010600030101010101" pitchFamily="2" charset="-122"/>
+                <a:ea typeface="宋体" panose="02010600030101010101" pitchFamily="2" charset="-122"/>
+              </a:rPr>
+              <a:t>节点</a:t>
+            </a:r>
+            <a:br>
+              <a:rPr kumimoji="0" lang="zh-CN" altLang="zh-CN" sz="600" b="0" i="0" u="none" strike="noStrike" cap="none" normalizeH="0" baseline="0">
+                <a:ln>
+                  <a:noFill/>
+                </a:ln>
+                <a:solidFill>
+                  <a:srgbClr val="000000"/>
+                </a:solidFill>
+                <a:effectLst/>
+                <a:latin typeface="宋体" panose="02010600030101010101" pitchFamily="2" charset="-122"/>
+                <a:ea typeface="宋体" panose="02010600030101010101" pitchFamily="2" charset="-122"/>
+              </a:rPr>
+            </a:br>
+            <a:r>
+              <a:rPr kumimoji="0" lang="zh-CN" altLang="zh-CN" sz="600" b="0" i="0" u="none" strike="noStrike" cap="none" normalizeH="0" baseline="0">
+                <a:ln>
+                  <a:noFill/>
+                </a:ln>
+                <a:solidFill>
+                  <a:srgbClr val="000000"/>
+                </a:solidFill>
+                <a:effectLst/>
+                <a:latin typeface="宋体" panose="02010600030101010101" pitchFamily="2" charset="-122"/>
+                <a:ea typeface="宋体" panose="02010600030101010101" pitchFamily="2" charset="-122"/>
+              </a:rPr>
+              <a:t>    </a:t>
+            </a:r>
+            <a:r>
+              <a:rPr kumimoji="0" lang="zh-CN" altLang="zh-CN" sz="600" b="1" i="0" u="none" strike="noStrike" cap="none" normalizeH="0" baseline="0">
+                <a:ln>
+                  <a:noFill/>
+                </a:ln>
+                <a:solidFill>
+                  <a:srgbClr val="000080"/>
+                </a:solidFill>
+                <a:effectLst/>
+                <a:latin typeface="宋体" panose="02010600030101010101" pitchFamily="2" charset="-122"/>
+                <a:ea typeface="宋体" panose="02010600030101010101" pitchFamily="2" charset="-122"/>
+              </a:rPr>
+              <a:t>for </a:t>
+            </a:r>
+            <a:r>
+              <a:rPr kumimoji="0" lang="zh-CN" altLang="zh-CN" sz="600" b="0" i="0" u="none" strike="noStrike" cap="none" normalizeH="0" baseline="0">
+                <a:ln>
+                  <a:noFill/>
+                </a:ln>
+                <a:solidFill>
+                  <a:srgbClr val="000000"/>
+                </a:solidFill>
+                <a:effectLst/>
+                <a:latin typeface="宋体" panose="02010600030101010101" pitchFamily="2" charset="-122"/>
+                <a:ea typeface="宋体" panose="02010600030101010101" pitchFamily="2" charset="-122"/>
+              </a:rPr>
+              <a:t>(TreeNode&lt;</a:t>
+            </a:r>
+            <a:r>
+              <a:rPr kumimoji="0" lang="zh-CN" altLang="zh-CN" sz="600" b="0" i="0" u="none" strike="noStrike" cap="none" normalizeH="0" baseline="0">
+                <a:ln>
+                  <a:noFill/>
+                </a:ln>
+                <a:solidFill>
+                  <a:srgbClr val="20999D"/>
+                </a:solidFill>
+                <a:effectLst/>
+                <a:latin typeface="宋体" panose="02010600030101010101" pitchFamily="2" charset="-122"/>
+                <a:ea typeface="宋体" panose="02010600030101010101" pitchFamily="2" charset="-122"/>
+              </a:rPr>
+              <a:t>K</a:t>
+            </a:r>
+            <a:r>
+              <a:rPr kumimoji="0" lang="zh-CN" altLang="zh-CN" sz="600" b="0" i="0" u="none" strike="noStrike" cap="none" normalizeH="0" baseline="0">
+                <a:ln>
+                  <a:noFill/>
+                </a:ln>
+                <a:solidFill>
+                  <a:srgbClr val="000000"/>
+                </a:solidFill>
+                <a:effectLst/>
+                <a:latin typeface="宋体" panose="02010600030101010101" pitchFamily="2" charset="-122"/>
+                <a:ea typeface="宋体" panose="02010600030101010101" pitchFamily="2" charset="-122"/>
+              </a:rPr>
+              <a:t>,</a:t>
+            </a:r>
+            <a:r>
+              <a:rPr kumimoji="0" lang="zh-CN" altLang="zh-CN" sz="600" b="0" i="0" u="none" strike="noStrike" cap="none" normalizeH="0" baseline="0">
+                <a:ln>
+                  <a:noFill/>
+                </a:ln>
+                <a:solidFill>
+                  <a:srgbClr val="20999D"/>
+                </a:solidFill>
+                <a:effectLst/>
+                <a:latin typeface="宋体" panose="02010600030101010101" pitchFamily="2" charset="-122"/>
+                <a:ea typeface="宋体" panose="02010600030101010101" pitchFamily="2" charset="-122"/>
+              </a:rPr>
+              <a:t>V</a:t>
+            </a:r>
+            <a:r>
+              <a:rPr kumimoji="0" lang="zh-CN" altLang="zh-CN" sz="600" b="0" i="0" u="none" strike="noStrike" cap="none" normalizeH="0" baseline="0">
+                <a:ln>
+                  <a:noFill/>
+                </a:ln>
+                <a:solidFill>
+                  <a:srgbClr val="000000"/>
+                </a:solidFill>
+                <a:effectLst/>
+                <a:latin typeface="宋体" panose="02010600030101010101" pitchFamily="2" charset="-122"/>
+                <a:ea typeface="宋体" panose="02010600030101010101" pitchFamily="2" charset="-122"/>
+              </a:rPr>
+              <a:t>&gt; r = </a:t>
+            </a:r>
+            <a:r>
+              <a:rPr kumimoji="0" lang="zh-CN" altLang="zh-CN" sz="600" b="1" i="0" u="none" strike="noStrike" cap="none" normalizeH="0" baseline="0">
+                <a:ln>
+                  <a:noFill/>
+                </a:ln>
+                <a:solidFill>
+                  <a:srgbClr val="000080"/>
+                </a:solidFill>
+                <a:effectLst/>
+                <a:latin typeface="宋体" panose="02010600030101010101" pitchFamily="2" charset="-122"/>
+                <a:ea typeface="宋体" panose="02010600030101010101" pitchFamily="2" charset="-122"/>
+              </a:rPr>
+              <a:t>this</a:t>
+            </a:r>
+            <a:r>
+              <a:rPr kumimoji="0" lang="zh-CN" altLang="zh-CN" sz="600" b="0" i="0" u="none" strike="noStrike" cap="none" normalizeH="0" baseline="0">
+                <a:ln>
+                  <a:noFill/>
+                </a:ln>
+                <a:solidFill>
+                  <a:srgbClr val="000000"/>
+                </a:solidFill>
+                <a:effectLst/>
+                <a:latin typeface="宋体" panose="02010600030101010101" pitchFamily="2" charset="-122"/>
+                <a:ea typeface="宋体" panose="02010600030101010101" pitchFamily="2" charset="-122"/>
+              </a:rPr>
+              <a:t>, p;;) {</a:t>
+            </a:r>
+            <a:br>
+              <a:rPr kumimoji="0" lang="zh-CN" altLang="zh-CN" sz="600" b="0" i="0" u="none" strike="noStrike" cap="none" normalizeH="0" baseline="0">
+                <a:ln>
+                  <a:noFill/>
+                </a:ln>
+                <a:solidFill>
+                  <a:srgbClr val="000000"/>
+                </a:solidFill>
+                <a:effectLst/>
+                <a:latin typeface="宋体" panose="02010600030101010101" pitchFamily="2" charset="-122"/>
+                <a:ea typeface="宋体" panose="02010600030101010101" pitchFamily="2" charset="-122"/>
+              </a:rPr>
+            </a:br>
+            <a:r>
+              <a:rPr kumimoji="0" lang="zh-CN" altLang="zh-CN" sz="600" b="0" i="0" u="none" strike="noStrike" cap="none" normalizeH="0" baseline="0">
+                <a:ln>
+                  <a:noFill/>
+                </a:ln>
+                <a:solidFill>
+                  <a:srgbClr val="000000"/>
+                </a:solidFill>
+                <a:effectLst/>
+                <a:latin typeface="宋体" panose="02010600030101010101" pitchFamily="2" charset="-122"/>
+                <a:ea typeface="宋体" panose="02010600030101010101" pitchFamily="2" charset="-122"/>
+              </a:rPr>
+              <a:t>        </a:t>
+            </a:r>
+            <a:r>
+              <a:rPr kumimoji="0" lang="zh-CN" altLang="zh-CN" sz="600" b="1" i="0" u="none" strike="noStrike" cap="none" normalizeH="0" baseline="0">
+                <a:ln>
+                  <a:noFill/>
+                </a:ln>
+                <a:solidFill>
+                  <a:srgbClr val="000080"/>
+                </a:solidFill>
+                <a:effectLst/>
+                <a:latin typeface="宋体" panose="02010600030101010101" pitchFamily="2" charset="-122"/>
+                <a:ea typeface="宋体" panose="02010600030101010101" pitchFamily="2" charset="-122"/>
+              </a:rPr>
+              <a:t>if </a:t>
+            </a:r>
+            <a:r>
+              <a:rPr kumimoji="0" lang="zh-CN" altLang="zh-CN" sz="600" b="0" i="0" u="none" strike="noStrike" cap="none" normalizeH="0" baseline="0">
+                <a:ln>
+                  <a:noFill/>
+                </a:ln>
+                <a:solidFill>
+                  <a:srgbClr val="000000"/>
+                </a:solidFill>
+                <a:effectLst/>
+                <a:latin typeface="宋体" panose="02010600030101010101" pitchFamily="2" charset="-122"/>
+                <a:ea typeface="宋体" panose="02010600030101010101" pitchFamily="2" charset="-122"/>
+              </a:rPr>
+              <a:t>((p = r.</a:t>
+            </a:r>
+            <a:r>
+              <a:rPr kumimoji="0" lang="zh-CN" altLang="zh-CN" sz="600" b="1" i="0" u="none" strike="noStrike" cap="none" normalizeH="0" baseline="0">
+                <a:ln>
+                  <a:noFill/>
+                </a:ln>
+                <a:solidFill>
+                  <a:srgbClr val="660E7A"/>
+                </a:solidFill>
+                <a:effectLst/>
+                <a:latin typeface="宋体" panose="02010600030101010101" pitchFamily="2" charset="-122"/>
+                <a:ea typeface="宋体" panose="02010600030101010101" pitchFamily="2" charset="-122"/>
+              </a:rPr>
+              <a:t>parent</a:t>
+            </a:r>
+            <a:r>
+              <a:rPr kumimoji="0" lang="zh-CN" altLang="zh-CN" sz="600" b="0" i="0" u="none" strike="noStrike" cap="none" normalizeH="0" baseline="0">
+                <a:ln>
+                  <a:noFill/>
+                </a:ln>
+                <a:solidFill>
+                  <a:srgbClr val="000000"/>
+                </a:solidFill>
+                <a:effectLst/>
+                <a:latin typeface="宋体" panose="02010600030101010101" pitchFamily="2" charset="-122"/>
+                <a:ea typeface="宋体" panose="02010600030101010101" pitchFamily="2" charset="-122"/>
+              </a:rPr>
+              <a:t>) == </a:t>
+            </a:r>
+            <a:r>
+              <a:rPr kumimoji="0" lang="zh-CN" altLang="zh-CN" sz="600" b="1" i="0" u="none" strike="noStrike" cap="none" normalizeH="0" baseline="0">
+                <a:ln>
+                  <a:noFill/>
+                </a:ln>
+                <a:solidFill>
+                  <a:srgbClr val="000080"/>
+                </a:solidFill>
+                <a:effectLst/>
+                <a:latin typeface="宋体" panose="02010600030101010101" pitchFamily="2" charset="-122"/>
+                <a:ea typeface="宋体" panose="02010600030101010101" pitchFamily="2" charset="-122"/>
+              </a:rPr>
+              <a:t>null</a:t>
+            </a:r>
+            <a:r>
+              <a:rPr kumimoji="0" lang="zh-CN" altLang="zh-CN" sz="600" b="0" i="0" u="none" strike="noStrike" cap="none" normalizeH="0" baseline="0">
+                <a:ln>
+                  <a:noFill/>
+                </a:ln>
+                <a:solidFill>
+                  <a:srgbClr val="000000"/>
+                </a:solidFill>
+                <a:effectLst/>
+                <a:latin typeface="宋体" panose="02010600030101010101" pitchFamily="2" charset="-122"/>
+                <a:ea typeface="宋体" panose="02010600030101010101" pitchFamily="2" charset="-122"/>
+              </a:rPr>
+              <a:t>)</a:t>
+            </a:r>
+            <a:br>
+              <a:rPr kumimoji="0" lang="zh-CN" altLang="zh-CN" sz="600" b="0" i="0" u="none" strike="noStrike" cap="none" normalizeH="0" baseline="0">
+                <a:ln>
+                  <a:noFill/>
+                </a:ln>
+                <a:solidFill>
+                  <a:srgbClr val="000000"/>
+                </a:solidFill>
+                <a:effectLst/>
+                <a:latin typeface="宋体" panose="02010600030101010101" pitchFamily="2" charset="-122"/>
+                <a:ea typeface="宋体" panose="02010600030101010101" pitchFamily="2" charset="-122"/>
+              </a:rPr>
+            </a:br>
+            <a:r>
+              <a:rPr kumimoji="0" lang="zh-CN" altLang="zh-CN" sz="600" b="0" i="0" u="none" strike="noStrike" cap="none" normalizeH="0" baseline="0">
+                <a:ln>
+                  <a:noFill/>
+                </a:ln>
+                <a:solidFill>
+                  <a:srgbClr val="000000"/>
+                </a:solidFill>
+                <a:effectLst/>
+                <a:latin typeface="宋体" panose="02010600030101010101" pitchFamily="2" charset="-122"/>
+                <a:ea typeface="宋体" panose="02010600030101010101" pitchFamily="2" charset="-122"/>
+              </a:rPr>
+              <a:t>            </a:t>
+            </a:r>
+            <a:r>
+              <a:rPr kumimoji="0" lang="zh-CN" altLang="zh-CN" sz="600" b="1" i="0" u="none" strike="noStrike" cap="none" normalizeH="0" baseline="0">
+                <a:ln>
+                  <a:noFill/>
+                </a:ln>
+                <a:solidFill>
+                  <a:srgbClr val="000080"/>
+                </a:solidFill>
+                <a:effectLst/>
+                <a:latin typeface="宋体" panose="02010600030101010101" pitchFamily="2" charset="-122"/>
+                <a:ea typeface="宋体" panose="02010600030101010101" pitchFamily="2" charset="-122"/>
+              </a:rPr>
+              <a:t>return </a:t>
+            </a:r>
+            <a:r>
+              <a:rPr kumimoji="0" lang="zh-CN" altLang="zh-CN" sz="600" b="0" i="0" u="none" strike="noStrike" cap="none" normalizeH="0" baseline="0">
+                <a:ln>
+                  <a:noFill/>
+                </a:ln>
+                <a:solidFill>
+                  <a:srgbClr val="000000"/>
+                </a:solidFill>
+                <a:effectLst/>
+                <a:latin typeface="宋体" panose="02010600030101010101" pitchFamily="2" charset="-122"/>
+                <a:ea typeface="宋体" panose="02010600030101010101" pitchFamily="2" charset="-122"/>
+              </a:rPr>
+              <a:t>r;</a:t>
+            </a:r>
+            <a:br>
+              <a:rPr kumimoji="0" lang="zh-CN" altLang="zh-CN" sz="600" b="0" i="0" u="none" strike="noStrike" cap="none" normalizeH="0" baseline="0">
+                <a:ln>
+                  <a:noFill/>
+                </a:ln>
+                <a:solidFill>
+                  <a:srgbClr val="000000"/>
+                </a:solidFill>
+                <a:effectLst/>
+                <a:latin typeface="宋体" panose="02010600030101010101" pitchFamily="2" charset="-122"/>
+                <a:ea typeface="宋体" panose="02010600030101010101" pitchFamily="2" charset="-122"/>
+              </a:rPr>
+            </a:br>
+            <a:r>
+              <a:rPr kumimoji="0" lang="zh-CN" altLang="zh-CN" sz="600" b="0" i="0" u="none" strike="noStrike" cap="none" normalizeH="0" baseline="0">
+                <a:ln>
+                  <a:noFill/>
+                </a:ln>
+                <a:solidFill>
+                  <a:srgbClr val="000000"/>
+                </a:solidFill>
+                <a:effectLst/>
+                <a:latin typeface="宋体" panose="02010600030101010101" pitchFamily="2" charset="-122"/>
+                <a:ea typeface="宋体" panose="02010600030101010101" pitchFamily="2" charset="-122"/>
+              </a:rPr>
+              <a:t>        r = p;</a:t>
+            </a:r>
+            <a:br>
+              <a:rPr kumimoji="0" lang="zh-CN" altLang="zh-CN" sz="600" b="0" i="0" u="none" strike="noStrike" cap="none" normalizeH="0" baseline="0">
+                <a:ln>
+                  <a:noFill/>
+                </a:ln>
+                <a:solidFill>
+                  <a:srgbClr val="000000"/>
+                </a:solidFill>
+                <a:effectLst/>
+                <a:latin typeface="宋体" panose="02010600030101010101" pitchFamily="2" charset="-122"/>
+                <a:ea typeface="宋体" panose="02010600030101010101" pitchFamily="2" charset="-122"/>
+              </a:rPr>
+            </a:br>
+            <a:r>
+              <a:rPr kumimoji="0" lang="zh-CN" altLang="zh-CN" sz="600" b="0" i="0" u="none" strike="noStrike" cap="none" normalizeH="0" baseline="0">
+                <a:ln>
+                  <a:noFill/>
+                </a:ln>
+                <a:solidFill>
+                  <a:srgbClr val="000000"/>
+                </a:solidFill>
+                <a:effectLst/>
+                <a:latin typeface="宋体" panose="02010600030101010101" pitchFamily="2" charset="-122"/>
+                <a:ea typeface="宋体" panose="02010600030101010101" pitchFamily="2" charset="-122"/>
+              </a:rPr>
+              <a:t>    }</a:t>
+            </a:r>
+            <a:br>
+              <a:rPr kumimoji="0" lang="zh-CN" altLang="zh-CN" sz="600" b="0" i="0" u="none" strike="noStrike" cap="none" normalizeH="0" baseline="0">
+                <a:ln>
+                  <a:noFill/>
+                </a:ln>
+                <a:solidFill>
+                  <a:srgbClr val="000000"/>
+                </a:solidFill>
+                <a:effectLst/>
+                <a:latin typeface="宋体" panose="02010600030101010101" pitchFamily="2" charset="-122"/>
+                <a:ea typeface="宋体" panose="02010600030101010101" pitchFamily="2" charset="-122"/>
+              </a:rPr>
+            </a:br>
+            <a:r>
+              <a:rPr kumimoji="0" lang="zh-CN" altLang="zh-CN" sz="600" b="0" i="0" u="none" strike="noStrike" cap="none" normalizeH="0" baseline="0">
+                <a:ln>
+                  <a:noFill/>
+                </a:ln>
+                <a:solidFill>
+                  <a:srgbClr val="000000"/>
+                </a:solidFill>
+                <a:effectLst/>
+                <a:latin typeface="宋体" panose="02010600030101010101" pitchFamily="2" charset="-122"/>
+                <a:ea typeface="宋体" panose="02010600030101010101" pitchFamily="2" charset="-122"/>
+              </a:rPr>
+              <a:t>}</a:t>
+            </a:r>
+            <a:endParaRPr kumimoji="0" lang="zh-CN" altLang="zh-CN" sz="1800" b="0" i="0" u="none" strike="noStrike" cap="none" normalizeH="0" baseline="0">
+              <a:ln>
+                <a:noFill/>
+              </a:ln>
+              <a:solidFill>
+                <a:schemeClr val="tx1"/>
+              </a:solidFill>
+              <a:effectLst/>
+              <a:latin typeface="Arial" panose="020B0604020202020204" pitchFamily="34" charset="0"/>
+            </a:endParaRPr>
+          </a:p>
+        </p:txBody>
+      </p:sp>
+      <p:pic>
+        <p:nvPicPr>
+          <p:cNvPr id="8" name="图片 7">
+            <a:extLst>
+              <a:ext uri="{FF2B5EF4-FFF2-40B4-BE49-F238E27FC236}">
+                <a16:creationId xmlns:a16="http://schemas.microsoft.com/office/drawing/2014/main" id="{E35A82F1-773F-4809-8FDD-48F0DEFDD54E}"/>
+              </a:ext>
+            </a:extLst>
+          </p:cNvPr>
+          <p:cNvPicPr>
+            <a:picLocks noChangeAspect="1"/>
+          </p:cNvPicPr>
+          <p:nvPr/>
+        </p:nvPicPr>
+        <p:blipFill>
+          <a:blip r:embed="rId2"/>
+          <a:stretch>
+            <a:fillRect/>
+          </a:stretch>
+        </p:blipFill>
+        <p:spPr>
+          <a:xfrm>
+            <a:off x="119269" y="2637615"/>
+            <a:ext cx="3348163" cy="2379182"/>
+          </a:xfrm>
+          <a:prstGeom prst="rect">
+            <a:avLst/>
+          </a:prstGeom>
+        </p:spPr>
+      </p:pic>
+      <p:pic>
+        <p:nvPicPr>
+          <p:cNvPr id="11" name="图片 10">
+            <a:extLst>
+              <a:ext uri="{FF2B5EF4-FFF2-40B4-BE49-F238E27FC236}">
+                <a16:creationId xmlns:a16="http://schemas.microsoft.com/office/drawing/2014/main" id="{25BFF2B3-51FA-482D-BA50-3290723B8A80}"/>
+              </a:ext>
+            </a:extLst>
+          </p:cNvPr>
+          <p:cNvPicPr>
+            <a:picLocks noChangeAspect="1"/>
+          </p:cNvPicPr>
+          <p:nvPr/>
+        </p:nvPicPr>
+        <p:blipFill>
+          <a:blip r:embed="rId3"/>
+          <a:stretch>
+            <a:fillRect/>
+          </a:stretch>
+        </p:blipFill>
+        <p:spPr>
+          <a:xfrm>
+            <a:off x="8097170" y="0"/>
+            <a:ext cx="4094830" cy="6858000"/>
+          </a:xfrm>
+          <a:prstGeom prst="rect">
+            <a:avLst/>
+          </a:prstGeom>
+        </p:spPr>
+      </p:pic>
+      <p:pic>
+        <p:nvPicPr>
+          <p:cNvPr id="12" name="图片 11">
+            <a:extLst>
+              <a:ext uri="{FF2B5EF4-FFF2-40B4-BE49-F238E27FC236}">
+                <a16:creationId xmlns:a16="http://schemas.microsoft.com/office/drawing/2014/main" id="{F629791C-0ED1-4A1F-8111-4434C2BC3072}"/>
+              </a:ext>
+            </a:extLst>
+          </p:cNvPr>
+          <p:cNvPicPr>
+            <a:picLocks noChangeAspect="1"/>
+          </p:cNvPicPr>
+          <p:nvPr/>
+        </p:nvPicPr>
+        <p:blipFill>
+          <a:blip r:embed="rId4"/>
+          <a:stretch>
+            <a:fillRect/>
+          </a:stretch>
+        </p:blipFill>
+        <p:spPr>
+          <a:xfrm>
+            <a:off x="4143936" y="1389656"/>
+            <a:ext cx="3732461" cy="3659422"/>
+          </a:xfrm>
+          <a:prstGeom prst="rect">
+            <a:avLst/>
+          </a:prstGeom>
+        </p:spPr>
+      </p:pic>
+      <p:pic>
+        <p:nvPicPr>
+          <p:cNvPr id="13" name="图片 12">
+            <a:extLst>
+              <a:ext uri="{FF2B5EF4-FFF2-40B4-BE49-F238E27FC236}">
+                <a16:creationId xmlns:a16="http://schemas.microsoft.com/office/drawing/2014/main" id="{CEA2EAD8-BD56-4F00-9E17-D67147B8516E}"/>
+              </a:ext>
+            </a:extLst>
+          </p:cNvPr>
+          <p:cNvPicPr>
+            <a:picLocks noChangeAspect="1"/>
+          </p:cNvPicPr>
+          <p:nvPr/>
+        </p:nvPicPr>
+        <p:blipFill>
+          <a:blip r:embed="rId5"/>
+          <a:stretch>
+            <a:fillRect/>
+          </a:stretch>
+        </p:blipFill>
+        <p:spPr>
+          <a:xfrm>
+            <a:off x="179329" y="5154045"/>
+            <a:ext cx="3027062" cy="1020143"/>
+          </a:xfrm>
+          <a:prstGeom prst="rect">
+            <a:avLst/>
+          </a:prstGeom>
+        </p:spPr>
+      </p:pic>
+      <p:pic>
+        <p:nvPicPr>
+          <p:cNvPr id="14" name="图片 13">
+            <a:extLst>
+              <a:ext uri="{FF2B5EF4-FFF2-40B4-BE49-F238E27FC236}">
+                <a16:creationId xmlns:a16="http://schemas.microsoft.com/office/drawing/2014/main" id="{0918DB73-D43E-48B0-B4DD-23717469D246}"/>
+              </a:ext>
+            </a:extLst>
+          </p:cNvPr>
+          <p:cNvPicPr>
+            <a:picLocks noChangeAspect="1"/>
+          </p:cNvPicPr>
+          <p:nvPr/>
+        </p:nvPicPr>
+        <p:blipFill>
+          <a:blip r:embed="rId6"/>
+          <a:stretch>
+            <a:fillRect/>
+          </a:stretch>
+        </p:blipFill>
+        <p:spPr>
+          <a:xfrm>
+            <a:off x="3825380" y="5468344"/>
+            <a:ext cx="3311438" cy="628200"/>
+          </a:xfrm>
+          <a:prstGeom prst="rect">
+            <a:avLst/>
+          </a:prstGeom>
+        </p:spPr>
+      </p:pic>
+    </p:spTree>
+    <p:extLst>
+      <p:ext uri="{BB962C8B-B14F-4D97-AF65-F5344CB8AC3E}">
+        <p14:creationId xmlns:p14="http://schemas.microsoft.com/office/powerpoint/2010/main" val="276244095"/>
+      </p:ext>
+    </p:extLst>
+  </p:cSld>
+  <p:clrMapOvr>
+    <a:masterClrMapping/>
+  </p:clrMapOvr>
+</p:sld>
+</file>
+
+<file path=ppt/slides/slide21.xml><?xml version="1.0" encoding="utf-8"?>
+<p:sld xmlns:a="http://schemas.openxmlformats.org/drawingml/2006/main" xmlns:r="http://schemas.openxmlformats.org/officeDocument/2006/relationships" xmlns:p="http://schemas.openxmlformats.org/presentationml/2006/main">
+  <p:cSld>
+    <p:spTree>
+      <p:nvGrpSpPr>
+        <p:cNvPr id="1" name=""/>
+        <p:cNvGrpSpPr/>
+        <p:nvPr/>
+      </p:nvGrpSpPr>
+      <p:grpSpPr>
+        <a:xfrm>
+          <a:off x="0" y="0"/>
+          <a:ext cx="0" cy="0"/>
+          <a:chOff x="0" y="0"/>
+          <a:chExt cx="0" cy="0"/>
+        </a:xfrm>
+      </p:grpSpPr>
+      <p:pic>
+        <p:nvPicPr>
+          <p:cNvPr id="2" name="图片 1">
+            <a:extLst>
+              <a:ext uri="{FF2B5EF4-FFF2-40B4-BE49-F238E27FC236}">
+                <a16:creationId xmlns:a16="http://schemas.microsoft.com/office/drawing/2014/main" id="{D73F8802-A23E-4B0C-BECB-B9B780D1EC3D}"/>
+              </a:ext>
+            </a:extLst>
+          </p:cNvPr>
+          <p:cNvPicPr>
+            <a:picLocks noChangeAspect="1"/>
+          </p:cNvPicPr>
+          <p:nvPr/>
+        </p:nvPicPr>
+        <p:blipFill>
+          <a:blip r:embed="rId2"/>
+          <a:stretch>
+            <a:fillRect/>
+          </a:stretch>
+        </p:blipFill>
+        <p:spPr>
+          <a:xfrm>
+            <a:off x="1777874" y="0"/>
+            <a:ext cx="2847702" cy="6858000"/>
+          </a:xfrm>
+          <a:prstGeom prst="rect">
+            <a:avLst/>
+          </a:prstGeom>
+        </p:spPr>
+      </p:pic>
+      <p:sp>
+        <p:nvSpPr>
+          <p:cNvPr id="3" name="矩形 2">
+            <a:extLst>
+              <a:ext uri="{FF2B5EF4-FFF2-40B4-BE49-F238E27FC236}">
+                <a16:creationId xmlns:a16="http://schemas.microsoft.com/office/drawing/2014/main" id="{83610F07-852C-463A-8107-F77C37896FD8}"/>
+              </a:ext>
+            </a:extLst>
+          </p:cNvPr>
+          <p:cNvSpPr/>
+          <p:nvPr/>
+        </p:nvSpPr>
+        <p:spPr>
+          <a:xfrm>
+            <a:off x="0" y="3976"/>
+            <a:ext cx="1864613" cy="584775"/>
+          </a:xfrm>
+          <a:prstGeom prst="rect">
+            <a:avLst/>
+          </a:prstGeom>
+        </p:spPr>
+        <p:txBody>
+          <a:bodyPr wrap="none">
+            <a:spAutoFit/>
+          </a:bodyPr>
+          <a:lstStyle/>
+          <a:p>
+            <a:r>
+              <a:rPr lang="en-US" altLang="zh-CN" sz="3200"/>
+              <a:t>HashMap</a:t>
+            </a:r>
+            <a:endParaRPr lang="zh-CN" altLang="en-US" sz="3200"/>
+          </a:p>
+        </p:txBody>
+      </p:sp>
+    </p:spTree>
+    <p:extLst>
+      <p:ext uri="{BB962C8B-B14F-4D97-AF65-F5344CB8AC3E}">
+        <p14:creationId xmlns:p14="http://schemas.microsoft.com/office/powerpoint/2010/main" val="2143802305"/>
+      </p:ext>
+    </p:extLst>
+  </p:cSld>
+  <p:clrMapOvr>
+    <a:masterClrMapping/>
+  </p:clrMapOvr>
+</p:sld>
+</file>
+
+<file path=ppt/slides/slide22.xml><?xml version="1.0" encoding="utf-8"?>
+<p:sld xmlns:a="http://schemas.openxmlformats.org/drawingml/2006/main" xmlns:r="http://schemas.openxmlformats.org/officeDocument/2006/relationships" xmlns:p="http://schemas.openxmlformats.org/presentationml/2006/main">
+  <p:cSld>
+    <p:spTree>
+      <p:nvGrpSpPr>
+        <p:cNvPr id="1" name=""/>
+        <p:cNvGrpSpPr/>
+        <p:nvPr/>
+      </p:nvGrpSpPr>
+      <p:grpSpPr>
+        <a:xfrm>
+          <a:off x="0" y="0"/>
+          <a:ext cx="0" cy="0"/>
+          <a:chOff x="0" y="0"/>
+          <a:chExt cx="0" cy="0"/>
+        </a:xfrm>
+      </p:grpSpPr>
+      <p:sp>
+        <p:nvSpPr>
+          <p:cNvPr id="2" name="矩形 1">
+            <a:extLst>
+              <a:ext uri="{FF2B5EF4-FFF2-40B4-BE49-F238E27FC236}">
+                <a16:creationId xmlns:a16="http://schemas.microsoft.com/office/drawing/2014/main" id="{35113C7A-21DA-4269-8292-5B50F2C36C1F}"/>
+              </a:ext>
+            </a:extLst>
+          </p:cNvPr>
+          <p:cNvSpPr/>
+          <p:nvPr/>
+        </p:nvSpPr>
+        <p:spPr>
+          <a:xfrm>
+            <a:off x="0" y="3976"/>
+            <a:ext cx="1864613" cy="584775"/>
+          </a:xfrm>
+          <a:prstGeom prst="rect">
+            <a:avLst/>
+          </a:prstGeom>
+        </p:spPr>
+        <p:txBody>
+          <a:bodyPr wrap="none">
+            <a:spAutoFit/>
+          </a:bodyPr>
+          <a:lstStyle/>
+          <a:p>
+            <a:r>
+              <a:rPr lang="en-US" altLang="zh-CN" sz="3200"/>
+              <a:t>HashMap</a:t>
+            </a:r>
+            <a:endParaRPr lang="zh-CN" altLang="en-US" sz="3200"/>
+          </a:p>
+        </p:txBody>
+      </p:sp>
+      <p:pic>
+        <p:nvPicPr>
+          <p:cNvPr id="5" name="图片 4">
+            <a:extLst>
+              <a:ext uri="{FF2B5EF4-FFF2-40B4-BE49-F238E27FC236}">
+                <a16:creationId xmlns:a16="http://schemas.microsoft.com/office/drawing/2014/main" id="{E8FFB8B5-6BC6-4F8E-96CD-FD927F93051E}"/>
+              </a:ext>
+            </a:extLst>
+          </p:cNvPr>
+          <p:cNvPicPr>
+            <a:picLocks noChangeAspect="1"/>
+          </p:cNvPicPr>
+          <p:nvPr/>
+        </p:nvPicPr>
+        <p:blipFill>
+          <a:blip r:embed="rId2"/>
+          <a:stretch>
+            <a:fillRect/>
+          </a:stretch>
+        </p:blipFill>
+        <p:spPr>
+          <a:xfrm>
+            <a:off x="41434" y="1791086"/>
+            <a:ext cx="6255277" cy="4538152"/>
+          </a:xfrm>
+          <a:prstGeom prst="rect">
+            <a:avLst/>
+          </a:prstGeom>
+        </p:spPr>
+      </p:pic>
+      <p:pic>
+        <p:nvPicPr>
+          <p:cNvPr id="7" name="图片 6">
+            <a:extLst>
+              <a:ext uri="{FF2B5EF4-FFF2-40B4-BE49-F238E27FC236}">
+                <a16:creationId xmlns:a16="http://schemas.microsoft.com/office/drawing/2014/main" id="{F07D2A7C-DC5E-4CA9-A7F0-120E4F199A6D}"/>
+              </a:ext>
+            </a:extLst>
+          </p:cNvPr>
+          <p:cNvPicPr>
+            <a:picLocks noChangeAspect="1"/>
+          </p:cNvPicPr>
+          <p:nvPr/>
+        </p:nvPicPr>
+        <p:blipFill>
+          <a:blip r:embed="rId3"/>
+          <a:stretch>
+            <a:fillRect/>
+          </a:stretch>
+        </p:blipFill>
+        <p:spPr>
+          <a:xfrm>
+            <a:off x="41434" y="647330"/>
+            <a:ext cx="5509547" cy="1047000"/>
+          </a:xfrm>
+          <a:prstGeom prst="rect">
+            <a:avLst/>
+          </a:prstGeom>
+        </p:spPr>
+      </p:pic>
+      <p:pic>
+        <p:nvPicPr>
+          <p:cNvPr id="9" name="图片 8">
+            <a:extLst>
+              <a:ext uri="{FF2B5EF4-FFF2-40B4-BE49-F238E27FC236}">
+                <a16:creationId xmlns:a16="http://schemas.microsoft.com/office/drawing/2014/main" id="{1A8031F4-B0CD-4355-904D-9913E7B32428}"/>
+              </a:ext>
+            </a:extLst>
+          </p:cNvPr>
+          <p:cNvPicPr>
+            <a:picLocks noChangeAspect="1"/>
+          </p:cNvPicPr>
+          <p:nvPr/>
+        </p:nvPicPr>
+        <p:blipFill>
+          <a:blip r:embed="rId4"/>
+          <a:stretch>
+            <a:fillRect/>
+          </a:stretch>
+        </p:blipFill>
+        <p:spPr>
+          <a:xfrm>
+            <a:off x="6521748" y="647330"/>
+            <a:ext cx="5509547" cy="756167"/>
+          </a:xfrm>
+          <a:prstGeom prst="rect">
+            <a:avLst/>
+          </a:prstGeom>
+        </p:spPr>
+      </p:pic>
+    </p:spTree>
+    <p:extLst>
+      <p:ext uri="{BB962C8B-B14F-4D97-AF65-F5344CB8AC3E}">
+        <p14:creationId xmlns:p14="http://schemas.microsoft.com/office/powerpoint/2010/main" val="4212114103"/>
       </p:ext>
     </p:extLst>
   </p:cSld>

</xml_diff>

<commit_message>
update java sets sound code ppt,HashMap 90%, concurrentHashMap 30%
</commit_message>
<xml_diff>
--- a/常用集合源码分析.pptx
+++ b/常用集合源码分析.pptx
@@ -5,7 +5,7 @@
     <p:sldMasterId id="2147483660" r:id="rId1"/>
   </p:sldMasterIdLst>
   <p:notesMasterIdLst>
-    <p:notesMasterId r:id="rId24"/>
+    <p:notesMasterId r:id="rId29"/>
   </p:notesMasterIdLst>
   <p:sldIdLst>
     <p:sldId id="267" r:id="rId2"/>
@@ -30,6 +30,11 @@
     <p:sldId id="277" r:id="rId21"/>
     <p:sldId id="288" r:id="rId22"/>
     <p:sldId id="287" r:id="rId23"/>
+    <p:sldId id="289" r:id="rId24"/>
+    <p:sldId id="290" r:id="rId25"/>
+    <p:sldId id="293" r:id="rId26"/>
+    <p:sldId id="291" r:id="rId27"/>
+    <p:sldId id="292" r:id="rId28"/>
   </p:sldIdLst>
   <p:sldSz cx="12192000" cy="6858000"/>
   <p:notesSz cx="6858000" cy="9144000"/>
@@ -221,7 +226,7 @@
           <a:p>
             <a:fld id="{7A220C89-F741-4A60-8725-24F669448BA8}" type="datetimeFigureOut">
               <a:rPr lang="zh-CN" altLang="en-US" smtClean="0"/>
-              <a:t>2018/8/19</a:t>
+              <a:t>2018/8/20</a:t>
             </a:fld>
             <a:endParaRPr lang="zh-CN" altLang="en-US"/>
           </a:p>
@@ -678,7 +683,7 @@
           <p:cNvPr id="4" name="日期占位符 3">
             <a:extLst>
               <a:ext uri="{FF2B5EF4-FFF2-40B4-BE49-F238E27FC236}">
-                <a16:creationId xmlns:a16="http://schemas.microsoft.com/office/drawing/2014/main" id="{E3C88C80-19D1-4BDB-93D6-01C8B5D57E2B}"/>
+                <a16:creationId xmlns:a16="http://schemas.microsoft.com/office/drawing/2014/main" xmlns="" id="{E3C88C80-19D1-4BDB-93D6-01C8B5D57E2B}"/>
               </a:ext>
             </a:extLst>
           </p:cNvPr>
@@ -696,7 +701,7 @@
           <a:p>
             <a:fld id="{E13947ED-5EF2-47D5-99F5-5EE8E4B8CE26}" type="datetimeFigureOut">
               <a:rPr lang="zh-CN" altLang="en-US" smtClean="0"/>
-              <a:t>2018/8/19</a:t>
+              <a:t>2018/8/20</a:t>
             </a:fld>
             <a:endParaRPr lang="zh-CN" altLang="en-US"/>
           </a:p>
@@ -707,7 +712,7 @@
           <p:cNvPr id="5" name="页脚占位符 4">
             <a:extLst>
               <a:ext uri="{FF2B5EF4-FFF2-40B4-BE49-F238E27FC236}">
-                <a16:creationId xmlns:a16="http://schemas.microsoft.com/office/drawing/2014/main" id="{DD2AB6A0-788E-44A1-9AE0-27A61338646E}"/>
+                <a16:creationId xmlns:a16="http://schemas.microsoft.com/office/drawing/2014/main" xmlns="" id="{DD2AB6A0-788E-44A1-9AE0-27A61338646E}"/>
               </a:ext>
             </a:extLst>
           </p:cNvPr>
@@ -732,7 +737,7 @@
           <p:cNvPr id="6" name="灯片编号占位符 5">
             <a:extLst>
               <a:ext uri="{FF2B5EF4-FFF2-40B4-BE49-F238E27FC236}">
-                <a16:creationId xmlns:a16="http://schemas.microsoft.com/office/drawing/2014/main" id="{990BFCAA-9D3B-477B-A442-619BF31A71E5}"/>
+                <a16:creationId xmlns:a16="http://schemas.microsoft.com/office/drawing/2014/main" xmlns="" id="{990BFCAA-9D3B-477B-A442-619BF31A71E5}"/>
               </a:ext>
             </a:extLst>
           </p:cNvPr>
@@ -761,7 +766,7 @@
           <p:cNvPr id="9" name="矩形 8">
             <a:extLst>
               <a:ext uri="{FF2B5EF4-FFF2-40B4-BE49-F238E27FC236}">
-                <a16:creationId xmlns:a16="http://schemas.microsoft.com/office/drawing/2014/main" id="{6C26513F-A3B8-4E41-B279-80D4C37DF881}"/>
+                <a16:creationId xmlns:a16="http://schemas.microsoft.com/office/drawing/2014/main" xmlns="" id="{6C26513F-A3B8-4E41-B279-80D4C37DF881}"/>
               </a:ext>
             </a:extLst>
           </p:cNvPr>
@@ -844,7 +849,7 @@
           <p:cNvPr id="2" name="标题 1">
             <a:extLst>
               <a:ext uri="{FF2B5EF4-FFF2-40B4-BE49-F238E27FC236}">
-                <a16:creationId xmlns:a16="http://schemas.microsoft.com/office/drawing/2014/main" id="{547EEB98-0393-480B-8E60-2A9EAD0978D9}"/>
+                <a16:creationId xmlns:a16="http://schemas.microsoft.com/office/drawing/2014/main" xmlns="" id="{547EEB98-0393-480B-8E60-2A9EAD0978D9}"/>
               </a:ext>
             </a:extLst>
           </p:cNvPr>
@@ -872,7 +877,7 @@
           <p:cNvPr id="3" name="竖排文字占位符 2">
             <a:extLst>
               <a:ext uri="{FF2B5EF4-FFF2-40B4-BE49-F238E27FC236}">
-                <a16:creationId xmlns:a16="http://schemas.microsoft.com/office/drawing/2014/main" id="{4D36B5DF-C4C3-4A77-8ACF-13B266642A8D}"/>
+                <a16:creationId xmlns:a16="http://schemas.microsoft.com/office/drawing/2014/main" xmlns="" id="{4D36B5DF-C4C3-4A77-8ACF-13B266642A8D}"/>
               </a:ext>
             </a:extLst>
           </p:cNvPr>
@@ -929,7 +934,7 @@
           <p:cNvPr id="4" name="日期占位符 3">
             <a:extLst>
               <a:ext uri="{FF2B5EF4-FFF2-40B4-BE49-F238E27FC236}">
-                <a16:creationId xmlns:a16="http://schemas.microsoft.com/office/drawing/2014/main" id="{DDE0ECAC-A3F9-42BE-BF00-901B87DA701C}"/>
+                <a16:creationId xmlns:a16="http://schemas.microsoft.com/office/drawing/2014/main" xmlns="" id="{DDE0ECAC-A3F9-42BE-BF00-901B87DA701C}"/>
               </a:ext>
             </a:extLst>
           </p:cNvPr>
@@ -947,7 +952,7 @@
           <a:p>
             <a:fld id="{E13947ED-5EF2-47D5-99F5-5EE8E4B8CE26}" type="datetimeFigureOut">
               <a:rPr lang="zh-CN" altLang="en-US" smtClean="0"/>
-              <a:t>2018/8/19</a:t>
+              <a:t>2018/8/20</a:t>
             </a:fld>
             <a:endParaRPr lang="zh-CN" altLang="en-US"/>
           </a:p>
@@ -958,7 +963,7 @@
           <p:cNvPr id="5" name="页脚占位符 4">
             <a:extLst>
               <a:ext uri="{FF2B5EF4-FFF2-40B4-BE49-F238E27FC236}">
-                <a16:creationId xmlns:a16="http://schemas.microsoft.com/office/drawing/2014/main" id="{D1B573EA-E7CA-4CD3-976F-3BA8607257B3}"/>
+                <a16:creationId xmlns:a16="http://schemas.microsoft.com/office/drawing/2014/main" xmlns="" id="{D1B573EA-E7CA-4CD3-976F-3BA8607257B3}"/>
               </a:ext>
             </a:extLst>
           </p:cNvPr>
@@ -983,7 +988,7 @@
           <p:cNvPr id="6" name="灯片编号占位符 5">
             <a:extLst>
               <a:ext uri="{FF2B5EF4-FFF2-40B4-BE49-F238E27FC236}">
-                <a16:creationId xmlns:a16="http://schemas.microsoft.com/office/drawing/2014/main" id="{01F2393C-774F-4C61-B26E-7E31793FF25B}"/>
+                <a16:creationId xmlns:a16="http://schemas.microsoft.com/office/drawing/2014/main" xmlns="" id="{01F2393C-774F-4C61-B26E-7E31793FF25B}"/>
               </a:ext>
             </a:extLst>
           </p:cNvPr>
@@ -1042,7 +1047,7 @@
           <p:cNvPr id="2" name="竖排标题 1">
             <a:extLst>
               <a:ext uri="{FF2B5EF4-FFF2-40B4-BE49-F238E27FC236}">
-                <a16:creationId xmlns:a16="http://schemas.microsoft.com/office/drawing/2014/main" id="{EDD4389D-1F5C-49F4-A396-E863F331CF99}"/>
+                <a16:creationId xmlns:a16="http://schemas.microsoft.com/office/drawing/2014/main" xmlns="" id="{EDD4389D-1F5C-49F4-A396-E863F331CF99}"/>
               </a:ext>
             </a:extLst>
           </p:cNvPr>
@@ -1075,7 +1080,7 @@
           <p:cNvPr id="3" name="竖排文字占位符 2">
             <a:extLst>
               <a:ext uri="{FF2B5EF4-FFF2-40B4-BE49-F238E27FC236}">
-                <a16:creationId xmlns:a16="http://schemas.microsoft.com/office/drawing/2014/main" id="{868EED7C-014A-412F-A030-FEEF200577A8}"/>
+                <a16:creationId xmlns:a16="http://schemas.microsoft.com/office/drawing/2014/main" xmlns="" id="{868EED7C-014A-412F-A030-FEEF200577A8}"/>
               </a:ext>
             </a:extLst>
           </p:cNvPr>
@@ -1137,7 +1142,7 @@
           <p:cNvPr id="4" name="日期占位符 3">
             <a:extLst>
               <a:ext uri="{FF2B5EF4-FFF2-40B4-BE49-F238E27FC236}">
-                <a16:creationId xmlns:a16="http://schemas.microsoft.com/office/drawing/2014/main" id="{552C2468-D58E-409B-B5B9-B259BA5D47C5}"/>
+                <a16:creationId xmlns:a16="http://schemas.microsoft.com/office/drawing/2014/main" xmlns="" id="{552C2468-D58E-409B-B5B9-B259BA5D47C5}"/>
               </a:ext>
             </a:extLst>
           </p:cNvPr>
@@ -1155,7 +1160,7 @@
           <a:p>
             <a:fld id="{E13947ED-5EF2-47D5-99F5-5EE8E4B8CE26}" type="datetimeFigureOut">
               <a:rPr lang="zh-CN" altLang="en-US" smtClean="0"/>
-              <a:t>2018/8/19</a:t>
+              <a:t>2018/8/20</a:t>
             </a:fld>
             <a:endParaRPr lang="zh-CN" altLang="en-US"/>
           </a:p>
@@ -1166,7 +1171,7 @@
           <p:cNvPr id="5" name="页脚占位符 4">
             <a:extLst>
               <a:ext uri="{FF2B5EF4-FFF2-40B4-BE49-F238E27FC236}">
-                <a16:creationId xmlns:a16="http://schemas.microsoft.com/office/drawing/2014/main" id="{39217E4D-8B68-498A-880E-43D36112B605}"/>
+                <a16:creationId xmlns:a16="http://schemas.microsoft.com/office/drawing/2014/main" xmlns="" id="{39217E4D-8B68-498A-880E-43D36112B605}"/>
               </a:ext>
             </a:extLst>
           </p:cNvPr>
@@ -1191,7 +1196,7 @@
           <p:cNvPr id="6" name="灯片编号占位符 5">
             <a:extLst>
               <a:ext uri="{FF2B5EF4-FFF2-40B4-BE49-F238E27FC236}">
-                <a16:creationId xmlns:a16="http://schemas.microsoft.com/office/drawing/2014/main" id="{8196A66A-5635-42D4-9D99-87FD143353B1}"/>
+                <a16:creationId xmlns:a16="http://schemas.microsoft.com/office/drawing/2014/main" xmlns="" id="{8196A66A-5635-42D4-9D99-87FD143353B1}"/>
               </a:ext>
             </a:extLst>
           </p:cNvPr>
@@ -1250,7 +1255,7 @@
           <p:cNvPr id="2" name="标题 1">
             <a:extLst>
               <a:ext uri="{FF2B5EF4-FFF2-40B4-BE49-F238E27FC236}">
-                <a16:creationId xmlns:a16="http://schemas.microsoft.com/office/drawing/2014/main" id="{EBD60D8C-16FE-4A0F-8162-224CE033DB87}"/>
+                <a16:creationId xmlns:a16="http://schemas.microsoft.com/office/drawing/2014/main" xmlns="" id="{EBD60D8C-16FE-4A0F-8162-224CE033DB87}"/>
               </a:ext>
             </a:extLst>
           </p:cNvPr>
@@ -1278,7 +1283,7 @@
           <p:cNvPr id="3" name="内容占位符 2">
             <a:extLst>
               <a:ext uri="{FF2B5EF4-FFF2-40B4-BE49-F238E27FC236}">
-                <a16:creationId xmlns:a16="http://schemas.microsoft.com/office/drawing/2014/main" id="{25FA777C-D381-45B9-8DE4-5B22917C81B7}"/>
+                <a16:creationId xmlns:a16="http://schemas.microsoft.com/office/drawing/2014/main" xmlns="" id="{25FA777C-D381-45B9-8DE4-5B22917C81B7}"/>
               </a:ext>
             </a:extLst>
           </p:cNvPr>
@@ -1335,7 +1340,7 @@
           <p:cNvPr id="4" name="日期占位符 3">
             <a:extLst>
               <a:ext uri="{FF2B5EF4-FFF2-40B4-BE49-F238E27FC236}">
-                <a16:creationId xmlns:a16="http://schemas.microsoft.com/office/drawing/2014/main" id="{19005A1B-C957-4703-9672-D38D7F0D42DE}"/>
+                <a16:creationId xmlns:a16="http://schemas.microsoft.com/office/drawing/2014/main" xmlns="" id="{19005A1B-C957-4703-9672-D38D7F0D42DE}"/>
               </a:ext>
             </a:extLst>
           </p:cNvPr>
@@ -1353,7 +1358,7 @@
           <a:p>
             <a:fld id="{E13947ED-5EF2-47D5-99F5-5EE8E4B8CE26}" type="datetimeFigureOut">
               <a:rPr lang="zh-CN" altLang="en-US" smtClean="0"/>
-              <a:t>2018/8/19</a:t>
+              <a:t>2018/8/20</a:t>
             </a:fld>
             <a:endParaRPr lang="zh-CN" altLang="en-US"/>
           </a:p>
@@ -1364,7 +1369,7 @@
           <p:cNvPr id="5" name="页脚占位符 4">
             <a:extLst>
               <a:ext uri="{FF2B5EF4-FFF2-40B4-BE49-F238E27FC236}">
-                <a16:creationId xmlns:a16="http://schemas.microsoft.com/office/drawing/2014/main" id="{13B04B88-D41A-4688-9279-72DDE1B03570}"/>
+                <a16:creationId xmlns:a16="http://schemas.microsoft.com/office/drawing/2014/main" xmlns="" id="{13B04B88-D41A-4688-9279-72DDE1B03570}"/>
               </a:ext>
             </a:extLst>
           </p:cNvPr>
@@ -1389,7 +1394,7 @@
           <p:cNvPr id="6" name="灯片编号占位符 5">
             <a:extLst>
               <a:ext uri="{FF2B5EF4-FFF2-40B4-BE49-F238E27FC236}">
-                <a16:creationId xmlns:a16="http://schemas.microsoft.com/office/drawing/2014/main" id="{13906B67-1FC3-45D1-809F-1D068B01C2CC}"/>
+                <a16:creationId xmlns:a16="http://schemas.microsoft.com/office/drawing/2014/main" xmlns="" id="{13906B67-1FC3-45D1-809F-1D068B01C2CC}"/>
               </a:ext>
             </a:extLst>
           </p:cNvPr>
@@ -1448,7 +1453,7 @@
           <p:cNvPr id="2" name="标题 1">
             <a:extLst>
               <a:ext uri="{FF2B5EF4-FFF2-40B4-BE49-F238E27FC236}">
-                <a16:creationId xmlns:a16="http://schemas.microsoft.com/office/drawing/2014/main" id="{93829A10-6E5B-407F-B75D-F81C28EC3C99}"/>
+                <a16:creationId xmlns:a16="http://schemas.microsoft.com/office/drawing/2014/main" xmlns="" id="{93829A10-6E5B-407F-B75D-F81C28EC3C99}"/>
               </a:ext>
             </a:extLst>
           </p:cNvPr>
@@ -1485,7 +1490,7 @@
           <p:cNvPr id="3" name="文本占位符 2">
             <a:extLst>
               <a:ext uri="{FF2B5EF4-FFF2-40B4-BE49-F238E27FC236}">
-                <a16:creationId xmlns:a16="http://schemas.microsoft.com/office/drawing/2014/main" id="{5CE05E73-EB18-44B9-86FB-CE40702FDFF1}"/>
+                <a16:creationId xmlns:a16="http://schemas.microsoft.com/office/drawing/2014/main" xmlns="" id="{5CE05E73-EB18-44B9-86FB-CE40702FDFF1}"/>
               </a:ext>
             </a:extLst>
           </p:cNvPr>
@@ -1610,7 +1615,7 @@
           <p:cNvPr id="4" name="日期占位符 3">
             <a:extLst>
               <a:ext uri="{FF2B5EF4-FFF2-40B4-BE49-F238E27FC236}">
-                <a16:creationId xmlns:a16="http://schemas.microsoft.com/office/drawing/2014/main" id="{06DC7E8F-AA26-44A7-86A1-15FAC0515E8B}"/>
+                <a16:creationId xmlns:a16="http://schemas.microsoft.com/office/drawing/2014/main" xmlns="" id="{06DC7E8F-AA26-44A7-86A1-15FAC0515E8B}"/>
               </a:ext>
             </a:extLst>
           </p:cNvPr>
@@ -1628,7 +1633,7 @@
           <a:p>
             <a:fld id="{E13947ED-5EF2-47D5-99F5-5EE8E4B8CE26}" type="datetimeFigureOut">
               <a:rPr lang="zh-CN" altLang="en-US" smtClean="0"/>
-              <a:t>2018/8/19</a:t>
+              <a:t>2018/8/20</a:t>
             </a:fld>
             <a:endParaRPr lang="zh-CN" altLang="en-US"/>
           </a:p>
@@ -1639,7 +1644,7 @@
           <p:cNvPr id="5" name="页脚占位符 4">
             <a:extLst>
               <a:ext uri="{FF2B5EF4-FFF2-40B4-BE49-F238E27FC236}">
-                <a16:creationId xmlns:a16="http://schemas.microsoft.com/office/drawing/2014/main" id="{5E53C6DD-ACA2-46A2-977E-CACA41DF418E}"/>
+                <a16:creationId xmlns:a16="http://schemas.microsoft.com/office/drawing/2014/main" xmlns="" id="{5E53C6DD-ACA2-46A2-977E-CACA41DF418E}"/>
               </a:ext>
             </a:extLst>
           </p:cNvPr>
@@ -1664,7 +1669,7 @@
           <p:cNvPr id="6" name="灯片编号占位符 5">
             <a:extLst>
               <a:ext uri="{FF2B5EF4-FFF2-40B4-BE49-F238E27FC236}">
-                <a16:creationId xmlns:a16="http://schemas.microsoft.com/office/drawing/2014/main" id="{94C0A770-B5C2-49A1-B551-FEBFEA495CCC}"/>
+                <a16:creationId xmlns:a16="http://schemas.microsoft.com/office/drawing/2014/main" xmlns="" id="{94C0A770-B5C2-49A1-B551-FEBFEA495CCC}"/>
               </a:ext>
             </a:extLst>
           </p:cNvPr>
@@ -1723,7 +1728,7 @@
           <p:cNvPr id="2" name="标题 1">
             <a:extLst>
               <a:ext uri="{FF2B5EF4-FFF2-40B4-BE49-F238E27FC236}">
-                <a16:creationId xmlns:a16="http://schemas.microsoft.com/office/drawing/2014/main" id="{20E86134-4E94-4A0C-A15D-B83812318D7B}"/>
+                <a16:creationId xmlns:a16="http://schemas.microsoft.com/office/drawing/2014/main" xmlns="" id="{20E86134-4E94-4A0C-A15D-B83812318D7B}"/>
               </a:ext>
             </a:extLst>
           </p:cNvPr>
@@ -1751,7 +1756,7 @@
           <p:cNvPr id="3" name="内容占位符 2">
             <a:extLst>
               <a:ext uri="{FF2B5EF4-FFF2-40B4-BE49-F238E27FC236}">
-                <a16:creationId xmlns:a16="http://schemas.microsoft.com/office/drawing/2014/main" id="{F96D7E77-2F48-4544-A1CD-9E86FCC55571}"/>
+                <a16:creationId xmlns:a16="http://schemas.microsoft.com/office/drawing/2014/main" xmlns="" id="{F96D7E77-2F48-4544-A1CD-9E86FCC55571}"/>
               </a:ext>
             </a:extLst>
           </p:cNvPr>
@@ -1813,7 +1818,7 @@
           <p:cNvPr id="4" name="内容占位符 3">
             <a:extLst>
               <a:ext uri="{FF2B5EF4-FFF2-40B4-BE49-F238E27FC236}">
-                <a16:creationId xmlns:a16="http://schemas.microsoft.com/office/drawing/2014/main" id="{378EF259-984C-4612-9697-1B614C457210}"/>
+                <a16:creationId xmlns:a16="http://schemas.microsoft.com/office/drawing/2014/main" xmlns="" id="{378EF259-984C-4612-9697-1B614C457210}"/>
               </a:ext>
             </a:extLst>
           </p:cNvPr>
@@ -1875,7 +1880,7 @@
           <p:cNvPr id="5" name="日期占位符 4">
             <a:extLst>
               <a:ext uri="{FF2B5EF4-FFF2-40B4-BE49-F238E27FC236}">
-                <a16:creationId xmlns:a16="http://schemas.microsoft.com/office/drawing/2014/main" id="{04FF540F-8520-4FB4-ACA3-49897EC342D8}"/>
+                <a16:creationId xmlns:a16="http://schemas.microsoft.com/office/drawing/2014/main" xmlns="" id="{04FF540F-8520-4FB4-ACA3-49897EC342D8}"/>
               </a:ext>
             </a:extLst>
           </p:cNvPr>
@@ -1893,7 +1898,7 @@
           <a:p>
             <a:fld id="{E13947ED-5EF2-47D5-99F5-5EE8E4B8CE26}" type="datetimeFigureOut">
               <a:rPr lang="zh-CN" altLang="en-US" smtClean="0"/>
-              <a:t>2018/8/19</a:t>
+              <a:t>2018/8/20</a:t>
             </a:fld>
             <a:endParaRPr lang="zh-CN" altLang="en-US"/>
           </a:p>
@@ -1904,7 +1909,7 @@
           <p:cNvPr id="6" name="页脚占位符 5">
             <a:extLst>
               <a:ext uri="{FF2B5EF4-FFF2-40B4-BE49-F238E27FC236}">
-                <a16:creationId xmlns:a16="http://schemas.microsoft.com/office/drawing/2014/main" id="{93EAA31E-3C16-4F4D-B614-85753F02F6B7}"/>
+                <a16:creationId xmlns:a16="http://schemas.microsoft.com/office/drawing/2014/main" xmlns="" id="{93EAA31E-3C16-4F4D-B614-85753F02F6B7}"/>
               </a:ext>
             </a:extLst>
           </p:cNvPr>
@@ -1929,7 +1934,7 @@
           <p:cNvPr id="7" name="灯片编号占位符 6">
             <a:extLst>
               <a:ext uri="{FF2B5EF4-FFF2-40B4-BE49-F238E27FC236}">
-                <a16:creationId xmlns:a16="http://schemas.microsoft.com/office/drawing/2014/main" id="{672D8E7C-60B4-42A0-AD00-D18A2C69FA31}"/>
+                <a16:creationId xmlns:a16="http://schemas.microsoft.com/office/drawing/2014/main" xmlns="" id="{672D8E7C-60B4-42A0-AD00-D18A2C69FA31}"/>
               </a:ext>
             </a:extLst>
           </p:cNvPr>
@@ -1988,7 +1993,7 @@
           <p:cNvPr id="2" name="标题 1">
             <a:extLst>
               <a:ext uri="{FF2B5EF4-FFF2-40B4-BE49-F238E27FC236}">
-                <a16:creationId xmlns:a16="http://schemas.microsoft.com/office/drawing/2014/main" id="{3DAA7673-F055-48BB-BC0D-B50A12E1DFAB}"/>
+                <a16:creationId xmlns:a16="http://schemas.microsoft.com/office/drawing/2014/main" xmlns="" id="{3DAA7673-F055-48BB-BC0D-B50A12E1DFAB}"/>
               </a:ext>
             </a:extLst>
           </p:cNvPr>
@@ -2021,7 +2026,7 @@
           <p:cNvPr id="3" name="文本占位符 2">
             <a:extLst>
               <a:ext uri="{FF2B5EF4-FFF2-40B4-BE49-F238E27FC236}">
-                <a16:creationId xmlns:a16="http://schemas.microsoft.com/office/drawing/2014/main" id="{12565607-4068-4C48-8E05-1F84A51D9647}"/>
+                <a16:creationId xmlns:a16="http://schemas.microsoft.com/office/drawing/2014/main" xmlns="" id="{12565607-4068-4C48-8E05-1F84A51D9647}"/>
               </a:ext>
             </a:extLst>
           </p:cNvPr>
@@ -2092,7 +2097,7 @@
           <p:cNvPr id="4" name="内容占位符 3">
             <a:extLst>
               <a:ext uri="{FF2B5EF4-FFF2-40B4-BE49-F238E27FC236}">
-                <a16:creationId xmlns:a16="http://schemas.microsoft.com/office/drawing/2014/main" id="{18D95BEA-0F84-49F2-BC33-24F0EFB4FF5C}"/>
+                <a16:creationId xmlns:a16="http://schemas.microsoft.com/office/drawing/2014/main" xmlns="" id="{18D95BEA-0F84-49F2-BC33-24F0EFB4FF5C}"/>
               </a:ext>
             </a:extLst>
           </p:cNvPr>
@@ -2154,7 +2159,7 @@
           <p:cNvPr id="5" name="文本占位符 4">
             <a:extLst>
               <a:ext uri="{FF2B5EF4-FFF2-40B4-BE49-F238E27FC236}">
-                <a16:creationId xmlns:a16="http://schemas.microsoft.com/office/drawing/2014/main" id="{FADB7FA0-9F9C-47EB-ADEC-362EE55BD927}"/>
+                <a16:creationId xmlns:a16="http://schemas.microsoft.com/office/drawing/2014/main" xmlns="" id="{FADB7FA0-9F9C-47EB-ADEC-362EE55BD927}"/>
               </a:ext>
             </a:extLst>
           </p:cNvPr>
@@ -2225,7 +2230,7 @@
           <p:cNvPr id="6" name="内容占位符 5">
             <a:extLst>
               <a:ext uri="{FF2B5EF4-FFF2-40B4-BE49-F238E27FC236}">
-                <a16:creationId xmlns:a16="http://schemas.microsoft.com/office/drawing/2014/main" id="{E7248ACC-75CB-41AA-817D-12AE2F3C6FFE}"/>
+                <a16:creationId xmlns:a16="http://schemas.microsoft.com/office/drawing/2014/main" xmlns="" id="{E7248ACC-75CB-41AA-817D-12AE2F3C6FFE}"/>
               </a:ext>
             </a:extLst>
           </p:cNvPr>
@@ -2287,7 +2292,7 @@
           <p:cNvPr id="7" name="日期占位符 6">
             <a:extLst>
               <a:ext uri="{FF2B5EF4-FFF2-40B4-BE49-F238E27FC236}">
-                <a16:creationId xmlns:a16="http://schemas.microsoft.com/office/drawing/2014/main" id="{0DB29D8F-F426-4E51-A0A5-3C4CEC90EC5D}"/>
+                <a16:creationId xmlns:a16="http://schemas.microsoft.com/office/drawing/2014/main" xmlns="" id="{0DB29D8F-F426-4E51-A0A5-3C4CEC90EC5D}"/>
               </a:ext>
             </a:extLst>
           </p:cNvPr>
@@ -2305,7 +2310,7 @@
           <a:p>
             <a:fld id="{E13947ED-5EF2-47D5-99F5-5EE8E4B8CE26}" type="datetimeFigureOut">
               <a:rPr lang="zh-CN" altLang="en-US" smtClean="0"/>
-              <a:t>2018/8/19</a:t>
+              <a:t>2018/8/20</a:t>
             </a:fld>
             <a:endParaRPr lang="zh-CN" altLang="en-US"/>
           </a:p>
@@ -2316,7 +2321,7 @@
           <p:cNvPr id="8" name="页脚占位符 7">
             <a:extLst>
               <a:ext uri="{FF2B5EF4-FFF2-40B4-BE49-F238E27FC236}">
-                <a16:creationId xmlns:a16="http://schemas.microsoft.com/office/drawing/2014/main" id="{A88F9B0E-30F6-457F-85F2-E64914582D9B}"/>
+                <a16:creationId xmlns:a16="http://schemas.microsoft.com/office/drawing/2014/main" xmlns="" id="{A88F9B0E-30F6-457F-85F2-E64914582D9B}"/>
               </a:ext>
             </a:extLst>
           </p:cNvPr>
@@ -2341,7 +2346,7 @@
           <p:cNvPr id="9" name="灯片编号占位符 8">
             <a:extLst>
               <a:ext uri="{FF2B5EF4-FFF2-40B4-BE49-F238E27FC236}">
-                <a16:creationId xmlns:a16="http://schemas.microsoft.com/office/drawing/2014/main" id="{A3E9E7FD-B0B2-4B59-94D3-CAF66405DB56}"/>
+                <a16:creationId xmlns:a16="http://schemas.microsoft.com/office/drawing/2014/main" xmlns="" id="{A3E9E7FD-B0B2-4B59-94D3-CAF66405DB56}"/>
               </a:ext>
             </a:extLst>
           </p:cNvPr>
@@ -2400,7 +2405,7 @@
           <p:cNvPr id="2" name="标题 1">
             <a:extLst>
               <a:ext uri="{FF2B5EF4-FFF2-40B4-BE49-F238E27FC236}">
-                <a16:creationId xmlns:a16="http://schemas.microsoft.com/office/drawing/2014/main" id="{6E8B22ED-2DBF-4A5A-8181-C8D94BB0A722}"/>
+                <a16:creationId xmlns:a16="http://schemas.microsoft.com/office/drawing/2014/main" xmlns="" id="{6E8B22ED-2DBF-4A5A-8181-C8D94BB0A722}"/>
               </a:ext>
             </a:extLst>
           </p:cNvPr>
@@ -2428,7 +2433,7 @@
           <p:cNvPr id="3" name="日期占位符 2">
             <a:extLst>
               <a:ext uri="{FF2B5EF4-FFF2-40B4-BE49-F238E27FC236}">
-                <a16:creationId xmlns:a16="http://schemas.microsoft.com/office/drawing/2014/main" id="{90CA4E6A-2A2F-4177-93FD-19E26096B93E}"/>
+                <a16:creationId xmlns:a16="http://schemas.microsoft.com/office/drawing/2014/main" xmlns="" id="{90CA4E6A-2A2F-4177-93FD-19E26096B93E}"/>
               </a:ext>
             </a:extLst>
           </p:cNvPr>
@@ -2446,7 +2451,7 @@
           <a:p>
             <a:fld id="{E13947ED-5EF2-47D5-99F5-5EE8E4B8CE26}" type="datetimeFigureOut">
               <a:rPr lang="zh-CN" altLang="en-US" smtClean="0"/>
-              <a:t>2018/8/19</a:t>
+              <a:t>2018/8/20</a:t>
             </a:fld>
             <a:endParaRPr lang="zh-CN" altLang="en-US"/>
           </a:p>
@@ -2457,7 +2462,7 @@
           <p:cNvPr id="4" name="页脚占位符 3">
             <a:extLst>
               <a:ext uri="{FF2B5EF4-FFF2-40B4-BE49-F238E27FC236}">
-                <a16:creationId xmlns:a16="http://schemas.microsoft.com/office/drawing/2014/main" id="{621446D4-BE62-44A4-9C63-2BFF90455072}"/>
+                <a16:creationId xmlns:a16="http://schemas.microsoft.com/office/drawing/2014/main" xmlns="" id="{621446D4-BE62-44A4-9C63-2BFF90455072}"/>
               </a:ext>
             </a:extLst>
           </p:cNvPr>
@@ -2482,7 +2487,7 @@
           <p:cNvPr id="5" name="灯片编号占位符 4">
             <a:extLst>
               <a:ext uri="{FF2B5EF4-FFF2-40B4-BE49-F238E27FC236}">
-                <a16:creationId xmlns:a16="http://schemas.microsoft.com/office/drawing/2014/main" id="{B8A11A11-70A6-45E2-944D-56FD59670EBB}"/>
+                <a16:creationId xmlns:a16="http://schemas.microsoft.com/office/drawing/2014/main" xmlns="" id="{B8A11A11-70A6-45E2-944D-56FD59670EBB}"/>
               </a:ext>
             </a:extLst>
           </p:cNvPr>
@@ -2541,7 +2546,7 @@
           <p:cNvPr id="2" name="日期占位符 1">
             <a:extLst>
               <a:ext uri="{FF2B5EF4-FFF2-40B4-BE49-F238E27FC236}">
-                <a16:creationId xmlns:a16="http://schemas.microsoft.com/office/drawing/2014/main" id="{944D6401-666C-4E1E-B427-A901A7B2A96C}"/>
+                <a16:creationId xmlns:a16="http://schemas.microsoft.com/office/drawing/2014/main" xmlns="" id="{944D6401-666C-4E1E-B427-A901A7B2A96C}"/>
               </a:ext>
             </a:extLst>
           </p:cNvPr>
@@ -2559,7 +2564,7 @@
           <a:p>
             <a:fld id="{E13947ED-5EF2-47D5-99F5-5EE8E4B8CE26}" type="datetimeFigureOut">
               <a:rPr lang="zh-CN" altLang="en-US" smtClean="0"/>
-              <a:t>2018/8/19</a:t>
+              <a:t>2018/8/20</a:t>
             </a:fld>
             <a:endParaRPr lang="zh-CN" altLang="en-US"/>
           </a:p>
@@ -2570,7 +2575,7 @@
           <p:cNvPr id="3" name="页脚占位符 2">
             <a:extLst>
               <a:ext uri="{FF2B5EF4-FFF2-40B4-BE49-F238E27FC236}">
-                <a16:creationId xmlns:a16="http://schemas.microsoft.com/office/drawing/2014/main" id="{C1141513-744D-4DB4-B4DB-10C84D946A98}"/>
+                <a16:creationId xmlns:a16="http://schemas.microsoft.com/office/drawing/2014/main" xmlns="" id="{C1141513-744D-4DB4-B4DB-10C84D946A98}"/>
               </a:ext>
             </a:extLst>
           </p:cNvPr>
@@ -2595,7 +2600,7 @@
           <p:cNvPr id="4" name="灯片编号占位符 3">
             <a:extLst>
               <a:ext uri="{FF2B5EF4-FFF2-40B4-BE49-F238E27FC236}">
-                <a16:creationId xmlns:a16="http://schemas.microsoft.com/office/drawing/2014/main" id="{50451892-D0AF-4AB1-A8B6-D32ECDC5BAD2}"/>
+                <a16:creationId xmlns:a16="http://schemas.microsoft.com/office/drawing/2014/main" xmlns="" id="{50451892-D0AF-4AB1-A8B6-D32ECDC5BAD2}"/>
               </a:ext>
             </a:extLst>
           </p:cNvPr>
@@ -2654,7 +2659,7 @@
           <p:cNvPr id="2" name="标题 1">
             <a:extLst>
               <a:ext uri="{FF2B5EF4-FFF2-40B4-BE49-F238E27FC236}">
-                <a16:creationId xmlns:a16="http://schemas.microsoft.com/office/drawing/2014/main" id="{1CDA1B03-EEB6-449F-B587-D8A250E3F408}"/>
+                <a16:creationId xmlns:a16="http://schemas.microsoft.com/office/drawing/2014/main" xmlns="" id="{1CDA1B03-EEB6-449F-B587-D8A250E3F408}"/>
               </a:ext>
             </a:extLst>
           </p:cNvPr>
@@ -2691,7 +2696,7 @@
           <p:cNvPr id="3" name="内容占位符 2">
             <a:extLst>
               <a:ext uri="{FF2B5EF4-FFF2-40B4-BE49-F238E27FC236}">
-                <a16:creationId xmlns:a16="http://schemas.microsoft.com/office/drawing/2014/main" id="{739C6ED7-0309-4F98-8E8C-1407596D463D}"/>
+                <a16:creationId xmlns:a16="http://schemas.microsoft.com/office/drawing/2014/main" xmlns="" id="{739C6ED7-0309-4F98-8E8C-1407596D463D}"/>
               </a:ext>
             </a:extLst>
           </p:cNvPr>
@@ -2781,7 +2786,7 @@
           <p:cNvPr id="4" name="文本占位符 3">
             <a:extLst>
               <a:ext uri="{FF2B5EF4-FFF2-40B4-BE49-F238E27FC236}">
-                <a16:creationId xmlns:a16="http://schemas.microsoft.com/office/drawing/2014/main" id="{8397134F-D875-45C7-8414-A1348E2A2713}"/>
+                <a16:creationId xmlns:a16="http://schemas.microsoft.com/office/drawing/2014/main" xmlns="" id="{8397134F-D875-45C7-8414-A1348E2A2713}"/>
               </a:ext>
             </a:extLst>
           </p:cNvPr>
@@ -2852,7 +2857,7 @@
           <p:cNvPr id="5" name="日期占位符 4">
             <a:extLst>
               <a:ext uri="{FF2B5EF4-FFF2-40B4-BE49-F238E27FC236}">
-                <a16:creationId xmlns:a16="http://schemas.microsoft.com/office/drawing/2014/main" id="{3CF02891-F26E-4C77-849A-A789958A3991}"/>
+                <a16:creationId xmlns:a16="http://schemas.microsoft.com/office/drawing/2014/main" xmlns="" id="{3CF02891-F26E-4C77-849A-A789958A3991}"/>
               </a:ext>
             </a:extLst>
           </p:cNvPr>
@@ -2870,7 +2875,7 @@
           <a:p>
             <a:fld id="{E13947ED-5EF2-47D5-99F5-5EE8E4B8CE26}" type="datetimeFigureOut">
               <a:rPr lang="zh-CN" altLang="en-US" smtClean="0"/>
-              <a:t>2018/8/19</a:t>
+              <a:t>2018/8/20</a:t>
             </a:fld>
             <a:endParaRPr lang="zh-CN" altLang="en-US"/>
           </a:p>
@@ -2881,7 +2886,7 @@
           <p:cNvPr id="6" name="页脚占位符 5">
             <a:extLst>
               <a:ext uri="{FF2B5EF4-FFF2-40B4-BE49-F238E27FC236}">
-                <a16:creationId xmlns:a16="http://schemas.microsoft.com/office/drawing/2014/main" id="{10F794DC-9C23-41AA-871C-1B1F276F55FD}"/>
+                <a16:creationId xmlns:a16="http://schemas.microsoft.com/office/drawing/2014/main" xmlns="" id="{10F794DC-9C23-41AA-871C-1B1F276F55FD}"/>
               </a:ext>
             </a:extLst>
           </p:cNvPr>
@@ -2906,7 +2911,7 @@
           <p:cNvPr id="7" name="灯片编号占位符 6">
             <a:extLst>
               <a:ext uri="{FF2B5EF4-FFF2-40B4-BE49-F238E27FC236}">
-                <a16:creationId xmlns:a16="http://schemas.microsoft.com/office/drawing/2014/main" id="{EFE8E85E-3D90-4BF4-BD34-8097D272FE25}"/>
+                <a16:creationId xmlns:a16="http://schemas.microsoft.com/office/drawing/2014/main" xmlns="" id="{EFE8E85E-3D90-4BF4-BD34-8097D272FE25}"/>
               </a:ext>
             </a:extLst>
           </p:cNvPr>
@@ -2965,7 +2970,7 @@
           <p:cNvPr id="2" name="标题 1">
             <a:extLst>
               <a:ext uri="{FF2B5EF4-FFF2-40B4-BE49-F238E27FC236}">
-                <a16:creationId xmlns:a16="http://schemas.microsoft.com/office/drawing/2014/main" id="{6AF319B2-F2EA-495A-82D3-E6EB39D4A314}"/>
+                <a16:creationId xmlns:a16="http://schemas.microsoft.com/office/drawing/2014/main" xmlns="" id="{6AF319B2-F2EA-495A-82D3-E6EB39D4A314}"/>
               </a:ext>
             </a:extLst>
           </p:cNvPr>
@@ -3002,7 +3007,7 @@
           <p:cNvPr id="3" name="图片占位符 2">
             <a:extLst>
               <a:ext uri="{FF2B5EF4-FFF2-40B4-BE49-F238E27FC236}">
-                <a16:creationId xmlns:a16="http://schemas.microsoft.com/office/drawing/2014/main" id="{DC669108-E9E2-412C-92F4-801DAD27A8D8}"/>
+                <a16:creationId xmlns:a16="http://schemas.microsoft.com/office/drawing/2014/main" xmlns="" id="{DC669108-E9E2-412C-92F4-801DAD27A8D8}"/>
               </a:ext>
             </a:extLst>
           </p:cNvPr>
@@ -3072,7 +3077,7 @@
           <p:cNvPr id="4" name="文本占位符 3">
             <a:extLst>
               <a:ext uri="{FF2B5EF4-FFF2-40B4-BE49-F238E27FC236}">
-                <a16:creationId xmlns:a16="http://schemas.microsoft.com/office/drawing/2014/main" id="{F644806A-9C87-4B48-9471-9E8D8BC120E1}"/>
+                <a16:creationId xmlns:a16="http://schemas.microsoft.com/office/drawing/2014/main" xmlns="" id="{F644806A-9C87-4B48-9471-9E8D8BC120E1}"/>
               </a:ext>
             </a:extLst>
           </p:cNvPr>
@@ -3143,7 +3148,7 @@
           <p:cNvPr id="5" name="日期占位符 4">
             <a:extLst>
               <a:ext uri="{FF2B5EF4-FFF2-40B4-BE49-F238E27FC236}">
-                <a16:creationId xmlns:a16="http://schemas.microsoft.com/office/drawing/2014/main" id="{7BE6CDDA-FE39-4DB3-A68F-E1EBE86A321D}"/>
+                <a16:creationId xmlns:a16="http://schemas.microsoft.com/office/drawing/2014/main" xmlns="" id="{7BE6CDDA-FE39-4DB3-A68F-E1EBE86A321D}"/>
               </a:ext>
             </a:extLst>
           </p:cNvPr>
@@ -3161,7 +3166,7 @@
           <a:p>
             <a:fld id="{E13947ED-5EF2-47D5-99F5-5EE8E4B8CE26}" type="datetimeFigureOut">
               <a:rPr lang="zh-CN" altLang="en-US" smtClean="0"/>
-              <a:t>2018/8/19</a:t>
+              <a:t>2018/8/20</a:t>
             </a:fld>
             <a:endParaRPr lang="zh-CN" altLang="en-US"/>
           </a:p>
@@ -3172,7 +3177,7 @@
           <p:cNvPr id="6" name="页脚占位符 5">
             <a:extLst>
               <a:ext uri="{FF2B5EF4-FFF2-40B4-BE49-F238E27FC236}">
-                <a16:creationId xmlns:a16="http://schemas.microsoft.com/office/drawing/2014/main" id="{EE0E17C6-1E15-4A08-99C9-CE3214A5BDB0}"/>
+                <a16:creationId xmlns:a16="http://schemas.microsoft.com/office/drawing/2014/main" xmlns="" id="{EE0E17C6-1E15-4A08-99C9-CE3214A5BDB0}"/>
               </a:ext>
             </a:extLst>
           </p:cNvPr>
@@ -3197,7 +3202,7 @@
           <p:cNvPr id="7" name="灯片编号占位符 6">
             <a:extLst>
               <a:ext uri="{FF2B5EF4-FFF2-40B4-BE49-F238E27FC236}">
-                <a16:creationId xmlns:a16="http://schemas.microsoft.com/office/drawing/2014/main" id="{F5EF518D-DE11-4978-A147-1D9DC5E1AEAA}"/>
+                <a16:creationId xmlns:a16="http://schemas.microsoft.com/office/drawing/2014/main" xmlns="" id="{F5EF518D-DE11-4978-A147-1D9DC5E1AEAA}"/>
               </a:ext>
             </a:extLst>
           </p:cNvPr>
@@ -3261,7 +3266,7 @@
           <p:cNvPr id="2" name="标题占位符 1">
             <a:extLst>
               <a:ext uri="{FF2B5EF4-FFF2-40B4-BE49-F238E27FC236}">
-                <a16:creationId xmlns:a16="http://schemas.microsoft.com/office/drawing/2014/main" id="{28EBF438-41A3-4937-996D-FA6764742BB8}"/>
+                <a16:creationId xmlns:a16="http://schemas.microsoft.com/office/drawing/2014/main" xmlns="" id="{28EBF438-41A3-4937-996D-FA6764742BB8}"/>
               </a:ext>
             </a:extLst>
           </p:cNvPr>
@@ -3299,7 +3304,7 @@
           <p:cNvPr id="3" name="文本占位符 2">
             <a:extLst>
               <a:ext uri="{FF2B5EF4-FFF2-40B4-BE49-F238E27FC236}">
-                <a16:creationId xmlns:a16="http://schemas.microsoft.com/office/drawing/2014/main" id="{FA3404A1-F618-4B83-9FE9-069EC716D197}"/>
+                <a16:creationId xmlns:a16="http://schemas.microsoft.com/office/drawing/2014/main" xmlns="" id="{FA3404A1-F618-4B83-9FE9-069EC716D197}"/>
               </a:ext>
             </a:extLst>
           </p:cNvPr>
@@ -3366,7 +3371,7 @@
           <p:cNvPr id="4" name="日期占位符 3">
             <a:extLst>
               <a:ext uri="{FF2B5EF4-FFF2-40B4-BE49-F238E27FC236}">
-                <a16:creationId xmlns:a16="http://schemas.microsoft.com/office/drawing/2014/main" id="{9C8E792F-4EBC-413C-A243-D97C66D1E2C0}"/>
+                <a16:creationId xmlns:a16="http://schemas.microsoft.com/office/drawing/2014/main" xmlns="" id="{9C8E792F-4EBC-413C-A243-D97C66D1E2C0}"/>
               </a:ext>
             </a:extLst>
           </p:cNvPr>
@@ -3402,7 +3407,7 @@
           <a:p>
             <a:fld id="{E13947ED-5EF2-47D5-99F5-5EE8E4B8CE26}" type="datetimeFigureOut">
               <a:rPr lang="zh-CN" altLang="en-US" smtClean="0"/>
-              <a:t>2018/8/19</a:t>
+              <a:t>2018/8/20</a:t>
             </a:fld>
             <a:endParaRPr lang="zh-CN" altLang="en-US"/>
           </a:p>
@@ -3413,7 +3418,7 @@
           <p:cNvPr id="5" name="页脚占位符 4">
             <a:extLst>
               <a:ext uri="{FF2B5EF4-FFF2-40B4-BE49-F238E27FC236}">
-                <a16:creationId xmlns:a16="http://schemas.microsoft.com/office/drawing/2014/main" id="{8D5A4C37-2E6F-4F77-B247-ED9AAB071824}"/>
+                <a16:creationId xmlns:a16="http://schemas.microsoft.com/office/drawing/2014/main" xmlns="" id="{8D5A4C37-2E6F-4F77-B247-ED9AAB071824}"/>
               </a:ext>
             </a:extLst>
           </p:cNvPr>
@@ -3456,7 +3461,7 @@
           <p:cNvPr id="6" name="灯片编号占位符 5">
             <a:extLst>
               <a:ext uri="{FF2B5EF4-FFF2-40B4-BE49-F238E27FC236}">
-                <a16:creationId xmlns:a16="http://schemas.microsoft.com/office/drawing/2014/main" id="{665BB5BD-B023-490B-8DCF-87B72E474604}"/>
+                <a16:creationId xmlns:a16="http://schemas.microsoft.com/office/drawing/2014/main" xmlns="" id="{665BB5BD-B023-490B-8DCF-87B72E474604}"/>
               </a:ext>
             </a:extLst>
           </p:cNvPr>
@@ -3824,7 +3829,7 @@
           <p:cNvPr id="2" name="文本框 1">
             <a:extLst>
               <a:ext uri="{FF2B5EF4-FFF2-40B4-BE49-F238E27FC236}">
-                <a16:creationId xmlns:a16="http://schemas.microsoft.com/office/drawing/2014/main" id="{F6B06F0D-1228-4443-B0F7-36556C7ECDBC}"/>
+                <a16:creationId xmlns:a16="http://schemas.microsoft.com/office/drawing/2014/main" xmlns="" id="{F6B06F0D-1228-4443-B0F7-36556C7ECDBC}"/>
               </a:ext>
             </a:extLst>
           </p:cNvPr>
@@ -3859,7 +3864,7 @@
           <p:cNvPr id="3" name="文本框 2">
             <a:extLst>
               <a:ext uri="{FF2B5EF4-FFF2-40B4-BE49-F238E27FC236}">
-                <a16:creationId xmlns:a16="http://schemas.microsoft.com/office/drawing/2014/main" id="{7F809FAF-1B62-4718-9A34-5E411051246F}"/>
+                <a16:creationId xmlns:a16="http://schemas.microsoft.com/office/drawing/2014/main" xmlns="" id="{7F809FAF-1B62-4718-9A34-5E411051246F}"/>
               </a:ext>
             </a:extLst>
           </p:cNvPr>
@@ -3895,7 +3900,7 @@
           <p:cNvPr id="4" name="文本框 3">
             <a:extLst>
               <a:ext uri="{FF2B5EF4-FFF2-40B4-BE49-F238E27FC236}">
-                <a16:creationId xmlns:a16="http://schemas.microsoft.com/office/drawing/2014/main" id="{9DAFDFA8-40DE-48CA-AF8F-EC62E6EDCE29}"/>
+                <a16:creationId xmlns:a16="http://schemas.microsoft.com/office/drawing/2014/main" xmlns="" id="{9DAFDFA8-40DE-48CA-AF8F-EC62E6EDCE29}"/>
               </a:ext>
             </a:extLst>
           </p:cNvPr>
@@ -3931,7 +3936,7 @@
           <p:cNvPr id="5" name="文本框 4">
             <a:extLst>
               <a:ext uri="{FF2B5EF4-FFF2-40B4-BE49-F238E27FC236}">
-                <a16:creationId xmlns:a16="http://schemas.microsoft.com/office/drawing/2014/main" id="{A32A5490-6048-430C-A38C-32B504C2FAB1}"/>
+                <a16:creationId xmlns:a16="http://schemas.microsoft.com/office/drawing/2014/main" xmlns="" id="{A32A5490-6048-430C-A38C-32B504C2FAB1}"/>
               </a:ext>
             </a:extLst>
           </p:cNvPr>
@@ -3940,7 +3945,7 @@
         </p:nvSpPr>
         <p:spPr>
           <a:xfrm>
-            <a:off x="5494712" y="3820708"/>
+            <a:off x="5451715" y="4545637"/>
             <a:ext cx="1757212" cy="584775"/>
           </a:xfrm>
           <a:prstGeom prst="rect">
@@ -3955,10 +3960,10 @@
           <a:lstStyle/>
           <a:p>
             <a:r>
-              <a:rPr lang="en-US" altLang="zh-CN" sz="3200"/>
+              <a:rPr lang="en-US" altLang="zh-CN" sz="3200" dirty="0" err="1"/>
               <a:t>TreeMap</a:t>
             </a:r>
-            <a:endParaRPr lang="zh-CN" altLang="en-US" sz="3200"/>
+            <a:endParaRPr lang="zh-CN" altLang="en-US" sz="3200" dirty="0"/>
           </a:p>
         </p:txBody>
       </p:sp>
@@ -3967,7 +3972,7 @@
           <p:cNvPr id="6" name="文本框 5">
             <a:extLst>
               <a:ext uri="{FF2B5EF4-FFF2-40B4-BE49-F238E27FC236}">
-                <a16:creationId xmlns:a16="http://schemas.microsoft.com/office/drawing/2014/main" id="{6EEC58BD-E0B4-4135-AD7B-22FF640B64BB}"/>
+                <a16:creationId xmlns:a16="http://schemas.microsoft.com/office/drawing/2014/main" xmlns="" id="{6EEC58BD-E0B4-4135-AD7B-22FF640B64BB}"/>
               </a:ext>
             </a:extLst>
           </p:cNvPr>
@@ -4003,7 +4008,7 @@
           <p:cNvPr id="7" name="文本框 6">
             <a:extLst>
               <a:ext uri="{FF2B5EF4-FFF2-40B4-BE49-F238E27FC236}">
-                <a16:creationId xmlns:a16="http://schemas.microsoft.com/office/drawing/2014/main" id="{ECD587B2-0662-4350-9ECB-2153752A1222}"/>
+                <a16:creationId xmlns:a16="http://schemas.microsoft.com/office/drawing/2014/main" xmlns="" id="{ECD587B2-0662-4350-9ECB-2153752A1222}"/>
               </a:ext>
             </a:extLst>
           </p:cNvPr>
@@ -4012,7 +4017,7 @@
         </p:nvSpPr>
         <p:spPr>
           <a:xfrm>
-            <a:off x="5479769" y="4470861"/>
+            <a:off x="5519843" y="5195790"/>
             <a:ext cx="1620957" cy="584775"/>
           </a:xfrm>
           <a:prstGeom prst="rect">
@@ -4027,10 +4032,49 @@
           <a:lstStyle/>
           <a:p>
             <a:r>
-              <a:rPr lang="en-US" altLang="zh-CN" sz="3200"/>
+              <a:rPr lang="en-US" altLang="zh-CN" sz="3200" dirty="0" err="1"/>
               <a:t>HashSet</a:t>
             </a:r>
-            <a:endParaRPr lang="zh-CN" altLang="en-US" sz="3200"/>
+            <a:endParaRPr lang="zh-CN" altLang="en-US" sz="3200" dirty="0"/>
+          </a:p>
+        </p:txBody>
+      </p:sp>
+      <p:sp>
+        <p:nvSpPr>
+          <p:cNvPr id="8" name="文本框 7">
+            <a:extLst>
+              <a:ext uri="{FF2B5EF4-FFF2-40B4-BE49-F238E27FC236}">
+                <a16:creationId xmlns:a16="http://schemas.microsoft.com/office/drawing/2014/main" xmlns="" id="{A32A5490-6048-430C-A38C-32B504C2FAB1}"/>
+              </a:ext>
+            </a:extLst>
+          </p:cNvPr>
+          <p:cNvSpPr txBox="1"/>
+          <p:nvPr/>
+        </p:nvSpPr>
+        <p:spPr>
+          <a:xfrm>
+            <a:off x="5479769" y="3820708"/>
+            <a:ext cx="3951723" cy="584775"/>
+          </a:xfrm>
+          <a:prstGeom prst="rect">
+            <a:avLst/>
+          </a:prstGeom>
+          <a:noFill/>
+        </p:spPr>
+        <p:txBody>
+          <a:bodyPr wrap="none" rtlCol="0" anchor="ctr">
+            <a:spAutoFit/>
+          </a:bodyPr>
+          <a:lstStyle/>
+          <a:p>
+            <a:r>
+              <a:rPr lang="en-US" altLang="zh-CN" sz="3200" dirty="0" err="1"/>
+              <a:t>ConcurrentHashMap</a:t>
+            </a:r>
+            <a:r>
+              <a:rPr lang="en-US" altLang="zh-CN" sz="3200" b="1" dirty="0"/>
+              <a:t> </a:t>
+            </a:r>
           </a:p>
         </p:txBody>
       </p:sp>
@@ -4069,7 +4113,7 @@
           <p:cNvPr id="2" name="矩形 1">
             <a:extLst>
               <a:ext uri="{FF2B5EF4-FFF2-40B4-BE49-F238E27FC236}">
-                <a16:creationId xmlns:a16="http://schemas.microsoft.com/office/drawing/2014/main" id="{6ADC338D-2A42-4214-AF1E-E893ABC84C3A}"/>
+                <a16:creationId xmlns:a16="http://schemas.microsoft.com/office/drawing/2014/main" xmlns="" id="{6ADC338D-2A42-4214-AF1E-E893ABC84C3A}"/>
               </a:ext>
             </a:extLst>
           </p:cNvPr>
@@ -4104,7 +4148,7 @@
           <p:cNvPr id="5" name="图片 4">
             <a:extLst>
               <a:ext uri="{FF2B5EF4-FFF2-40B4-BE49-F238E27FC236}">
-                <a16:creationId xmlns:a16="http://schemas.microsoft.com/office/drawing/2014/main" id="{7BA30A2C-2D5E-4743-A6F3-ECE697C6B2F3}"/>
+                <a16:creationId xmlns:a16="http://schemas.microsoft.com/office/drawing/2014/main" xmlns="" id="{7BA30A2C-2D5E-4743-A6F3-ECE697C6B2F3}"/>
               </a:ext>
             </a:extLst>
           </p:cNvPr>
@@ -4164,7 +4208,7 @@
           <p:cNvPr id="2" name="矩形 1">
             <a:extLst>
               <a:ext uri="{FF2B5EF4-FFF2-40B4-BE49-F238E27FC236}">
-                <a16:creationId xmlns:a16="http://schemas.microsoft.com/office/drawing/2014/main" id="{36E8F243-5DCE-4B6B-B182-3A83785914E5}"/>
+                <a16:creationId xmlns:a16="http://schemas.microsoft.com/office/drawing/2014/main" xmlns="" id="{36E8F243-5DCE-4B6B-B182-3A83785914E5}"/>
               </a:ext>
             </a:extLst>
           </p:cNvPr>
@@ -4199,7 +4243,7 @@
           <p:cNvPr id="3" name="图片 2">
             <a:extLst>
               <a:ext uri="{FF2B5EF4-FFF2-40B4-BE49-F238E27FC236}">
-                <a16:creationId xmlns:a16="http://schemas.microsoft.com/office/drawing/2014/main" id="{4570B9F7-5484-40ED-92EF-5D099046089E}"/>
+                <a16:creationId xmlns:a16="http://schemas.microsoft.com/office/drawing/2014/main" xmlns="" id="{4570B9F7-5484-40ED-92EF-5D099046089E}"/>
               </a:ext>
             </a:extLst>
           </p:cNvPr>
@@ -4259,7 +4303,7 @@
           <p:cNvPr id="3" name="图片 2">
             <a:extLst>
               <a:ext uri="{FF2B5EF4-FFF2-40B4-BE49-F238E27FC236}">
-                <a16:creationId xmlns:a16="http://schemas.microsoft.com/office/drawing/2014/main" id="{AFD6668A-FCFA-4750-9810-10E65F53D474}"/>
+                <a16:creationId xmlns:a16="http://schemas.microsoft.com/office/drawing/2014/main" xmlns="" id="{AFD6668A-FCFA-4750-9810-10E65F53D474}"/>
               </a:ext>
             </a:extLst>
           </p:cNvPr>
@@ -4319,7 +4363,7 @@
           <p:cNvPr id="2" name="矩形 1">
             <a:extLst>
               <a:ext uri="{FF2B5EF4-FFF2-40B4-BE49-F238E27FC236}">
-                <a16:creationId xmlns:a16="http://schemas.microsoft.com/office/drawing/2014/main" id="{A7C3A55E-ACA6-468B-8EE2-F79CC155B43C}"/>
+                <a16:creationId xmlns:a16="http://schemas.microsoft.com/office/drawing/2014/main" xmlns="" id="{A7C3A55E-ACA6-468B-8EE2-F79CC155B43C}"/>
               </a:ext>
             </a:extLst>
           </p:cNvPr>
@@ -4354,7 +4398,7 @@
           <p:cNvPr id="4" name="矩形 3">
             <a:extLst>
               <a:ext uri="{FF2B5EF4-FFF2-40B4-BE49-F238E27FC236}">
-                <a16:creationId xmlns:a16="http://schemas.microsoft.com/office/drawing/2014/main" id="{8EE2C36E-41C4-4812-B2C7-6D3DA3A05C81}"/>
+                <a16:creationId xmlns:a16="http://schemas.microsoft.com/office/drawing/2014/main" xmlns="" id="{8EE2C36E-41C4-4812-B2C7-6D3DA3A05C81}"/>
               </a:ext>
             </a:extLst>
           </p:cNvPr>
@@ -4388,7 +4432,7 @@
           <p:cNvPr id="10" name="图片 9">
             <a:extLst>
               <a:ext uri="{FF2B5EF4-FFF2-40B4-BE49-F238E27FC236}">
-                <a16:creationId xmlns:a16="http://schemas.microsoft.com/office/drawing/2014/main" id="{4DA7838D-466F-4DD2-B7A1-2616B47DA946}"/>
+                <a16:creationId xmlns:a16="http://schemas.microsoft.com/office/drawing/2014/main" xmlns="" id="{4DA7838D-466F-4DD2-B7A1-2616B47DA946}"/>
               </a:ext>
             </a:extLst>
           </p:cNvPr>
@@ -4448,7 +4492,7 @@
           <p:cNvPr id="2" name="矩形 1">
             <a:extLst>
               <a:ext uri="{FF2B5EF4-FFF2-40B4-BE49-F238E27FC236}">
-                <a16:creationId xmlns:a16="http://schemas.microsoft.com/office/drawing/2014/main" id="{34E60C45-1274-4BDF-BC43-94EAA77545BA}"/>
+                <a16:creationId xmlns:a16="http://schemas.microsoft.com/office/drawing/2014/main" xmlns="" id="{34E60C45-1274-4BDF-BC43-94EAA77545BA}"/>
               </a:ext>
             </a:extLst>
           </p:cNvPr>
@@ -4483,7 +4527,7 @@
           <p:cNvPr id="3" name="Picture 2" descr="https://images2015.cnblogs.com/blog/406535/201606/406535-20160601172257399-1416926928.png">
             <a:extLst>
               <a:ext uri="{FF2B5EF4-FFF2-40B4-BE49-F238E27FC236}">
-                <a16:creationId xmlns:a16="http://schemas.microsoft.com/office/drawing/2014/main" id="{BF4BEE9A-A291-4CD8-A8F6-D98A727EF59C}"/>
+                <a16:creationId xmlns:a16="http://schemas.microsoft.com/office/drawing/2014/main" xmlns="" id="{BF4BEE9A-A291-4CD8-A8F6-D98A727EF59C}"/>
               </a:ext>
             </a:extLst>
           </p:cNvPr>
@@ -4530,7 +4574,7 @@
           <p:cNvPr id="4" name="矩形 3">
             <a:extLst>
               <a:ext uri="{FF2B5EF4-FFF2-40B4-BE49-F238E27FC236}">
-                <a16:creationId xmlns:a16="http://schemas.microsoft.com/office/drawing/2014/main" id="{2DF72FFF-0DAF-4686-B844-A92CEEF45642}"/>
+                <a16:creationId xmlns:a16="http://schemas.microsoft.com/office/drawing/2014/main" xmlns="" id="{2DF72FFF-0DAF-4686-B844-A92CEEF45642}"/>
               </a:ext>
             </a:extLst>
           </p:cNvPr>
@@ -4605,6 +4649,10 @@
                 <a:latin typeface="verdana" panose="020B0604030504040204" pitchFamily="34" charset="0"/>
               </a:rPr>
               <a:t>方法是花费常数时间的，但是如果插入元素和删除元素，除非插入和删除的位置都在表末尾，否则代码开销会很大，因为里面需要数组的移动。</a:t>
+            </a:r>
+            <a:r>
+              <a:rPr lang="zh-CN" altLang="en-US"/>
+              <a:t/>
             </a:r>
             <a:br>
               <a:rPr lang="zh-CN" altLang="en-US"/>
@@ -4684,7 +4732,7 @@
           <p:cNvPr id="21" name="图片 20">
             <a:extLst>
               <a:ext uri="{FF2B5EF4-FFF2-40B4-BE49-F238E27FC236}">
-                <a16:creationId xmlns:a16="http://schemas.microsoft.com/office/drawing/2014/main" id="{8541D66C-F8B9-4365-A941-3D0ED71A687C}"/>
+                <a16:creationId xmlns:a16="http://schemas.microsoft.com/office/drawing/2014/main" xmlns="" id="{8541D66C-F8B9-4365-A941-3D0ED71A687C}"/>
               </a:ext>
             </a:extLst>
           </p:cNvPr>
@@ -4714,7 +4762,7 @@
           <p:cNvPr id="26" name="图片 25">
             <a:extLst>
               <a:ext uri="{FF2B5EF4-FFF2-40B4-BE49-F238E27FC236}">
-                <a16:creationId xmlns:a16="http://schemas.microsoft.com/office/drawing/2014/main" id="{9B6054CF-A77E-4E7F-AA2D-C9C8EF028FA0}"/>
+                <a16:creationId xmlns:a16="http://schemas.microsoft.com/office/drawing/2014/main" xmlns="" id="{9B6054CF-A77E-4E7F-AA2D-C9C8EF028FA0}"/>
               </a:ext>
             </a:extLst>
           </p:cNvPr>
@@ -4744,7 +4792,7 @@
           <p:cNvPr id="2" name="矩形 1">
             <a:extLst>
               <a:ext uri="{FF2B5EF4-FFF2-40B4-BE49-F238E27FC236}">
-                <a16:creationId xmlns:a16="http://schemas.microsoft.com/office/drawing/2014/main" id="{1686E41A-9C10-4E1D-94C6-C784BE48F0CC}"/>
+                <a16:creationId xmlns:a16="http://schemas.microsoft.com/office/drawing/2014/main" xmlns="" id="{1686E41A-9C10-4E1D-94C6-C784BE48F0CC}"/>
               </a:ext>
             </a:extLst>
           </p:cNvPr>
@@ -4779,7 +4827,7 @@
           <p:cNvPr id="10" name="直接箭头连接符 9">
             <a:extLst>
               <a:ext uri="{FF2B5EF4-FFF2-40B4-BE49-F238E27FC236}">
-                <a16:creationId xmlns:a16="http://schemas.microsoft.com/office/drawing/2014/main" id="{0C4371D2-F3DF-4F01-90B6-3477DAA91942}"/>
+                <a16:creationId xmlns:a16="http://schemas.microsoft.com/office/drawing/2014/main" xmlns="" id="{0C4371D2-F3DF-4F01-90B6-3477DAA91942}"/>
               </a:ext>
             </a:extLst>
           </p:cNvPr>
@@ -4820,7 +4868,7 @@
           <p:cNvPr id="3" name="图片 2">
             <a:extLst>
               <a:ext uri="{FF2B5EF4-FFF2-40B4-BE49-F238E27FC236}">
-                <a16:creationId xmlns:a16="http://schemas.microsoft.com/office/drawing/2014/main" id="{9E25F210-4A83-4C9A-B699-E753E4584248}"/>
+                <a16:creationId xmlns:a16="http://schemas.microsoft.com/office/drawing/2014/main" xmlns="" id="{9E25F210-4A83-4C9A-B699-E753E4584248}"/>
               </a:ext>
             </a:extLst>
           </p:cNvPr>
@@ -4850,7 +4898,7 @@
           <p:cNvPr id="4" name="文本框 3">
             <a:extLst>
               <a:ext uri="{FF2B5EF4-FFF2-40B4-BE49-F238E27FC236}">
-                <a16:creationId xmlns:a16="http://schemas.microsoft.com/office/drawing/2014/main" id="{5A5055F5-2C11-4670-9021-E6FF25D8C017}"/>
+                <a16:creationId xmlns:a16="http://schemas.microsoft.com/office/drawing/2014/main" xmlns="" id="{5A5055F5-2C11-4670-9021-E6FF25D8C017}"/>
               </a:ext>
             </a:extLst>
           </p:cNvPr>
@@ -4889,7 +4937,7 @@
           <p:cNvPr id="8" name="直接箭头连接符 7">
             <a:extLst>
               <a:ext uri="{FF2B5EF4-FFF2-40B4-BE49-F238E27FC236}">
-                <a16:creationId xmlns:a16="http://schemas.microsoft.com/office/drawing/2014/main" id="{FE0AB037-F91F-47A5-B6CA-774630B70B09}"/>
+                <a16:creationId xmlns:a16="http://schemas.microsoft.com/office/drawing/2014/main" xmlns="" id="{FE0AB037-F91F-47A5-B6CA-774630B70B09}"/>
               </a:ext>
             </a:extLst>
           </p:cNvPr>
@@ -4926,6 +4974,34 @@
           </a:fontRef>
         </p:style>
       </p:cxnSp>
+      <p:sp>
+        <p:nvSpPr>
+          <p:cNvPr id="5" name="矩形 4"/>
+          <p:cNvSpPr/>
+          <p:nvPr/>
+        </p:nvSpPr>
+        <p:spPr>
+          <a:xfrm>
+            <a:off x="2116250" y="152357"/>
+            <a:ext cx="4099199" cy="369332"/>
+          </a:xfrm>
+          <a:prstGeom prst="rect">
+            <a:avLst/>
+          </a:prstGeom>
+        </p:spPr>
+        <p:txBody>
+          <a:bodyPr wrap="none">
+            <a:spAutoFit/>
+          </a:bodyPr>
+          <a:lstStyle/>
+          <a:p>
+            <a:r>
+              <a:rPr lang="zh-CN" altLang="en-US" dirty="0"/>
+              <a:t>http://www.importnew.com/28263.html</a:t>
+            </a:r>
+          </a:p>
+        </p:txBody>
+      </p:sp>
     </p:spTree>
     <p:extLst>
       <p:ext uri="{BB962C8B-B14F-4D97-AF65-F5344CB8AC3E}">
@@ -4961,7 +5037,7 @@
           <p:cNvPr id="14" name="图片 1">
             <a:extLst>
               <a:ext uri="{FF2B5EF4-FFF2-40B4-BE49-F238E27FC236}">
-                <a16:creationId xmlns:a16="http://schemas.microsoft.com/office/drawing/2014/main" id="{F4130D34-576C-4F7A-9021-79D21F13B043}"/>
+                <a16:creationId xmlns:a16="http://schemas.microsoft.com/office/drawing/2014/main" xmlns="" id="{F4130D34-576C-4F7A-9021-79D21F13B043}"/>
               </a:ext>
             </a:extLst>
           </p:cNvPr>
@@ -4991,7 +5067,7 @@
           <p:cNvPr id="12" name="Picture 11">
             <a:extLst>
               <a:ext uri="{FF2B5EF4-FFF2-40B4-BE49-F238E27FC236}">
-                <a16:creationId xmlns:a16="http://schemas.microsoft.com/office/drawing/2014/main" id="{8A5D0982-D20C-40ED-8519-739F2B028923}"/>
+                <a16:creationId xmlns:a16="http://schemas.microsoft.com/office/drawing/2014/main" xmlns="" id="{8A5D0982-D20C-40ED-8519-739F2B028923}"/>
               </a:ext>
             </a:extLst>
           </p:cNvPr>
@@ -5021,7 +5097,7 @@
           <p:cNvPr id="2" name="图片 1">
             <a:extLst>
               <a:ext uri="{FF2B5EF4-FFF2-40B4-BE49-F238E27FC236}">
-                <a16:creationId xmlns:a16="http://schemas.microsoft.com/office/drawing/2014/main" id="{1D638218-ADE2-4AD2-AD25-176E53A67F02}"/>
+                <a16:creationId xmlns:a16="http://schemas.microsoft.com/office/drawing/2014/main" xmlns="" id="{1D638218-ADE2-4AD2-AD25-176E53A67F02}"/>
               </a:ext>
             </a:extLst>
           </p:cNvPr>
@@ -5051,7 +5127,7 @@
           <p:cNvPr id="3" name="图片 2">
             <a:extLst>
               <a:ext uri="{FF2B5EF4-FFF2-40B4-BE49-F238E27FC236}">
-                <a16:creationId xmlns:a16="http://schemas.microsoft.com/office/drawing/2014/main" id="{BA504C82-5F9E-48C3-8986-62A677426930}"/>
+                <a16:creationId xmlns:a16="http://schemas.microsoft.com/office/drawing/2014/main" xmlns="" id="{BA504C82-5F9E-48C3-8986-62A677426930}"/>
               </a:ext>
             </a:extLst>
           </p:cNvPr>
@@ -5081,7 +5157,7 @@
           <p:cNvPr id="4" name="矩形 3">
             <a:extLst>
               <a:ext uri="{FF2B5EF4-FFF2-40B4-BE49-F238E27FC236}">
-                <a16:creationId xmlns:a16="http://schemas.microsoft.com/office/drawing/2014/main" id="{8A3FAE2A-727D-45E3-B4D5-53945535E49C}"/>
+                <a16:creationId xmlns:a16="http://schemas.microsoft.com/office/drawing/2014/main" xmlns="" id="{8A3FAE2A-727D-45E3-B4D5-53945535E49C}"/>
               </a:ext>
             </a:extLst>
           </p:cNvPr>
@@ -5161,7 +5237,7 @@
           <p:cNvPr id="5" name="矩形 4">
             <a:extLst>
               <a:ext uri="{FF2B5EF4-FFF2-40B4-BE49-F238E27FC236}">
-                <a16:creationId xmlns:a16="http://schemas.microsoft.com/office/drawing/2014/main" id="{A56A558E-151A-4372-994F-DEAD1A4F127A}"/>
+                <a16:creationId xmlns:a16="http://schemas.microsoft.com/office/drawing/2014/main" xmlns="" id="{A56A558E-151A-4372-994F-DEAD1A4F127A}"/>
               </a:ext>
             </a:extLst>
           </p:cNvPr>
@@ -5196,7 +5272,7 @@
           <p:cNvPr id="7" name="直接箭头连接符 6">
             <a:extLst>
               <a:ext uri="{FF2B5EF4-FFF2-40B4-BE49-F238E27FC236}">
-                <a16:creationId xmlns:a16="http://schemas.microsoft.com/office/drawing/2014/main" id="{45615441-D71E-42F9-BCBE-834C64F42E3F}"/>
+                <a16:creationId xmlns:a16="http://schemas.microsoft.com/office/drawing/2014/main" xmlns="" id="{45615441-D71E-42F9-BCBE-834C64F42E3F}"/>
               </a:ext>
             </a:extLst>
           </p:cNvPr>
@@ -5235,7 +5311,7 @@
           <p:cNvPr id="8" name="文本框 7">
             <a:extLst>
               <a:ext uri="{FF2B5EF4-FFF2-40B4-BE49-F238E27FC236}">
-                <a16:creationId xmlns:a16="http://schemas.microsoft.com/office/drawing/2014/main" id="{CEA168E1-BFB3-41CD-BFF5-2EE638AF794F}"/>
+                <a16:creationId xmlns:a16="http://schemas.microsoft.com/office/drawing/2014/main" xmlns="" id="{CEA168E1-BFB3-41CD-BFF5-2EE638AF794F}"/>
               </a:ext>
             </a:extLst>
           </p:cNvPr>
@@ -5279,7 +5355,7 @@
           <p:cNvPr id="10" name="直接箭头连接符 9">
             <a:extLst>
               <a:ext uri="{FF2B5EF4-FFF2-40B4-BE49-F238E27FC236}">
-                <a16:creationId xmlns:a16="http://schemas.microsoft.com/office/drawing/2014/main" id="{CBFD6EC9-0FB8-43A9-8B79-E85A26123A71}"/>
+                <a16:creationId xmlns:a16="http://schemas.microsoft.com/office/drawing/2014/main" xmlns="" id="{CBFD6EC9-0FB8-43A9-8B79-E85A26123A71}"/>
               </a:ext>
             </a:extLst>
           </p:cNvPr>
@@ -5321,7 +5397,7 @@
           <p:cNvPr id="11" name="文本框 10">
             <a:extLst>
               <a:ext uri="{FF2B5EF4-FFF2-40B4-BE49-F238E27FC236}">
-                <a16:creationId xmlns:a16="http://schemas.microsoft.com/office/drawing/2014/main" id="{86F08652-CE8E-4229-ABEF-F8328B3ED002}"/>
+                <a16:creationId xmlns:a16="http://schemas.microsoft.com/office/drawing/2014/main" xmlns="" id="{86F08652-CE8E-4229-ABEF-F8328B3ED002}"/>
               </a:ext>
             </a:extLst>
           </p:cNvPr>
@@ -5365,7 +5441,7 @@
           <p:cNvPr id="6" name="Rectangle 1">
             <a:extLst>
               <a:ext uri="{FF2B5EF4-FFF2-40B4-BE49-F238E27FC236}">
-                <a16:creationId xmlns:a16="http://schemas.microsoft.com/office/drawing/2014/main" id="{F3B81E4C-EF02-4349-B146-868B06C4B76D}"/>
+                <a16:creationId xmlns:a16="http://schemas.microsoft.com/office/drawing/2014/main" xmlns="" id="{F3B81E4C-EF02-4349-B146-868B06C4B76D}"/>
               </a:ext>
             </a:extLst>
           </p:cNvPr>
@@ -5703,7 +5779,7 @@
           <p:cNvPr id="15" name="Rectangle 14">
             <a:extLst>
               <a:ext uri="{FF2B5EF4-FFF2-40B4-BE49-F238E27FC236}">
-                <a16:creationId xmlns:a16="http://schemas.microsoft.com/office/drawing/2014/main" id="{F7936145-19B8-43F1-861E-7ABDFCB52FFF}"/>
+                <a16:creationId xmlns:a16="http://schemas.microsoft.com/office/drawing/2014/main" xmlns="" id="{F7936145-19B8-43F1-861E-7ABDFCB52FFF}"/>
               </a:ext>
             </a:extLst>
           </p:cNvPr>
@@ -5767,7 +5843,7 @@
           <p:cNvPr id="3" name="矩形 2">
             <a:extLst>
               <a:ext uri="{FF2B5EF4-FFF2-40B4-BE49-F238E27FC236}">
-                <a16:creationId xmlns:a16="http://schemas.microsoft.com/office/drawing/2014/main" id="{DE9DD378-45A5-4001-A3B8-50837D02A6DF}"/>
+                <a16:creationId xmlns:a16="http://schemas.microsoft.com/office/drawing/2014/main" xmlns="" id="{DE9DD378-45A5-4001-A3B8-50837D02A6DF}"/>
               </a:ext>
             </a:extLst>
           </p:cNvPr>
@@ -5802,7 +5878,7 @@
           <p:cNvPr id="4" name="图片 3">
             <a:extLst>
               <a:ext uri="{FF2B5EF4-FFF2-40B4-BE49-F238E27FC236}">
-                <a16:creationId xmlns:a16="http://schemas.microsoft.com/office/drawing/2014/main" id="{11B5C592-F94A-4DCC-8C7F-82B4A2592932}"/>
+                <a16:creationId xmlns:a16="http://schemas.microsoft.com/office/drawing/2014/main" xmlns="" id="{11B5C592-F94A-4DCC-8C7F-82B4A2592932}"/>
               </a:ext>
             </a:extLst>
           </p:cNvPr>
@@ -5832,7 +5908,7 @@
           <p:cNvPr id="5" name="图片 4">
             <a:extLst>
               <a:ext uri="{FF2B5EF4-FFF2-40B4-BE49-F238E27FC236}">
-                <a16:creationId xmlns:a16="http://schemas.microsoft.com/office/drawing/2014/main" id="{D75AA593-31A2-4DA7-BAB4-56D218C8DE9B}"/>
+                <a16:creationId xmlns:a16="http://schemas.microsoft.com/office/drawing/2014/main" xmlns="" id="{D75AA593-31A2-4DA7-BAB4-56D218C8DE9B}"/>
               </a:ext>
             </a:extLst>
           </p:cNvPr>
@@ -5862,7 +5938,7 @@
           <p:cNvPr id="6" name="图片 5">
             <a:extLst>
               <a:ext uri="{FF2B5EF4-FFF2-40B4-BE49-F238E27FC236}">
-                <a16:creationId xmlns:a16="http://schemas.microsoft.com/office/drawing/2014/main" id="{9CD33F91-7DBB-4FCC-98DD-7050367D98F2}"/>
+                <a16:creationId xmlns:a16="http://schemas.microsoft.com/office/drawing/2014/main" xmlns="" id="{9CD33F91-7DBB-4FCC-98DD-7050367D98F2}"/>
               </a:ext>
             </a:extLst>
           </p:cNvPr>
@@ -5892,7 +5968,7 @@
           <p:cNvPr id="7" name="矩形 6">
             <a:extLst>
               <a:ext uri="{FF2B5EF4-FFF2-40B4-BE49-F238E27FC236}">
-                <a16:creationId xmlns:a16="http://schemas.microsoft.com/office/drawing/2014/main" id="{C6007EA4-99C6-4F05-877E-E89C6C3AE256}"/>
+                <a16:creationId xmlns:a16="http://schemas.microsoft.com/office/drawing/2014/main" xmlns="" id="{C6007EA4-99C6-4F05-877E-E89C6C3AE256}"/>
               </a:ext>
             </a:extLst>
           </p:cNvPr>
@@ -5986,7 +6062,7 @@
           <p:cNvPr id="8" name="矩形 7">
             <a:extLst>
               <a:ext uri="{FF2B5EF4-FFF2-40B4-BE49-F238E27FC236}">
-                <a16:creationId xmlns:a16="http://schemas.microsoft.com/office/drawing/2014/main" id="{B8F22018-0A85-4270-A4AA-46C72219303D}"/>
+                <a16:creationId xmlns:a16="http://schemas.microsoft.com/office/drawing/2014/main" xmlns="" id="{B8F22018-0A85-4270-A4AA-46C72219303D}"/>
               </a:ext>
             </a:extLst>
           </p:cNvPr>
@@ -6062,7 +6138,7 @@
           <p:cNvPr id="9" name="箭头: 右 8">
             <a:extLst>
               <a:ext uri="{FF2B5EF4-FFF2-40B4-BE49-F238E27FC236}">
-                <a16:creationId xmlns:a16="http://schemas.microsoft.com/office/drawing/2014/main" id="{AF9B2D61-EE29-4DFA-96C5-0664D2DD9A49}"/>
+                <a16:creationId xmlns:a16="http://schemas.microsoft.com/office/drawing/2014/main" xmlns="" id="{AF9B2D61-EE29-4DFA-96C5-0664D2DD9A49}"/>
               </a:ext>
             </a:extLst>
           </p:cNvPr>
@@ -6138,7 +6214,7 @@
           <p:cNvPr id="13" name="图片 12">
             <a:extLst>
               <a:ext uri="{FF2B5EF4-FFF2-40B4-BE49-F238E27FC236}">
-                <a16:creationId xmlns:a16="http://schemas.microsoft.com/office/drawing/2014/main" id="{69131F11-8A89-4879-8859-AA1827890F1C}"/>
+                <a16:creationId xmlns:a16="http://schemas.microsoft.com/office/drawing/2014/main" xmlns="" id="{69131F11-8A89-4879-8859-AA1827890F1C}"/>
               </a:ext>
             </a:extLst>
           </p:cNvPr>
@@ -6168,7 +6244,7 @@
           <p:cNvPr id="4" name="矩形 3">
             <a:extLst>
               <a:ext uri="{FF2B5EF4-FFF2-40B4-BE49-F238E27FC236}">
-                <a16:creationId xmlns:a16="http://schemas.microsoft.com/office/drawing/2014/main" id="{AE8A2B54-3F30-41F0-ABB8-0D815726FD82}"/>
+                <a16:creationId xmlns:a16="http://schemas.microsoft.com/office/drawing/2014/main" xmlns="" id="{AE8A2B54-3F30-41F0-ABB8-0D815726FD82}"/>
               </a:ext>
             </a:extLst>
           </p:cNvPr>
@@ -6203,7 +6279,7 @@
           <p:cNvPr id="6" name="图片 5">
             <a:extLst>
               <a:ext uri="{FF2B5EF4-FFF2-40B4-BE49-F238E27FC236}">
-                <a16:creationId xmlns:a16="http://schemas.microsoft.com/office/drawing/2014/main" id="{E3A46FB1-2489-4F34-A991-A0A72082FEBB}"/>
+                <a16:creationId xmlns:a16="http://schemas.microsoft.com/office/drawing/2014/main" xmlns="" id="{E3A46FB1-2489-4F34-A991-A0A72082FEBB}"/>
               </a:ext>
             </a:extLst>
           </p:cNvPr>
@@ -6233,7 +6309,7 @@
           <p:cNvPr id="7" name="图片 6">
             <a:extLst>
               <a:ext uri="{FF2B5EF4-FFF2-40B4-BE49-F238E27FC236}">
-                <a16:creationId xmlns:a16="http://schemas.microsoft.com/office/drawing/2014/main" id="{F3E6B8C9-09C7-44EA-8D22-DF87F7FCD483}"/>
+                <a16:creationId xmlns:a16="http://schemas.microsoft.com/office/drawing/2014/main" xmlns="" id="{F3E6B8C9-09C7-44EA-8D22-DF87F7FCD483}"/>
               </a:ext>
             </a:extLst>
           </p:cNvPr>
@@ -6263,7 +6339,7 @@
           <p:cNvPr id="8" name="图片 7">
             <a:extLst>
               <a:ext uri="{FF2B5EF4-FFF2-40B4-BE49-F238E27FC236}">
-                <a16:creationId xmlns:a16="http://schemas.microsoft.com/office/drawing/2014/main" id="{F0B77830-B77C-4C47-A968-B1DFFE8BC45D}"/>
+                <a16:creationId xmlns:a16="http://schemas.microsoft.com/office/drawing/2014/main" xmlns="" id="{F0B77830-B77C-4C47-A968-B1DFFE8BC45D}"/>
               </a:ext>
             </a:extLst>
           </p:cNvPr>
@@ -6293,7 +6369,7 @@
           <p:cNvPr id="9" name="图片 8">
             <a:extLst>
               <a:ext uri="{FF2B5EF4-FFF2-40B4-BE49-F238E27FC236}">
-                <a16:creationId xmlns:a16="http://schemas.microsoft.com/office/drawing/2014/main" id="{CFF1A19B-DB4F-42C8-955D-43BC1C10E355}"/>
+                <a16:creationId xmlns:a16="http://schemas.microsoft.com/office/drawing/2014/main" xmlns="" id="{CFF1A19B-DB4F-42C8-955D-43BC1C10E355}"/>
               </a:ext>
             </a:extLst>
           </p:cNvPr>
@@ -6323,7 +6399,7 @@
           <p:cNvPr id="10" name="矩形 9">
             <a:extLst>
               <a:ext uri="{FF2B5EF4-FFF2-40B4-BE49-F238E27FC236}">
-                <a16:creationId xmlns:a16="http://schemas.microsoft.com/office/drawing/2014/main" id="{26472812-F516-4BFF-9A49-CAF487E417F0}"/>
+                <a16:creationId xmlns:a16="http://schemas.microsoft.com/office/drawing/2014/main" xmlns="" id="{26472812-F516-4BFF-9A49-CAF487E417F0}"/>
               </a:ext>
             </a:extLst>
           </p:cNvPr>
@@ -6363,7 +6439,7 @@
           <p:cNvPr id="12" name="直接箭头连接符 11">
             <a:extLst>
               <a:ext uri="{FF2B5EF4-FFF2-40B4-BE49-F238E27FC236}">
-                <a16:creationId xmlns:a16="http://schemas.microsoft.com/office/drawing/2014/main" id="{1EF3CA87-29D4-4F1C-9BA8-C8125E1848CA}"/>
+                <a16:creationId xmlns:a16="http://schemas.microsoft.com/office/drawing/2014/main" xmlns="" id="{1EF3CA87-29D4-4F1C-9BA8-C8125E1848CA}"/>
               </a:ext>
             </a:extLst>
           </p:cNvPr>
@@ -6404,7 +6480,7 @@
           <p:cNvPr id="15" name="直接箭头连接符 14">
             <a:extLst>
               <a:ext uri="{FF2B5EF4-FFF2-40B4-BE49-F238E27FC236}">
-                <a16:creationId xmlns:a16="http://schemas.microsoft.com/office/drawing/2014/main" id="{10D33DDD-0297-4161-929F-3B28878A0A07}"/>
+                <a16:creationId xmlns:a16="http://schemas.microsoft.com/office/drawing/2014/main" xmlns="" id="{10D33DDD-0297-4161-929F-3B28878A0A07}"/>
               </a:ext>
             </a:extLst>
           </p:cNvPr>
@@ -6476,7 +6552,7 @@
           <p:cNvPr id="2" name="图片 1">
             <a:extLst>
               <a:ext uri="{FF2B5EF4-FFF2-40B4-BE49-F238E27FC236}">
-                <a16:creationId xmlns:a16="http://schemas.microsoft.com/office/drawing/2014/main" id="{4BB2E5F0-37A9-4C2A-84E5-B14E551B770B}"/>
+                <a16:creationId xmlns:a16="http://schemas.microsoft.com/office/drawing/2014/main" xmlns="" id="{4BB2E5F0-37A9-4C2A-84E5-B14E551B770B}"/>
               </a:ext>
             </a:extLst>
           </p:cNvPr>
@@ -6506,7 +6582,7 @@
           <p:cNvPr id="4" name="图片 2">
             <a:extLst>
               <a:ext uri="{FF2B5EF4-FFF2-40B4-BE49-F238E27FC236}">
-                <a16:creationId xmlns:a16="http://schemas.microsoft.com/office/drawing/2014/main" id="{AF7FB1F2-9F38-4A20-874E-05F240D81077}"/>
+                <a16:creationId xmlns:a16="http://schemas.microsoft.com/office/drawing/2014/main" xmlns="" id="{AF7FB1F2-9F38-4A20-874E-05F240D81077}"/>
               </a:ext>
             </a:extLst>
           </p:cNvPr>
@@ -6536,7 +6612,7 @@
           <p:cNvPr id="5" name="矩形 3">
             <a:extLst>
               <a:ext uri="{FF2B5EF4-FFF2-40B4-BE49-F238E27FC236}">
-                <a16:creationId xmlns:a16="http://schemas.microsoft.com/office/drawing/2014/main" id="{234C32AB-7B6F-45D5-AE3E-46DE252921D1}"/>
+                <a16:creationId xmlns:a16="http://schemas.microsoft.com/office/drawing/2014/main" xmlns="" id="{234C32AB-7B6F-45D5-AE3E-46DE252921D1}"/>
               </a:ext>
             </a:extLst>
           </p:cNvPr>
@@ -6571,7 +6647,7 @@
           <p:cNvPr id="8" name="Picture 7">
             <a:extLst>
               <a:ext uri="{FF2B5EF4-FFF2-40B4-BE49-F238E27FC236}">
-                <a16:creationId xmlns:a16="http://schemas.microsoft.com/office/drawing/2014/main" id="{C19391FE-D974-4DD3-9FB3-5C8CD095A216}"/>
+                <a16:creationId xmlns:a16="http://schemas.microsoft.com/office/drawing/2014/main" xmlns="" id="{C19391FE-D974-4DD3-9FB3-5C8CD095A216}"/>
               </a:ext>
             </a:extLst>
           </p:cNvPr>
@@ -6601,7 +6677,7 @@
           <p:cNvPr id="6" name="图片 5">
             <a:extLst>
               <a:ext uri="{FF2B5EF4-FFF2-40B4-BE49-F238E27FC236}">
-                <a16:creationId xmlns:a16="http://schemas.microsoft.com/office/drawing/2014/main" id="{5CE207F1-47EC-4DDF-8CE9-D1A639366FC3}"/>
+                <a16:creationId xmlns:a16="http://schemas.microsoft.com/office/drawing/2014/main" xmlns="" id="{5CE207F1-47EC-4DDF-8CE9-D1A639366FC3}"/>
               </a:ext>
             </a:extLst>
           </p:cNvPr>
@@ -6661,7 +6737,7 @@
           <p:cNvPr id="2" name="矩形 1">
             <a:extLst>
               <a:ext uri="{FF2B5EF4-FFF2-40B4-BE49-F238E27FC236}">
-                <a16:creationId xmlns:a16="http://schemas.microsoft.com/office/drawing/2014/main" id="{7DA04801-F599-4551-8745-5A355DA55921}"/>
+                <a16:creationId xmlns:a16="http://schemas.microsoft.com/office/drawing/2014/main" xmlns="" id="{7DA04801-F599-4551-8745-5A355DA55921}"/>
               </a:ext>
             </a:extLst>
           </p:cNvPr>
@@ -6696,7 +6772,7 @@
           <p:cNvPr id="3" name="矩形 2">
             <a:extLst>
               <a:ext uri="{FF2B5EF4-FFF2-40B4-BE49-F238E27FC236}">
-                <a16:creationId xmlns:a16="http://schemas.microsoft.com/office/drawing/2014/main" id="{A6FD37D9-3803-4319-83EB-19F790B68397}"/>
+                <a16:creationId xmlns:a16="http://schemas.microsoft.com/office/drawing/2014/main" xmlns="" id="{A6FD37D9-3803-4319-83EB-19F790B68397}"/>
               </a:ext>
             </a:extLst>
           </p:cNvPr>
@@ -6738,7 +6814,7 @@
           <p:cNvPr id="4" name="图片 3">
             <a:extLst>
               <a:ext uri="{FF2B5EF4-FFF2-40B4-BE49-F238E27FC236}">
-                <a16:creationId xmlns:a16="http://schemas.microsoft.com/office/drawing/2014/main" id="{4ACBE816-EB61-49F4-89A7-296DED44B970}"/>
+                <a16:creationId xmlns:a16="http://schemas.microsoft.com/office/drawing/2014/main" xmlns="" id="{4ACBE816-EB61-49F4-89A7-296DED44B970}"/>
               </a:ext>
             </a:extLst>
           </p:cNvPr>
@@ -6768,7 +6844,7 @@
           <p:cNvPr id="5" name="矩形 4">
             <a:extLst>
               <a:ext uri="{FF2B5EF4-FFF2-40B4-BE49-F238E27FC236}">
-                <a16:creationId xmlns:a16="http://schemas.microsoft.com/office/drawing/2014/main" id="{F1B5222A-5751-4D32-948E-ADA4A41E030D}"/>
+                <a16:creationId xmlns:a16="http://schemas.microsoft.com/office/drawing/2014/main" xmlns="" id="{F1B5222A-5751-4D32-948E-ADA4A41E030D}"/>
               </a:ext>
             </a:extLst>
           </p:cNvPr>
@@ -6802,7 +6878,7 @@
           <p:cNvPr id="6" name="图片 5">
             <a:extLst>
               <a:ext uri="{FF2B5EF4-FFF2-40B4-BE49-F238E27FC236}">
-                <a16:creationId xmlns:a16="http://schemas.microsoft.com/office/drawing/2014/main" id="{D8226A40-DEAB-4352-9C17-9074D99251EB}"/>
+                <a16:creationId xmlns:a16="http://schemas.microsoft.com/office/drawing/2014/main" xmlns="" id="{D8226A40-DEAB-4352-9C17-9074D99251EB}"/>
               </a:ext>
             </a:extLst>
           </p:cNvPr>
@@ -6832,7 +6908,7 @@
           <p:cNvPr id="7" name="图片 6">
             <a:extLst>
               <a:ext uri="{FF2B5EF4-FFF2-40B4-BE49-F238E27FC236}">
-                <a16:creationId xmlns:a16="http://schemas.microsoft.com/office/drawing/2014/main" id="{9C88286F-A500-439B-9803-0E713BC10B28}"/>
+                <a16:creationId xmlns:a16="http://schemas.microsoft.com/office/drawing/2014/main" xmlns="" id="{9C88286F-A500-439B-9803-0E713BC10B28}"/>
               </a:ext>
             </a:extLst>
           </p:cNvPr>
@@ -6862,7 +6938,7 @@
           <p:cNvPr id="8" name="矩形 7">
             <a:extLst>
               <a:ext uri="{FF2B5EF4-FFF2-40B4-BE49-F238E27FC236}">
-                <a16:creationId xmlns:a16="http://schemas.microsoft.com/office/drawing/2014/main" id="{FE8D7E59-A703-4517-9AA8-8642D221B14D}"/>
+                <a16:creationId xmlns:a16="http://schemas.microsoft.com/office/drawing/2014/main" xmlns="" id="{FE8D7E59-A703-4517-9AA8-8642D221B14D}"/>
               </a:ext>
             </a:extLst>
           </p:cNvPr>
@@ -6897,7 +6973,7 @@
           <p:cNvPr id="9" name="图片 8">
             <a:extLst>
               <a:ext uri="{FF2B5EF4-FFF2-40B4-BE49-F238E27FC236}">
-                <a16:creationId xmlns:a16="http://schemas.microsoft.com/office/drawing/2014/main" id="{A576655E-88DB-4FF0-869D-01FA45C32CAD}"/>
+                <a16:creationId xmlns:a16="http://schemas.microsoft.com/office/drawing/2014/main" xmlns="" id="{A576655E-88DB-4FF0-869D-01FA45C32CAD}"/>
               </a:ext>
             </a:extLst>
           </p:cNvPr>
@@ -6927,7 +7003,7 @@
           <p:cNvPr id="10" name="图片 9">
             <a:extLst>
               <a:ext uri="{FF2B5EF4-FFF2-40B4-BE49-F238E27FC236}">
-                <a16:creationId xmlns:a16="http://schemas.microsoft.com/office/drawing/2014/main" id="{DC5BB7FB-6D52-4629-8BA0-336CC0D3C8E9}"/>
+                <a16:creationId xmlns:a16="http://schemas.microsoft.com/office/drawing/2014/main" xmlns="" id="{DC5BB7FB-6D52-4629-8BA0-336CC0D3C8E9}"/>
               </a:ext>
             </a:extLst>
           </p:cNvPr>
@@ -6987,7 +7063,7 @@
           <p:cNvPr id="2" name="矩形 1">
             <a:extLst>
               <a:ext uri="{FF2B5EF4-FFF2-40B4-BE49-F238E27FC236}">
-                <a16:creationId xmlns:a16="http://schemas.microsoft.com/office/drawing/2014/main" id="{35113C7A-21DA-4269-8292-5B50F2C36C1F}"/>
+                <a16:creationId xmlns:a16="http://schemas.microsoft.com/office/drawing/2014/main" xmlns="" id="{35113C7A-21DA-4269-8292-5B50F2C36C1F}"/>
               </a:ext>
             </a:extLst>
           </p:cNvPr>
@@ -7022,7 +7098,7 @@
           <p:cNvPr id="4" name="Rectangle 2">
             <a:extLst>
               <a:ext uri="{FF2B5EF4-FFF2-40B4-BE49-F238E27FC236}">
-                <a16:creationId xmlns:a16="http://schemas.microsoft.com/office/drawing/2014/main" id="{6C233EB1-2B8A-4B5C-8B6A-90947D46BE9B}"/>
+                <a16:creationId xmlns:a16="http://schemas.microsoft.com/office/drawing/2014/main" xmlns="" id="{6C233EB1-2B8A-4B5C-8B6A-90947D46BE9B}"/>
               </a:ext>
             </a:extLst>
           </p:cNvPr>
@@ -7378,7 +7454,7 @@
           <p:cNvPr id="5" name="Rectangle 3">
             <a:extLst>
               <a:ext uri="{FF2B5EF4-FFF2-40B4-BE49-F238E27FC236}">
-                <a16:creationId xmlns:a16="http://schemas.microsoft.com/office/drawing/2014/main" id="{BCF492BE-A8D7-4B74-BF6C-7CE81E1F10A8}"/>
+                <a16:creationId xmlns:a16="http://schemas.microsoft.com/office/drawing/2014/main" xmlns="" id="{BCF492BE-A8D7-4B74-BF6C-7CE81E1F10A8}"/>
               </a:ext>
             </a:extLst>
           </p:cNvPr>
@@ -8190,7 +8266,7 @@
           <p:cNvPr id="7" name="Rectangle 4">
             <a:extLst>
               <a:ext uri="{FF2B5EF4-FFF2-40B4-BE49-F238E27FC236}">
-                <a16:creationId xmlns:a16="http://schemas.microsoft.com/office/drawing/2014/main" id="{8A63C07C-0AD4-43C5-9A21-13C237FD8AAA}"/>
+                <a16:creationId xmlns:a16="http://schemas.microsoft.com/office/drawing/2014/main" xmlns="" id="{8A63C07C-0AD4-43C5-9A21-13C237FD8AAA}"/>
               </a:ext>
             </a:extLst>
           </p:cNvPr>
@@ -8430,6 +8506,20 @@
               </a:rPr>
               <a:t>节点</a:t>
             </a:r>
+            <a:r>
+              <a:rPr kumimoji="0" lang="zh-CN" altLang="zh-CN" sz="600" b="0" i="0" u="none" strike="noStrike" cap="none" normalizeH="0" baseline="0">
+                <a:ln>
+                  <a:noFill/>
+                </a:ln>
+                <a:solidFill>
+                  <a:srgbClr val="000000"/>
+                </a:solidFill>
+                <a:effectLst/>
+                <a:latin typeface="宋体" panose="02010600030101010101" pitchFamily="2" charset="-122"/>
+                <a:ea typeface="宋体" panose="02010600030101010101" pitchFamily="2" charset="-122"/>
+              </a:rPr>
+              <a:t/>
+            </a:r>
             <a:br>
               <a:rPr kumimoji="0" lang="zh-CN" altLang="zh-CN" sz="600" b="0" i="0" u="none" strike="noStrike" cap="none" normalizeH="0" baseline="0">
                 <a:ln>
@@ -8834,7 +8924,7 @@
           <p:cNvPr id="8" name="图片 7">
             <a:extLst>
               <a:ext uri="{FF2B5EF4-FFF2-40B4-BE49-F238E27FC236}">
-                <a16:creationId xmlns:a16="http://schemas.microsoft.com/office/drawing/2014/main" id="{E35A82F1-773F-4809-8FDD-48F0DEFDD54E}"/>
+                <a16:creationId xmlns:a16="http://schemas.microsoft.com/office/drawing/2014/main" xmlns="" id="{E35A82F1-773F-4809-8FDD-48F0DEFDD54E}"/>
               </a:ext>
             </a:extLst>
           </p:cNvPr>
@@ -8864,7 +8954,7 @@
           <p:cNvPr id="11" name="图片 10">
             <a:extLst>
               <a:ext uri="{FF2B5EF4-FFF2-40B4-BE49-F238E27FC236}">
-                <a16:creationId xmlns:a16="http://schemas.microsoft.com/office/drawing/2014/main" id="{25BFF2B3-51FA-482D-BA50-3290723B8A80}"/>
+                <a16:creationId xmlns:a16="http://schemas.microsoft.com/office/drawing/2014/main" xmlns="" id="{25BFF2B3-51FA-482D-BA50-3290723B8A80}"/>
               </a:ext>
             </a:extLst>
           </p:cNvPr>
@@ -8894,7 +8984,7 @@
           <p:cNvPr id="12" name="图片 11">
             <a:extLst>
               <a:ext uri="{FF2B5EF4-FFF2-40B4-BE49-F238E27FC236}">
-                <a16:creationId xmlns:a16="http://schemas.microsoft.com/office/drawing/2014/main" id="{F629791C-0ED1-4A1F-8111-4434C2BC3072}"/>
+                <a16:creationId xmlns:a16="http://schemas.microsoft.com/office/drawing/2014/main" xmlns="" id="{F629791C-0ED1-4A1F-8111-4434C2BC3072}"/>
               </a:ext>
             </a:extLst>
           </p:cNvPr>
@@ -8924,7 +9014,7 @@
           <p:cNvPr id="13" name="图片 12">
             <a:extLst>
               <a:ext uri="{FF2B5EF4-FFF2-40B4-BE49-F238E27FC236}">
-                <a16:creationId xmlns:a16="http://schemas.microsoft.com/office/drawing/2014/main" id="{CEA2EAD8-BD56-4F00-9E17-D67147B8516E}"/>
+                <a16:creationId xmlns:a16="http://schemas.microsoft.com/office/drawing/2014/main" xmlns="" id="{CEA2EAD8-BD56-4F00-9E17-D67147B8516E}"/>
               </a:ext>
             </a:extLst>
           </p:cNvPr>
@@ -8954,7 +9044,7 @@
           <p:cNvPr id="14" name="图片 13">
             <a:extLst>
               <a:ext uri="{FF2B5EF4-FFF2-40B4-BE49-F238E27FC236}">
-                <a16:creationId xmlns:a16="http://schemas.microsoft.com/office/drawing/2014/main" id="{0918DB73-D43E-48B0-B4DD-23717469D246}"/>
+                <a16:creationId xmlns:a16="http://schemas.microsoft.com/office/drawing/2014/main" xmlns="" id="{0918DB73-D43E-48B0-B4DD-23717469D246}"/>
               </a:ext>
             </a:extLst>
           </p:cNvPr>
@@ -9014,7 +9104,7 @@
           <p:cNvPr id="2" name="图片 1">
             <a:extLst>
               <a:ext uri="{FF2B5EF4-FFF2-40B4-BE49-F238E27FC236}">
-                <a16:creationId xmlns:a16="http://schemas.microsoft.com/office/drawing/2014/main" id="{D73F8802-A23E-4B0C-BECB-B9B780D1EC3D}"/>
+                <a16:creationId xmlns:a16="http://schemas.microsoft.com/office/drawing/2014/main" xmlns="" id="{D73F8802-A23E-4B0C-BECB-B9B780D1EC3D}"/>
               </a:ext>
             </a:extLst>
           </p:cNvPr>
@@ -9044,7 +9134,7 @@
           <p:cNvPr id="3" name="矩形 2">
             <a:extLst>
               <a:ext uri="{FF2B5EF4-FFF2-40B4-BE49-F238E27FC236}">
-                <a16:creationId xmlns:a16="http://schemas.microsoft.com/office/drawing/2014/main" id="{83610F07-852C-463A-8107-F77C37896FD8}"/>
+                <a16:creationId xmlns:a16="http://schemas.microsoft.com/office/drawing/2014/main" xmlns="" id="{83610F07-852C-463A-8107-F77C37896FD8}"/>
               </a:ext>
             </a:extLst>
           </p:cNvPr>
@@ -9067,10 +9157,10 @@
           <a:lstStyle/>
           <a:p>
             <a:r>
-              <a:rPr lang="en-US" altLang="zh-CN" sz="3200"/>
+              <a:rPr lang="en-US" altLang="zh-CN" sz="3200" dirty="0" err="1"/>
               <a:t>HashMap</a:t>
             </a:r>
-            <a:endParaRPr lang="zh-CN" altLang="en-US" sz="3200"/>
+            <a:endParaRPr lang="zh-CN" altLang="en-US" sz="3200" dirty="0"/>
           </a:p>
         </p:txBody>
       </p:sp>
@@ -9109,7 +9199,7 @@
           <p:cNvPr id="2" name="矩形 1">
             <a:extLst>
               <a:ext uri="{FF2B5EF4-FFF2-40B4-BE49-F238E27FC236}">
-                <a16:creationId xmlns:a16="http://schemas.microsoft.com/office/drawing/2014/main" id="{35113C7A-21DA-4269-8292-5B50F2C36C1F}"/>
+                <a16:creationId xmlns:a16="http://schemas.microsoft.com/office/drawing/2014/main" xmlns="" id="{35113C7A-21DA-4269-8292-5B50F2C36C1F}"/>
               </a:ext>
             </a:extLst>
           </p:cNvPr>
@@ -9144,7 +9234,7 @@
           <p:cNvPr id="5" name="图片 4">
             <a:extLst>
               <a:ext uri="{FF2B5EF4-FFF2-40B4-BE49-F238E27FC236}">
-                <a16:creationId xmlns:a16="http://schemas.microsoft.com/office/drawing/2014/main" id="{E8FFB8B5-6BC6-4F8E-96CD-FD927F93051E}"/>
+                <a16:creationId xmlns:a16="http://schemas.microsoft.com/office/drawing/2014/main" xmlns="" id="{E8FFB8B5-6BC6-4F8E-96CD-FD927F93051E}"/>
               </a:ext>
             </a:extLst>
           </p:cNvPr>
@@ -9174,7 +9264,7 @@
           <p:cNvPr id="7" name="图片 6">
             <a:extLst>
               <a:ext uri="{FF2B5EF4-FFF2-40B4-BE49-F238E27FC236}">
-                <a16:creationId xmlns:a16="http://schemas.microsoft.com/office/drawing/2014/main" id="{F07D2A7C-DC5E-4CA9-A7F0-120E4F199A6D}"/>
+                <a16:creationId xmlns:a16="http://schemas.microsoft.com/office/drawing/2014/main" xmlns="" id="{F07D2A7C-DC5E-4CA9-A7F0-120E4F199A6D}"/>
               </a:ext>
             </a:extLst>
           </p:cNvPr>
@@ -9204,7 +9294,7 @@
           <p:cNvPr id="9" name="图片 8">
             <a:extLst>
               <a:ext uri="{FF2B5EF4-FFF2-40B4-BE49-F238E27FC236}">
-                <a16:creationId xmlns:a16="http://schemas.microsoft.com/office/drawing/2014/main" id="{1A8031F4-B0CD-4355-904D-9913E7B32428}"/>
+                <a16:creationId xmlns:a16="http://schemas.microsoft.com/office/drawing/2014/main" xmlns="" id="{1A8031F4-B0CD-4355-904D-9913E7B32428}"/>
               </a:ext>
             </a:extLst>
           </p:cNvPr>
@@ -9233,6 +9323,698 @@
     <p:extLst>
       <p:ext uri="{BB962C8B-B14F-4D97-AF65-F5344CB8AC3E}">
         <p14:creationId xmlns:p14="http://schemas.microsoft.com/office/powerpoint/2010/main" val="4212114103"/>
+      </p:ext>
+    </p:extLst>
+  </p:cSld>
+  <p:clrMapOvr>
+    <a:masterClrMapping/>
+  </p:clrMapOvr>
+</p:sld>
+</file>
+
+<file path=ppt/slides/slide23.xml><?xml version="1.0" encoding="utf-8"?>
+<p:sld xmlns:a="http://schemas.openxmlformats.org/drawingml/2006/main" xmlns:r="http://schemas.openxmlformats.org/officeDocument/2006/relationships" xmlns:p="http://schemas.openxmlformats.org/presentationml/2006/main">
+  <p:cSld>
+    <p:spTree>
+      <p:nvGrpSpPr>
+        <p:cNvPr id="1" name=""/>
+        <p:cNvGrpSpPr/>
+        <p:nvPr/>
+      </p:nvGrpSpPr>
+      <p:grpSpPr>
+        <a:xfrm>
+          <a:off x="0" y="0"/>
+          <a:ext cx="0" cy="0"/>
+          <a:chOff x="0" y="0"/>
+          <a:chExt cx="0" cy="0"/>
+        </a:xfrm>
+      </p:grpSpPr>
+      <p:sp>
+        <p:nvSpPr>
+          <p:cNvPr id="2" name="矩形 1">
+            <a:extLst>
+              <a:ext uri="{FF2B5EF4-FFF2-40B4-BE49-F238E27FC236}">
+                <a16:creationId xmlns:a16="http://schemas.microsoft.com/office/drawing/2014/main" xmlns="" id="{83610F07-852C-463A-8107-F77C37896FD8}"/>
+              </a:ext>
+            </a:extLst>
+          </p:cNvPr>
+          <p:cNvSpPr/>
+          <p:nvPr/>
+        </p:nvSpPr>
+        <p:spPr>
+          <a:xfrm>
+            <a:off x="0" y="3976"/>
+            <a:ext cx="3839513" cy="584775"/>
+          </a:xfrm>
+          <a:prstGeom prst="rect">
+            <a:avLst/>
+          </a:prstGeom>
+        </p:spPr>
+        <p:txBody>
+          <a:bodyPr wrap="none">
+            <a:spAutoFit/>
+          </a:bodyPr>
+          <a:lstStyle/>
+          <a:p>
+            <a:r>
+              <a:rPr lang="en-US" altLang="zh-CN" sz="3200" dirty="0" err="1"/>
+              <a:t>ConcurrentHashMap</a:t>
+            </a:r>
+            <a:endParaRPr lang="zh-CN" altLang="en-US" sz="3200" dirty="0"/>
+          </a:p>
+        </p:txBody>
+      </p:sp>
+      <p:pic>
+        <p:nvPicPr>
+          <p:cNvPr id="1028" name="Picture 4" descr="3"/>
+          <p:cNvPicPr>
+            <a:picLocks noChangeAspect="1" noChangeArrowheads="1"/>
+          </p:cNvPicPr>
+          <p:nvPr/>
+        </p:nvPicPr>
+        <p:blipFill>
+          <a:blip r:embed="rId2" cstate="print">
+            <a:extLst>
+              <a:ext uri="{28A0092B-C50C-407E-A947-70E740481C1C}">
+                <a14:useLocalDpi xmlns:a14="http://schemas.microsoft.com/office/drawing/2010/main" val="0"/>
+              </a:ext>
+            </a:extLst>
+          </a:blip>
+          <a:srcRect/>
+          <a:stretch>
+            <a:fillRect/>
+          </a:stretch>
+        </p:blipFill>
+        <p:spPr bwMode="auto">
+          <a:xfrm>
+            <a:off x="174739" y="748672"/>
+            <a:ext cx="5260996" cy="3813901"/>
+          </a:xfrm>
+          <a:prstGeom prst="rect">
+            <a:avLst/>
+          </a:prstGeom>
+          <a:noFill/>
+          <a:extLst>
+            <a:ext uri="{909E8E84-426E-40DD-AFC4-6F175D3DCCD1}">
+              <a14:hiddenFill xmlns:a14="http://schemas.microsoft.com/office/drawing/2010/main">
+                <a:solidFill>
+                  <a:srgbClr val="FFFFFF"/>
+                </a:solidFill>
+              </a14:hiddenFill>
+            </a:ext>
+          </a:extLst>
+        </p:spPr>
+      </p:pic>
+      <p:sp>
+        <p:nvSpPr>
+          <p:cNvPr id="8" name="右箭头 7"/>
+          <p:cNvSpPr/>
+          <p:nvPr/>
+        </p:nvSpPr>
+        <p:spPr>
+          <a:xfrm rot="10800000">
+            <a:off x="4950939" y="988850"/>
+            <a:ext cx="1713811" cy="736253"/>
+          </a:xfrm>
+          <a:prstGeom prst="rightArrow">
+            <a:avLst/>
+          </a:prstGeom>
+          <a:solidFill>
+            <a:srgbClr val="FF0000"/>
+          </a:solidFill>
+        </p:spPr>
+        <p:style>
+          <a:lnRef idx="2">
+            <a:schemeClr val="accent1">
+              <a:shade val="50000"/>
+            </a:schemeClr>
+          </a:lnRef>
+          <a:fillRef idx="1">
+            <a:schemeClr val="accent1"/>
+          </a:fillRef>
+          <a:effectRef idx="0">
+            <a:schemeClr val="accent1"/>
+          </a:effectRef>
+          <a:fontRef idx="minor">
+            <a:schemeClr val="lt1"/>
+          </a:fontRef>
+        </p:style>
+        <p:txBody>
+          <a:bodyPr rtlCol="0" anchor="ctr"/>
+          <a:lstStyle/>
+          <a:p>
+            <a:pPr algn="ctr"/>
+            <a:endParaRPr lang="zh-CN" altLang="en-US">
+              <a:solidFill>
+                <a:srgbClr val="FF0000"/>
+              </a:solidFill>
+            </a:endParaRPr>
+          </a:p>
+        </p:txBody>
+      </p:sp>
+      <p:sp>
+        <p:nvSpPr>
+          <p:cNvPr id="9" name="文本框 8"/>
+          <p:cNvSpPr txBox="1"/>
+          <p:nvPr/>
+        </p:nvSpPr>
+        <p:spPr>
+          <a:xfrm>
+            <a:off x="6722323" y="1095869"/>
+            <a:ext cx="4719562" cy="369332"/>
+          </a:xfrm>
+          <a:prstGeom prst="rect">
+            <a:avLst/>
+          </a:prstGeom>
+          <a:noFill/>
+        </p:spPr>
+        <p:txBody>
+          <a:bodyPr wrap="none" rtlCol="0">
+            <a:spAutoFit/>
+          </a:bodyPr>
+          <a:lstStyle/>
+          <a:p>
+            <a:r>
+              <a:rPr lang="zh-CN" altLang="en-US" dirty="0" smtClean="0">
+                <a:solidFill>
+                  <a:srgbClr val="FF0000"/>
+                </a:solidFill>
+              </a:rPr>
+              <a:t>注意，这是</a:t>
+            </a:r>
+            <a:r>
+              <a:rPr lang="en-US" altLang="zh-CN" dirty="0" smtClean="0">
+                <a:solidFill>
+                  <a:srgbClr val="FF0000"/>
+                </a:solidFill>
+              </a:rPr>
+              <a:t>1.7</a:t>
+            </a:r>
+            <a:r>
+              <a:rPr lang="zh-CN" altLang="en-US" dirty="0" smtClean="0">
+                <a:solidFill>
+                  <a:srgbClr val="FF0000"/>
+                </a:solidFill>
+              </a:rPr>
+              <a:t>的结构，后续源码是</a:t>
+            </a:r>
+            <a:r>
+              <a:rPr lang="en-US" altLang="zh-CN" dirty="0" smtClean="0">
+                <a:solidFill>
+                  <a:srgbClr val="FF0000"/>
+                </a:solidFill>
+              </a:rPr>
+              <a:t>1.8</a:t>
+            </a:r>
+            <a:r>
+              <a:rPr lang="zh-CN" altLang="en-US" dirty="0" smtClean="0">
+                <a:solidFill>
+                  <a:srgbClr val="FF0000"/>
+                </a:solidFill>
+              </a:rPr>
+              <a:t>版本的</a:t>
+            </a:r>
+            <a:endParaRPr lang="zh-CN" altLang="en-US" dirty="0">
+              <a:solidFill>
+                <a:srgbClr val="FF0000"/>
+              </a:solidFill>
+            </a:endParaRPr>
+          </a:p>
+        </p:txBody>
+      </p:sp>
+      <p:pic>
+        <p:nvPicPr>
+          <p:cNvPr id="1030" name="Picture 6" descr="4"/>
+          <p:cNvPicPr>
+            <a:picLocks noChangeAspect="1" noChangeArrowheads="1"/>
+          </p:cNvPicPr>
+          <p:nvPr/>
+        </p:nvPicPr>
+        <p:blipFill>
+          <a:blip r:embed="rId3">
+            <a:extLst>
+              <a:ext uri="{28A0092B-C50C-407E-A947-70E740481C1C}">
+                <a14:useLocalDpi xmlns:a14="http://schemas.microsoft.com/office/drawing/2010/main" val="0"/>
+              </a:ext>
+            </a:extLst>
+          </a:blip>
+          <a:srcRect/>
+          <a:stretch>
+            <a:fillRect/>
+          </a:stretch>
+        </p:blipFill>
+        <p:spPr bwMode="auto">
+          <a:xfrm>
+            <a:off x="4645116" y="3256460"/>
+            <a:ext cx="7546884" cy="3349045"/>
+          </a:xfrm>
+          <a:prstGeom prst="rect">
+            <a:avLst/>
+          </a:prstGeom>
+          <a:noFill/>
+          <a:extLst>
+            <a:ext uri="{909E8E84-426E-40DD-AFC4-6F175D3DCCD1}">
+              <a14:hiddenFill xmlns:a14="http://schemas.microsoft.com/office/drawing/2010/main">
+                <a:solidFill>
+                  <a:srgbClr val="FFFFFF"/>
+                </a:solidFill>
+              </a14:hiddenFill>
+            </a:ext>
+          </a:extLst>
+        </p:spPr>
+      </p:pic>
+    </p:spTree>
+    <p:extLst>
+      <p:ext uri="{BB962C8B-B14F-4D97-AF65-F5344CB8AC3E}">
+        <p14:creationId xmlns:p14="http://schemas.microsoft.com/office/powerpoint/2010/main" val="3328292633"/>
+      </p:ext>
+    </p:extLst>
+  </p:cSld>
+  <p:clrMapOvr>
+    <a:masterClrMapping/>
+  </p:clrMapOvr>
+</p:sld>
+</file>
+
+<file path=ppt/slides/slide24.xml><?xml version="1.0" encoding="utf-8"?>
+<p:sld xmlns:a="http://schemas.openxmlformats.org/drawingml/2006/main" xmlns:r="http://schemas.openxmlformats.org/officeDocument/2006/relationships" xmlns:p="http://schemas.openxmlformats.org/presentationml/2006/main">
+  <p:cSld>
+    <p:spTree>
+      <p:nvGrpSpPr>
+        <p:cNvPr id="1" name=""/>
+        <p:cNvGrpSpPr/>
+        <p:nvPr/>
+      </p:nvGrpSpPr>
+      <p:grpSpPr>
+        <a:xfrm>
+          <a:off x="0" y="0"/>
+          <a:ext cx="0" cy="0"/>
+          <a:chOff x="0" y="0"/>
+          <a:chExt cx="0" cy="0"/>
+        </a:xfrm>
+      </p:grpSpPr>
+      <p:sp>
+        <p:nvSpPr>
+          <p:cNvPr id="4" name="矩形 3">
+            <a:extLst>
+              <a:ext uri="{FF2B5EF4-FFF2-40B4-BE49-F238E27FC236}">
+                <a16:creationId xmlns:a16="http://schemas.microsoft.com/office/drawing/2014/main" xmlns="" id="{83610F07-852C-463A-8107-F77C37896FD8}"/>
+              </a:ext>
+            </a:extLst>
+          </p:cNvPr>
+          <p:cNvSpPr/>
+          <p:nvPr/>
+        </p:nvSpPr>
+        <p:spPr>
+          <a:xfrm>
+            <a:off x="0" y="3976"/>
+            <a:ext cx="3839513" cy="584775"/>
+          </a:xfrm>
+          <a:prstGeom prst="rect">
+            <a:avLst/>
+          </a:prstGeom>
+        </p:spPr>
+        <p:txBody>
+          <a:bodyPr wrap="none">
+            <a:spAutoFit/>
+          </a:bodyPr>
+          <a:lstStyle/>
+          <a:p>
+            <a:r>
+              <a:rPr lang="en-US" altLang="zh-CN" sz="3200" dirty="0" err="1"/>
+              <a:t>ConcurrentHashMap</a:t>
+            </a:r>
+            <a:endParaRPr lang="zh-CN" altLang="en-US" sz="3200" dirty="0"/>
+          </a:p>
+        </p:txBody>
+      </p:sp>
+      <p:pic>
+        <p:nvPicPr>
+          <p:cNvPr id="6" name="图片 5"/>
+          <p:cNvPicPr>
+            <a:picLocks noChangeAspect="1"/>
+          </p:cNvPicPr>
+          <p:nvPr/>
+        </p:nvPicPr>
+        <p:blipFill>
+          <a:blip r:embed="rId2"/>
+          <a:stretch>
+            <a:fillRect/>
+          </a:stretch>
+        </p:blipFill>
+        <p:spPr>
+          <a:xfrm>
+            <a:off x="978161" y="588751"/>
+            <a:ext cx="8043796" cy="6269249"/>
+          </a:xfrm>
+          <a:prstGeom prst="rect">
+            <a:avLst/>
+          </a:prstGeom>
+        </p:spPr>
+      </p:pic>
+    </p:spTree>
+    <p:extLst>
+      <p:ext uri="{BB962C8B-B14F-4D97-AF65-F5344CB8AC3E}">
+        <p14:creationId xmlns:p14="http://schemas.microsoft.com/office/powerpoint/2010/main" val="299140676"/>
+      </p:ext>
+    </p:extLst>
+  </p:cSld>
+  <p:clrMapOvr>
+    <a:masterClrMapping/>
+  </p:clrMapOvr>
+</p:sld>
+</file>
+
+<file path=ppt/slides/slide25.xml><?xml version="1.0" encoding="utf-8"?>
+<p:sld xmlns:a="http://schemas.openxmlformats.org/drawingml/2006/main" xmlns:r="http://schemas.openxmlformats.org/officeDocument/2006/relationships" xmlns:p="http://schemas.openxmlformats.org/presentationml/2006/main">
+  <p:cSld>
+    <p:spTree>
+      <p:nvGrpSpPr>
+        <p:cNvPr id="1" name=""/>
+        <p:cNvGrpSpPr/>
+        <p:nvPr/>
+      </p:nvGrpSpPr>
+      <p:grpSpPr>
+        <a:xfrm>
+          <a:off x="0" y="0"/>
+          <a:ext cx="0" cy="0"/>
+          <a:chOff x="0" y="0"/>
+          <a:chExt cx="0" cy="0"/>
+        </a:xfrm>
+      </p:grpSpPr>
+      <p:pic>
+        <p:nvPicPr>
+          <p:cNvPr id="3" name="图片 2"/>
+          <p:cNvPicPr>
+            <a:picLocks noChangeAspect="1"/>
+          </p:cNvPicPr>
+          <p:nvPr/>
+        </p:nvPicPr>
+        <p:blipFill>
+          <a:blip r:embed="rId2"/>
+          <a:stretch>
+            <a:fillRect/>
+          </a:stretch>
+        </p:blipFill>
+        <p:spPr>
+          <a:xfrm>
+            <a:off x="4266398" y="0"/>
+            <a:ext cx="3253323" cy="6771503"/>
+          </a:xfrm>
+          <a:prstGeom prst="rect">
+            <a:avLst/>
+          </a:prstGeom>
+        </p:spPr>
+      </p:pic>
+      <p:sp>
+        <p:nvSpPr>
+          <p:cNvPr id="4" name="矩形 3">
+            <a:extLst>
+              <a:ext uri="{FF2B5EF4-FFF2-40B4-BE49-F238E27FC236}">
+                <a16:creationId xmlns:a16="http://schemas.microsoft.com/office/drawing/2014/main" xmlns="" id="{83610F07-852C-463A-8107-F77C37896FD8}"/>
+              </a:ext>
+            </a:extLst>
+          </p:cNvPr>
+          <p:cNvSpPr/>
+          <p:nvPr/>
+        </p:nvSpPr>
+        <p:spPr>
+          <a:xfrm>
+            <a:off x="0" y="3976"/>
+            <a:ext cx="3839513" cy="584775"/>
+          </a:xfrm>
+          <a:prstGeom prst="rect">
+            <a:avLst/>
+          </a:prstGeom>
+        </p:spPr>
+        <p:txBody>
+          <a:bodyPr wrap="none">
+            <a:spAutoFit/>
+          </a:bodyPr>
+          <a:lstStyle/>
+          <a:p>
+            <a:r>
+              <a:rPr lang="en-US" altLang="zh-CN" sz="3200" dirty="0" err="1"/>
+              <a:t>ConcurrentHashMap</a:t>
+            </a:r>
+            <a:endParaRPr lang="zh-CN" altLang="en-US" sz="3200" dirty="0"/>
+          </a:p>
+        </p:txBody>
+      </p:sp>
+      <p:pic>
+        <p:nvPicPr>
+          <p:cNvPr id="2" name="图片 1"/>
+          <p:cNvPicPr>
+            <a:picLocks noChangeAspect="1"/>
+          </p:cNvPicPr>
+          <p:nvPr/>
+        </p:nvPicPr>
+        <p:blipFill>
+          <a:blip r:embed="rId3"/>
+          <a:stretch>
+            <a:fillRect/>
+          </a:stretch>
+        </p:blipFill>
+        <p:spPr>
+          <a:xfrm>
+            <a:off x="100138" y="881898"/>
+            <a:ext cx="3639236" cy="730052"/>
+          </a:xfrm>
+          <a:prstGeom prst="rect">
+            <a:avLst/>
+          </a:prstGeom>
+        </p:spPr>
+      </p:pic>
+      <p:pic>
+        <p:nvPicPr>
+          <p:cNvPr id="5" name="图片 4"/>
+          <p:cNvPicPr>
+            <a:picLocks noChangeAspect="1"/>
+          </p:cNvPicPr>
+          <p:nvPr/>
+        </p:nvPicPr>
+        <p:blipFill>
+          <a:blip r:embed="rId4"/>
+          <a:stretch>
+            <a:fillRect/>
+          </a:stretch>
+        </p:blipFill>
+        <p:spPr>
+          <a:xfrm>
+            <a:off x="7619860" y="204175"/>
+            <a:ext cx="4572140" cy="4046549"/>
+          </a:xfrm>
+          <a:prstGeom prst="rect">
+            <a:avLst/>
+          </a:prstGeom>
+        </p:spPr>
+      </p:pic>
+      <p:pic>
+        <p:nvPicPr>
+          <p:cNvPr id="6" name="图片 5"/>
+          <p:cNvPicPr>
+            <a:picLocks noChangeAspect="1"/>
+          </p:cNvPicPr>
+          <p:nvPr/>
+        </p:nvPicPr>
+        <p:blipFill>
+          <a:blip r:embed="rId5"/>
+          <a:stretch>
+            <a:fillRect/>
+          </a:stretch>
+        </p:blipFill>
+        <p:spPr>
+          <a:xfrm>
+            <a:off x="161096" y="2227449"/>
+            <a:ext cx="3678417" cy="378610"/>
+          </a:xfrm>
+          <a:prstGeom prst="rect">
+            <a:avLst/>
+          </a:prstGeom>
+        </p:spPr>
+      </p:pic>
+      <p:pic>
+        <p:nvPicPr>
+          <p:cNvPr id="7" name="图片 6"/>
+          <p:cNvPicPr>
+            <a:picLocks noChangeAspect="1"/>
+          </p:cNvPicPr>
+          <p:nvPr/>
+        </p:nvPicPr>
+        <p:blipFill>
+          <a:blip r:embed="rId6"/>
+          <a:stretch>
+            <a:fillRect/>
+          </a:stretch>
+        </p:blipFill>
+        <p:spPr>
+          <a:xfrm>
+            <a:off x="100138" y="2992843"/>
+            <a:ext cx="3739375" cy="607092"/>
+          </a:xfrm>
+          <a:prstGeom prst="rect">
+            <a:avLst/>
+          </a:prstGeom>
+        </p:spPr>
+      </p:pic>
+      <p:pic>
+        <p:nvPicPr>
+          <p:cNvPr id="8" name="图片 7"/>
+          <p:cNvPicPr>
+            <a:picLocks noChangeAspect="1"/>
+          </p:cNvPicPr>
+          <p:nvPr/>
+        </p:nvPicPr>
+        <p:blipFill>
+          <a:blip r:embed="rId7"/>
+          <a:stretch>
+            <a:fillRect/>
+          </a:stretch>
+        </p:blipFill>
+        <p:spPr>
+          <a:xfrm>
+            <a:off x="100139" y="3986719"/>
+            <a:ext cx="3739374" cy="994110"/>
+          </a:xfrm>
+          <a:prstGeom prst="rect">
+            <a:avLst/>
+          </a:prstGeom>
+        </p:spPr>
+      </p:pic>
+    </p:spTree>
+    <p:extLst>
+      <p:ext uri="{BB962C8B-B14F-4D97-AF65-F5344CB8AC3E}">
+        <p14:creationId xmlns:p14="http://schemas.microsoft.com/office/powerpoint/2010/main" val="2574423838"/>
+      </p:ext>
+    </p:extLst>
+  </p:cSld>
+  <p:clrMapOvr>
+    <a:masterClrMapping/>
+  </p:clrMapOvr>
+</p:sld>
+</file>
+
+<file path=ppt/slides/slide26.xml><?xml version="1.0" encoding="utf-8"?>
+<p:sld xmlns:a="http://schemas.openxmlformats.org/drawingml/2006/main" xmlns:r="http://schemas.openxmlformats.org/officeDocument/2006/relationships" xmlns:p="http://schemas.openxmlformats.org/presentationml/2006/main">
+  <p:cSld>
+    <p:spTree>
+      <p:nvGrpSpPr>
+        <p:cNvPr id="1" name=""/>
+        <p:cNvGrpSpPr/>
+        <p:nvPr/>
+      </p:nvGrpSpPr>
+      <p:grpSpPr>
+        <a:xfrm>
+          <a:off x="0" y="0"/>
+          <a:ext cx="0" cy="0"/>
+          <a:chOff x="0" y="0"/>
+          <a:chExt cx="0" cy="0"/>
+        </a:xfrm>
+      </p:grpSpPr>
+      <p:sp>
+        <p:nvSpPr>
+          <p:cNvPr id="4" name="矩形 3">
+            <a:extLst>
+              <a:ext uri="{FF2B5EF4-FFF2-40B4-BE49-F238E27FC236}">
+                <a16:creationId xmlns:a16="http://schemas.microsoft.com/office/drawing/2014/main" xmlns="" id="{83610F07-852C-463A-8107-F77C37896FD8}"/>
+              </a:ext>
+            </a:extLst>
+          </p:cNvPr>
+          <p:cNvSpPr/>
+          <p:nvPr/>
+        </p:nvSpPr>
+        <p:spPr>
+          <a:xfrm>
+            <a:off x="0" y="3976"/>
+            <a:ext cx="3839513" cy="584775"/>
+          </a:xfrm>
+          <a:prstGeom prst="rect">
+            <a:avLst/>
+          </a:prstGeom>
+        </p:spPr>
+        <p:txBody>
+          <a:bodyPr wrap="none">
+            <a:spAutoFit/>
+          </a:bodyPr>
+          <a:lstStyle/>
+          <a:p>
+            <a:r>
+              <a:rPr lang="en-US" altLang="zh-CN" sz="3200" dirty="0" err="1"/>
+              <a:t>ConcurrentHashMap</a:t>
+            </a:r>
+            <a:endParaRPr lang="zh-CN" altLang="en-US" sz="3200" dirty="0"/>
+          </a:p>
+        </p:txBody>
+      </p:sp>
+    </p:spTree>
+    <p:extLst>
+      <p:ext uri="{BB962C8B-B14F-4D97-AF65-F5344CB8AC3E}">
+        <p14:creationId xmlns:p14="http://schemas.microsoft.com/office/powerpoint/2010/main" val="3733571271"/>
+      </p:ext>
+    </p:extLst>
+  </p:cSld>
+  <p:clrMapOvr>
+    <a:masterClrMapping/>
+  </p:clrMapOvr>
+</p:sld>
+</file>
+
+<file path=ppt/slides/slide27.xml><?xml version="1.0" encoding="utf-8"?>
+<p:sld xmlns:a="http://schemas.openxmlformats.org/drawingml/2006/main" xmlns:r="http://schemas.openxmlformats.org/officeDocument/2006/relationships" xmlns:p="http://schemas.openxmlformats.org/presentationml/2006/main">
+  <p:cSld>
+    <p:spTree>
+      <p:nvGrpSpPr>
+        <p:cNvPr id="1" name=""/>
+        <p:cNvGrpSpPr/>
+        <p:nvPr/>
+      </p:nvGrpSpPr>
+      <p:grpSpPr>
+        <a:xfrm>
+          <a:off x="0" y="0"/>
+          <a:ext cx="0" cy="0"/>
+          <a:chOff x="0" y="0"/>
+          <a:chExt cx="0" cy="0"/>
+        </a:xfrm>
+      </p:grpSpPr>
+      <p:sp>
+        <p:nvSpPr>
+          <p:cNvPr id="4" name="矩形 3">
+            <a:extLst>
+              <a:ext uri="{FF2B5EF4-FFF2-40B4-BE49-F238E27FC236}">
+                <a16:creationId xmlns:a16="http://schemas.microsoft.com/office/drawing/2014/main" xmlns="" id="{83610F07-852C-463A-8107-F77C37896FD8}"/>
+              </a:ext>
+            </a:extLst>
+          </p:cNvPr>
+          <p:cNvSpPr/>
+          <p:nvPr/>
+        </p:nvSpPr>
+        <p:spPr>
+          <a:xfrm>
+            <a:off x="0" y="3976"/>
+            <a:ext cx="3839513" cy="584775"/>
+          </a:xfrm>
+          <a:prstGeom prst="rect">
+            <a:avLst/>
+          </a:prstGeom>
+        </p:spPr>
+        <p:txBody>
+          <a:bodyPr wrap="none">
+            <a:spAutoFit/>
+          </a:bodyPr>
+          <a:lstStyle/>
+          <a:p>
+            <a:r>
+              <a:rPr lang="en-US" altLang="zh-CN" sz="3200" dirty="0" err="1"/>
+              <a:t>ConcurrentHashMap</a:t>
+            </a:r>
+            <a:endParaRPr lang="zh-CN" altLang="en-US" sz="3200" dirty="0"/>
+          </a:p>
+        </p:txBody>
+      </p:sp>
+    </p:spTree>
+    <p:extLst>
+      <p:ext uri="{BB962C8B-B14F-4D97-AF65-F5344CB8AC3E}">
+        <p14:creationId xmlns:p14="http://schemas.microsoft.com/office/powerpoint/2010/main" val="2962993276"/>
       </p:ext>
     </p:extLst>
   </p:cSld>
@@ -9264,7 +10046,7 @@
           <p:cNvPr id="2" name="矩形 1">
             <a:extLst>
               <a:ext uri="{FF2B5EF4-FFF2-40B4-BE49-F238E27FC236}">
-                <a16:creationId xmlns:a16="http://schemas.microsoft.com/office/drawing/2014/main" id="{0121B0F3-2A2A-456C-B6CB-DC8E6C73E366}"/>
+                <a16:creationId xmlns:a16="http://schemas.microsoft.com/office/drawing/2014/main" xmlns="" id="{0121B0F3-2A2A-456C-B6CB-DC8E6C73E366}"/>
               </a:ext>
             </a:extLst>
           </p:cNvPr>
@@ -9299,7 +10081,7 @@
           <p:cNvPr id="3" name="图片 2">
             <a:extLst>
               <a:ext uri="{FF2B5EF4-FFF2-40B4-BE49-F238E27FC236}">
-                <a16:creationId xmlns:a16="http://schemas.microsoft.com/office/drawing/2014/main" id="{8BE457DB-7447-43BB-A9A3-29E3157B2E94}"/>
+                <a16:creationId xmlns:a16="http://schemas.microsoft.com/office/drawing/2014/main" xmlns="" id="{8BE457DB-7447-43BB-A9A3-29E3157B2E94}"/>
               </a:ext>
             </a:extLst>
           </p:cNvPr>
@@ -9359,7 +10141,7 @@
           <p:cNvPr id="2" name="矩形 1">
             <a:extLst>
               <a:ext uri="{FF2B5EF4-FFF2-40B4-BE49-F238E27FC236}">
-                <a16:creationId xmlns:a16="http://schemas.microsoft.com/office/drawing/2014/main" id="{6F83A1AB-83A6-431F-B860-D70267A819A0}"/>
+                <a16:creationId xmlns:a16="http://schemas.microsoft.com/office/drawing/2014/main" xmlns="" id="{6F83A1AB-83A6-431F-B860-D70267A819A0}"/>
               </a:ext>
             </a:extLst>
           </p:cNvPr>
@@ -9394,7 +10176,7 @@
           <p:cNvPr id="4" name="图片 3">
             <a:extLst>
               <a:ext uri="{FF2B5EF4-FFF2-40B4-BE49-F238E27FC236}">
-                <a16:creationId xmlns:a16="http://schemas.microsoft.com/office/drawing/2014/main" id="{4AFAA403-E90F-41E9-B603-8F7FA2C2A409}"/>
+                <a16:creationId xmlns:a16="http://schemas.microsoft.com/office/drawing/2014/main" xmlns="" id="{4AFAA403-E90F-41E9-B603-8F7FA2C2A409}"/>
               </a:ext>
             </a:extLst>
           </p:cNvPr>
@@ -9454,7 +10236,7 @@
           <p:cNvPr id="4" name="图片 3">
             <a:extLst>
               <a:ext uri="{FF2B5EF4-FFF2-40B4-BE49-F238E27FC236}">
-                <a16:creationId xmlns:a16="http://schemas.microsoft.com/office/drawing/2014/main" id="{0E059787-601E-4559-8474-B232F7BF9D06}"/>
+                <a16:creationId xmlns:a16="http://schemas.microsoft.com/office/drawing/2014/main" xmlns="" id="{0E059787-601E-4559-8474-B232F7BF9D06}"/>
               </a:ext>
             </a:extLst>
           </p:cNvPr>
@@ -9484,7 +10266,7 @@
           <p:cNvPr id="5" name="文本框 4">
             <a:extLst>
               <a:ext uri="{FF2B5EF4-FFF2-40B4-BE49-F238E27FC236}">
-                <a16:creationId xmlns:a16="http://schemas.microsoft.com/office/drawing/2014/main" id="{4FD79C78-9900-416A-9B55-E96D493A95D4}"/>
+                <a16:creationId xmlns:a16="http://schemas.microsoft.com/office/drawing/2014/main" xmlns="" id="{4FD79C78-9900-416A-9B55-E96D493A95D4}"/>
               </a:ext>
             </a:extLst>
           </p:cNvPr>
@@ -9523,7 +10305,7 @@
           <p:cNvPr id="7" name="文本框 6">
             <a:extLst>
               <a:ext uri="{FF2B5EF4-FFF2-40B4-BE49-F238E27FC236}">
-                <a16:creationId xmlns:a16="http://schemas.microsoft.com/office/drawing/2014/main" id="{E188D6B1-F65C-4303-B0A1-DB5FD4B5E476}"/>
+                <a16:creationId xmlns:a16="http://schemas.microsoft.com/office/drawing/2014/main" xmlns="" id="{E188D6B1-F65C-4303-B0A1-DB5FD4B5E476}"/>
               </a:ext>
             </a:extLst>
           </p:cNvPr>
@@ -9570,7 +10352,7 @@
           <p:cNvPr id="8" name="图片 7">
             <a:extLst>
               <a:ext uri="{FF2B5EF4-FFF2-40B4-BE49-F238E27FC236}">
-                <a16:creationId xmlns:a16="http://schemas.microsoft.com/office/drawing/2014/main" id="{E87B60D8-FF6C-41F3-BCDD-7E2161F966A6}"/>
+                <a16:creationId xmlns:a16="http://schemas.microsoft.com/office/drawing/2014/main" xmlns="" id="{E87B60D8-FF6C-41F3-BCDD-7E2161F966A6}"/>
               </a:ext>
             </a:extLst>
           </p:cNvPr>
@@ -9630,7 +10412,7 @@
           <p:cNvPr id="2" name="矩形 1">
             <a:extLst>
               <a:ext uri="{FF2B5EF4-FFF2-40B4-BE49-F238E27FC236}">
-                <a16:creationId xmlns:a16="http://schemas.microsoft.com/office/drawing/2014/main" id="{F9AC4A6B-3FE4-4AE7-B564-879E0034C1B8}"/>
+                <a16:creationId xmlns:a16="http://schemas.microsoft.com/office/drawing/2014/main" xmlns="" id="{F9AC4A6B-3FE4-4AE7-B564-879E0034C1B8}"/>
               </a:ext>
             </a:extLst>
           </p:cNvPr>
@@ -9665,7 +10447,7 @@
           <p:cNvPr id="4" name="图片 3">
             <a:extLst>
               <a:ext uri="{FF2B5EF4-FFF2-40B4-BE49-F238E27FC236}">
-                <a16:creationId xmlns:a16="http://schemas.microsoft.com/office/drawing/2014/main" id="{6A4CF27D-28CB-488B-B307-223F682CE2D3}"/>
+                <a16:creationId xmlns:a16="http://schemas.microsoft.com/office/drawing/2014/main" xmlns="" id="{6A4CF27D-28CB-488B-B307-223F682CE2D3}"/>
               </a:ext>
             </a:extLst>
           </p:cNvPr>
@@ -9725,7 +10507,7 @@
           <p:cNvPr id="2" name="矩形 1">
             <a:extLst>
               <a:ext uri="{FF2B5EF4-FFF2-40B4-BE49-F238E27FC236}">
-                <a16:creationId xmlns:a16="http://schemas.microsoft.com/office/drawing/2014/main" id="{36A05B3F-D8BE-4915-A149-396E33D7E183}"/>
+                <a16:creationId xmlns:a16="http://schemas.microsoft.com/office/drawing/2014/main" xmlns="" id="{36A05B3F-D8BE-4915-A149-396E33D7E183}"/>
               </a:ext>
             </a:extLst>
           </p:cNvPr>
@@ -9760,7 +10542,7 @@
           <p:cNvPr id="3" name="矩形 2">
             <a:extLst>
               <a:ext uri="{FF2B5EF4-FFF2-40B4-BE49-F238E27FC236}">
-                <a16:creationId xmlns:a16="http://schemas.microsoft.com/office/drawing/2014/main" id="{1AB84466-254D-47FB-8FA5-B9BC82239344}"/>
+                <a16:creationId xmlns:a16="http://schemas.microsoft.com/office/drawing/2014/main" xmlns="" id="{1AB84466-254D-47FB-8FA5-B9BC82239344}"/>
               </a:ext>
             </a:extLst>
           </p:cNvPr>
@@ -9795,7 +10577,7 @@
           <p:cNvPr id="4" name="矩形 3">
             <a:extLst>
               <a:ext uri="{FF2B5EF4-FFF2-40B4-BE49-F238E27FC236}">
-                <a16:creationId xmlns:a16="http://schemas.microsoft.com/office/drawing/2014/main" id="{992E0B2A-979E-4760-883A-80B884513AC5}"/>
+                <a16:creationId xmlns:a16="http://schemas.microsoft.com/office/drawing/2014/main" xmlns="" id="{992E0B2A-979E-4760-883A-80B884513AC5}"/>
               </a:ext>
             </a:extLst>
           </p:cNvPr>
@@ -9829,7 +10611,7 @@
           <p:cNvPr id="5" name="矩形 4">
             <a:extLst>
               <a:ext uri="{FF2B5EF4-FFF2-40B4-BE49-F238E27FC236}">
-                <a16:creationId xmlns:a16="http://schemas.microsoft.com/office/drawing/2014/main" id="{DC5A2B13-B596-404A-9B2E-AD6E8A6894FF}"/>
+                <a16:creationId xmlns:a16="http://schemas.microsoft.com/office/drawing/2014/main" xmlns="" id="{DC5A2B13-B596-404A-9B2E-AD6E8A6894FF}"/>
               </a:ext>
             </a:extLst>
           </p:cNvPr>
@@ -9863,7 +10645,7 @@
           <p:cNvPr id="6" name="图片 5">
             <a:extLst>
               <a:ext uri="{FF2B5EF4-FFF2-40B4-BE49-F238E27FC236}">
-                <a16:creationId xmlns:a16="http://schemas.microsoft.com/office/drawing/2014/main" id="{A3E24AA1-82A0-44C4-876B-1F3777CDCC2E}"/>
+                <a16:creationId xmlns:a16="http://schemas.microsoft.com/office/drawing/2014/main" xmlns="" id="{A3E24AA1-82A0-44C4-876B-1F3777CDCC2E}"/>
               </a:ext>
             </a:extLst>
           </p:cNvPr>
@@ -9893,7 +10675,7 @@
           <p:cNvPr id="7" name="图片 6">
             <a:extLst>
               <a:ext uri="{FF2B5EF4-FFF2-40B4-BE49-F238E27FC236}">
-                <a16:creationId xmlns:a16="http://schemas.microsoft.com/office/drawing/2014/main" id="{DD6054DB-0352-4A81-8533-6FAD84A1798C}"/>
+                <a16:creationId xmlns:a16="http://schemas.microsoft.com/office/drawing/2014/main" xmlns="" id="{DD6054DB-0352-4A81-8533-6FAD84A1798C}"/>
               </a:ext>
             </a:extLst>
           </p:cNvPr>
@@ -9923,7 +10705,7 @@
           <p:cNvPr id="9" name="图片 8">
             <a:extLst>
               <a:ext uri="{FF2B5EF4-FFF2-40B4-BE49-F238E27FC236}">
-                <a16:creationId xmlns:a16="http://schemas.microsoft.com/office/drawing/2014/main" id="{458F0245-F124-48AF-BFAC-B2AE0E0C9AB2}"/>
+                <a16:creationId xmlns:a16="http://schemas.microsoft.com/office/drawing/2014/main" xmlns="" id="{458F0245-F124-48AF-BFAC-B2AE0E0C9AB2}"/>
               </a:ext>
             </a:extLst>
           </p:cNvPr>
@@ -9983,7 +10765,7 @@
           <p:cNvPr id="2" name="图片 1">
             <a:extLst>
               <a:ext uri="{FF2B5EF4-FFF2-40B4-BE49-F238E27FC236}">
-                <a16:creationId xmlns:a16="http://schemas.microsoft.com/office/drawing/2014/main" id="{1051AF13-2DEB-405A-844C-02CE2F5FA1B3}"/>
+                <a16:creationId xmlns:a16="http://schemas.microsoft.com/office/drawing/2014/main" xmlns="" id="{1051AF13-2DEB-405A-844C-02CE2F5FA1B3}"/>
               </a:ext>
             </a:extLst>
           </p:cNvPr>
@@ -10013,7 +10795,7 @@
           <p:cNvPr id="3" name="矩形 2">
             <a:extLst>
               <a:ext uri="{FF2B5EF4-FFF2-40B4-BE49-F238E27FC236}">
-                <a16:creationId xmlns:a16="http://schemas.microsoft.com/office/drawing/2014/main" id="{9A90253A-0395-4A15-BCC5-BC8BA69D8B8B}"/>
+                <a16:creationId xmlns:a16="http://schemas.microsoft.com/office/drawing/2014/main" xmlns="" id="{9A90253A-0395-4A15-BCC5-BC8BA69D8B8B}"/>
               </a:ext>
             </a:extLst>
           </p:cNvPr>
@@ -10048,7 +10830,7 @@
           <p:cNvPr id="4" name="图片 3">
             <a:extLst>
               <a:ext uri="{FF2B5EF4-FFF2-40B4-BE49-F238E27FC236}">
-                <a16:creationId xmlns:a16="http://schemas.microsoft.com/office/drawing/2014/main" id="{2B15CA16-4656-44B0-8FFB-70C0F95CA91A}"/>
+                <a16:creationId xmlns:a16="http://schemas.microsoft.com/office/drawing/2014/main" xmlns="" id="{2B15CA16-4656-44B0-8FFB-70C0F95CA91A}"/>
               </a:ext>
             </a:extLst>
           </p:cNvPr>
@@ -10078,7 +10860,7 @@
           <p:cNvPr id="5" name="图片 4">
             <a:extLst>
               <a:ext uri="{FF2B5EF4-FFF2-40B4-BE49-F238E27FC236}">
-                <a16:creationId xmlns:a16="http://schemas.microsoft.com/office/drawing/2014/main" id="{B1C1782E-891F-46EA-AB6A-B76410303850}"/>
+                <a16:creationId xmlns:a16="http://schemas.microsoft.com/office/drawing/2014/main" xmlns="" id="{B1C1782E-891F-46EA-AB6A-B76410303850}"/>
               </a:ext>
             </a:extLst>
           </p:cNvPr>
@@ -10138,7 +10920,7 @@
           <p:cNvPr id="2" name="矩形 1">
             <a:extLst>
               <a:ext uri="{FF2B5EF4-FFF2-40B4-BE49-F238E27FC236}">
-                <a16:creationId xmlns:a16="http://schemas.microsoft.com/office/drawing/2014/main" id="{466C6482-9EAB-4617-BAD3-6D0C5FEF2ABC}"/>
+                <a16:creationId xmlns:a16="http://schemas.microsoft.com/office/drawing/2014/main" xmlns="" id="{466C6482-9EAB-4617-BAD3-6D0C5FEF2ABC}"/>
               </a:ext>
             </a:extLst>
           </p:cNvPr>
@@ -10173,7 +10955,7 @@
           <p:cNvPr id="5" name="图片 4">
             <a:extLst>
               <a:ext uri="{FF2B5EF4-FFF2-40B4-BE49-F238E27FC236}">
-                <a16:creationId xmlns:a16="http://schemas.microsoft.com/office/drawing/2014/main" id="{29A83C1B-9158-429B-B468-E619A686248B}"/>
+                <a16:creationId xmlns:a16="http://schemas.microsoft.com/office/drawing/2014/main" xmlns="" id="{29A83C1B-9158-429B-B468-E619A686248B}"/>
               </a:ext>
             </a:extLst>
           </p:cNvPr>

</xml_diff>

<commit_message>
update java sets 100%
</commit_message>
<xml_diff>
--- a/常用集合源码分析.pptx
+++ b/常用集合源码分析.pptx
@@ -5,7 +5,7 @@
     <p:sldMasterId id="2147483660" r:id="rId1"/>
   </p:sldMasterIdLst>
   <p:notesMasterIdLst>
-    <p:notesMasterId r:id="rId29"/>
+    <p:notesMasterId r:id="rId32"/>
   </p:notesMasterIdLst>
   <p:sldIdLst>
     <p:sldId id="267" r:id="rId2"/>
@@ -35,6 +35,9 @@
     <p:sldId id="293" r:id="rId26"/>
     <p:sldId id="291" r:id="rId27"/>
     <p:sldId id="292" r:id="rId28"/>
+    <p:sldId id="294" r:id="rId29"/>
+    <p:sldId id="295" r:id="rId30"/>
+    <p:sldId id="296" r:id="rId31"/>
   </p:sldIdLst>
   <p:sldSz cx="12192000" cy="6858000"/>
   <p:notesSz cx="6858000" cy="9144000"/>
@@ -226,7 +229,7 @@
           <a:p>
             <a:fld id="{7A220C89-F741-4A60-8725-24F669448BA8}" type="datetimeFigureOut">
               <a:rPr lang="zh-CN" altLang="en-US" smtClean="0"/>
-              <a:t>2018/8/20</a:t>
+              <a:t>2018/8/23</a:t>
             </a:fld>
             <a:endParaRPr lang="zh-CN" altLang="en-US"/>
           </a:p>
@@ -683,7 +686,7 @@
           <p:cNvPr id="4" name="日期占位符 3">
             <a:extLst>
               <a:ext uri="{FF2B5EF4-FFF2-40B4-BE49-F238E27FC236}">
-                <a16:creationId xmlns:a16="http://schemas.microsoft.com/office/drawing/2014/main" xmlns="" id="{E3C88C80-19D1-4BDB-93D6-01C8B5D57E2B}"/>
+                <a16:creationId xmlns="" xmlns:a16="http://schemas.microsoft.com/office/drawing/2014/main" id="{E3C88C80-19D1-4BDB-93D6-01C8B5D57E2B}"/>
               </a:ext>
             </a:extLst>
           </p:cNvPr>
@@ -701,7 +704,7 @@
           <a:p>
             <a:fld id="{E13947ED-5EF2-47D5-99F5-5EE8E4B8CE26}" type="datetimeFigureOut">
               <a:rPr lang="zh-CN" altLang="en-US" smtClean="0"/>
-              <a:t>2018/8/20</a:t>
+              <a:t>2018/8/23</a:t>
             </a:fld>
             <a:endParaRPr lang="zh-CN" altLang="en-US"/>
           </a:p>
@@ -712,7 +715,7 @@
           <p:cNvPr id="5" name="页脚占位符 4">
             <a:extLst>
               <a:ext uri="{FF2B5EF4-FFF2-40B4-BE49-F238E27FC236}">
-                <a16:creationId xmlns:a16="http://schemas.microsoft.com/office/drawing/2014/main" xmlns="" id="{DD2AB6A0-788E-44A1-9AE0-27A61338646E}"/>
+                <a16:creationId xmlns="" xmlns:a16="http://schemas.microsoft.com/office/drawing/2014/main" id="{DD2AB6A0-788E-44A1-9AE0-27A61338646E}"/>
               </a:ext>
             </a:extLst>
           </p:cNvPr>
@@ -737,7 +740,7 @@
           <p:cNvPr id="6" name="灯片编号占位符 5">
             <a:extLst>
               <a:ext uri="{FF2B5EF4-FFF2-40B4-BE49-F238E27FC236}">
-                <a16:creationId xmlns:a16="http://schemas.microsoft.com/office/drawing/2014/main" xmlns="" id="{990BFCAA-9D3B-477B-A442-619BF31A71E5}"/>
+                <a16:creationId xmlns="" xmlns:a16="http://schemas.microsoft.com/office/drawing/2014/main" id="{990BFCAA-9D3B-477B-A442-619BF31A71E5}"/>
               </a:ext>
             </a:extLst>
           </p:cNvPr>
@@ -766,7 +769,7 @@
           <p:cNvPr id="9" name="矩形 8">
             <a:extLst>
               <a:ext uri="{FF2B5EF4-FFF2-40B4-BE49-F238E27FC236}">
-                <a16:creationId xmlns:a16="http://schemas.microsoft.com/office/drawing/2014/main" xmlns="" id="{6C26513F-A3B8-4E41-B279-80D4C37DF881}"/>
+                <a16:creationId xmlns="" xmlns:a16="http://schemas.microsoft.com/office/drawing/2014/main" id="{6C26513F-A3B8-4E41-B279-80D4C37DF881}"/>
               </a:ext>
             </a:extLst>
           </p:cNvPr>
@@ -849,7 +852,7 @@
           <p:cNvPr id="2" name="标题 1">
             <a:extLst>
               <a:ext uri="{FF2B5EF4-FFF2-40B4-BE49-F238E27FC236}">
-                <a16:creationId xmlns:a16="http://schemas.microsoft.com/office/drawing/2014/main" xmlns="" id="{547EEB98-0393-480B-8E60-2A9EAD0978D9}"/>
+                <a16:creationId xmlns="" xmlns:a16="http://schemas.microsoft.com/office/drawing/2014/main" id="{547EEB98-0393-480B-8E60-2A9EAD0978D9}"/>
               </a:ext>
             </a:extLst>
           </p:cNvPr>
@@ -877,7 +880,7 @@
           <p:cNvPr id="3" name="竖排文字占位符 2">
             <a:extLst>
               <a:ext uri="{FF2B5EF4-FFF2-40B4-BE49-F238E27FC236}">
-                <a16:creationId xmlns:a16="http://schemas.microsoft.com/office/drawing/2014/main" xmlns="" id="{4D36B5DF-C4C3-4A77-8ACF-13B266642A8D}"/>
+                <a16:creationId xmlns="" xmlns:a16="http://schemas.microsoft.com/office/drawing/2014/main" id="{4D36B5DF-C4C3-4A77-8ACF-13B266642A8D}"/>
               </a:ext>
             </a:extLst>
           </p:cNvPr>
@@ -934,7 +937,7 @@
           <p:cNvPr id="4" name="日期占位符 3">
             <a:extLst>
               <a:ext uri="{FF2B5EF4-FFF2-40B4-BE49-F238E27FC236}">
-                <a16:creationId xmlns:a16="http://schemas.microsoft.com/office/drawing/2014/main" xmlns="" id="{DDE0ECAC-A3F9-42BE-BF00-901B87DA701C}"/>
+                <a16:creationId xmlns="" xmlns:a16="http://schemas.microsoft.com/office/drawing/2014/main" id="{DDE0ECAC-A3F9-42BE-BF00-901B87DA701C}"/>
               </a:ext>
             </a:extLst>
           </p:cNvPr>
@@ -952,7 +955,7 @@
           <a:p>
             <a:fld id="{E13947ED-5EF2-47D5-99F5-5EE8E4B8CE26}" type="datetimeFigureOut">
               <a:rPr lang="zh-CN" altLang="en-US" smtClean="0"/>
-              <a:t>2018/8/20</a:t>
+              <a:t>2018/8/23</a:t>
             </a:fld>
             <a:endParaRPr lang="zh-CN" altLang="en-US"/>
           </a:p>
@@ -963,7 +966,7 @@
           <p:cNvPr id="5" name="页脚占位符 4">
             <a:extLst>
               <a:ext uri="{FF2B5EF4-FFF2-40B4-BE49-F238E27FC236}">
-                <a16:creationId xmlns:a16="http://schemas.microsoft.com/office/drawing/2014/main" xmlns="" id="{D1B573EA-E7CA-4CD3-976F-3BA8607257B3}"/>
+                <a16:creationId xmlns="" xmlns:a16="http://schemas.microsoft.com/office/drawing/2014/main" id="{D1B573EA-E7CA-4CD3-976F-3BA8607257B3}"/>
               </a:ext>
             </a:extLst>
           </p:cNvPr>
@@ -988,7 +991,7 @@
           <p:cNvPr id="6" name="灯片编号占位符 5">
             <a:extLst>
               <a:ext uri="{FF2B5EF4-FFF2-40B4-BE49-F238E27FC236}">
-                <a16:creationId xmlns:a16="http://schemas.microsoft.com/office/drawing/2014/main" xmlns="" id="{01F2393C-774F-4C61-B26E-7E31793FF25B}"/>
+                <a16:creationId xmlns="" xmlns:a16="http://schemas.microsoft.com/office/drawing/2014/main" id="{01F2393C-774F-4C61-B26E-7E31793FF25B}"/>
               </a:ext>
             </a:extLst>
           </p:cNvPr>
@@ -1047,7 +1050,7 @@
           <p:cNvPr id="2" name="竖排标题 1">
             <a:extLst>
               <a:ext uri="{FF2B5EF4-FFF2-40B4-BE49-F238E27FC236}">
-                <a16:creationId xmlns:a16="http://schemas.microsoft.com/office/drawing/2014/main" xmlns="" id="{EDD4389D-1F5C-49F4-A396-E863F331CF99}"/>
+                <a16:creationId xmlns="" xmlns:a16="http://schemas.microsoft.com/office/drawing/2014/main" id="{EDD4389D-1F5C-49F4-A396-E863F331CF99}"/>
               </a:ext>
             </a:extLst>
           </p:cNvPr>
@@ -1080,7 +1083,7 @@
           <p:cNvPr id="3" name="竖排文字占位符 2">
             <a:extLst>
               <a:ext uri="{FF2B5EF4-FFF2-40B4-BE49-F238E27FC236}">
-                <a16:creationId xmlns:a16="http://schemas.microsoft.com/office/drawing/2014/main" xmlns="" id="{868EED7C-014A-412F-A030-FEEF200577A8}"/>
+                <a16:creationId xmlns="" xmlns:a16="http://schemas.microsoft.com/office/drawing/2014/main" id="{868EED7C-014A-412F-A030-FEEF200577A8}"/>
               </a:ext>
             </a:extLst>
           </p:cNvPr>
@@ -1142,7 +1145,7 @@
           <p:cNvPr id="4" name="日期占位符 3">
             <a:extLst>
               <a:ext uri="{FF2B5EF4-FFF2-40B4-BE49-F238E27FC236}">
-                <a16:creationId xmlns:a16="http://schemas.microsoft.com/office/drawing/2014/main" xmlns="" id="{552C2468-D58E-409B-B5B9-B259BA5D47C5}"/>
+                <a16:creationId xmlns="" xmlns:a16="http://schemas.microsoft.com/office/drawing/2014/main" id="{552C2468-D58E-409B-B5B9-B259BA5D47C5}"/>
               </a:ext>
             </a:extLst>
           </p:cNvPr>
@@ -1160,7 +1163,7 @@
           <a:p>
             <a:fld id="{E13947ED-5EF2-47D5-99F5-5EE8E4B8CE26}" type="datetimeFigureOut">
               <a:rPr lang="zh-CN" altLang="en-US" smtClean="0"/>
-              <a:t>2018/8/20</a:t>
+              <a:t>2018/8/23</a:t>
             </a:fld>
             <a:endParaRPr lang="zh-CN" altLang="en-US"/>
           </a:p>
@@ -1171,7 +1174,7 @@
           <p:cNvPr id="5" name="页脚占位符 4">
             <a:extLst>
               <a:ext uri="{FF2B5EF4-FFF2-40B4-BE49-F238E27FC236}">
-                <a16:creationId xmlns:a16="http://schemas.microsoft.com/office/drawing/2014/main" xmlns="" id="{39217E4D-8B68-498A-880E-43D36112B605}"/>
+                <a16:creationId xmlns="" xmlns:a16="http://schemas.microsoft.com/office/drawing/2014/main" id="{39217E4D-8B68-498A-880E-43D36112B605}"/>
               </a:ext>
             </a:extLst>
           </p:cNvPr>
@@ -1196,7 +1199,7 @@
           <p:cNvPr id="6" name="灯片编号占位符 5">
             <a:extLst>
               <a:ext uri="{FF2B5EF4-FFF2-40B4-BE49-F238E27FC236}">
-                <a16:creationId xmlns:a16="http://schemas.microsoft.com/office/drawing/2014/main" xmlns="" id="{8196A66A-5635-42D4-9D99-87FD143353B1}"/>
+                <a16:creationId xmlns="" xmlns:a16="http://schemas.microsoft.com/office/drawing/2014/main" id="{8196A66A-5635-42D4-9D99-87FD143353B1}"/>
               </a:ext>
             </a:extLst>
           </p:cNvPr>
@@ -1255,7 +1258,7 @@
           <p:cNvPr id="2" name="标题 1">
             <a:extLst>
               <a:ext uri="{FF2B5EF4-FFF2-40B4-BE49-F238E27FC236}">
-                <a16:creationId xmlns:a16="http://schemas.microsoft.com/office/drawing/2014/main" xmlns="" id="{EBD60D8C-16FE-4A0F-8162-224CE033DB87}"/>
+                <a16:creationId xmlns="" xmlns:a16="http://schemas.microsoft.com/office/drawing/2014/main" id="{EBD60D8C-16FE-4A0F-8162-224CE033DB87}"/>
               </a:ext>
             </a:extLst>
           </p:cNvPr>
@@ -1283,7 +1286,7 @@
           <p:cNvPr id="3" name="内容占位符 2">
             <a:extLst>
               <a:ext uri="{FF2B5EF4-FFF2-40B4-BE49-F238E27FC236}">
-                <a16:creationId xmlns:a16="http://schemas.microsoft.com/office/drawing/2014/main" xmlns="" id="{25FA777C-D381-45B9-8DE4-5B22917C81B7}"/>
+                <a16:creationId xmlns="" xmlns:a16="http://schemas.microsoft.com/office/drawing/2014/main" id="{25FA777C-D381-45B9-8DE4-5B22917C81B7}"/>
               </a:ext>
             </a:extLst>
           </p:cNvPr>
@@ -1340,7 +1343,7 @@
           <p:cNvPr id="4" name="日期占位符 3">
             <a:extLst>
               <a:ext uri="{FF2B5EF4-FFF2-40B4-BE49-F238E27FC236}">
-                <a16:creationId xmlns:a16="http://schemas.microsoft.com/office/drawing/2014/main" xmlns="" id="{19005A1B-C957-4703-9672-D38D7F0D42DE}"/>
+                <a16:creationId xmlns="" xmlns:a16="http://schemas.microsoft.com/office/drawing/2014/main" id="{19005A1B-C957-4703-9672-D38D7F0D42DE}"/>
               </a:ext>
             </a:extLst>
           </p:cNvPr>
@@ -1358,7 +1361,7 @@
           <a:p>
             <a:fld id="{E13947ED-5EF2-47D5-99F5-5EE8E4B8CE26}" type="datetimeFigureOut">
               <a:rPr lang="zh-CN" altLang="en-US" smtClean="0"/>
-              <a:t>2018/8/20</a:t>
+              <a:t>2018/8/23</a:t>
             </a:fld>
             <a:endParaRPr lang="zh-CN" altLang="en-US"/>
           </a:p>
@@ -1369,7 +1372,7 @@
           <p:cNvPr id="5" name="页脚占位符 4">
             <a:extLst>
               <a:ext uri="{FF2B5EF4-FFF2-40B4-BE49-F238E27FC236}">
-                <a16:creationId xmlns:a16="http://schemas.microsoft.com/office/drawing/2014/main" xmlns="" id="{13B04B88-D41A-4688-9279-72DDE1B03570}"/>
+                <a16:creationId xmlns="" xmlns:a16="http://schemas.microsoft.com/office/drawing/2014/main" id="{13B04B88-D41A-4688-9279-72DDE1B03570}"/>
               </a:ext>
             </a:extLst>
           </p:cNvPr>
@@ -1394,7 +1397,7 @@
           <p:cNvPr id="6" name="灯片编号占位符 5">
             <a:extLst>
               <a:ext uri="{FF2B5EF4-FFF2-40B4-BE49-F238E27FC236}">
-                <a16:creationId xmlns:a16="http://schemas.microsoft.com/office/drawing/2014/main" xmlns="" id="{13906B67-1FC3-45D1-809F-1D068B01C2CC}"/>
+                <a16:creationId xmlns="" xmlns:a16="http://schemas.microsoft.com/office/drawing/2014/main" id="{13906B67-1FC3-45D1-809F-1D068B01C2CC}"/>
               </a:ext>
             </a:extLst>
           </p:cNvPr>
@@ -1453,7 +1456,7 @@
           <p:cNvPr id="2" name="标题 1">
             <a:extLst>
               <a:ext uri="{FF2B5EF4-FFF2-40B4-BE49-F238E27FC236}">
-                <a16:creationId xmlns:a16="http://schemas.microsoft.com/office/drawing/2014/main" xmlns="" id="{93829A10-6E5B-407F-B75D-F81C28EC3C99}"/>
+                <a16:creationId xmlns="" xmlns:a16="http://schemas.microsoft.com/office/drawing/2014/main" id="{93829A10-6E5B-407F-B75D-F81C28EC3C99}"/>
               </a:ext>
             </a:extLst>
           </p:cNvPr>
@@ -1490,7 +1493,7 @@
           <p:cNvPr id="3" name="文本占位符 2">
             <a:extLst>
               <a:ext uri="{FF2B5EF4-FFF2-40B4-BE49-F238E27FC236}">
-                <a16:creationId xmlns:a16="http://schemas.microsoft.com/office/drawing/2014/main" xmlns="" id="{5CE05E73-EB18-44B9-86FB-CE40702FDFF1}"/>
+                <a16:creationId xmlns="" xmlns:a16="http://schemas.microsoft.com/office/drawing/2014/main" id="{5CE05E73-EB18-44B9-86FB-CE40702FDFF1}"/>
               </a:ext>
             </a:extLst>
           </p:cNvPr>
@@ -1615,7 +1618,7 @@
           <p:cNvPr id="4" name="日期占位符 3">
             <a:extLst>
               <a:ext uri="{FF2B5EF4-FFF2-40B4-BE49-F238E27FC236}">
-                <a16:creationId xmlns:a16="http://schemas.microsoft.com/office/drawing/2014/main" xmlns="" id="{06DC7E8F-AA26-44A7-86A1-15FAC0515E8B}"/>
+                <a16:creationId xmlns="" xmlns:a16="http://schemas.microsoft.com/office/drawing/2014/main" id="{06DC7E8F-AA26-44A7-86A1-15FAC0515E8B}"/>
               </a:ext>
             </a:extLst>
           </p:cNvPr>
@@ -1633,7 +1636,7 @@
           <a:p>
             <a:fld id="{E13947ED-5EF2-47D5-99F5-5EE8E4B8CE26}" type="datetimeFigureOut">
               <a:rPr lang="zh-CN" altLang="en-US" smtClean="0"/>
-              <a:t>2018/8/20</a:t>
+              <a:t>2018/8/23</a:t>
             </a:fld>
             <a:endParaRPr lang="zh-CN" altLang="en-US"/>
           </a:p>
@@ -1644,7 +1647,7 @@
           <p:cNvPr id="5" name="页脚占位符 4">
             <a:extLst>
               <a:ext uri="{FF2B5EF4-FFF2-40B4-BE49-F238E27FC236}">
-                <a16:creationId xmlns:a16="http://schemas.microsoft.com/office/drawing/2014/main" xmlns="" id="{5E53C6DD-ACA2-46A2-977E-CACA41DF418E}"/>
+                <a16:creationId xmlns="" xmlns:a16="http://schemas.microsoft.com/office/drawing/2014/main" id="{5E53C6DD-ACA2-46A2-977E-CACA41DF418E}"/>
               </a:ext>
             </a:extLst>
           </p:cNvPr>
@@ -1669,7 +1672,7 @@
           <p:cNvPr id="6" name="灯片编号占位符 5">
             <a:extLst>
               <a:ext uri="{FF2B5EF4-FFF2-40B4-BE49-F238E27FC236}">
-                <a16:creationId xmlns:a16="http://schemas.microsoft.com/office/drawing/2014/main" xmlns="" id="{94C0A770-B5C2-49A1-B551-FEBFEA495CCC}"/>
+                <a16:creationId xmlns="" xmlns:a16="http://schemas.microsoft.com/office/drawing/2014/main" id="{94C0A770-B5C2-49A1-B551-FEBFEA495CCC}"/>
               </a:ext>
             </a:extLst>
           </p:cNvPr>
@@ -1728,7 +1731,7 @@
           <p:cNvPr id="2" name="标题 1">
             <a:extLst>
               <a:ext uri="{FF2B5EF4-FFF2-40B4-BE49-F238E27FC236}">
-                <a16:creationId xmlns:a16="http://schemas.microsoft.com/office/drawing/2014/main" xmlns="" id="{20E86134-4E94-4A0C-A15D-B83812318D7B}"/>
+                <a16:creationId xmlns="" xmlns:a16="http://schemas.microsoft.com/office/drawing/2014/main" id="{20E86134-4E94-4A0C-A15D-B83812318D7B}"/>
               </a:ext>
             </a:extLst>
           </p:cNvPr>
@@ -1756,7 +1759,7 @@
           <p:cNvPr id="3" name="内容占位符 2">
             <a:extLst>
               <a:ext uri="{FF2B5EF4-FFF2-40B4-BE49-F238E27FC236}">
-                <a16:creationId xmlns:a16="http://schemas.microsoft.com/office/drawing/2014/main" xmlns="" id="{F96D7E77-2F48-4544-A1CD-9E86FCC55571}"/>
+                <a16:creationId xmlns="" xmlns:a16="http://schemas.microsoft.com/office/drawing/2014/main" id="{F96D7E77-2F48-4544-A1CD-9E86FCC55571}"/>
               </a:ext>
             </a:extLst>
           </p:cNvPr>
@@ -1818,7 +1821,7 @@
           <p:cNvPr id="4" name="内容占位符 3">
             <a:extLst>
               <a:ext uri="{FF2B5EF4-FFF2-40B4-BE49-F238E27FC236}">
-                <a16:creationId xmlns:a16="http://schemas.microsoft.com/office/drawing/2014/main" xmlns="" id="{378EF259-984C-4612-9697-1B614C457210}"/>
+                <a16:creationId xmlns="" xmlns:a16="http://schemas.microsoft.com/office/drawing/2014/main" id="{378EF259-984C-4612-9697-1B614C457210}"/>
               </a:ext>
             </a:extLst>
           </p:cNvPr>
@@ -1880,7 +1883,7 @@
           <p:cNvPr id="5" name="日期占位符 4">
             <a:extLst>
               <a:ext uri="{FF2B5EF4-FFF2-40B4-BE49-F238E27FC236}">
-                <a16:creationId xmlns:a16="http://schemas.microsoft.com/office/drawing/2014/main" xmlns="" id="{04FF540F-8520-4FB4-ACA3-49897EC342D8}"/>
+                <a16:creationId xmlns="" xmlns:a16="http://schemas.microsoft.com/office/drawing/2014/main" id="{04FF540F-8520-4FB4-ACA3-49897EC342D8}"/>
               </a:ext>
             </a:extLst>
           </p:cNvPr>
@@ -1898,7 +1901,7 @@
           <a:p>
             <a:fld id="{E13947ED-5EF2-47D5-99F5-5EE8E4B8CE26}" type="datetimeFigureOut">
               <a:rPr lang="zh-CN" altLang="en-US" smtClean="0"/>
-              <a:t>2018/8/20</a:t>
+              <a:t>2018/8/23</a:t>
             </a:fld>
             <a:endParaRPr lang="zh-CN" altLang="en-US"/>
           </a:p>
@@ -1909,7 +1912,7 @@
           <p:cNvPr id="6" name="页脚占位符 5">
             <a:extLst>
               <a:ext uri="{FF2B5EF4-FFF2-40B4-BE49-F238E27FC236}">
-                <a16:creationId xmlns:a16="http://schemas.microsoft.com/office/drawing/2014/main" xmlns="" id="{93EAA31E-3C16-4F4D-B614-85753F02F6B7}"/>
+                <a16:creationId xmlns="" xmlns:a16="http://schemas.microsoft.com/office/drawing/2014/main" id="{93EAA31E-3C16-4F4D-B614-85753F02F6B7}"/>
               </a:ext>
             </a:extLst>
           </p:cNvPr>
@@ -1934,7 +1937,7 @@
           <p:cNvPr id="7" name="灯片编号占位符 6">
             <a:extLst>
               <a:ext uri="{FF2B5EF4-FFF2-40B4-BE49-F238E27FC236}">
-                <a16:creationId xmlns:a16="http://schemas.microsoft.com/office/drawing/2014/main" xmlns="" id="{672D8E7C-60B4-42A0-AD00-D18A2C69FA31}"/>
+                <a16:creationId xmlns="" xmlns:a16="http://schemas.microsoft.com/office/drawing/2014/main" id="{672D8E7C-60B4-42A0-AD00-D18A2C69FA31}"/>
               </a:ext>
             </a:extLst>
           </p:cNvPr>
@@ -1993,7 +1996,7 @@
           <p:cNvPr id="2" name="标题 1">
             <a:extLst>
               <a:ext uri="{FF2B5EF4-FFF2-40B4-BE49-F238E27FC236}">
-                <a16:creationId xmlns:a16="http://schemas.microsoft.com/office/drawing/2014/main" xmlns="" id="{3DAA7673-F055-48BB-BC0D-B50A12E1DFAB}"/>
+                <a16:creationId xmlns="" xmlns:a16="http://schemas.microsoft.com/office/drawing/2014/main" id="{3DAA7673-F055-48BB-BC0D-B50A12E1DFAB}"/>
               </a:ext>
             </a:extLst>
           </p:cNvPr>
@@ -2026,7 +2029,7 @@
           <p:cNvPr id="3" name="文本占位符 2">
             <a:extLst>
               <a:ext uri="{FF2B5EF4-FFF2-40B4-BE49-F238E27FC236}">
-                <a16:creationId xmlns:a16="http://schemas.microsoft.com/office/drawing/2014/main" xmlns="" id="{12565607-4068-4C48-8E05-1F84A51D9647}"/>
+                <a16:creationId xmlns="" xmlns:a16="http://schemas.microsoft.com/office/drawing/2014/main" id="{12565607-4068-4C48-8E05-1F84A51D9647}"/>
               </a:ext>
             </a:extLst>
           </p:cNvPr>
@@ -2097,7 +2100,7 @@
           <p:cNvPr id="4" name="内容占位符 3">
             <a:extLst>
               <a:ext uri="{FF2B5EF4-FFF2-40B4-BE49-F238E27FC236}">
-                <a16:creationId xmlns:a16="http://schemas.microsoft.com/office/drawing/2014/main" xmlns="" id="{18D95BEA-0F84-49F2-BC33-24F0EFB4FF5C}"/>
+                <a16:creationId xmlns="" xmlns:a16="http://schemas.microsoft.com/office/drawing/2014/main" id="{18D95BEA-0F84-49F2-BC33-24F0EFB4FF5C}"/>
               </a:ext>
             </a:extLst>
           </p:cNvPr>
@@ -2159,7 +2162,7 @@
           <p:cNvPr id="5" name="文本占位符 4">
             <a:extLst>
               <a:ext uri="{FF2B5EF4-FFF2-40B4-BE49-F238E27FC236}">
-                <a16:creationId xmlns:a16="http://schemas.microsoft.com/office/drawing/2014/main" xmlns="" id="{FADB7FA0-9F9C-47EB-ADEC-362EE55BD927}"/>
+                <a16:creationId xmlns="" xmlns:a16="http://schemas.microsoft.com/office/drawing/2014/main" id="{FADB7FA0-9F9C-47EB-ADEC-362EE55BD927}"/>
               </a:ext>
             </a:extLst>
           </p:cNvPr>
@@ -2230,7 +2233,7 @@
           <p:cNvPr id="6" name="内容占位符 5">
             <a:extLst>
               <a:ext uri="{FF2B5EF4-FFF2-40B4-BE49-F238E27FC236}">
-                <a16:creationId xmlns:a16="http://schemas.microsoft.com/office/drawing/2014/main" xmlns="" id="{E7248ACC-75CB-41AA-817D-12AE2F3C6FFE}"/>
+                <a16:creationId xmlns="" xmlns:a16="http://schemas.microsoft.com/office/drawing/2014/main" id="{E7248ACC-75CB-41AA-817D-12AE2F3C6FFE}"/>
               </a:ext>
             </a:extLst>
           </p:cNvPr>
@@ -2292,7 +2295,7 @@
           <p:cNvPr id="7" name="日期占位符 6">
             <a:extLst>
               <a:ext uri="{FF2B5EF4-FFF2-40B4-BE49-F238E27FC236}">
-                <a16:creationId xmlns:a16="http://schemas.microsoft.com/office/drawing/2014/main" xmlns="" id="{0DB29D8F-F426-4E51-A0A5-3C4CEC90EC5D}"/>
+                <a16:creationId xmlns="" xmlns:a16="http://schemas.microsoft.com/office/drawing/2014/main" id="{0DB29D8F-F426-4E51-A0A5-3C4CEC90EC5D}"/>
               </a:ext>
             </a:extLst>
           </p:cNvPr>
@@ -2310,7 +2313,7 @@
           <a:p>
             <a:fld id="{E13947ED-5EF2-47D5-99F5-5EE8E4B8CE26}" type="datetimeFigureOut">
               <a:rPr lang="zh-CN" altLang="en-US" smtClean="0"/>
-              <a:t>2018/8/20</a:t>
+              <a:t>2018/8/23</a:t>
             </a:fld>
             <a:endParaRPr lang="zh-CN" altLang="en-US"/>
           </a:p>
@@ -2321,7 +2324,7 @@
           <p:cNvPr id="8" name="页脚占位符 7">
             <a:extLst>
               <a:ext uri="{FF2B5EF4-FFF2-40B4-BE49-F238E27FC236}">
-                <a16:creationId xmlns:a16="http://schemas.microsoft.com/office/drawing/2014/main" xmlns="" id="{A88F9B0E-30F6-457F-85F2-E64914582D9B}"/>
+                <a16:creationId xmlns="" xmlns:a16="http://schemas.microsoft.com/office/drawing/2014/main" id="{A88F9B0E-30F6-457F-85F2-E64914582D9B}"/>
               </a:ext>
             </a:extLst>
           </p:cNvPr>
@@ -2346,7 +2349,7 @@
           <p:cNvPr id="9" name="灯片编号占位符 8">
             <a:extLst>
               <a:ext uri="{FF2B5EF4-FFF2-40B4-BE49-F238E27FC236}">
-                <a16:creationId xmlns:a16="http://schemas.microsoft.com/office/drawing/2014/main" xmlns="" id="{A3E9E7FD-B0B2-4B59-94D3-CAF66405DB56}"/>
+                <a16:creationId xmlns="" xmlns:a16="http://schemas.microsoft.com/office/drawing/2014/main" id="{A3E9E7FD-B0B2-4B59-94D3-CAF66405DB56}"/>
               </a:ext>
             </a:extLst>
           </p:cNvPr>
@@ -2405,7 +2408,7 @@
           <p:cNvPr id="2" name="标题 1">
             <a:extLst>
               <a:ext uri="{FF2B5EF4-FFF2-40B4-BE49-F238E27FC236}">
-                <a16:creationId xmlns:a16="http://schemas.microsoft.com/office/drawing/2014/main" xmlns="" id="{6E8B22ED-2DBF-4A5A-8181-C8D94BB0A722}"/>
+                <a16:creationId xmlns="" xmlns:a16="http://schemas.microsoft.com/office/drawing/2014/main" id="{6E8B22ED-2DBF-4A5A-8181-C8D94BB0A722}"/>
               </a:ext>
             </a:extLst>
           </p:cNvPr>
@@ -2433,7 +2436,7 @@
           <p:cNvPr id="3" name="日期占位符 2">
             <a:extLst>
               <a:ext uri="{FF2B5EF4-FFF2-40B4-BE49-F238E27FC236}">
-                <a16:creationId xmlns:a16="http://schemas.microsoft.com/office/drawing/2014/main" xmlns="" id="{90CA4E6A-2A2F-4177-93FD-19E26096B93E}"/>
+                <a16:creationId xmlns="" xmlns:a16="http://schemas.microsoft.com/office/drawing/2014/main" id="{90CA4E6A-2A2F-4177-93FD-19E26096B93E}"/>
               </a:ext>
             </a:extLst>
           </p:cNvPr>
@@ -2451,7 +2454,7 @@
           <a:p>
             <a:fld id="{E13947ED-5EF2-47D5-99F5-5EE8E4B8CE26}" type="datetimeFigureOut">
               <a:rPr lang="zh-CN" altLang="en-US" smtClean="0"/>
-              <a:t>2018/8/20</a:t>
+              <a:t>2018/8/23</a:t>
             </a:fld>
             <a:endParaRPr lang="zh-CN" altLang="en-US"/>
           </a:p>
@@ -2462,7 +2465,7 @@
           <p:cNvPr id="4" name="页脚占位符 3">
             <a:extLst>
               <a:ext uri="{FF2B5EF4-FFF2-40B4-BE49-F238E27FC236}">
-                <a16:creationId xmlns:a16="http://schemas.microsoft.com/office/drawing/2014/main" xmlns="" id="{621446D4-BE62-44A4-9C63-2BFF90455072}"/>
+                <a16:creationId xmlns="" xmlns:a16="http://schemas.microsoft.com/office/drawing/2014/main" id="{621446D4-BE62-44A4-9C63-2BFF90455072}"/>
               </a:ext>
             </a:extLst>
           </p:cNvPr>
@@ -2487,7 +2490,7 @@
           <p:cNvPr id="5" name="灯片编号占位符 4">
             <a:extLst>
               <a:ext uri="{FF2B5EF4-FFF2-40B4-BE49-F238E27FC236}">
-                <a16:creationId xmlns:a16="http://schemas.microsoft.com/office/drawing/2014/main" xmlns="" id="{B8A11A11-70A6-45E2-944D-56FD59670EBB}"/>
+                <a16:creationId xmlns="" xmlns:a16="http://schemas.microsoft.com/office/drawing/2014/main" id="{B8A11A11-70A6-45E2-944D-56FD59670EBB}"/>
               </a:ext>
             </a:extLst>
           </p:cNvPr>
@@ -2546,7 +2549,7 @@
           <p:cNvPr id="2" name="日期占位符 1">
             <a:extLst>
               <a:ext uri="{FF2B5EF4-FFF2-40B4-BE49-F238E27FC236}">
-                <a16:creationId xmlns:a16="http://schemas.microsoft.com/office/drawing/2014/main" xmlns="" id="{944D6401-666C-4E1E-B427-A901A7B2A96C}"/>
+                <a16:creationId xmlns="" xmlns:a16="http://schemas.microsoft.com/office/drawing/2014/main" id="{944D6401-666C-4E1E-B427-A901A7B2A96C}"/>
               </a:ext>
             </a:extLst>
           </p:cNvPr>
@@ -2564,7 +2567,7 @@
           <a:p>
             <a:fld id="{E13947ED-5EF2-47D5-99F5-5EE8E4B8CE26}" type="datetimeFigureOut">
               <a:rPr lang="zh-CN" altLang="en-US" smtClean="0"/>
-              <a:t>2018/8/20</a:t>
+              <a:t>2018/8/23</a:t>
             </a:fld>
             <a:endParaRPr lang="zh-CN" altLang="en-US"/>
           </a:p>
@@ -2575,7 +2578,7 @@
           <p:cNvPr id="3" name="页脚占位符 2">
             <a:extLst>
               <a:ext uri="{FF2B5EF4-FFF2-40B4-BE49-F238E27FC236}">
-                <a16:creationId xmlns:a16="http://schemas.microsoft.com/office/drawing/2014/main" xmlns="" id="{C1141513-744D-4DB4-B4DB-10C84D946A98}"/>
+                <a16:creationId xmlns="" xmlns:a16="http://schemas.microsoft.com/office/drawing/2014/main" id="{C1141513-744D-4DB4-B4DB-10C84D946A98}"/>
               </a:ext>
             </a:extLst>
           </p:cNvPr>
@@ -2600,7 +2603,7 @@
           <p:cNvPr id="4" name="灯片编号占位符 3">
             <a:extLst>
               <a:ext uri="{FF2B5EF4-FFF2-40B4-BE49-F238E27FC236}">
-                <a16:creationId xmlns:a16="http://schemas.microsoft.com/office/drawing/2014/main" xmlns="" id="{50451892-D0AF-4AB1-A8B6-D32ECDC5BAD2}"/>
+                <a16:creationId xmlns="" xmlns:a16="http://schemas.microsoft.com/office/drawing/2014/main" id="{50451892-D0AF-4AB1-A8B6-D32ECDC5BAD2}"/>
               </a:ext>
             </a:extLst>
           </p:cNvPr>
@@ -2659,7 +2662,7 @@
           <p:cNvPr id="2" name="标题 1">
             <a:extLst>
               <a:ext uri="{FF2B5EF4-FFF2-40B4-BE49-F238E27FC236}">
-                <a16:creationId xmlns:a16="http://schemas.microsoft.com/office/drawing/2014/main" xmlns="" id="{1CDA1B03-EEB6-449F-B587-D8A250E3F408}"/>
+                <a16:creationId xmlns="" xmlns:a16="http://schemas.microsoft.com/office/drawing/2014/main" id="{1CDA1B03-EEB6-449F-B587-D8A250E3F408}"/>
               </a:ext>
             </a:extLst>
           </p:cNvPr>
@@ -2696,7 +2699,7 @@
           <p:cNvPr id="3" name="内容占位符 2">
             <a:extLst>
               <a:ext uri="{FF2B5EF4-FFF2-40B4-BE49-F238E27FC236}">
-                <a16:creationId xmlns:a16="http://schemas.microsoft.com/office/drawing/2014/main" xmlns="" id="{739C6ED7-0309-4F98-8E8C-1407596D463D}"/>
+                <a16:creationId xmlns="" xmlns:a16="http://schemas.microsoft.com/office/drawing/2014/main" id="{739C6ED7-0309-4F98-8E8C-1407596D463D}"/>
               </a:ext>
             </a:extLst>
           </p:cNvPr>
@@ -2786,7 +2789,7 @@
           <p:cNvPr id="4" name="文本占位符 3">
             <a:extLst>
               <a:ext uri="{FF2B5EF4-FFF2-40B4-BE49-F238E27FC236}">
-                <a16:creationId xmlns:a16="http://schemas.microsoft.com/office/drawing/2014/main" xmlns="" id="{8397134F-D875-45C7-8414-A1348E2A2713}"/>
+                <a16:creationId xmlns="" xmlns:a16="http://schemas.microsoft.com/office/drawing/2014/main" id="{8397134F-D875-45C7-8414-A1348E2A2713}"/>
               </a:ext>
             </a:extLst>
           </p:cNvPr>
@@ -2857,7 +2860,7 @@
           <p:cNvPr id="5" name="日期占位符 4">
             <a:extLst>
               <a:ext uri="{FF2B5EF4-FFF2-40B4-BE49-F238E27FC236}">
-                <a16:creationId xmlns:a16="http://schemas.microsoft.com/office/drawing/2014/main" xmlns="" id="{3CF02891-F26E-4C77-849A-A789958A3991}"/>
+                <a16:creationId xmlns="" xmlns:a16="http://schemas.microsoft.com/office/drawing/2014/main" id="{3CF02891-F26E-4C77-849A-A789958A3991}"/>
               </a:ext>
             </a:extLst>
           </p:cNvPr>
@@ -2875,7 +2878,7 @@
           <a:p>
             <a:fld id="{E13947ED-5EF2-47D5-99F5-5EE8E4B8CE26}" type="datetimeFigureOut">
               <a:rPr lang="zh-CN" altLang="en-US" smtClean="0"/>
-              <a:t>2018/8/20</a:t>
+              <a:t>2018/8/23</a:t>
             </a:fld>
             <a:endParaRPr lang="zh-CN" altLang="en-US"/>
           </a:p>
@@ -2886,7 +2889,7 @@
           <p:cNvPr id="6" name="页脚占位符 5">
             <a:extLst>
               <a:ext uri="{FF2B5EF4-FFF2-40B4-BE49-F238E27FC236}">
-                <a16:creationId xmlns:a16="http://schemas.microsoft.com/office/drawing/2014/main" xmlns="" id="{10F794DC-9C23-41AA-871C-1B1F276F55FD}"/>
+                <a16:creationId xmlns="" xmlns:a16="http://schemas.microsoft.com/office/drawing/2014/main" id="{10F794DC-9C23-41AA-871C-1B1F276F55FD}"/>
               </a:ext>
             </a:extLst>
           </p:cNvPr>
@@ -2911,7 +2914,7 @@
           <p:cNvPr id="7" name="灯片编号占位符 6">
             <a:extLst>
               <a:ext uri="{FF2B5EF4-FFF2-40B4-BE49-F238E27FC236}">
-                <a16:creationId xmlns:a16="http://schemas.microsoft.com/office/drawing/2014/main" xmlns="" id="{EFE8E85E-3D90-4BF4-BD34-8097D272FE25}"/>
+                <a16:creationId xmlns="" xmlns:a16="http://schemas.microsoft.com/office/drawing/2014/main" id="{EFE8E85E-3D90-4BF4-BD34-8097D272FE25}"/>
               </a:ext>
             </a:extLst>
           </p:cNvPr>
@@ -2970,7 +2973,7 @@
           <p:cNvPr id="2" name="标题 1">
             <a:extLst>
               <a:ext uri="{FF2B5EF4-FFF2-40B4-BE49-F238E27FC236}">
-                <a16:creationId xmlns:a16="http://schemas.microsoft.com/office/drawing/2014/main" xmlns="" id="{6AF319B2-F2EA-495A-82D3-E6EB39D4A314}"/>
+                <a16:creationId xmlns="" xmlns:a16="http://schemas.microsoft.com/office/drawing/2014/main" id="{6AF319B2-F2EA-495A-82D3-E6EB39D4A314}"/>
               </a:ext>
             </a:extLst>
           </p:cNvPr>
@@ -3007,7 +3010,7 @@
           <p:cNvPr id="3" name="图片占位符 2">
             <a:extLst>
               <a:ext uri="{FF2B5EF4-FFF2-40B4-BE49-F238E27FC236}">
-                <a16:creationId xmlns:a16="http://schemas.microsoft.com/office/drawing/2014/main" xmlns="" id="{DC669108-E9E2-412C-92F4-801DAD27A8D8}"/>
+                <a16:creationId xmlns="" xmlns:a16="http://schemas.microsoft.com/office/drawing/2014/main" id="{DC669108-E9E2-412C-92F4-801DAD27A8D8}"/>
               </a:ext>
             </a:extLst>
           </p:cNvPr>
@@ -3077,7 +3080,7 @@
           <p:cNvPr id="4" name="文本占位符 3">
             <a:extLst>
               <a:ext uri="{FF2B5EF4-FFF2-40B4-BE49-F238E27FC236}">
-                <a16:creationId xmlns:a16="http://schemas.microsoft.com/office/drawing/2014/main" xmlns="" id="{F644806A-9C87-4B48-9471-9E8D8BC120E1}"/>
+                <a16:creationId xmlns="" xmlns:a16="http://schemas.microsoft.com/office/drawing/2014/main" id="{F644806A-9C87-4B48-9471-9E8D8BC120E1}"/>
               </a:ext>
             </a:extLst>
           </p:cNvPr>
@@ -3148,7 +3151,7 @@
           <p:cNvPr id="5" name="日期占位符 4">
             <a:extLst>
               <a:ext uri="{FF2B5EF4-FFF2-40B4-BE49-F238E27FC236}">
-                <a16:creationId xmlns:a16="http://schemas.microsoft.com/office/drawing/2014/main" xmlns="" id="{7BE6CDDA-FE39-4DB3-A68F-E1EBE86A321D}"/>
+                <a16:creationId xmlns="" xmlns:a16="http://schemas.microsoft.com/office/drawing/2014/main" id="{7BE6CDDA-FE39-4DB3-A68F-E1EBE86A321D}"/>
               </a:ext>
             </a:extLst>
           </p:cNvPr>
@@ -3166,7 +3169,7 @@
           <a:p>
             <a:fld id="{E13947ED-5EF2-47D5-99F5-5EE8E4B8CE26}" type="datetimeFigureOut">
               <a:rPr lang="zh-CN" altLang="en-US" smtClean="0"/>
-              <a:t>2018/8/20</a:t>
+              <a:t>2018/8/23</a:t>
             </a:fld>
             <a:endParaRPr lang="zh-CN" altLang="en-US"/>
           </a:p>
@@ -3177,7 +3180,7 @@
           <p:cNvPr id="6" name="页脚占位符 5">
             <a:extLst>
               <a:ext uri="{FF2B5EF4-FFF2-40B4-BE49-F238E27FC236}">
-                <a16:creationId xmlns:a16="http://schemas.microsoft.com/office/drawing/2014/main" xmlns="" id="{EE0E17C6-1E15-4A08-99C9-CE3214A5BDB0}"/>
+                <a16:creationId xmlns="" xmlns:a16="http://schemas.microsoft.com/office/drawing/2014/main" id="{EE0E17C6-1E15-4A08-99C9-CE3214A5BDB0}"/>
               </a:ext>
             </a:extLst>
           </p:cNvPr>
@@ -3202,7 +3205,7 @@
           <p:cNvPr id="7" name="灯片编号占位符 6">
             <a:extLst>
               <a:ext uri="{FF2B5EF4-FFF2-40B4-BE49-F238E27FC236}">
-                <a16:creationId xmlns:a16="http://schemas.microsoft.com/office/drawing/2014/main" xmlns="" id="{F5EF518D-DE11-4978-A147-1D9DC5E1AEAA}"/>
+                <a16:creationId xmlns="" xmlns:a16="http://schemas.microsoft.com/office/drawing/2014/main" id="{F5EF518D-DE11-4978-A147-1D9DC5E1AEAA}"/>
               </a:ext>
             </a:extLst>
           </p:cNvPr>
@@ -3266,7 +3269,7 @@
           <p:cNvPr id="2" name="标题占位符 1">
             <a:extLst>
               <a:ext uri="{FF2B5EF4-FFF2-40B4-BE49-F238E27FC236}">
-                <a16:creationId xmlns:a16="http://schemas.microsoft.com/office/drawing/2014/main" xmlns="" id="{28EBF438-41A3-4937-996D-FA6764742BB8}"/>
+                <a16:creationId xmlns="" xmlns:a16="http://schemas.microsoft.com/office/drawing/2014/main" id="{28EBF438-41A3-4937-996D-FA6764742BB8}"/>
               </a:ext>
             </a:extLst>
           </p:cNvPr>
@@ -3304,7 +3307,7 @@
           <p:cNvPr id="3" name="文本占位符 2">
             <a:extLst>
               <a:ext uri="{FF2B5EF4-FFF2-40B4-BE49-F238E27FC236}">
-                <a16:creationId xmlns:a16="http://schemas.microsoft.com/office/drawing/2014/main" xmlns="" id="{FA3404A1-F618-4B83-9FE9-069EC716D197}"/>
+                <a16:creationId xmlns="" xmlns:a16="http://schemas.microsoft.com/office/drawing/2014/main" id="{FA3404A1-F618-4B83-9FE9-069EC716D197}"/>
               </a:ext>
             </a:extLst>
           </p:cNvPr>
@@ -3371,7 +3374,7 @@
           <p:cNvPr id="4" name="日期占位符 3">
             <a:extLst>
               <a:ext uri="{FF2B5EF4-FFF2-40B4-BE49-F238E27FC236}">
-                <a16:creationId xmlns:a16="http://schemas.microsoft.com/office/drawing/2014/main" xmlns="" id="{9C8E792F-4EBC-413C-A243-D97C66D1E2C0}"/>
+                <a16:creationId xmlns="" xmlns:a16="http://schemas.microsoft.com/office/drawing/2014/main" id="{9C8E792F-4EBC-413C-A243-D97C66D1E2C0}"/>
               </a:ext>
             </a:extLst>
           </p:cNvPr>
@@ -3407,7 +3410,7 @@
           <a:p>
             <a:fld id="{E13947ED-5EF2-47D5-99F5-5EE8E4B8CE26}" type="datetimeFigureOut">
               <a:rPr lang="zh-CN" altLang="en-US" smtClean="0"/>
-              <a:t>2018/8/20</a:t>
+              <a:t>2018/8/23</a:t>
             </a:fld>
             <a:endParaRPr lang="zh-CN" altLang="en-US"/>
           </a:p>
@@ -3418,7 +3421,7 @@
           <p:cNvPr id="5" name="页脚占位符 4">
             <a:extLst>
               <a:ext uri="{FF2B5EF4-FFF2-40B4-BE49-F238E27FC236}">
-                <a16:creationId xmlns:a16="http://schemas.microsoft.com/office/drawing/2014/main" xmlns="" id="{8D5A4C37-2E6F-4F77-B247-ED9AAB071824}"/>
+                <a16:creationId xmlns="" xmlns:a16="http://schemas.microsoft.com/office/drawing/2014/main" id="{8D5A4C37-2E6F-4F77-B247-ED9AAB071824}"/>
               </a:ext>
             </a:extLst>
           </p:cNvPr>
@@ -3461,7 +3464,7 @@
           <p:cNvPr id="6" name="灯片编号占位符 5">
             <a:extLst>
               <a:ext uri="{FF2B5EF4-FFF2-40B4-BE49-F238E27FC236}">
-                <a16:creationId xmlns:a16="http://schemas.microsoft.com/office/drawing/2014/main" xmlns="" id="{665BB5BD-B023-490B-8DCF-87B72E474604}"/>
+                <a16:creationId xmlns="" xmlns:a16="http://schemas.microsoft.com/office/drawing/2014/main" id="{665BB5BD-B023-490B-8DCF-87B72E474604}"/>
               </a:ext>
             </a:extLst>
           </p:cNvPr>
@@ -3829,7 +3832,7 @@
           <p:cNvPr id="2" name="文本框 1">
             <a:extLst>
               <a:ext uri="{FF2B5EF4-FFF2-40B4-BE49-F238E27FC236}">
-                <a16:creationId xmlns:a16="http://schemas.microsoft.com/office/drawing/2014/main" xmlns="" id="{F6B06F0D-1228-4443-B0F7-36556C7ECDBC}"/>
+                <a16:creationId xmlns="" xmlns:a16="http://schemas.microsoft.com/office/drawing/2014/main" id="{F6B06F0D-1228-4443-B0F7-36556C7ECDBC}"/>
               </a:ext>
             </a:extLst>
           </p:cNvPr>
@@ -3864,7 +3867,7 @@
           <p:cNvPr id="3" name="文本框 2">
             <a:extLst>
               <a:ext uri="{FF2B5EF4-FFF2-40B4-BE49-F238E27FC236}">
-                <a16:creationId xmlns:a16="http://schemas.microsoft.com/office/drawing/2014/main" xmlns="" id="{7F809FAF-1B62-4718-9A34-5E411051246F}"/>
+                <a16:creationId xmlns="" xmlns:a16="http://schemas.microsoft.com/office/drawing/2014/main" id="{7F809FAF-1B62-4718-9A34-5E411051246F}"/>
               </a:ext>
             </a:extLst>
           </p:cNvPr>
@@ -3900,7 +3903,7 @@
           <p:cNvPr id="4" name="文本框 3">
             <a:extLst>
               <a:ext uri="{FF2B5EF4-FFF2-40B4-BE49-F238E27FC236}">
-                <a16:creationId xmlns:a16="http://schemas.microsoft.com/office/drawing/2014/main" xmlns="" id="{9DAFDFA8-40DE-48CA-AF8F-EC62E6EDCE29}"/>
+                <a16:creationId xmlns="" xmlns:a16="http://schemas.microsoft.com/office/drawing/2014/main" id="{9DAFDFA8-40DE-48CA-AF8F-EC62E6EDCE29}"/>
               </a:ext>
             </a:extLst>
           </p:cNvPr>
@@ -3933,10 +3936,10 @@
       </p:sp>
       <p:sp>
         <p:nvSpPr>
-          <p:cNvPr id="5" name="文本框 4">
-            <a:extLst>
-              <a:ext uri="{FF2B5EF4-FFF2-40B4-BE49-F238E27FC236}">
-                <a16:creationId xmlns:a16="http://schemas.microsoft.com/office/drawing/2014/main" xmlns="" id="{A32A5490-6048-430C-A38C-32B504C2FAB1}"/>
+          <p:cNvPr id="6" name="文本框 5">
+            <a:extLst>
+              <a:ext uri="{FF2B5EF4-FFF2-40B4-BE49-F238E27FC236}">
+                <a16:creationId xmlns="" xmlns:a16="http://schemas.microsoft.com/office/drawing/2014/main" id="{6EEC58BD-E0B4-4135-AD7B-22FF640B64BB}"/>
               </a:ext>
             </a:extLst>
           </p:cNvPr>
@@ -3945,8 +3948,8 @@
         </p:nvSpPr>
         <p:spPr>
           <a:xfrm>
-            <a:off x="5451715" y="4545637"/>
-            <a:ext cx="1757212" cy="584775"/>
+            <a:off x="5494712" y="3170555"/>
+            <a:ext cx="1864613" cy="584775"/>
           </a:xfrm>
           <a:prstGeom prst="rect">
             <a:avLst/>
@@ -3960,19 +3963,19 @@
           <a:lstStyle/>
           <a:p>
             <a:r>
-              <a:rPr lang="en-US" altLang="zh-CN" sz="3200" dirty="0" err="1"/>
-              <a:t>TreeMap</a:t>
-            </a:r>
-            <a:endParaRPr lang="zh-CN" altLang="en-US" sz="3200" dirty="0"/>
-          </a:p>
-        </p:txBody>
-      </p:sp>
-      <p:sp>
-        <p:nvSpPr>
-          <p:cNvPr id="6" name="文本框 5">
-            <a:extLst>
-              <a:ext uri="{FF2B5EF4-FFF2-40B4-BE49-F238E27FC236}">
-                <a16:creationId xmlns:a16="http://schemas.microsoft.com/office/drawing/2014/main" xmlns="" id="{6EEC58BD-E0B4-4135-AD7B-22FF640B64BB}"/>
+              <a:rPr lang="en-US" altLang="zh-CN" sz="3200"/>
+              <a:t>HashMap</a:t>
+            </a:r>
+            <a:endParaRPr lang="zh-CN" altLang="en-US" sz="3200"/>
+          </a:p>
+        </p:txBody>
+      </p:sp>
+      <p:sp>
+        <p:nvSpPr>
+          <p:cNvPr id="7" name="文本框 6">
+            <a:extLst>
+              <a:ext uri="{FF2B5EF4-FFF2-40B4-BE49-F238E27FC236}">
+                <a16:creationId xmlns="" xmlns:a16="http://schemas.microsoft.com/office/drawing/2014/main" id="{ECD587B2-0662-4350-9ECB-2153752A1222}"/>
               </a:ext>
             </a:extLst>
           </p:cNvPr>
@@ -3981,8 +3984,8 @@
         </p:nvSpPr>
         <p:spPr>
           <a:xfrm>
-            <a:off x="5494712" y="3170555"/>
-            <a:ext cx="1864613" cy="584775"/>
+            <a:off x="5479769" y="4470861"/>
+            <a:ext cx="1620957" cy="584775"/>
           </a:xfrm>
           <a:prstGeom prst="rect">
             <a:avLst/>
@@ -3996,42 +3999,6 @@
           <a:lstStyle/>
           <a:p>
             <a:r>
-              <a:rPr lang="en-US" altLang="zh-CN" sz="3200"/>
-              <a:t>HashMap</a:t>
-            </a:r>
-            <a:endParaRPr lang="zh-CN" altLang="en-US" sz="3200"/>
-          </a:p>
-        </p:txBody>
-      </p:sp>
-      <p:sp>
-        <p:nvSpPr>
-          <p:cNvPr id="7" name="文本框 6">
-            <a:extLst>
-              <a:ext uri="{FF2B5EF4-FFF2-40B4-BE49-F238E27FC236}">
-                <a16:creationId xmlns:a16="http://schemas.microsoft.com/office/drawing/2014/main" xmlns="" id="{ECD587B2-0662-4350-9ECB-2153752A1222}"/>
-              </a:ext>
-            </a:extLst>
-          </p:cNvPr>
-          <p:cNvSpPr txBox="1"/>
-          <p:nvPr/>
-        </p:nvSpPr>
-        <p:spPr>
-          <a:xfrm>
-            <a:off x="5519843" y="5195790"/>
-            <a:ext cx="1620957" cy="584775"/>
-          </a:xfrm>
-          <a:prstGeom prst="rect">
-            <a:avLst/>
-          </a:prstGeom>
-          <a:noFill/>
-        </p:spPr>
-        <p:txBody>
-          <a:bodyPr wrap="none" rtlCol="0" anchor="ctr">
-            <a:spAutoFit/>
-          </a:bodyPr>
-          <a:lstStyle/>
-          <a:p>
-            <a:r>
               <a:rPr lang="en-US" altLang="zh-CN" sz="3200" dirty="0" err="1"/>
               <a:t>HashSet</a:t>
             </a:r>
@@ -4044,7 +4011,7 @@
           <p:cNvPr id="8" name="文本框 7">
             <a:extLst>
               <a:ext uri="{FF2B5EF4-FFF2-40B4-BE49-F238E27FC236}">
-                <a16:creationId xmlns:a16="http://schemas.microsoft.com/office/drawing/2014/main" xmlns="" id="{A32A5490-6048-430C-A38C-32B504C2FAB1}"/>
+                <a16:creationId xmlns="" xmlns:a16="http://schemas.microsoft.com/office/drawing/2014/main" id="{A32A5490-6048-430C-A38C-32B504C2FAB1}"/>
               </a:ext>
             </a:extLst>
           </p:cNvPr>
@@ -4113,7 +4080,7 @@
           <p:cNvPr id="2" name="矩形 1">
             <a:extLst>
               <a:ext uri="{FF2B5EF4-FFF2-40B4-BE49-F238E27FC236}">
-                <a16:creationId xmlns:a16="http://schemas.microsoft.com/office/drawing/2014/main" xmlns="" id="{6ADC338D-2A42-4214-AF1E-E893ABC84C3A}"/>
+                <a16:creationId xmlns="" xmlns:a16="http://schemas.microsoft.com/office/drawing/2014/main" id="{6ADC338D-2A42-4214-AF1E-E893ABC84C3A}"/>
               </a:ext>
             </a:extLst>
           </p:cNvPr>
@@ -4148,7 +4115,7 @@
           <p:cNvPr id="5" name="图片 4">
             <a:extLst>
               <a:ext uri="{FF2B5EF4-FFF2-40B4-BE49-F238E27FC236}">
-                <a16:creationId xmlns:a16="http://schemas.microsoft.com/office/drawing/2014/main" xmlns="" id="{7BA30A2C-2D5E-4743-A6F3-ECE697C6B2F3}"/>
+                <a16:creationId xmlns="" xmlns:a16="http://schemas.microsoft.com/office/drawing/2014/main" id="{7BA30A2C-2D5E-4743-A6F3-ECE697C6B2F3}"/>
               </a:ext>
             </a:extLst>
           </p:cNvPr>
@@ -4208,7 +4175,7 @@
           <p:cNvPr id="2" name="矩形 1">
             <a:extLst>
               <a:ext uri="{FF2B5EF4-FFF2-40B4-BE49-F238E27FC236}">
-                <a16:creationId xmlns:a16="http://schemas.microsoft.com/office/drawing/2014/main" xmlns="" id="{36E8F243-5DCE-4B6B-B182-3A83785914E5}"/>
+                <a16:creationId xmlns="" xmlns:a16="http://schemas.microsoft.com/office/drawing/2014/main" id="{36E8F243-5DCE-4B6B-B182-3A83785914E5}"/>
               </a:ext>
             </a:extLst>
           </p:cNvPr>
@@ -4243,7 +4210,7 @@
           <p:cNvPr id="3" name="图片 2">
             <a:extLst>
               <a:ext uri="{FF2B5EF4-FFF2-40B4-BE49-F238E27FC236}">
-                <a16:creationId xmlns:a16="http://schemas.microsoft.com/office/drawing/2014/main" xmlns="" id="{4570B9F7-5484-40ED-92EF-5D099046089E}"/>
+                <a16:creationId xmlns="" xmlns:a16="http://schemas.microsoft.com/office/drawing/2014/main" id="{4570B9F7-5484-40ED-92EF-5D099046089E}"/>
               </a:ext>
             </a:extLst>
           </p:cNvPr>
@@ -4303,7 +4270,7 @@
           <p:cNvPr id="3" name="图片 2">
             <a:extLst>
               <a:ext uri="{FF2B5EF4-FFF2-40B4-BE49-F238E27FC236}">
-                <a16:creationId xmlns:a16="http://schemas.microsoft.com/office/drawing/2014/main" xmlns="" id="{AFD6668A-FCFA-4750-9810-10E65F53D474}"/>
+                <a16:creationId xmlns="" xmlns:a16="http://schemas.microsoft.com/office/drawing/2014/main" id="{AFD6668A-FCFA-4750-9810-10E65F53D474}"/>
               </a:ext>
             </a:extLst>
           </p:cNvPr>
@@ -4363,7 +4330,7 @@
           <p:cNvPr id="2" name="矩形 1">
             <a:extLst>
               <a:ext uri="{FF2B5EF4-FFF2-40B4-BE49-F238E27FC236}">
-                <a16:creationId xmlns:a16="http://schemas.microsoft.com/office/drawing/2014/main" xmlns="" id="{A7C3A55E-ACA6-468B-8EE2-F79CC155B43C}"/>
+                <a16:creationId xmlns="" xmlns:a16="http://schemas.microsoft.com/office/drawing/2014/main" id="{A7C3A55E-ACA6-468B-8EE2-F79CC155B43C}"/>
               </a:ext>
             </a:extLst>
           </p:cNvPr>
@@ -4398,7 +4365,7 @@
           <p:cNvPr id="4" name="矩形 3">
             <a:extLst>
               <a:ext uri="{FF2B5EF4-FFF2-40B4-BE49-F238E27FC236}">
-                <a16:creationId xmlns:a16="http://schemas.microsoft.com/office/drawing/2014/main" xmlns="" id="{8EE2C36E-41C4-4812-B2C7-6D3DA3A05C81}"/>
+                <a16:creationId xmlns="" xmlns:a16="http://schemas.microsoft.com/office/drawing/2014/main" id="{8EE2C36E-41C4-4812-B2C7-6D3DA3A05C81}"/>
               </a:ext>
             </a:extLst>
           </p:cNvPr>
@@ -4432,7 +4399,7 @@
           <p:cNvPr id="10" name="图片 9">
             <a:extLst>
               <a:ext uri="{FF2B5EF4-FFF2-40B4-BE49-F238E27FC236}">
-                <a16:creationId xmlns:a16="http://schemas.microsoft.com/office/drawing/2014/main" xmlns="" id="{4DA7838D-466F-4DD2-B7A1-2616B47DA946}"/>
+                <a16:creationId xmlns="" xmlns:a16="http://schemas.microsoft.com/office/drawing/2014/main" id="{4DA7838D-466F-4DD2-B7A1-2616B47DA946}"/>
               </a:ext>
             </a:extLst>
           </p:cNvPr>
@@ -4492,7 +4459,7 @@
           <p:cNvPr id="2" name="矩形 1">
             <a:extLst>
               <a:ext uri="{FF2B5EF4-FFF2-40B4-BE49-F238E27FC236}">
-                <a16:creationId xmlns:a16="http://schemas.microsoft.com/office/drawing/2014/main" xmlns="" id="{34E60C45-1274-4BDF-BC43-94EAA77545BA}"/>
+                <a16:creationId xmlns="" xmlns:a16="http://schemas.microsoft.com/office/drawing/2014/main" id="{34E60C45-1274-4BDF-BC43-94EAA77545BA}"/>
               </a:ext>
             </a:extLst>
           </p:cNvPr>
@@ -4527,7 +4494,7 @@
           <p:cNvPr id="3" name="Picture 2" descr="https://images2015.cnblogs.com/blog/406535/201606/406535-20160601172257399-1416926928.png">
             <a:extLst>
               <a:ext uri="{FF2B5EF4-FFF2-40B4-BE49-F238E27FC236}">
-                <a16:creationId xmlns:a16="http://schemas.microsoft.com/office/drawing/2014/main" xmlns="" id="{BF4BEE9A-A291-4CD8-A8F6-D98A727EF59C}"/>
+                <a16:creationId xmlns="" xmlns:a16="http://schemas.microsoft.com/office/drawing/2014/main" id="{BF4BEE9A-A291-4CD8-A8F6-D98A727EF59C}"/>
               </a:ext>
             </a:extLst>
           </p:cNvPr>
@@ -4574,7 +4541,7 @@
           <p:cNvPr id="4" name="矩形 3">
             <a:extLst>
               <a:ext uri="{FF2B5EF4-FFF2-40B4-BE49-F238E27FC236}">
-                <a16:creationId xmlns:a16="http://schemas.microsoft.com/office/drawing/2014/main" xmlns="" id="{2DF72FFF-0DAF-4686-B844-A92CEEF45642}"/>
+                <a16:creationId xmlns="" xmlns:a16="http://schemas.microsoft.com/office/drawing/2014/main" id="{2DF72FFF-0DAF-4686-B844-A92CEEF45642}"/>
               </a:ext>
             </a:extLst>
           </p:cNvPr>
@@ -4732,7 +4699,7 @@
           <p:cNvPr id="21" name="图片 20">
             <a:extLst>
               <a:ext uri="{FF2B5EF4-FFF2-40B4-BE49-F238E27FC236}">
-                <a16:creationId xmlns:a16="http://schemas.microsoft.com/office/drawing/2014/main" xmlns="" id="{8541D66C-F8B9-4365-A941-3D0ED71A687C}"/>
+                <a16:creationId xmlns="" xmlns:a16="http://schemas.microsoft.com/office/drawing/2014/main" id="{8541D66C-F8B9-4365-A941-3D0ED71A687C}"/>
               </a:ext>
             </a:extLst>
           </p:cNvPr>
@@ -4762,7 +4729,7 @@
           <p:cNvPr id="26" name="图片 25">
             <a:extLst>
               <a:ext uri="{FF2B5EF4-FFF2-40B4-BE49-F238E27FC236}">
-                <a16:creationId xmlns:a16="http://schemas.microsoft.com/office/drawing/2014/main" xmlns="" id="{9B6054CF-A77E-4E7F-AA2D-C9C8EF028FA0}"/>
+                <a16:creationId xmlns="" xmlns:a16="http://schemas.microsoft.com/office/drawing/2014/main" id="{9B6054CF-A77E-4E7F-AA2D-C9C8EF028FA0}"/>
               </a:ext>
             </a:extLst>
           </p:cNvPr>
@@ -4792,7 +4759,7 @@
           <p:cNvPr id="2" name="矩形 1">
             <a:extLst>
               <a:ext uri="{FF2B5EF4-FFF2-40B4-BE49-F238E27FC236}">
-                <a16:creationId xmlns:a16="http://schemas.microsoft.com/office/drawing/2014/main" xmlns="" id="{1686E41A-9C10-4E1D-94C6-C784BE48F0CC}"/>
+                <a16:creationId xmlns="" xmlns:a16="http://schemas.microsoft.com/office/drawing/2014/main" id="{1686E41A-9C10-4E1D-94C6-C784BE48F0CC}"/>
               </a:ext>
             </a:extLst>
           </p:cNvPr>
@@ -4827,7 +4794,7 @@
           <p:cNvPr id="10" name="直接箭头连接符 9">
             <a:extLst>
               <a:ext uri="{FF2B5EF4-FFF2-40B4-BE49-F238E27FC236}">
-                <a16:creationId xmlns:a16="http://schemas.microsoft.com/office/drawing/2014/main" xmlns="" id="{0C4371D2-F3DF-4F01-90B6-3477DAA91942}"/>
+                <a16:creationId xmlns="" xmlns:a16="http://schemas.microsoft.com/office/drawing/2014/main" id="{0C4371D2-F3DF-4F01-90B6-3477DAA91942}"/>
               </a:ext>
             </a:extLst>
           </p:cNvPr>
@@ -4868,7 +4835,7 @@
           <p:cNvPr id="3" name="图片 2">
             <a:extLst>
               <a:ext uri="{FF2B5EF4-FFF2-40B4-BE49-F238E27FC236}">
-                <a16:creationId xmlns:a16="http://schemas.microsoft.com/office/drawing/2014/main" xmlns="" id="{9E25F210-4A83-4C9A-B699-E753E4584248}"/>
+                <a16:creationId xmlns="" xmlns:a16="http://schemas.microsoft.com/office/drawing/2014/main" id="{9E25F210-4A83-4C9A-B699-E753E4584248}"/>
               </a:ext>
             </a:extLst>
           </p:cNvPr>
@@ -4898,7 +4865,7 @@
           <p:cNvPr id="4" name="文本框 3">
             <a:extLst>
               <a:ext uri="{FF2B5EF4-FFF2-40B4-BE49-F238E27FC236}">
-                <a16:creationId xmlns:a16="http://schemas.microsoft.com/office/drawing/2014/main" xmlns="" id="{5A5055F5-2C11-4670-9021-E6FF25D8C017}"/>
+                <a16:creationId xmlns="" xmlns:a16="http://schemas.microsoft.com/office/drawing/2014/main" id="{5A5055F5-2C11-4670-9021-E6FF25D8C017}"/>
               </a:ext>
             </a:extLst>
           </p:cNvPr>
@@ -4937,7 +4904,7 @@
           <p:cNvPr id="8" name="直接箭头连接符 7">
             <a:extLst>
               <a:ext uri="{FF2B5EF4-FFF2-40B4-BE49-F238E27FC236}">
-                <a16:creationId xmlns:a16="http://schemas.microsoft.com/office/drawing/2014/main" xmlns="" id="{FE0AB037-F91F-47A5-B6CA-774630B70B09}"/>
+                <a16:creationId xmlns="" xmlns:a16="http://schemas.microsoft.com/office/drawing/2014/main" id="{FE0AB037-F91F-47A5-B6CA-774630B70B09}"/>
               </a:ext>
             </a:extLst>
           </p:cNvPr>
@@ -5037,7 +5004,7 @@
           <p:cNvPr id="14" name="图片 1">
             <a:extLst>
               <a:ext uri="{FF2B5EF4-FFF2-40B4-BE49-F238E27FC236}">
-                <a16:creationId xmlns:a16="http://schemas.microsoft.com/office/drawing/2014/main" xmlns="" id="{F4130D34-576C-4F7A-9021-79D21F13B043}"/>
+                <a16:creationId xmlns="" xmlns:a16="http://schemas.microsoft.com/office/drawing/2014/main" id="{F4130D34-576C-4F7A-9021-79D21F13B043}"/>
               </a:ext>
             </a:extLst>
           </p:cNvPr>
@@ -5067,7 +5034,7 @@
           <p:cNvPr id="12" name="Picture 11">
             <a:extLst>
               <a:ext uri="{FF2B5EF4-FFF2-40B4-BE49-F238E27FC236}">
-                <a16:creationId xmlns:a16="http://schemas.microsoft.com/office/drawing/2014/main" xmlns="" id="{8A5D0982-D20C-40ED-8519-739F2B028923}"/>
+                <a16:creationId xmlns="" xmlns:a16="http://schemas.microsoft.com/office/drawing/2014/main" id="{8A5D0982-D20C-40ED-8519-739F2B028923}"/>
               </a:ext>
             </a:extLst>
           </p:cNvPr>
@@ -5097,7 +5064,7 @@
           <p:cNvPr id="2" name="图片 1">
             <a:extLst>
               <a:ext uri="{FF2B5EF4-FFF2-40B4-BE49-F238E27FC236}">
-                <a16:creationId xmlns:a16="http://schemas.microsoft.com/office/drawing/2014/main" xmlns="" id="{1D638218-ADE2-4AD2-AD25-176E53A67F02}"/>
+                <a16:creationId xmlns="" xmlns:a16="http://schemas.microsoft.com/office/drawing/2014/main" id="{1D638218-ADE2-4AD2-AD25-176E53A67F02}"/>
               </a:ext>
             </a:extLst>
           </p:cNvPr>
@@ -5127,7 +5094,7 @@
           <p:cNvPr id="3" name="图片 2">
             <a:extLst>
               <a:ext uri="{FF2B5EF4-FFF2-40B4-BE49-F238E27FC236}">
-                <a16:creationId xmlns:a16="http://schemas.microsoft.com/office/drawing/2014/main" xmlns="" id="{BA504C82-5F9E-48C3-8986-62A677426930}"/>
+                <a16:creationId xmlns="" xmlns:a16="http://schemas.microsoft.com/office/drawing/2014/main" id="{BA504C82-5F9E-48C3-8986-62A677426930}"/>
               </a:ext>
             </a:extLst>
           </p:cNvPr>
@@ -5157,7 +5124,7 @@
           <p:cNvPr id="4" name="矩形 3">
             <a:extLst>
               <a:ext uri="{FF2B5EF4-FFF2-40B4-BE49-F238E27FC236}">
-                <a16:creationId xmlns:a16="http://schemas.microsoft.com/office/drawing/2014/main" xmlns="" id="{8A3FAE2A-727D-45E3-B4D5-53945535E49C}"/>
+                <a16:creationId xmlns="" xmlns:a16="http://schemas.microsoft.com/office/drawing/2014/main" id="{8A3FAE2A-727D-45E3-B4D5-53945535E49C}"/>
               </a:ext>
             </a:extLst>
           </p:cNvPr>
@@ -5237,7 +5204,7 @@
           <p:cNvPr id="5" name="矩形 4">
             <a:extLst>
               <a:ext uri="{FF2B5EF4-FFF2-40B4-BE49-F238E27FC236}">
-                <a16:creationId xmlns:a16="http://schemas.microsoft.com/office/drawing/2014/main" xmlns="" id="{A56A558E-151A-4372-994F-DEAD1A4F127A}"/>
+                <a16:creationId xmlns="" xmlns:a16="http://schemas.microsoft.com/office/drawing/2014/main" id="{A56A558E-151A-4372-994F-DEAD1A4F127A}"/>
               </a:ext>
             </a:extLst>
           </p:cNvPr>
@@ -5272,7 +5239,7 @@
           <p:cNvPr id="7" name="直接箭头连接符 6">
             <a:extLst>
               <a:ext uri="{FF2B5EF4-FFF2-40B4-BE49-F238E27FC236}">
-                <a16:creationId xmlns:a16="http://schemas.microsoft.com/office/drawing/2014/main" xmlns="" id="{45615441-D71E-42F9-BCBE-834C64F42E3F}"/>
+                <a16:creationId xmlns="" xmlns:a16="http://schemas.microsoft.com/office/drawing/2014/main" id="{45615441-D71E-42F9-BCBE-834C64F42E3F}"/>
               </a:ext>
             </a:extLst>
           </p:cNvPr>
@@ -5311,7 +5278,7 @@
           <p:cNvPr id="8" name="文本框 7">
             <a:extLst>
               <a:ext uri="{FF2B5EF4-FFF2-40B4-BE49-F238E27FC236}">
-                <a16:creationId xmlns:a16="http://schemas.microsoft.com/office/drawing/2014/main" xmlns="" id="{CEA168E1-BFB3-41CD-BFF5-2EE638AF794F}"/>
+                <a16:creationId xmlns="" xmlns:a16="http://schemas.microsoft.com/office/drawing/2014/main" id="{CEA168E1-BFB3-41CD-BFF5-2EE638AF794F}"/>
               </a:ext>
             </a:extLst>
           </p:cNvPr>
@@ -5355,7 +5322,7 @@
           <p:cNvPr id="10" name="直接箭头连接符 9">
             <a:extLst>
               <a:ext uri="{FF2B5EF4-FFF2-40B4-BE49-F238E27FC236}">
-                <a16:creationId xmlns:a16="http://schemas.microsoft.com/office/drawing/2014/main" xmlns="" id="{CBFD6EC9-0FB8-43A9-8B79-E85A26123A71}"/>
+                <a16:creationId xmlns="" xmlns:a16="http://schemas.microsoft.com/office/drawing/2014/main" id="{CBFD6EC9-0FB8-43A9-8B79-E85A26123A71}"/>
               </a:ext>
             </a:extLst>
           </p:cNvPr>
@@ -5397,7 +5364,7 @@
           <p:cNvPr id="11" name="文本框 10">
             <a:extLst>
               <a:ext uri="{FF2B5EF4-FFF2-40B4-BE49-F238E27FC236}">
-                <a16:creationId xmlns:a16="http://schemas.microsoft.com/office/drawing/2014/main" xmlns="" id="{86F08652-CE8E-4229-ABEF-F8328B3ED002}"/>
+                <a16:creationId xmlns="" xmlns:a16="http://schemas.microsoft.com/office/drawing/2014/main" id="{86F08652-CE8E-4229-ABEF-F8328B3ED002}"/>
               </a:ext>
             </a:extLst>
           </p:cNvPr>
@@ -5441,7 +5408,7 @@
           <p:cNvPr id="6" name="Rectangle 1">
             <a:extLst>
               <a:ext uri="{FF2B5EF4-FFF2-40B4-BE49-F238E27FC236}">
-                <a16:creationId xmlns:a16="http://schemas.microsoft.com/office/drawing/2014/main" xmlns="" id="{F3B81E4C-EF02-4349-B146-868B06C4B76D}"/>
+                <a16:creationId xmlns="" xmlns:a16="http://schemas.microsoft.com/office/drawing/2014/main" id="{F3B81E4C-EF02-4349-B146-868B06C4B76D}"/>
               </a:ext>
             </a:extLst>
           </p:cNvPr>
@@ -5779,7 +5746,7 @@
           <p:cNvPr id="15" name="Rectangle 14">
             <a:extLst>
               <a:ext uri="{FF2B5EF4-FFF2-40B4-BE49-F238E27FC236}">
-                <a16:creationId xmlns:a16="http://schemas.microsoft.com/office/drawing/2014/main" xmlns="" id="{F7936145-19B8-43F1-861E-7ABDFCB52FFF}"/>
+                <a16:creationId xmlns="" xmlns:a16="http://schemas.microsoft.com/office/drawing/2014/main" id="{F7936145-19B8-43F1-861E-7ABDFCB52FFF}"/>
               </a:ext>
             </a:extLst>
           </p:cNvPr>
@@ -5843,7 +5810,7 @@
           <p:cNvPr id="3" name="矩形 2">
             <a:extLst>
               <a:ext uri="{FF2B5EF4-FFF2-40B4-BE49-F238E27FC236}">
-                <a16:creationId xmlns:a16="http://schemas.microsoft.com/office/drawing/2014/main" xmlns="" id="{DE9DD378-45A5-4001-A3B8-50837D02A6DF}"/>
+                <a16:creationId xmlns="" xmlns:a16="http://schemas.microsoft.com/office/drawing/2014/main" id="{DE9DD378-45A5-4001-A3B8-50837D02A6DF}"/>
               </a:ext>
             </a:extLst>
           </p:cNvPr>
@@ -5878,7 +5845,7 @@
           <p:cNvPr id="4" name="图片 3">
             <a:extLst>
               <a:ext uri="{FF2B5EF4-FFF2-40B4-BE49-F238E27FC236}">
-                <a16:creationId xmlns:a16="http://schemas.microsoft.com/office/drawing/2014/main" xmlns="" id="{11B5C592-F94A-4DCC-8C7F-82B4A2592932}"/>
+                <a16:creationId xmlns="" xmlns:a16="http://schemas.microsoft.com/office/drawing/2014/main" id="{11B5C592-F94A-4DCC-8C7F-82B4A2592932}"/>
               </a:ext>
             </a:extLst>
           </p:cNvPr>
@@ -5908,7 +5875,7 @@
           <p:cNvPr id="5" name="图片 4">
             <a:extLst>
               <a:ext uri="{FF2B5EF4-FFF2-40B4-BE49-F238E27FC236}">
-                <a16:creationId xmlns:a16="http://schemas.microsoft.com/office/drawing/2014/main" xmlns="" id="{D75AA593-31A2-4DA7-BAB4-56D218C8DE9B}"/>
+                <a16:creationId xmlns="" xmlns:a16="http://schemas.microsoft.com/office/drawing/2014/main" id="{D75AA593-31A2-4DA7-BAB4-56D218C8DE9B}"/>
               </a:ext>
             </a:extLst>
           </p:cNvPr>
@@ -5938,7 +5905,7 @@
           <p:cNvPr id="6" name="图片 5">
             <a:extLst>
               <a:ext uri="{FF2B5EF4-FFF2-40B4-BE49-F238E27FC236}">
-                <a16:creationId xmlns:a16="http://schemas.microsoft.com/office/drawing/2014/main" xmlns="" id="{9CD33F91-7DBB-4FCC-98DD-7050367D98F2}"/>
+                <a16:creationId xmlns="" xmlns:a16="http://schemas.microsoft.com/office/drawing/2014/main" id="{9CD33F91-7DBB-4FCC-98DD-7050367D98F2}"/>
               </a:ext>
             </a:extLst>
           </p:cNvPr>
@@ -5968,7 +5935,7 @@
           <p:cNvPr id="7" name="矩形 6">
             <a:extLst>
               <a:ext uri="{FF2B5EF4-FFF2-40B4-BE49-F238E27FC236}">
-                <a16:creationId xmlns:a16="http://schemas.microsoft.com/office/drawing/2014/main" xmlns="" id="{C6007EA4-99C6-4F05-877E-E89C6C3AE256}"/>
+                <a16:creationId xmlns="" xmlns:a16="http://schemas.microsoft.com/office/drawing/2014/main" id="{C6007EA4-99C6-4F05-877E-E89C6C3AE256}"/>
               </a:ext>
             </a:extLst>
           </p:cNvPr>
@@ -6062,7 +6029,7 @@
           <p:cNvPr id="8" name="矩形 7">
             <a:extLst>
               <a:ext uri="{FF2B5EF4-FFF2-40B4-BE49-F238E27FC236}">
-                <a16:creationId xmlns:a16="http://schemas.microsoft.com/office/drawing/2014/main" xmlns="" id="{B8F22018-0A85-4270-A4AA-46C72219303D}"/>
+                <a16:creationId xmlns="" xmlns:a16="http://schemas.microsoft.com/office/drawing/2014/main" id="{B8F22018-0A85-4270-A4AA-46C72219303D}"/>
               </a:ext>
             </a:extLst>
           </p:cNvPr>
@@ -6138,7 +6105,7 @@
           <p:cNvPr id="9" name="箭头: 右 8">
             <a:extLst>
               <a:ext uri="{FF2B5EF4-FFF2-40B4-BE49-F238E27FC236}">
-                <a16:creationId xmlns:a16="http://schemas.microsoft.com/office/drawing/2014/main" xmlns="" id="{AF9B2D61-EE29-4DFA-96C5-0664D2DD9A49}"/>
+                <a16:creationId xmlns="" xmlns:a16="http://schemas.microsoft.com/office/drawing/2014/main" id="{AF9B2D61-EE29-4DFA-96C5-0664D2DD9A49}"/>
               </a:ext>
             </a:extLst>
           </p:cNvPr>
@@ -6214,7 +6181,7 @@
           <p:cNvPr id="13" name="图片 12">
             <a:extLst>
               <a:ext uri="{FF2B5EF4-FFF2-40B4-BE49-F238E27FC236}">
-                <a16:creationId xmlns:a16="http://schemas.microsoft.com/office/drawing/2014/main" xmlns="" id="{69131F11-8A89-4879-8859-AA1827890F1C}"/>
+                <a16:creationId xmlns="" xmlns:a16="http://schemas.microsoft.com/office/drawing/2014/main" id="{69131F11-8A89-4879-8859-AA1827890F1C}"/>
               </a:ext>
             </a:extLst>
           </p:cNvPr>
@@ -6244,7 +6211,7 @@
           <p:cNvPr id="4" name="矩形 3">
             <a:extLst>
               <a:ext uri="{FF2B5EF4-FFF2-40B4-BE49-F238E27FC236}">
-                <a16:creationId xmlns:a16="http://schemas.microsoft.com/office/drawing/2014/main" xmlns="" id="{AE8A2B54-3F30-41F0-ABB8-0D815726FD82}"/>
+                <a16:creationId xmlns="" xmlns:a16="http://schemas.microsoft.com/office/drawing/2014/main" id="{AE8A2B54-3F30-41F0-ABB8-0D815726FD82}"/>
               </a:ext>
             </a:extLst>
           </p:cNvPr>
@@ -6279,7 +6246,7 @@
           <p:cNvPr id="6" name="图片 5">
             <a:extLst>
               <a:ext uri="{FF2B5EF4-FFF2-40B4-BE49-F238E27FC236}">
-                <a16:creationId xmlns:a16="http://schemas.microsoft.com/office/drawing/2014/main" xmlns="" id="{E3A46FB1-2489-4F34-A991-A0A72082FEBB}"/>
+                <a16:creationId xmlns="" xmlns:a16="http://schemas.microsoft.com/office/drawing/2014/main" id="{E3A46FB1-2489-4F34-A991-A0A72082FEBB}"/>
               </a:ext>
             </a:extLst>
           </p:cNvPr>
@@ -6309,7 +6276,7 @@
           <p:cNvPr id="7" name="图片 6">
             <a:extLst>
               <a:ext uri="{FF2B5EF4-FFF2-40B4-BE49-F238E27FC236}">
-                <a16:creationId xmlns:a16="http://schemas.microsoft.com/office/drawing/2014/main" xmlns="" id="{F3E6B8C9-09C7-44EA-8D22-DF87F7FCD483}"/>
+                <a16:creationId xmlns="" xmlns:a16="http://schemas.microsoft.com/office/drawing/2014/main" id="{F3E6B8C9-09C7-44EA-8D22-DF87F7FCD483}"/>
               </a:ext>
             </a:extLst>
           </p:cNvPr>
@@ -6339,7 +6306,7 @@
           <p:cNvPr id="8" name="图片 7">
             <a:extLst>
               <a:ext uri="{FF2B5EF4-FFF2-40B4-BE49-F238E27FC236}">
-                <a16:creationId xmlns:a16="http://schemas.microsoft.com/office/drawing/2014/main" xmlns="" id="{F0B77830-B77C-4C47-A968-B1DFFE8BC45D}"/>
+                <a16:creationId xmlns="" xmlns:a16="http://schemas.microsoft.com/office/drawing/2014/main" id="{F0B77830-B77C-4C47-A968-B1DFFE8BC45D}"/>
               </a:ext>
             </a:extLst>
           </p:cNvPr>
@@ -6369,7 +6336,7 @@
           <p:cNvPr id="9" name="图片 8">
             <a:extLst>
               <a:ext uri="{FF2B5EF4-FFF2-40B4-BE49-F238E27FC236}">
-                <a16:creationId xmlns:a16="http://schemas.microsoft.com/office/drawing/2014/main" xmlns="" id="{CFF1A19B-DB4F-42C8-955D-43BC1C10E355}"/>
+                <a16:creationId xmlns="" xmlns:a16="http://schemas.microsoft.com/office/drawing/2014/main" id="{CFF1A19B-DB4F-42C8-955D-43BC1C10E355}"/>
               </a:ext>
             </a:extLst>
           </p:cNvPr>
@@ -6399,7 +6366,7 @@
           <p:cNvPr id="10" name="矩形 9">
             <a:extLst>
               <a:ext uri="{FF2B5EF4-FFF2-40B4-BE49-F238E27FC236}">
-                <a16:creationId xmlns:a16="http://schemas.microsoft.com/office/drawing/2014/main" xmlns="" id="{26472812-F516-4BFF-9A49-CAF487E417F0}"/>
+                <a16:creationId xmlns="" xmlns:a16="http://schemas.microsoft.com/office/drawing/2014/main" id="{26472812-F516-4BFF-9A49-CAF487E417F0}"/>
               </a:ext>
             </a:extLst>
           </p:cNvPr>
@@ -6439,7 +6406,7 @@
           <p:cNvPr id="12" name="直接箭头连接符 11">
             <a:extLst>
               <a:ext uri="{FF2B5EF4-FFF2-40B4-BE49-F238E27FC236}">
-                <a16:creationId xmlns:a16="http://schemas.microsoft.com/office/drawing/2014/main" xmlns="" id="{1EF3CA87-29D4-4F1C-9BA8-C8125E1848CA}"/>
+                <a16:creationId xmlns="" xmlns:a16="http://schemas.microsoft.com/office/drawing/2014/main" id="{1EF3CA87-29D4-4F1C-9BA8-C8125E1848CA}"/>
               </a:ext>
             </a:extLst>
           </p:cNvPr>
@@ -6480,7 +6447,7 @@
           <p:cNvPr id="15" name="直接箭头连接符 14">
             <a:extLst>
               <a:ext uri="{FF2B5EF4-FFF2-40B4-BE49-F238E27FC236}">
-                <a16:creationId xmlns:a16="http://schemas.microsoft.com/office/drawing/2014/main" xmlns="" id="{10D33DDD-0297-4161-929F-3B28878A0A07}"/>
+                <a16:creationId xmlns="" xmlns:a16="http://schemas.microsoft.com/office/drawing/2014/main" id="{10D33DDD-0297-4161-929F-3B28878A0A07}"/>
               </a:ext>
             </a:extLst>
           </p:cNvPr>
@@ -6552,7 +6519,7 @@
           <p:cNvPr id="2" name="图片 1">
             <a:extLst>
               <a:ext uri="{FF2B5EF4-FFF2-40B4-BE49-F238E27FC236}">
-                <a16:creationId xmlns:a16="http://schemas.microsoft.com/office/drawing/2014/main" xmlns="" id="{4BB2E5F0-37A9-4C2A-84E5-B14E551B770B}"/>
+                <a16:creationId xmlns="" xmlns:a16="http://schemas.microsoft.com/office/drawing/2014/main" id="{4BB2E5F0-37A9-4C2A-84E5-B14E551B770B}"/>
               </a:ext>
             </a:extLst>
           </p:cNvPr>
@@ -6582,7 +6549,7 @@
           <p:cNvPr id="4" name="图片 2">
             <a:extLst>
               <a:ext uri="{FF2B5EF4-FFF2-40B4-BE49-F238E27FC236}">
-                <a16:creationId xmlns:a16="http://schemas.microsoft.com/office/drawing/2014/main" xmlns="" id="{AF7FB1F2-9F38-4A20-874E-05F240D81077}"/>
+                <a16:creationId xmlns="" xmlns:a16="http://schemas.microsoft.com/office/drawing/2014/main" id="{AF7FB1F2-9F38-4A20-874E-05F240D81077}"/>
               </a:ext>
             </a:extLst>
           </p:cNvPr>
@@ -6612,7 +6579,7 @@
           <p:cNvPr id="5" name="矩形 3">
             <a:extLst>
               <a:ext uri="{FF2B5EF4-FFF2-40B4-BE49-F238E27FC236}">
-                <a16:creationId xmlns:a16="http://schemas.microsoft.com/office/drawing/2014/main" xmlns="" id="{234C32AB-7B6F-45D5-AE3E-46DE252921D1}"/>
+                <a16:creationId xmlns="" xmlns:a16="http://schemas.microsoft.com/office/drawing/2014/main" id="{234C32AB-7B6F-45D5-AE3E-46DE252921D1}"/>
               </a:ext>
             </a:extLst>
           </p:cNvPr>
@@ -6647,7 +6614,7 @@
           <p:cNvPr id="8" name="Picture 7">
             <a:extLst>
               <a:ext uri="{FF2B5EF4-FFF2-40B4-BE49-F238E27FC236}">
-                <a16:creationId xmlns:a16="http://schemas.microsoft.com/office/drawing/2014/main" xmlns="" id="{C19391FE-D974-4DD3-9FB3-5C8CD095A216}"/>
+                <a16:creationId xmlns="" xmlns:a16="http://schemas.microsoft.com/office/drawing/2014/main" id="{C19391FE-D974-4DD3-9FB3-5C8CD095A216}"/>
               </a:ext>
             </a:extLst>
           </p:cNvPr>
@@ -6677,7 +6644,7 @@
           <p:cNvPr id="6" name="图片 5">
             <a:extLst>
               <a:ext uri="{FF2B5EF4-FFF2-40B4-BE49-F238E27FC236}">
-                <a16:creationId xmlns:a16="http://schemas.microsoft.com/office/drawing/2014/main" xmlns="" id="{5CE207F1-47EC-4DDF-8CE9-D1A639366FC3}"/>
+                <a16:creationId xmlns="" xmlns:a16="http://schemas.microsoft.com/office/drawing/2014/main" id="{5CE207F1-47EC-4DDF-8CE9-D1A639366FC3}"/>
               </a:ext>
             </a:extLst>
           </p:cNvPr>
@@ -6737,7 +6704,7 @@
           <p:cNvPr id="2" name="矩形 1">
             <a:extLst>
               <a:ext uri="{FF2B5EF4-FFF2-40B4-BE49-F238E27FC236}">
-                <a16:creationId xmlns:a16="http://schemas.microsoft.com/office/drawing/2014/main" xmlns="" id="{7DA04801-F599-4551-8745-5A355DA55921}"/>
+                <a16:creationId xmlns="" xmlns:a16="http://schemas.microsoft.com/office/drawing/2014/main" id="{7DA04801-F599-4551-8745-5A355DA55921}"/>
               </a:ext>
             </a:extLst>
           </p:cNvPr>
@@ -6772,7 +6739,7 @@
           <p:cNvPr id="3" name="矩形 2">
             <a:extLst>
               <a:ext uri="{FF2B5EF4-FFF2-40B4-BE49-F238E27FC236}">
-                <a16:creationId xmlns:a16="http://schemas.microsoft.com/office/drawing/2014/main" xmlns="" id="{A6FD37D9-3803-4319-83EB-19F790B68397}"/>
+                <a16:creationId xmlns="" xmlns:a16="http://schemas.microsoft.com/office/drawing/2014/main" id="{A6FD37D9-3803-4319-83EB-19F790B68397}"/>
               </a:ext>
             </a:extLst>
           </p:cNvPr>
@@ -6814,7 +6781,7 @@
           <p:cNvPr id="4" name="图片 3">
             <a:extLst>
               <a:ext uri="{FF2B5EF4-FFF2-40B4-BE49-F238E27FC236}">
-                <a16:creationId xmlns:a16="http://schemas.microsoft.com/office/drawing/2014/main" xmlns="" id="{4ACBE816-EB61-49F4-89A7-296DED44B970}"/>
+                <a16:creationId xmlns="" xmlns:a16="http://schemas.microsoft.com/office/drawing/2014/main" id="{4ACBE816-EB61-49F4-89A7-296DED44B970}"/>
               </a:ext>
             </a:extLst>
           </p:cNvPr>
@@ -6844,7 +6811,7 @@
           <p:cNvPr id="5" name="矩形 4">
             <a:extLst>
               <a:ext uri="{FF2B5EF4-FFF2-40B4-BE49-F238E27FC236}">
-                <a16:creationId xmlns:a16="http://schemas.microsoft.com/office/drawing/2014/main" xmlns="" id="{F1B5222A-5751-4D32-948E-ADA4A41E030D}"/>
+                <a16:creationId xmlns="" xmlns:a16="http://schemas.microsoft.com/office/drawing/2014/main" id="{F1B5222A-5751-4D32-948E-ADA4A41E030D}"/>
               </a:ext>
             </a:extLst>
           </p:cNvPr>
@@ -6878,7 +6845,7 @@
           <p:cNvPr id="6" name="图片 5">
             <a:extLst>
               <a:ext uri="{FF2B5EF4-FFF2-40B4-BE49-F238E27FC236}">
-                <a16:creationId xmlns:a16="http://schemas.microsoft.com/office/drawing/2014/main" xmlns="" id="{D8226A40-DEAB-4352-9C17-9074D99251EB}"/>
+                <a16:creationId xmlns="" xmlns:a16="http://schemas.microsoft.com/office/drawing/2014/main" id="{D8226A40-DEAB-4352-9C17-9074D99251EB}"/>
               </a:ext>
             </a:extLst>
           </p:cNvPr>
@@ -6908,7 +6875,7 @@
           <p:cNvPr id="7" name="图片 6">
             <a:extLst>
               <a:ext uri="{FF2B5EF4-FFF2-40B4-BE49-F238E27FC236}">
-                <a16:creationId xmlns:a16="http://schemas.microsoft.com/office/drawing/2014/main" xmlns="" id="{9C88286F-A500-439B-9803-0E713BC10B28}"/>
+                <a16:creationId xmlns="" xmlns:a16="http://schemas.microsoft.com/office/drawing/2014/main" id="{9C88286F-A500-439B-9803-0E713BC10B28}"/>
               </a:ext>
             </a:extLst>
           </p:cNvPr>
@@ -6938,7 +6905,7 @@
           <p:cNvPr id="8" name="矩形 7">
             <a:extLst>
               <a:ext uri="{FF2B5EF4-FFF2-40B4-BE49-F238E27FC236}">
-                <a16:creationId xmlns:a16="http://schemas.microsoft.com/office/drawing/2014/main" xmlns="" id="{FE8D7E59-A703-4517-9AA8-8642D221B14D}"/>
+                <a16:creationId xmlns="" xmlns:a16="http://schemas.microsoft.com/office/drawing/2014/main" id="{FE8D7E59-A703-4517-9AA8-8642D221B14D}"/>
               </a:ext>
             </a:extLst>
           </p:cNvPr>
@@ -6973,7 +6940,7 @@
           <p:cNvPr id="9" name="图片 8">
             <a:extLst>
               <a:ext uri="{FF2B5EF4-FFF2-40B4-BE49-F238E27FC236}">
-                <a16:creationId xmlns:a16="http://schemas.microsoft.com/office/drawing/2014/main" xmlns="" id="{A576655E-88DB-4FF0-869D-01FA45C32CAD}"/>
+                <a16:creationId xmlns="" xmlns:a16="http://schemas.microsoft.com/office/drawing/2014/main" id="{A576655E-88DB-4FF0-869D-01FA45C32CAD}"/>
               </a:ext>
             </a:extLst>
           </p:cNvPr>
@@ -7003,7 +6970,7 @@
           <p:cNvPr id="10" name="图片 9">
             <a:extLst>
               <a:ext uri="{FF2B5EF4-FFF2-40B4-BE49-F238E27FC236}">
-                <a16:creationId xmlns:a16="http://schemas.microsoft.com/office/drawing/2014/main" xmlns="" id="{DC5BB7FB-6D52-4629-8BA0-336CC0D3C8E9}"/>
+                <a16:creationId xmlns="" xmlns:a16="http://schemas.microsoft.com/office/drawing/2014/main" id="{DC5BB7FB-6D52-4629-8BA0-336CC0D3C8E9}"/>
               </a:ext>
             </a:extLst>
           </p:cNvPr>
@@ -7063,7 +7030,7 @@
           <p:cNvPr id="2" name="矩形 1">
             <a:extLst>
               <a:ext uri="{FF2B5EF4-FFF2-40B4-BE49-F238E27FC236}">
-                <a16:creationId xmlns:a16="http://schemas.microsoft.com/office/drawing/2014/main" xmlns="" id="{35113C7A-21DA-4269-8292-5B50F2C36C1F}"/>
+                <a16:creationId xmlns="" xmlns:a16="http://schemas.microsoft.com/office/drawing/2014/main" id="{35113C7A-21DA-4269-8292-5B50F2C36C1F}"/>
               </a:ext>
             </a:extLst>
           </p:cNvPr>
@@ -7098,7 +7065,7 @@
           <p:cNvPr id="4" name="Rectangle 2">
             <a:extLst>
               <a:ext uri="{FF2B5EF4-FFF2-40B4-BE49-F238E27FC236}">
-                <a16:creationId xmlns:a16="http://schemas.microsoft.com/office/drawing/2014/main" xmlns="" id="{6C233EB1-2B8A-4B5C-8B6A-90947D46BE9B}"/>
+                <a16:creationId xmlns="" xmlns:a16="http://schemas.microsoft.com/office/drawing/2014/main" id="{6C233EB1-2B8A-4B5C-8B6A-90947D46BE9B}"/>
               </a:ext>
             </a:extLst>
           </p:cNvPr>
@@ -7454,7 +7421,7 @@
           <p:cNvPr id="5" name="Rectangle 3">
             <a:extLst>
               <a:ext uri="{FF2B5EF4-FFF2-40B4-BE49-F238E27FC236}">
-                <a16:creationId xmlns:a16="http://schemas.microsoft.com/office/drawing/2014/main" xmlns="" id="{BCF492BE-A8D7-4B74-BF6C-7CE81E1F10A8}"/>
+                <a16:creationId xmlns="" xmlns:a16="http://schemas.microsoft.com/office/drawing/2014/main" id="{BCF492BE-A8D7-4B74-BF6C-7CE81E1F10A8}"/>
               </a:ext>
             </a:extLst>
           </p:cNvPr>
@@ -8266,7 +8233,7 @@
           <p:cNvPr id="7" name="Rectangle 4">
             <a:extLst>
               <a:ext uri="{FF2B5EF4-FFF2-40B4-BE49-F238E27FC236}">
-                <a16:creationId xmlns:a16="http://schemas.microsoft.com/office/drawing/2014/main" xmlns="" id="{8A63C07C-0AD4-43C5-9A21-13C237FD8AAA}"/>
+                <a16:creationId xmlns="" xmlns:a16="http://schemas.microsoft.com/office/drawing/2014/main" id="{8A63C07C-0AD4-43C5-9A21-13C237FD8AAA}"/>
               </a:ext>
             </a:extLst>
           </p:cNvPr>
@@ -8924,7 +8891,7 @@
           <p:cNvPr id="8" name="图片 7">
             <a:extLst>
               <a:ext uri="{FF2B5EF4-FFF2-40B4-BE49-F238E27FC236}">
-                <a16:creationId xmlns:a16="http://schemas.microsoft.com/office/drawing/2014/main" xmlns="" id="{E35A82F1-773F-4809-8FDD-48F0DEFDD54E}"/>
+                <a16:creationId xmlns="" xmlns:a16="http://schemas.microsoft.com/office/drawing/2014/main" id="{E35A82F1-773F-4809-8FDD-48F0DEFDD54E}"/>
               </a:ext>
             </a:extLst>
           </p:cNvPr>
@@ -8954,7 +8921,7 @@
           <p:cNvPr id="11" name="图片 10">
             <a:extLst>
               <a:ext uri="{FF2B5EF4-FFF2-40B4-BE49-F238E27FC236}">
-                <a16:creationId xmlns:a16="http://schemas.microsoft.com/office/drawing/2014/main" xmlns="" id="{25BFF2B3-51FA-482D-BA50-3290723B8A80}"/>
+                <a16:creationId xmlns="" xmlns:a16="http://schemas.microsoft.com/office/drawing/2014/main" id="{25BFF2B3-51FA-482D-BA50-3290723B8A80}"/>
               </a:ext>
             </a:extLst>
           </p:cNvPr>
@@ -8984,7 +8951,7 @@
           <p:cNvPr id="12" name="图片 11">
             <a:extLst>
               <a:ext uri="{FF2B5EF4-FFF2-40B4-BE49-F238E27FC236}">
-                <a16:creationId xmlns:a16="http://schemas.microsoft.com/office/drawing/2014/main" xmlns="" id="{F629791C-0ED1-4A1F-8111-4434C2BC3072}"/>
+                <a16:creationId xmlns="" xmlns:a16="http://schemas.microsoft.com/office/drawing/2014/main" id="{F629791C-0ED1-4A1F-8111-4434C2BC3072}"/>
               </a:ext>
             </a:extLst>
           </p:cNvPr>
@@ -9014,7 +8981,7 @@
           <p:cNvPr id="13" name="图片 12">
             <a:extLst>
               <a:ext uri="{FF2B5EF4-FFF2-40B4-BE49-F238E27FC236}">
-                <a16:creationId xmlns:a16="http://schemas.microsoft.com/office/drawing/2014/main" xmlns="" id="{CEA2EAD8-BD56-4F00-9E17-D67147B8516E}"/>
+                <a16:creationId xmlns="" xmlns:a16="http://schemas.microsoft.com/office/drawing/2014/main" id="{CEA2EAD8-BD56-4F00-9E17-D67147B8516E}"/>
               </a:ext>
             </a:extLst>
           </p:cNvPr>
@@ -9044,7 +9011,7 @@
           <p:cNvPr id="14" name="图片 13">
             <a:extLst>
               <a:ext uri="{FF2B5EF4-FFF2-40B4-BE49-F238E27FC236}">
-                <a16:creationId xmlns:a16="http://schemas.microsoft.com/office/drawing/2014/main" xmlns="" id="{0918DB73-D43E-48B0-B4DD-23717469D246}"/>
+                <a16:creationId xmlns="" xmlns:a16="http://schemas.microsoft.com/office/drawing/2014/main" id="{0918DB73-D43E-48B0-B4DD-23717469D246}"/>
               </a:ext>
             </a:extLst>
           </p:cNvPr>
@@ -9104,7 +9071,7 @@
           <p:cNvPr id="2" name="图片 1">
             <a:extLst>
               <a:ext uri="{FF2B5EF4-FFF2-40B4-BE49-F238E27FC236}">
-                <a16:creationId xmlns:a16="http://schemas.microsoft.com/office/drawing/2014/main" xmlns="" id="{D73F8802-A23E-4B0C-BECB-B9B780D1EC3D}"/>
+                <a16:creationId xmlns="" xmlns:a16="http://schemas.microsoft.com/office/drawing/2014/main" id="{D73F8802-A23E-4B0C-BECB-B9B780D1EC3D}"/>
               </a:ext>
             </a:extLst>
           </p:cNvPr>
@@ -9134,7 +9101,7 @@
           <p:cNvPr id="3" name="矩形 2">
             <a:extLst>
               <a:ext uri="{FF2B5EF4-FFF2-40B4-BE49-F238E27FC236}">
-                <a16:creationId xmlns:a16="http://schemas.microsoft.com/office/drawing/2014/main" xmlns="" id="{83610F07-852C-463A-8107-F77C37896FD8}"/>
+                <a16:creationId xmlns="" xmlns:a16="http://schemas.microsoft.com/office/drawing/2014/main" id="{83610F07-852C-463A-8107-F77C37896FD8}"/>
               </a:ext>
             </a:extLst>
           </p:cNvPr>
@@ -9199,7 +9166,7 @@
           <p:cNvPr id="2" name="矩形 1">
             <a:extLst>
               <a:ext uri="{FF2B5EF4-FFF2-40B4-BE49-F238E27FC236}">
-                <a16:creationId xmlns:a16="http://schemas.microsoft.com/office/drawing/2014/main" xmlns="" id="{35113C7A-21DA-4269-8292-5B50F2C36C1F}"/>
+                <a16:creationId xmlns="" xmlns:a16="http://schemas.microsoft.com/office/drawing/2014/main" id="{35113C7A-21DA-4269-8292-5B50F2C36C1F}"/>
               </a:ext>
             </a:extLst>
           </p:cNvPr>
@@ -9234,7 +9201,7 @@
           <p:cNvPr id="5" name="图片 4">
             <a:extLst>
               <a:ext uri="{FF2B5EF4-FFF2-40B4-BE49-F238E27FC236}">
-                <a16:creationId xmlns:a16="http://schemas.microsoft.com/office/drawing/2014/main" xmlns="" id="{E8FFB8B5-6BC6-4F8E-96CD-FD927F93051E}"/>
+                <a16:creationId xmlns="" xmlns:a16="http://schemas.microsoft.com/office/drawing/2014/main" id="{E8FFB8B5-6BC6-4F8E-96CD-FD927F93051E}"/>
               </a:ext>
             </a:extLst>
           </p:cNvPr>
@@ -9264,7 +9231,7 @@
           <p:cNvPr id="7" name="图片 6">
             <a:extLst>
               <a:ext uri="{FF2B5EF4-FFF2-40B4-BE49-F238E27FC236}">
-                <a16:creationId xmlns:a16="http://schemas.microsoft.com/office/drawing/2014/main" xmlns="" id="{F07D2A7C-DC5E-4CA9-A7F0-120E4F199A6D}"/>
+                <a16:creationId xmlns="" xmlns:a16="http://schemas.microsoft.com/office/drawing/2014/main" id="{F07D2A7C-DC5E-4CA9-A7F0-120E4F199A6D}"/>
               </a:ext>
             </a:extLst>
           </p:cNvPr>
@@ -9294,7 +9261,7 @@
           <p:cNvPr id="9" name="图片 8">
             <a:extLst>
               <a:ext uri="{FF2B5EF4-FFF2-40B4-BE49-F238E27FC236}">
-                <a16:creationId xmlns:a16="http://schemas.microsoft.com/office/drawing/2014/main" xmlns="" id="{1A8031F4-B0CD-4355-904D-9913E7B32428}"/>
+                <a16:creationId xmlns="" xmlns:a16="http://schemas.microsoft.com/office/drawing/2014/main" id="{1A8031F4-B0CD-4355-904D-9913E7B32428}"/>
               </a:ext>
             </a:extLst>
           </p:cNvPr>
@@ -9354,7 +9321,7 @@
           <p:cNvPr id="2" name="矩形 1">
             <a:extLst>
               <a:ext uri="{FF2B5EF4-FFF2-40B4-BE49-F238E27FC236}">
-                <a16:creationId xmlns:a16="http://schemas.microsoft.com/office/drawing/2014/main" xmlns="" id="{83610F07-852C-463A-8107-F77C37896FD8}"/>
+                <a16:creationId xmlns="" xmlns:a16="http://schemas.microsoft.com/office/drawing/2014/main" id="{83610F07-852C-463A-8107-F77C37896FD8}"/>
               </a:ext>
             </a:extLst>
           </p:cNvPr>
@@ -9618,7 +9585,7 @@
           <p:cNvPr id="4" name="矩形 3">
             <a:extLst>
               <a:ext uri="{FF2B5EF4-FFF2-40B4-BE49-F238E27FC236}">
-                <a16:creationId xmlns:a16="http://schemas.microsoft.com/office/drawing/2014/main" xmlns="" id="{83610F07-852C-463A-8107-F77C37896FD8}"/>
+                <a16:creationId xmlns="" xmlns:a16="http://schemas.microsoft.com/office/drawing/2014/main" id="{83610F07-852C-463A-8107-F77C37896FD8}"/>
               </a:ext>
             </a:extLst>
           </p:cNvPr>
@@ -9718,8 +9685,8 @@
         </p:blipFill>
         <p:spPr>
           <a:xfrm>
-            <a:off x="4266398" y="0"/>
-            <a:ext cx="3253323" cy="6771503"/>
+            <a:off x="4226012" y="2435"/>
+            <a:ext cx="3293710" cy="6855565"/>
           </a:xfrm>
           <a:prstGeom prst="rect">
             <a:avLst/>
@@ -9731,7 +9698,7 @@
           <p:cNvPr id="4" name="矩形 3">
             <a:extLst>
               <a:ext uri="{FF2B5EF4-FFF2-40B4-BE49-F238E27FC236}">
-                <a16:creationId xmlns:a16="http://schemas.microsoft.com/office/drawing/2014/main" xmlns="" id="{83610F07-852C-463A-8107-F77C37896FD8}"/>
+                <a16:creationId xmlns="" xmlns:a16="http://schemas.microsoft.com/office/drawing/2014/main" id="{83610F07-852C-463A-8107-F77C37896FD8}"/>
               </a:ext>
             </a:extLst>
           </p:cNvPr>
@@ -9811,7 +9778,7 @@
       </p:pic>
       <p:pic>
         <p:nvPicPr>
-          <p:cNvPr id="6" name="图片 5"/>
+          <p:cNvPr id="9" name="图片 8"/>
           <p:cNvPicPr>
             <a:picLocks noChangeAspect="1"/>
           </p:cNvPicPr>
@@ -9825,8 +9792,8 @@
         </p:blipFill>
         <p:spPr>
           <a:xfrm>
-            <a:off x="161096" y="2227449"/>
-            <a:ext cx="3678417" cy="378610"/>
+            <a:off x="100138" y="3046317"/>
+            <a:ext cx="4025736" cy="506439"/>
           </a:xfrm>
           <a:prstGeom prst="rect">
             <a:avLst/>
@@ -9835,7 +9802,7 @@
       </p:pic>
       <p:pic>
         <p:nvPicPr>
-          <p:cNvPr id="7" name="图片 6"/>
+          <p:cNvPr id="11" name="图片 10"/>
           <p:cNvPicPr>
             <a:picLocks noChangeAspect="1"/>
           </p:cNvPicPr>
@@ -9849,8 +9816,8 @@
         </p:blipFill>
         <p:spPr>
           <a:xfrm>
-            <a:off x="100138" y="2992843"/>
-            <a:ext cx="3739375" cy="607092"/>
+            <a:off x="100139" y="1931294"/>
+            <a:ext cx="3639236" cy="561853"/>
           </a:xfrm>
           <a:prstGeom prst="rect">
             <a:avLst/>
@@ -9859,7 +9826,7 @@
       </p:pic>
       <p:pic>
         <p:nvPicPr>
-          <p:cNvPr id="8" name="图片 7"/>
+          <p:cNvPr id="13" name="图片 12"/>
           <p:cNvPicPr>
             <a:picLocks noChangeAspect="1"/>
           </p:cNvPicPr>
@@ -9873,8 +9840,8 @@
         </p:blipFill>
         <p:spPr>
           <a:xfrm>
-            <a:off x="100139" y="3986719"/>
-            <a:ext cx="3739374" cy="994110"/>
+            <a:off x="278175" y="3673484"/>
+            <a:ext cx="3669662" cy="3034882"/>
           </a:xfrm>
           <a:prstGeom prst="rect">
             <a:avLst/>
@@ -9916,7 +9883,7 @@
           <p:cNvPr id="4" name="矩形 3">
             <a:extLst>
               <a:ext uri="{FF2B5EF4-FFF2-40B4-BE49-F238E27FC236}">
-                <a16:creationId xmlns:a16="http://schemas.microsoft.com/office/drawing/2014/main" xmlns="" id="{83610F07-852C-463A-8107-F77C37896FD8}"/>
+                <a16:creationId xmlns="" xmlns:a16="http://schemas.microsoft.com/office/drawing/2014/main" id="{83610F07-852C-463A-8107-F77C37896FD8}"/>
               </a:ext>
             </a:extLst>
           </p:cNvPr>
@@ -9946,6 +9913,142 @@
           </a:p>
         </p:txBody>
       </p:sp>
+      <p:pic>
+        <p:nvPicPr>
+          <p:cNvPr id="2" name="图片 1"/>
+          <p:cNvPicPr>
+            <a:picLocks noChangeAspect="1"/>
+          </p:cNvPicPr>
+          <p:nvPr/>
+        </p:nvPicPr>
+        <p:blipFill>
+          <a:blip r:embed="rId2"/>
+          <a:stretch>
+            <a:fillRect/>
+          </a:stretch>
+        </p:blipFill>
+        <p:spPr>
+          <a:xfrm>
+            <a:off x="221125" y="914704"/>
+            <a:ext cx="4284925" cy="1490745"/>
+          </a:xfrm>
+          <a:prstGeom prst="rect">
+            <a:avLst/>
+          </a:prstGeom>
+        </p:spPr>
+      </p:pic>
+      <p:sp>
+        <p:nvSpPr>
+          <p:cNvPr id="6" name="右箭头 5"/>
+          <p:cNvSpPr/>
+          <p:nvPr/>
+        </p:nvSpPr>
+        <p:spPr>
+          <a:xfrm>
+            <a:off x="4712043" y="1589903"/>
+            <a:ext cx="1416908" cy="123567"/>
+          </a:xfrm>
+          <a:prstGeom prst="rightArrow">
+            <a:avLst/>
+          </a:prstGeom>
+        </p:spPr>
+        <p:style>
+          <a:lnRef idx="2">
+            <a:schemeClr val="accent1">
+              <a:shade val="50000"/>
+            </a:schemeClr>
+          </a:lnRef>
+          <a:fillRef idx="1">
+            <a:schemeClr val="accent1"/>
+          </a:fillRef>
+          <a:effectRef idx="0">
+            <a:schemeClr val="accent1"/>
+          </a:effectRef>
+          <a:fontRef idx="minor">
+            <a:schemeClr val="lt1"/>
+          </a:fontRef>
+        </p:style>
+        <p:txBody>
+          <a:bodyPr rtlCol="0" anchor="ctr"/>
+          <a:lstStyle/>
+          <a:p>
+            <a:pPr algn="ctr"/>
+            <a:endParaRPr lang="zh-CN" altLang="en-US"/>
+          </a:p>
+        </p:txBody>
+      </p:sp>
+      <p:pic>
+        <p:nvPicPr>
+          <p:cNvPr id="7" name="图片 6"/>
+          <p:cNvPicPr>
+            <a:picLocks noChangeAspect="1"/>
+          </p:cNvPicPr>
+          <p:nvPr/>
+        </p:nvPicPr>
+        <p:blipFill>
+          <a:blip r:embed="rId3"/>
+          <a:stretch>
+            <a:fillRect/>
+          </a:stretch>
+        </p:blipFill>
+        <p:spPr>
+          <a:xfrm>
+            <a:off x="221125" y="3077476"/>
+            <a:ext cx="4870097" cy="1378550"/>
+          </a:xfrm>
+          <a:prstGeom prst="rect">
+            <a:avLst/>
+          </a:prstGeom>
+        </p:spPr>
+      </p:pic>
+      <p:pic>
+        <p:nvPicPr>
+          <p:cNvPr id="9" name="图片 8"/>
+          <p:cNvPicPr>
+            <a:picLocks noChangeAspect="1"/>
+          </p:cNvPicPr>
+          <p:nvPr/>
+        </p:nvPicPr>
+        <p:blipFill>
+          <a:blip r:embed="rId4"/>
+          <a:stretch>
+            <a:fillRect/>
+          </a:stretch>
+        </p:blipFill>
+        <p:spPr>
+          <a:xfrm>
+            <a:off x="252565" y="4802115"/>
+            <a:ext cx="4253485" cy="1017917"/>
+          </a:xfrm>
+          <a:prstGeom prst="rect">
+            <a:avLst/>
+          </a:prstGeom>
+        </p:spPr>
+      </p:pic>
+      <p:pic>
+        <p:nvPicPr>
+          <p:cNvPr id="11" name="图片 10"/>
+          <p:cNvPicPr>
+            <a:picLocks noChangeAspect="1"/>
+          </p:cNvPicPr>
+          <p:nvPr/>
+        </p:nvPicPr>
+        <p:blipFill>
+          <a:blip r:embed="rId5"/>
+          <a:stretch>
+            <a:fillRect/>
+          </a:stretch>
+        </p:blipFill>
+        <p:spPr>
+          <a:xfrm>
+            <a:off x="6738551" y="33569"/>
+            <a:ext cx="4000396" cy="6782105"/>
+          </a:xfrm>
+          <a:prstGeom prst="rect">
+            <a:avLst/>
+          </a:prstGeom>
+        </p:spPr>
+      </p:pic>
     </p:spTree>
     <p:extLst>
       <p:ext uri="{BB962C8B-B14F-4D97-AF65-F5344CB8AC3E}">
@@ -9981,7 +10084,7 @@
           <p:cNvPr id="4" name="矩形 3">
             <a:extLst>
               <a:ext uri="{FF2B5EF4-FFF2-40B4-BE49-F238E27FC236}">
-                <a16:creationId xmlns:a16="http://schemas.microsoft.com/office/drawing/2014/main" xmlns="" id="{83610F07-852C-463A-8107-F77C37896FD8}"/>
+                <a16:creationId xmlns="" xmlns:a16="http://schemas.microsoft.com/office/drawing/2014/main" id="{83610F07-852C-463A-8107-F77C37896FD8}"/>
               </a:ext>
             </a:extLst>
           </p:cNvPr>
@@ -10011,10 +10114,1353 @@
           </a:p>
         </p:txBody>
       </p:sp>
+      <p:sp>
+        <p:nvSpPr>
+          <p:cNvPr id="6" name="Rectangle 3"/>
+          <p:cNvSpPr>
+            <a:spLocks noChangeArrowheads="1"/>
+          </p:cNvSpPr>
+          <p:nvPr/>
+        </p:nvSpPr>
+        <p:spPr bwMode="auto">
+          <a:xfrm>
+            <a:off x="333632" y="4442422"/>
+            <a:ext cx="4827373" cy="1754326"/>
+          </a:xfrm>
+          <a:prstGeom prst="rect">
+            <a:avLst/>
+          </a:prstGeom>
+          <a:solidFill>
+            <a:srgbClr val="FFFFFF"/>
+          </a:solidFill>
+          <a:ln>
+            <a:noFill/>
+          </a:ln>
+          <a:effectLst/>
+          <a:extLst>
+            <a:ext uri="{91240B29-F687-4F45-9708-019B960494DF}">
+              <a14:hiddenLine xmlns:a14="http://schemas.microsoft.com/office/drawing/2010/main" w="9525">
+                <a:solidFill>
+                  <a:schemeClr val="tx1"/>
+                </a:solidFill>
+                <a:miter lim="800000"/>
+                <a:headEnd/>
+                <a:tailEnd/>
+              </a14:hiddenLine>
+            </a:ext>
+            <a:ext uri="{AF507438-7753-43E0-B8FC-AC1667EBCBE1}">
+              <a14:hiddenEffects xmlns:a14="http://schemas.microsoft.com/office/drawing/2010/main">
+                <a:effectLst>
+                  <a:outerShdw dist="35921" dir="2700000" algn="ctr" rotWithShape="0">
+                    <a:schemeClr val="bg2"/>
+                  </a:outerShdw>
+                </a:effectLst>
+              </a14:hiddenEffects>
+            </a:ext>
+          </a:extLst>
+        </p:spPr>
+        <p:txBody>
+          <a:bodyPr vert="horz" wrap="square" lIns="91440" tIns="45720" rIns="91440" bIns="45720" numCol="1" anchor="ctr" anchorCtr="0" compatLnSpc="1">
+            <a:prstTxWarp prst="textNoShape">
+              <a:avLst/>
+            </a:prstTxWarp>
+            <a:spAutoFit/>
+          </a:bodyPr>
+          <a:lstStyle/>
+          <a:p>
+            <a:pPr marL="0" marR="0" lvl="0" indent="0" algn="l" defTabSz="914400" rtl="0" eaLnBrk="0" fontAlgn="base" latinLnBrk="0" hangingPunct="0">
+              <a:lnSpc>
+                <a:spcPct val="100000"/>
+              </a:lnSpc>
+              <a:spcBef>
+                <a:spcPct val="0"/>
+              </a:spcBef>
+              <a:spcAft>
+                <a:spcPct val="0"/>
+              </a:spcAft>
+              <a:buClrTx/>
+              <a:buSzTx/>
+              <a:buFontTx/>
+              <a:buNone/>
+              <a:tabLst/>
+            </a:pPr>
+            <a:r>
+              <a:rPr kumimoji="0" lang="zh-CN" altLang="zh-CN" sz="900" b="0" i="0" u="none" strike="noStrike" cap="none" normalizeH="0" baseline="0" dirty="0" smtClean="0">
+                <a:ln>
+                  <a:noFill/>
+                </a:ln>
+                <a:solidFill>
+                  <a:srgbClr val="000000"/>
+                </a:solidFill>
+                <a:effectLst/>
+                <a:latin typeface="宋体" panose="02010600030101010101" pitchFamily="2" charset="-122"/>
+                <a:ea typeface="宋体" panose="02010600030101010101" pitchFamily="2" charset="-122"/>
+              </a:rPr>
+              <a:t>Node&lt;</a:t>
+            </a:r>
+            <a:r>
+              <a:rPr kumimoji="0" lang="zh-CN" altLang="zh-CN" sz="900" b="0" i="0" u="none" strike="noStrike" cap="none" normalizeH="0" baseline="0" dirty="0" smtClean="0">
+                <a:ln>
+                  <a:noFill/>
+                </a:ln>
+                <a:solidFill>
+                  <a:srgbClr val="20999D"/>
+                </a:solidFill>
+                <a:effectLst/>
+                <a:latin typeface="宋体" panose="02010600030101010101" pitchFamily="2" charset="-122"/>
+                <a:ea typeface="宋体" panose="02010600030101010101" pitchFamily="2" charset="-122"/>
+              </a:rPr>
+              <a:t>K</a:t>
+            </a:r>
+            <a:r>
+              <a:rPr kumimoji="0" lang="zh-CN" altLang="zh-CN" sz="900" b="0" i="0" u="none" strike="noStrike" cap="none" normalizeH="0" baseline="0" dirty="0" smtClean="0">
+                <a:ln>
+                  <a:noFill/>
+                </a:ln>
+                <a:solidFill>
+                  <a:srgbClr val="000000"/>
+                </a:solidFill>
+                <a:effectLst/>
+                <a:latin typeface="宋体" panose="02010600030101010101" pitchFamily="2" charset="-122"/>
+                <a:ea typeface="宋体" panose="02010600030101010101" pitchFamily="2" charset="-122"/>
+              </a:rPr>
+              <a:t>,</a:t>
+            </a:r>
+            <a:r>
+              <a:rPr kumimoji="0" lang="zh-CN" altLang="zh-CN" sz="900" b="0" i="0" u="none" strike="noStrike" cap="none" normalizeH="0" baseline="0" dirty="0" smtClean="0">
+                <a:ln>
+                  <a:noFill/>
+                </a:ln>
+                <a:solidFill>
+                  <a:srgbClr val="20999D"/>
+                </a:solidFill>
+                <a:effectLst/>
+                <a:latin typeface="宋体" panose="02010600030101010101" pitchFamily="2" charset="-122"/>
+                <a:ea typeface="宋体" panose="02010600030101010101" pitchFamily="2" charset="-122"/>
+              </a:rPr>
+              <a:t>V</a:t>
+            </a:r>
+            <a:r>
+              <a:rPr kumimoji="0" lang="zh-CN" altLang="zh-CN" sz="900" b="0" i="0" u="none" strike="noStrike" cap="none" normalizeH="0" baseline="0" dirty="0" smtClean="0">
+                <a:ln>
+                  <a:noFill/>
+                </a:ln>
+                <a:solidFill>
+                  <a:srgbClr val="000000"/>
+                </a:solidFill>
+                <a:effectLst/>
+                <a:latin typeface="宋体" panose="02010600030101010101" pitchFamily="2" charset="-122"/>
+                <a:ea typeface="宋体" panose="02010600030101010101" pitchFamily="2" charset="-122"/>
+              </a:rPr>
+              <a:t>&gt; find(</a:t>
+            </a:r>
+            <a:r>
+              <a:rPr kumimoji="0" lang="zh-CN" altLang="zh-CN" sz="900" b="1" i="0" u="none" strike="noStrike" cap="none" normalizeH="0" baseline="0" dirty="0" smtClean="0">
+                <a:ln>
+                  <a:noFill/>
+                </a:ln>
+                <a:solidFill>
+                  <a:srgbClr val="000080"/>
+                </a:solidFill>
+                <a:effectLst/>
+                <a:latin typeface="宋体" panose="02010600030101010101" pitchFamily="2" charset="-122"/>
+                <a:ea typeface="宋体" panose="02010600030101010101" pitchFamily="2" charset="-122"/>
+              </a:rPr>
+              <a:t>int </a:t>
+            </a:r>
+            <a:r>
+              <a:rPr kumimoji="0" lang="zh-CN" altLang="zh-CN" sz="900" b="0" i="0" u="none" strike="noStrike" cap="none" normalizeH="0" baseline="0" dirty="0" smtClean="0">
+                <a:ln>
+                  <a:noFill/>
+                </a:ln>
+                <a:solidFill>
+                  <a:srgbClr val="000000"/>
+                </a:solidFill>
+                <a:effectLst/>
+                <a:latin typeface="宋体" panose="02010600030101010101" pitchFamily="2" charset="-122"/>
+                <a:ea typeface="宋体" panose="02010600030101010101" pitchFamily="2" charset="-122"/>
+              </a:rPr>
+              <a:t>h, Object k) {</a:t>
+            </a:r>
+            <a:br>
+              <a:rPr kumimoji="0" lang="zh-CN" altLang="zh-CN" sz="900" b="0" i="0" u="none" strike="noStrike" cap="none" normalizeH="0" baseline="0" dirty="0" smtClean="0">
+                <a:ln>
+                  <a:noFill/>
+                </a:ln>
+                <a:solidFill>
+                  <a:srgbClr val="000000"/>
+                </a:solidFill>
+                <a:effectLst/>
+                <a:latin typeface="宋体" panose="02010600030101010101" pitchFamily="2" charset="-122"/>
+                <a:ea typeface="宋体" panose="02010600030101010101" pitchFamily="2" charset="-122"/>
+              </a:rPr>
+            </a:br>
+            <a:r>
+              <a:rPr kumimoji="0" lang="zh-CN" altLang="zh-CN" sz="900" b="0" i="0" u="none" strike="noStrike" cap="none" normalizeH="0" baseline="0" dirty="0" smtClean="0">
+                <a:ln>
+                  <a:noFill/>
+                </a:ln>
+                <a:solidFill>
+                  <a:srgbClr val="000000"/>
+                </a:solidFill>
+                <a:effectLst/>
+                <a:latin typeface="宋体" panose="02010600030101010101" pitchFamily="2" charset="-122"/>
+                <a:ea typeface="宋体" panose="02010600030101010101" pitchFamily="2" charset="-122"/>
+              </a:rPr>
+              <a:t>    Node&lt;</a:t>
+            </a:r>
+            <a:r>
+              <a:rPr kumimoji="0" lang="zh-CN" altLang="zh-CN" sz="900" b="0" i="0" u="none" strike="noStrike" cap="none" normalizeH="0" baseline="0" dirty="0" smtClean="0">
+                <a:ln>
+                  <a:noFill/>
+                </a:ln>
+                <a:solidFill>
+                  <a:srgbClr val="20999D"/>
+                </a:solidFill>
+                <a:effectLst/>
+                <a:latin typeface="宋体" panose="02010600030101010101" pitchFamily="2" charset="-122"/>
+                <a:ea typeface="宋体" panose="02010600030101010101" pitchFamily="2" charset="-122"/>
+              </a:rPr>
+              <a:t>K</a:t>
+            </a:r>
+            <a:r>
+              <a:rPr kumimoji="0" lang="zh-CN" altLang="zh-CN" sz="900" b="0" i="0" u="none" strike="noStrike" cap="none" normalizeH="0" baseline="0" dirty="0" smtClean="0">
+                <a:ln>
+                  <a:noFill/>
+                </a:ln>
+                <a:solidFill>
+                  <a:srgbClr val="000000"/>
+                </a:solidFill>
+                <a:effectLst/>
+                <a:latin typeface="宋体" panose="02010600030101010101" pitchFamily="2" charset="-122"/>
+                <a:ea typeface="宋体" panose="02010600030101010101" pitchFamily="2" charset="-122"/>
+              </a:rPr>
+              <a:t>,</a:t>
+            </a:r>
+            <a:r>
+              <a:rPr kumimoji="0" lang="zh-CN" altLang="zh-CN" sz="900" b="0" i="0" u="none" strike="noStrike" cap="none" normalizeH="0" baseline="0" dirty="0" smtClean="0">
+                <a:ln>
+                  <a:noFill/>
+                </a:ln>
+                <a:solidFill>
+                  <a:srgbClr val="20999D"/>
+                </a:solidFill>
+                <a:effectLst/>
+                <a:latin typeface="宋体" panose="02010600030101010101" pitchFamily="2" charset="-122"/>
+                <a:ea typeface="宋体" panose="02010600030101010101" pitchFamily="2" charset="-122"/>
+              </a:rPr>
+              <a:t>V</a:t>
+            </a:r>
+            <a:r>
+              <a:rPr kumimoji="0" lang="zh-CN" altLang="zh-CN" sz="900" b="0" i="0" u="none" strike="noStrike" cap="none" normalizeH="0" baseline="0" dirty="0" smtClean="0">
+                <a:ln>
+                  <a:noFill/>
+                </a:ln>
+                <a:solidFill>
+                  <a:srgbClr val="000000"/>
+                </a:solidFill>
+                <a:effectLst/>
+                <a:latin typeface="宋体" panose="02010600030101010101" pitchFamily="2" charset="-122"/>
+                <a:ea typeface="宋体" panose="02010600030101010101" pitchFamily="2" charset="-122"/>
+              </a:rPr>
+              <a:t>&gt; e = </a:t>
+            </a:r>
+            <a:r>
+              <a:rPr kumimoji="0" lang="zh-CN" altLang="zh-CN" sz="900" b="1" i="0" u="none" strike="noStrike" cap="none" normalizeH="0" baseline="0" dirty="0" smtClean="0">
+                <a:ln>
+                  <a:noFill/>
+                </a:ln>
+                <a:solidFill>
+                  <a:srgbClr val="000080"/>
+                </a:solidFill>
+                <a:effectLst/>
+                <a:latin typeface="宋体" panose="02010600030101010101" pitchFamily="2" charset="-122"/>
+                <a:ea typeface="宋体" panose="02010600030101010101" pitchFamily="2" charset="-122"/>
+              </a:rPr>
+              <a:t>this</a:t>
+            </a:r>
+            <a:r>
+              <a:rPr kumimoji="0" lang="zh-CN" altLang="zh-CN" sz="900" b="0" i="0" u="none" strike="noStrike" cap="none" normalizeH="0" baseline="0" dirty="0" smtClean="0">
+                <a:ln>
+                  <a:noFill/>
+                </a:ln>
+                <a:solidFill>
+                  <a:srgbClr val="000000"/>
+                </a:solidFill>
+                <a:effectLst/>
+                <a:latin typeface="宋体" panose="02010600030101010101" pitchFamily="2" charset="-122"/>
+                <a:ea typeface="宋体" panose="02010600030101010101" pitchFamily="2" charset="-122"/>
+              </a:rPr>
+              <a:t>;</a:t>
+            </a:r>
+            <a:br>
+              <a:rPr kumimoji="0" lang="zh-CN" altLang="zh-CN" sz="900" b="0" i="0" u="none" strike="noStrike" cap="none" normalizeH="0" baseline="0" dirty="0" smtClean="0">
+                <a:ln>
+                  <a:noFill/>
+                </a:ln>
+                <a:solidFill>
+                  <a:srgbClr val="000000"/>
+                </a:solidFill>
+                <a:effectLst/>
+                <a:latin typeface="宋体" panose="02010600030101010101" pitchFamily="2" charset="-122"/>
+                <a:ea typeface="宋体" panose="02010600030101010101" pitchFamily="2" charset="-122"/>
+              </a:rPr>
+            </a:br>
+            <a:r>
+              <a:rPr kumimoji="0" lang="zh-CN" altLang="zh-CN" sz="900" b="0" i="0" u="none" strike="noStrike" cap="none" normalizeH="0" baseline="0" dirty="0" smtClean="0">
+                <a:ln>
+                  <a:noFill/>
+                </a:ln>
+                <a:solidFill>
+                  <a:srgbClr val="000000"/>
+                </a:solidFill>
+                <a:effectLst/>
+                <a:latin typeface="宋体" panose="02010600030101010101" pitchFamily="2" charset="-122"/>
+                <a:ea typeface="宋体" panose="02010600030101010101" pitchFamily="2" charset="-122"/>
+              </a:rPr>
+              <a:t>    </a:t>
+            </a:r>
+            <a:r>
+              <a:rPr kumimoji="0" lang="zh-CN" altLang="zh-CN" sz="900" b="1" i="0" u="none" strike="noStrike" cap="none" normalizeH="0" baseline="0" dirty="0" smtClean="0">
+                <a:ln>
+                  <a:noFill/>
+                </a:ln>
+                <a:solidFill>
+                  <a:srgbClr val="000080"/>
+                </a:solidFill>
+                <a:effectLst/>
+                <a:latin typeface="宋体" panose="02010600030101010101" pitchFamily="2" charset="-122"/>
+                <a:ea typeface="宋体" panose="02010600030101010101" pitchFamily="2" charset="-122"/>
+              </a:rPr>
+              <a:t>if </a:t>
+            </a:r>
+            <a:r>
+              <a:rPr kumimoji="0" lang="zh-CN" altLang="zh-CN" sz="900" b="0" i="0" u="none" strike="noStrike" cap="none" normalizeH="0" baseline="0" dirty="0" smtClean="0">
+                <a:ln>
+                  <a:noFill/>
+                </a:ln>
+                <a:solidFill>
+                  <a:srgbClr val="000000"/>
+                </a:solidFill>
+                <a:effectLst/>
+                <a:latin typeface="宋体" panose="02010600030101010101" pitchFamily="2" charset="-122"/>
+                <a:ea typeface="宋体" panose="02010600030101010101" pitchFamily="2" charset="-122"/>
+              </a:rPr>
+              <a:t>(k != </a:t>
+            </a:r>
+            <a:r>
+              <a:rPr kumimoji="0" lang="zh-CN" altLang="zh-CN" sz="900" b="1" i="0" u="none" strike="noStrike" cap="none" normalizeH="0" baseline="0" dirty="0" smtClean="0">
+                <a:ln>
+                  <a:noFill/>
+                </a:ln>
+                <a:solidFill>
+                  <a:srgbClr val="000080"/>
+                </a:solidFill>
+                <a:effectLst/>
+                <a:latin typeface="宋体" panose="02010600030101010101" pitchFamily="2" charset="-122"/>
+                <a:ea typeface="宋体" panose="02010600030101010101" pitchFamily="2" charset="-122"/>
+              </a:rPr>
+              <a:t>null</a:t>
+            </a:r>
+            <a:r>
+              <a:rPr kumimoji="0" lang="zh-CN" altLang="zh-CN" sz="900" b="0" i="0" u="none" strike="noStrike" cap="none" normalizeH="0" baseline="0" dirty="0" smtClean="0">
+                <a:ln>
+                  <a:noFill/>
+                </a:ln>
+                <a:solidFill>
+                  <a:srgbClr val="000000"/>
+                </a:solidFill>
+                <a:effectLst/>
+                <a:latin typeface="宋体" panose="02010600030101010101" pitchFamily="2" charset="-122"/>
+                <a:ea typeface="宋体" panose="02010600030101010101" pitchFamily="2" charset="-122"/>
+              </a:rPr>
+              <a:t>) {</a:t>
+            </a:r>
+            <a:br>
+              <a:rPr kumimoji="0" lang="zh-CN" altLang="zh-CN" sz="900" b="0" i="0" u="none" strike="noStrike" cap="none" normalizeH="0" baseline="0" dirty="0" smtClean="0">
+                <a:ln>
+                  <a:noFill/>
+                </a:ln>
+                <a:solidFill>
+                  <a:srgbClr val="000000"/>
+                </a:solidFill>
+                <a:effectLst/>
+                <a:latin typeface="宋体" panose="02010600030101010101" pitchFamily="2" charset="-122"/>
+                <a:ea typeface="宋体" panose="02010600030101010101" pitchFamily="2" charset="-122"/>
+              </a:rPr>
+            </a:br>
+            <a:r>
+              <a:rPr kumimoji="0" lang="zh-CN" altLang="zh-CN" sz="900" b="0" i="0" u="none" strike="noStrike" cap="none" normalizeH="0" baseline="0" dirty="0" smtClean="0">
+                <a:ln>
+                  <a:noFill/>
+                </a:ln>
+                <a:solidFill>
+                  <a:srgbClr val="000000"/>
+                </a:solidFill>
+                <a:effectLst/>
+                <a:latin typeface="宋体" panose="02010600030101010101" pitchFamily="2" charset="-122"/>
+                <a:ea typeface="宋体" panose="02010600030101010101" pitchFamily="2" charset="-122"/>
+              </a:rPr>
+              <a:t>        </a:t>
+            </a:r>
+            <a:r>
+              <a:rPr kumimoji="0" lang="zh-CN" altLang="zh-CN" sz="900" b="1" i="0" u="none" strike="noStrike" cap="none" normalizeH="0" baseline="0" dirty="0" smtClean="0">
+                <a:ln>
+                  <a:noFill/>
+                </a:ln>
+                <a:solidFill>
+                  <a:srgbClr val="000080"/>
+                </a:solidFill>
+                <a:effectLst/>
+                <a:latin typeface="宋体" panose="02010600030101010101" pitchFamily="2" charset="-122"/>
+                <a:ea typeface="宋体" panose="02010600030101010101" pitchFamily="2" charset="-122"/>
+              </a:rPr>
+              <a:t>do </a:t>
+            </a:r>
+            <a:r>
+              <a:rPr kumimoji="0" lang="zh-CN" altLang="zh-CN" sz="900" b="0" i="0" u="none" strike="noStrike" cap="none" normalizeH="0" baseline="0" dirty="0" smtClean="0">
+                <a:ln>
+                  <a:noFill/>
+                </a:ln>
+                <a:solidFill>
+                  <a:srgbClr val="000000"/>
+                </a:solidFill>
+                <a:effectLst/>
+                <a:latin typeface="宋体" panose="02010600030101010101" pitchFamily="2" charset="-122"/>
+                <a:ea typeface="宋体" panose="02010600030101010101" pitchFamily="2" charset="-122"/>
+              </a:rPr>
+              <a:t>{</a:t>
+            </a:r>
+            <a:br>
+              <a:rPr kumimoji="0" lang="zh-CN" altLang="zh-CN" sz="900" b="0" i="0" u="none" strike="noStrike" cap="none" normalizeH="0" baseline="0" dirty="0" smtClean="0">
+                <a:ln>
+                  <a:noFill/>
+                </a:ln>
+                <a:solidFill>
+                  <a:srgbClr val="000000"/>
+                </a:solidFill>
+                <a:effectLst/>
+                <a:latin typeface="宋体" panose="02010600030101010101" pitchFamily="2" charset="-122"/>
+                <a:ea typeface="宋体" panose="02010600030101010101" pitchFamily="2" charset="-122"/>
+              </a:rPr>
+            </a:br>
+            <a:r>
+              <a:rPr kumimoji="0" lang="zh-CN" altLang="zh-CN" sz="900" b="0" i="0" u="none" strike="noStrike" cap="none" normalizeH="0" baseline="0" dirty="0" smtClean="0">
+                <a:ln>
+                  <a:noFill/>
+                </a:ln>
+                <a:solidFill>
+                  <a:srgbClr val="000000"/>
+                </a:solidFill>
+                <a:effectLst/>
+                <a:latin typeface="宋体" panose="02010600030101010101" pitchFamily="2" charset="-122"/>
+                <a:ea typeface="宋体" panose="02010600030101010101" pitchFamily="2" charset="-122"/>
+              </a:rPr>
+              <a:t>            </a:t>
+            </a:r>
+            <a:r>
+              <a:rPr kumimoji="0" lang="zh-CN" altLang="zh-CN" sz="900" b="0" i="0" u="none" strike="noStrike" cap="none" normalizeH="0" baseline="0" dirty="0" smtClean="0">
+                <a:ln>
+                  <a:noFill/>
+                </a:ln>
+                <a:solidFill>
+                  <a:srgbClr val="20999D"/>
+                </a:solidFill>
+                <a:effectLst/>
+                <a:latin typeface="宋体" panose="02010600030101010101" pitchFamily="2" charset="-122"/>
+                <a:ea typeface="宋体" panose="02010600030101010101" pitchFamily="2" charset="-122"/>
+              </a:rPr>
+              <a:t>K </a:t>
+            </a:r>
+            <a:r>
+              <a:rPr kumimoji="0" lang="zh-CN" altLang="zh-CN" sz="900" b="0" i="0" u="none" strike="noStrike" cap="none" normalizeH="0" baseline="0" dirty="0" smtClean="0">
+                <a:ln>
+                  <a:noFill/>
+                </a:ln>
+                <a:solidFill>
+                  <a:srgbClr val="000000"/>
+                </a:solidFill>
+                <a:effectLst/>
+                <a:latin typeface="宋体" panose="02010600030101010101" pitchFamily="2" charset="-122"/>
+                <a:ea typeface="宋体" panose="02010600030101010101" pitchFamily="2" charset="-122"/>
+              </a:rPr>
+              <a:t>ek;</a:t>
+            </a:r>
+            <a:br>
+              <a:rPr kumimoji="0" lang="zh-CN" altLang="zh-CN" sz="900" b="0" i="0" u="none" strike="noStrike" cap="none" normalizeH="0" baseline="0" dirty="0" smtClean="0">
+                <a:ln>
+                  <a:noFill/>
+                </a:ln>
+                <a:solidFill>
+                  <a:srgbClr val="000000"/>
+                </a:solidFill>
+                <a:effectLst/>
+                <a:latin typeface="宋体" panose="02010600030101010101" pitchFamily="2" charset="-122"/>
+                <a:ea typeface="宋体" panose="02010600030101010101" pitchFamily="2" charset="-122"/>
+              </a:rPr>
+            </a:br>
+            <a:r>
+              <a:rPr kumimoji="0" lang="zh-CN" altLang="zh-CN" sz="900" b="0" i="0" u="none" strike="noStrike" cap="none" normalizeH="0" baseline="0" dirty="0" smtClean="0">
+                <a:ln>
+                  <a:noFill/>
+                </a:ln>
+                <a:solidFill>
+                  <a:srgbClr val="000000"/>
+                </a:solidFill>
+                <a:effectLst/>
+                <a:latin typeface="宋体" panose="02010600030101010101" pitchFamily="2" charset="-122"/>
+                <a:ea typeface="宋体" panose="02010600030101010101" pitchFamily="2" charset="-122"/>
+              </a:rPr>
+              <a:t>            </a:t>
+            </a:r>
+            <a:r>
+              <a:rPr kumimoji="0" lang="zh-CN" altLang="zh-CN" sz="900" b="1" i="0" u="none" strike="noStrike" cap="none" normalizeH="0" baseline="0" dirty="0" smtClean="0">
+                <a:ln>
+                  <a:noFill/>
+                </a:ln>
+                <a:solidFill>
+                  <a:srgbClr val="000080"/>
+                </a:solidFill>
+                <a:effectLst/>
+                <a:latin typeface="宋体" panose="02010600030101010101" pitchFamily="2" charset="-122"/>
+                <a:ea typeface="宋体" panose="02010600030101010101" pitchFamily="2" charset="-122"/>
+              </a:rPr>
+              <a:t>if </a:t>
+            </a:r>
+            <a:r>
+              <a:rPr kumimoji="0" lang="zh-CN" altLang="zh-CN" sz="900" b="0" i="0" u="none" strike="noStrike" cap="none" normalizeH="0" baseline="0" dirty="0" smtClean="0">
+                <a:ln>
+                  <a:noFill/>
+                </a:ln>
+                <a:solidFill>
+                  <a:srgbClr val="000000"/>
+                </a:solidFill>
+                <a:effectLst/>
+                <a:latin typeface="宋体" panose="02010600030101010101" pitchFamily="2" charset="-122"/>
+                <a:ea typeface="宋体" panose="02010600030101010101" pitchFamily="2" charset="-122"/>
+              </a:rPr>
+              <a:t>(e.</a:t>
+            </a:r>
+            <a:r>
+              <a:rPr kumimoji="0" lang="zh-CN" altLang="zh-CN" sz="900" b="1" i="0" u="none" strike="noStrike" cap="none" normalizeH="0" baseline="0" dirty="0" smtClean="0">
+                <a:ln>
+                  <a:noFill/>
+                </a:ln>
+                <a:solidFill>
+                  <a:srgbClr val="660E7A"/>
+                </a:solidFill>
+                <a:effectLst/>
+                <a:latin typeface="宋体" panose="02010600030101010101" pitchFamily="2" charset="-122"/>
+                <a:ea typeface="宋体" panose="02010600030101010101" pitchFamily="2" charset="-122"/>
+              </a:rPr>
+              <a:t>hash </a:t>
+            </a:r>
+            <a:r>
+              <a:rPr kumimoji="0" lang="zh-CN" altLang="zh-CN" sz="900" b="0" i="0" u="none" strike="noStrike" cap="none" normalizeH="0" baseline="0" dirty="0" smtClean="0">
+                <a:ln>
+                  <a:noFill/>
+                </a:ln>
+                <a:solidFill>
+                  <a:srgbClr val="000000"/>
+                </a:solidFill>
+                <a:effectLst/>
+                <a:latin typeface="宋体" panose="02010600030101010101" pitchFamily="2" charset="-122"/>
+                <a:ea typeface="宋体" panose="02010600030101010101" pitchFamily="2" charset="-122"/>
+              </a:rPr>
+              <a:t>== h &amp;&amp;</a:t>
+            </a:r>
+            <a:br>
+              <a:rPr kumimoji="0" lang="zh-CN" altLang="zh-CN" sz="900" b="0" i="0" u="none" strike="noStrike" cap="none" normalizeH="0" baseline="0" dirty="0" smtClean="0">
+                <a:ln>
+                  <a:noFill/>
+                </a:ln>
+                <a:solidFill>
+                  <a:srgbClr val="000000"/>
+                </a:solidFill>
+                <a:effectLst/>
+                <a:latin typeface="宋体" panose="02010600030101010101" pitchFamily="2" charset="-122"/>
+                <a:ea typeface="宋体" panose="02010600030101010101" pitchFamily="2" charset="-122"/>
+              </a:rPr>
+            </a:br>
+            <a:r>
+              <a:rPr kumimoji="0" lang="zh-CN" altLang="zh-CN" sz="900" b="0" i="0" u="none" strike="noStrike" cap="none" normalizeH="0" baseline="0" dirty="0" smtClean="0">
+                <a:ln>
+                  <a:noFill/>
+                </a:ln>
+                <a:solidFill>
+                  <a:srgbClr val="000000"/>
+                </a:solidFill>
+                <a:effectLst/>
+                <a:latin typeface="宋体" panose="02010600030101010101" pitchFamily="2" charset="-122"/>
+                <a:ea typeface="宋体" panose="02010600030101010101" pitchFamily="2" charset="-122"/>
+              </a:rPr>
+              <a:t>                ((ek = e.</a:t>
+            </a:r>
+            <a:r>
+              <a:rPr kumimoji="0" lang="zh-CN" altLang="zh-CN" sz="900" b="1" i="0" u="none" strike="noStrike" cap="none" normalizeH="0" baseline="0" dirty="0" smtClean="0">
+                <a:ln>
+                  <a:noFill/>
+                </a:ln>
+                <a:solidFill>
+                  <a:srgbClr val="660E7A"/>
+                </a:solidFill>
+                <a:effectLst/>
+                <a:latin typeface="宋体" panose="02010600030101010101" pitchFamily="2" charset="-122"/>
+                <a:ea typeface="宋体" panose="02010600030101010101" pitchFamily="2" charset="-122"/>
+              </a:rPr>
+              <a:t>key</a:t>
+            </a:r>
+            <a:r>
+              <a:rPr kumimoji="0" lang="zh-CN" altLang="zh-CN" sz="900" b="0" i="0" u="none" strike="noStrike" cap="none" normalizeH="0" baseline="0" dirty="0" smtClean="0">
+                <a:ln>
+                  <a:noFill/>
+                </a:ln>
+                <a:solidFill>
+                  <a:srgbClr val="000000"/>
+                </a:solidFill>
+                <a:effectLst/>
+                <a:latin typeface="宋体" panose="02010600030101010101" pitchFamily="2" charset="-122"/>
+                <a:ea typeface="宋体" panose="02010600030101010101" pitchFamily="2" charset="-122"/>
+              </a:rPr>
+              <a:t>) == k || (ek != </a:t>
+            </a:r>
+            <a:r>
+              <a:rPr kumimoji="0" lang="zh-CN" altLang="zh-CN" sz="900" b="1" i="0" u="none" strike="noStrike" cap="none" normalizeH="0" baseline="0" dirty="0" smtClean="0">
+                <a:ln>
+                  <a:noFill/>
+                </a:ln>
+                <a:solidFill>
+                  <a:srgbClr val="000080"/>
+                </a:solidFill>
+                <a:effectLst/>
+                <a:latin typeface="宋体" panose="02010600030101010101" pitchFamily="2" charset="-122"/>
+                <a:ea typeface="宋体" panose="02010600030101010101" pitchFamily="2" charset="-122"/>
+              </a:rPr>
+              <a:t>null </a:t>
+            </a:r>
+            <a:r>
+              <a:rPr kumimoji="0" lang="zh-CN" altLang="zh-CN" sz="900" b="0" i="0" u="none" strike="noStrike" cap="none" normalizeH="0" baseline="0" dirty="0" smtClean="0">
+                <a:ln>
+                  <a:noFill/>
+                </a:ln>
+                <a:solidFill>
+                  <a:srgbClr val="000000"/>
+                </a:solidFill>
+                <a:effectLst/>
+                <a:latin typeface="宋体" panose="02010600030101010101" pitchFamily="2" charset="-122"/>
+                <a:ea typeface="宋体" panose="02010600030101010101" pitchFamily="2" charset="-122"/>
+              </a:rPr>
+              <a:t>&amp;&amp; k.equals(ek))))</a:t>
+            </a:r>
+            <a:br>
+              <a:rPr kumimoji="0" lang="zh-CN" altLang="zh-CN" sz="900" b="0" i="0" u="none" strike="noStrike" cap="none" normalizeH="0" baseline="0" dirty="0" smtClean="0">
+                <a:ln>
+                  <a:noFill/>
+                </a:ln>
+                <a:solidFill>
+                  <a:srgbClr val="000000"/>
+                </a:solidFill>
+                <a:effectLst/>
+                <a:latin typeface="宋体" panose="02010600030101010101" pitchFamily="2" charset="-122"/>
+                <a:ea typeface="宋体" panose="02010600030101010101" pitchFamily="2" charset="-122"/>
+              </a:rPr>
+            </a:br>
+            <a:r>
+              <a:rPr kumimoji="0" lang="zh-CN" altLang="zh-CN" sz="900" b="0" i="0" u="none" strike="noStrike" cap="none" normalizeH="0" baseline="0" dirty="0" smtClean="0">
+                <a:ln>
+                  <a:noFill/>
+                </a:ln>
+                <a:solidFill>
+                  <a:srgbClr val="000000"/>
+                </a:solidFill>
+                <a:effectLst/>
+                <a:latin typeface="宋体" panose="02010600030101010101" pitchFamily="2" charset="-122"/>
+                <a:ea typeface="宋体" panose="02010600030101010101" pitchFamily="2" charset="-122"/>
+              </a:rPr>
+              <a:t>                </a:t>
+            </a:r>
+            <a:r>
+              <a:rPr kumimoji="0" lang="zh-CN" altLang="zh-CN" sz="900" b="1" i="0" u="none" strike="noStrike" cap="none" normalizeH="0" baseline="0" dirty="0" smtClean="0">
+                <a:ln>
+                  <a:noFill/>
+                </a:ln>
+                <a:solidFill>
+                  <a:srgbClr val="000080"/>
+                </a:solidFill>
+                <a:effectLst/>
+                <a:latin typeface="宋体" panose="02010600030101010101" pitchFamily="2" charset="-122"/>
+                <a:ea typeface="宋体" panose="02010600030101010101" pitchFamily="2" charset="-122"/>
+              </a:rPr>
+              <a:t>return </a:t>
+            </a:r>
+            <a:r>
+              <a:rPr kumimoji="0" lang="zh-CN" altLang="zh-CN" sz="900" b="0" i="0" u="none" strike="noStrike" cap="none" normalizeH="0" baseline="0" dirty="0" smtClean="0">
+                <a:ln>
+                  <a:noFill/>
+                </a:ln>
+                <a:solidFill>
+                  <a:srgbClr val="000000"/>
+                </a:solidFill>
+                <a:effectLst/>
+                <a:latin typeface="宋体" panose="02010600030101010101" pitchFamily="2" charset="-122"/>
+                <a:ea typeface="宋体" panose="02010600030101010101" pitchFamily="2" charset="-122"/>
+              </a:rPr>
+              <a:t>e;</a:t>
+            </a:r>
+            <a:br>
+              <a:rPr kumimoji="0" lang="zh-CN" altLang="zh-CN" sz="900" b="0" i="0" u="none" strike="noStrike" cap="none" normalizeH="0" baseline="0" dirty="0" smtClean="0">
+                <a:ln>
+                  <a:noFill/>
+                </a:ln>
+                <a:solidFill>
+                  <a:srgbClr val="000000"/>
+                </a:solidFill>
+                <a:effectLst/>
+                <a:latin typeface="宋体" panose="02010600030101010101" pitchFamily="2" charset="-122"/>
+                <a:ea typeface="宋体" panose="02010600030101010101" pitchFamily="2" charset="-122"/>
+              </a:rPr>
+            </a:br>
+            <a:r>
+              <a:rPr kumimoji="0" lang="zh-CN" altLang="zh-CN" sz="900" b="0" i="0" u="none" strike="noStrike" cap="none" normalizeH="0" baseline="0" dirty="0" smtClean="0">
+                <a:ln>
+                  <a:noFill/>
+                </a:ln>
+                <a:solidFill>
+                  <a:srgbClr val="000000"/>
+                </a:solidFill>
+                <a:effectLst/>
+                <a:latin typeface="宋体" panose="02010600030101010101" pitchFamily="2" charset="-122"/>
+                <a:ea typeface="宋体" panose="02010600030101010101" pitchFamily="2" charset="-122"/>
+              </a:rPr>
+              <a:t>        } </a:t>
+            </a:r>
+            <a:r>
+              <a:rPr kumimoji="0" lang="zh-CN" altLang="zh-CN" sz="900" b="1" i="0" u="none" strike="noStrike" cap="none" normalizeH="0" baseline="0" dirty="0" smtClean="0">
+                <a:ln>
+                  <a:noFill/>
+                </a:ln>
+                <a:solidFill>
+                  <a:srgbClr val="000080"/>
+                </a:solidFill>
+                <a:effectLst/>
+                <a:latin typeface="宋体" panose="02010600030101010101" pitchFamily="2" charset="-122"/>
+                <a:ea typeface="宋体" panose="02010600030101010101" pitchFamily="2" charset="-122"/>
+              </a:rPr>
+              <a:t>while </a:t>
+            </a:r>
+            <a:r>
+              <a:rPr kumimoji="0" lang="zh-CN" altLang="zh-CN" sz="900" b="0" i="0" u="none" strike="noStrike" cap="none" normalizeH="0" baseline="0" dirty="0" smtClean="0">
+                <a:ln>
+                  <a:noFill/>
+                </a:ln>
+                <a:solidFill>
+                  <a:srgbClr val="000000"/>
+                </a:solidFill>
+                <a:effectLst/>
+                <a:latin typeface="宋体" panose="02010600030101010101" pitchFamily="2" charset="-122"/>
+                <a:ea typeface="宋体" panose="02010600030101010101" pitchFamily="2" charset="-122"/>
+              </a:rPr>
+              <a:t>((e = e.</a:t>
+            </a:r>
+            <a:r>
+              <a:rPr kumimoji="0" lang="zh-CN" altLang="zh-CN" sz="900" b="1" i="0" u="none" strike="noStrike" cap="none" normalizeH="0" baseline="0" dirty="0" smtClean="0">
+                <a:ln>
+                  <a:noFill/>
+                </a:ln>
+                <a:solidFill>
+                  <a:srgbClr val="660E7A"/>
+                </a:solidFill>
+                <a:effectLst/>
+                <a:latin typeface="宋体" panose="02010600030101010101" pitchFamily="2" charset="-122"/>
+                <a:ea typeface="宋体" panose="02010600030101010101" pitchFamily="2" charset="-122"/>
+              </a:rPr>
+              <a:t>next</a:t>
+            </a:r>
+            <a:r>
+              <a:rPr kumimoji="0" lang="zh-CN" altLang="zh-CN" sz="900" b="0" i="0" u="none" strike="noStrike" cap="none" normalizeH="0" baseline="0" dirty="0" smtClean="0">
+                <a:ln>
+                  <a:noFill/>
+                </a:ln>
+                <a:solidFill>
+                  <a:srgbClr val="000000"/>
+                </a:solidFill>
+                <a:effectLst/>
+                <a:latin typeface="宋体" panose="02010600030101010101" pitchFamily="2" charset="-122"/>
+                <a:ea typeface="宋体" panose="02010600030101010101" pitchFamily="2" charset="-122"/>
+              </a:rPr>
+              <a:t>) != </a:t>
+            </a:r>
+            <a:r>
+              <a:rPr kumimoji="0" lang="zh-CN" altLang="zh-CN" sz="900" b="1" i="0" u="none" strike="noStrike" cap="none" normalizeH="0" baseline="0" dirty="0" smtClean="0">
+                <a:ln>
+                  <a:noFill/>
+                </a:ln>
+                <a:solidFill>
+                  <a:srgbClr val="000080"/>
+                </a:solidFill>
+                <a:effectLst/>
+                <a:latin typeface="宋体" panose="02010600030101010101" pitchFamily="2" charset="-122"/>
+                <a:ea typeface="宋体" panose="02010600030101010101" pitchFamily="2" charset="-122"/>
+              </a:rPr>
+              <a:t>null</a:t>
+            </a:r>
+            <a:r>
+              <a:rPr kumimoji="0" lang="zh-CN" altLang="zh-CN" sz="900" b="0" i="0" u="none" strike="noStrike" cap="none" normalizeH="0" baseline="0" dirty="0" smtClean="0">
+                <a:ln>
+                  <a:noFill/>
+                </a:ln>
+                <a:solidFill>
+                  <a:srgbClr val="000000"/>
+                </a:solidFill>
+                <a:effectLst/>
+                <a:latin typeface="宋体" panose="02010600030101010101" pitchFamily="2" charset="-122"/>
+                <a:ea typeface="宋体" panose="02010600030101010101" pitchFamily="2" charset="-122"/>
+              </a:rPr>
+              <a:t>);</a:t>
+            </a:r>
+            <a:br>
+              <a:rPr kumimoji="0" lang="zh-CN" altLang="zh-CN" sz="900" b="0" i="0" u="none" strike="noStrike" cap="none" normalizeH="0" baseline="0" dirty="0" smtClean="0">
+                <a:ln>
+                  <a:noFill/>
+                </a:ln>
+                <a:solidFill>
+                  <a:srgbClr val="000000"/>
+                </a:solidFill>
+                <a:effectLst/>
+                <a:latin typeface="宋体" panose="02010600030101010101" pitchFamily="2" charset="-122"/>
+                <a:ea typeface="宋体" panose="02010600030101010101" pitchFamily="2" charset="-122"/>
+              </a:rPr>
+            </a:br>
+            <a:r>
+              <a:rPr kumimoji="0" lang="zh-CN" altLang="zh-CN" sz="900" b="0" i="0" u="none" strike="noStrike" cap="none" normalizeH="0" baseline="0" dirty="0" smtClean="0">
+                <a:ln>
+                  <a:noFill/>
+                </a:ln>
+                <a:solidFill>
+                  <a:srgbClr val="000000"/>
+                </a:solidFill>
+                <a:effectLst/>
+                <a:latin typeface="宋体" panose="02010600030101010101" pitchFamily="2" charset="-122"/>
+                <a:ea typeface="宋体" panose="02010600030101010101" pitchFamily="2" charset="-122"/>
+              </a:rPr>
+              <a:t>    }</a:t>
+            </a:r>
+            <a:br>
+              <a:rPr kumimoji="0" lang="zh-CN" altLang="zh-CN" sz="900" b="0" i="0" u="none" strike="noStrike" cap="none" normalizeH="0" baseline="0" dirty="0" smtClean="0">
+                <a:ln>
+                  <a:noFill/>
+                </a:ln>
+                <a:solidFill>
+                  <a:srgbClr val="000000"/>
+                </a:solidFill>
+                <a:effectLst/>
+                <a:latin typeface="宋体" panose="02010600030101010101" pitchFamily="2" charset="-122"/>
+                <a:ea typeface="宋体" panose="02010600030101010101" pitchFamily="2" charset="-122"/>
+              </a:rPr>
+            </a:br>
+            <a:r>
+              <a:rPr kumimoji="0" lang="zh-CN" altLang="zh-CN" sz="900" b="0" i="0" u="none" strike="noStrike" cap="none" normalizeH="0" baseline="0" dirty="0" smtClean="0">
+                <a:ln>
+                  <a:noFill/>
+                </a:ln>
+                <a:solidFill>
+                  <a:srgbClr val="000000"/>
+                </a:solidFill>
+                <a:effectLst/>
+                <a:latin typeface="宋体" panose="02010600030101010101" pitchFamily="2" charset="-122"/>
+                <a:ea typeface="宋体" panose="02010600030101010101" pitchFamily="2" charset="-122"/>
+              </a:rPr>
+              <a:t>    </a:t>
+            </a:r>
+            <a:r>
+              <a:rPr kumimoji="0" lang="zh-CN" altLang="zh-CN" sz="900" b="1" i="0" u="none" strike="noStrike" cap="none" normalizeH="0" baseline="0" dirty="0" smtClean="0">
+                <a:ln>
+                  <a:noFill/>
+                </a:ln>
+                <a:solidFill>
+                  <a:srgbClr val="000080"/>
+                </a:solidFill>
+                <a:effectLst/>
+                <a:latin typeface="宋体" panose="02010600030101010101" pitchFamily="2" charset="-122"/>
+                <a:ea typeface="宋体" panose="02010600030101010101" pitchFamily="2" charset="-122"/>
+              </a:rPr>
+              <a:t>return null</a:t>
+            </a:r>
+            <a:r>
+              <a:rPr kumimoji="0" lang="zh-CN" altLang="zh-CN" sz="900" b="0" i="0" u="none" strike="noStrike" cap="none" normalizeH="0" baseline="0" dirty="0" smtClean="0">
+                <a:ln>
+                  <a:noFill/>
+                </a:ln>
+                <a:solidFill>
+                  <a:srgbClr val="000000"/>
+                </a:solidFill>
+                <a:effectLst/>
+                <a:latin typeface="宋体" panose="02010600030101010101" pitchFamily="2" charset="-122"/>
+                <a:ea typeface="宋体" panose="02010600030101010101" pitchFamily="2" charset="-122"/>
+              </a:rPr>
+              <a:t>;</a:t>
+            </a:r>
+            <a:br>
+              <a:rPr kumimoji="0" lang="zh-CN" altLang="zh-CN" sz="900" b="0" i="0" u="none" strike="noStrike" cap="none" normalizeH="0" baseline="0" dirty="0" smtClean="0">
+                <a:ln>
+                  <a:noFill/>
+                </a:ln>
+                <a:solidFill>
+                  <a:srgbClr val="000000"/>
+                </a:solidFill>
+                <a:effectLst/>
+                <a:latin typeface="宋体" panose="02010600030101010101" pitchFamily="2" charset="-122"/>
+                <a:ea typeface="宋体" panose="02010600030101010101" pitchFamily="2" charset="-122"/>
+              </a:rPr>
+            </a:br>
+            <a:r>
+              <a:rPr kumimoji="0" lang="zh-CN" altLang="zh-CN" sz="900" b="0" i="0" u="none" strike="noStrike" cap="none" normalizeH="0" baseline="0" dirty="0" smtClean="0">
+                <a:ln>
+                  <a:noFill/>
+                </a:ln>
+                <a:solidFill>
+                  <a:srgbClr val="000000"/>
+                </a:solidFill>
+                <a:effectLst/>
+                <a:latin typeface="宋体" panose="02010600030101010101" pitchFamily="2" charset="-122"/>
+                <a:ea typeface="宋体" panose="02010600030101010101" pitchFamily="2" charset="-122"/>
+              </a:rPr>
+              <a:t>}</a:t>
+            </a:r>
+            <a:endParaRPr kumimoji="0" lang="zh-CN" altLang="zh-CN" sz="1800" b="0" i="0" u="none" strike="noStrike" cap="none" normalizeH="0" baseline="0" dirty="0" smtClean="0">
+              <a:ln>
+                <a:noFill/>
+              </a:ln>
+              <a:solidFill>
+                <a:schemeClr val="tx1"/>
+              </a:solidFill>
+              <a:effectLst/>
+              <a:latin typeface="Arial" panose="020B0604020202020204" pitchFamily="34" charset="0"/>
+            </a:endParaRPr>
+          </a:p>
+        </p:txBody>
+      </p:sp>
+      <p:pic>
+        <p:nvPicPr>
+          <p:cNvPr id="2" name="图片 1"/>
+          <p:cNvPicPr>
+            <a:picLocks noChangeAspect="1"/>
+          </p:cNvPicPr>
+          <p:nvPr/>
+        </p:nvPicPr>
+        <p:blipFill>
+          <a:blip r:embed="rId2"/>
+          <a:stretch>
+            <a:fillRect/>
+          </a:stretch>
+        </p:blipFill>
+        <p:spPr>
+          <a:xfrm>
+            <a:off x="617838" y="851865"/>
+            <a:ext cx="4065405" cy="2753105"/>
+          </a:xfrm>
+          <a:prstGeom prst="rect">
+            <a:avLst/>
+          </a:prstGeom>
+        </p:spPr>
+      </p:pic>
+      <p:pic>
+        <p:nvPicPr>
+          <p:cNvPr id="7" name="图片 6"/>
+          <p:cNvPicPr>
+            <a:picLocks noChangeAspect="1"/>
+          </p:cNvPicPr>
+          <p:nvPr/>
+        </p:nvPicPr>
+        <p:blipFill>
+          <a:blip r:embed="rId3"/>
+          <a:stretch>
+            <a:fillRect/>
+          </a:stretch>
+        </p:blipFill>
+        <p:spPr>
+          <a:xfrm>
+            <a:off x="6173656" y="-75467"/>
+            <a:ext cx="5726504" cy="6933467"/>
+          </a:xfrm>
+          <a:prstGeom prst="rect">
+            <a:avLst/>
+          </a:prstGeom>
+        </p:spPr>
+      </p:pic>
     </p:spTree>
     <p:extLst>
       <p:ext uri="{BB962C8B-B14F-4D97-AF65-F5344CB8AC3E}">
         <p14:creationId xmlns:p14="http://schemas.microsoft.com/office/powerpoint/2010/main" val="2962993276"/>
+      </p:ext>
+    </p:extLst>
+  </p:cSld>
+  <p:clrMapOvr>
+    <a:masterClrMapping/>
+  </p:clrMapOvr>
+</p:sld>
+</file>
+
+<file path=ppt/slides/slide28.xml><?xml version="1.0" encoding="utf-8"?>
+<p:sld xmlns:a="http://schemas.openxmlformats.org/drawingml/2006/main" xmlns:r="http://schemas.openxmlformats.org/officeDocument/2006/relationships" xmlns:p="http://schemas.openxmlformats.org/presentationml/2006/main">
+  <p:cSld>
+    <p:spTree>
+      <p:nvGrpSpPr>
+        <p:cNvPr id="1" name=""/>
+        <p:cNvGrpSpPr/>
+        <p:nvPr/>
+      </p:nvGrpSpPr>
+      <p:grpSpPr>
+        <a:xfrm>
+          <a:off x="0" y="0"/>
+          <a:ext cx="0" cy="0"/>
+          <a:chOff x="0" y="0"/>
+          <a:chExt cx="0" cy="0"/>
+        </a:xfrm>
+      </p:grpSpPr>
+      <p:pic>
+        <p:nvPicPr>
+          <p:cNvPr id="4" name="图片 3"/>
+          <p:cNvPicPr>
+            <a:picLocks noChangeAspect="1"/>
+          </p:cNvPicPr>
+          <p:nvPr/>
+        </p:nvPicPr>
+        <p:blipFill>
+          <a:blip r:embed="rId2"/>
+          <a:stretch>
+            <a:fillRect/>
+          </a:stretch>
+        </p:blipFill>
+        <p:spPr>
+          <a:xfrm>
+            <a:off x="6400800" y="0"/>
+            <a:ext cx="4056756" cy="6820323"/>
+          </a:xfrm>
+          <a:prstGeom prst="rect">
+            <a:avLst/>
+          </a:prstGeom>
+        </p:spPr>
+      </p:pic>
+      <p:sp>
+        <p:nvSpPr>
+          <p:cNvPr id="5" name="矩形 4">
+            <a:extLst>
+              <a:ext uri="{FF2B5EF4-FFF2-40B4-BE49-F238E27FC236}">
+                <a16:creationId xmlns="" xmlns:a16="http://schemas.microsoft.com/office/drawing/2014/main" id="{83610F07-852C-463A-8107-F77C37896FD8}"/>
+              </a:ext>
+            </a:extLst>
+          </p:cNvPr>
+          <p:cNvSpPr/>
+          <p:nvPr/>
+        </p:nvSpPr>
+        <p:spPr>
+          <a:xfrm>
+            <a:off x="0" y="3976"/>
+            <a:ext cx="3839513" cy="584775"/>
+          </a:xfrm>
+          <a:prstGeom prst="rect">
+            <a:avLst/>
+          </a:prstGeom>
+        </p:spPr>
+        <p:txBody>
+          <a:bodyPr wrap="none">
+            <a:spAutoFit/>
+          </a:bodyPr>
+          <a:lstStyle/>
+          <a:p>
+            <a:r>
+              <a:rPr lang="en-US" altLang="zh-CN" sz="3200" dirty="0" err="1"/>
+              <a:t>ConcurrentHashMap</a:t>
+            </a:r>
+            <a:endParaRPr lang="zh-CN" altLang="en-US" sz="3200" dirty="0"/>
+          </a:p>
+        </p:txBody>
+      </p:sp>
+      <p:pic>
+        <p:nvPicPr>
+          <p:cNvPr id="6" name="图片 5"/>
+          <p:cNvPicPr>
+            <a:picLocks noChangeAspect="1"/>
+          </p:cNvPicPr>
+          <p:nvPr/>
+        </p:nvPicPr>
+        <p:blipFill>
+          <a:blip r:embed="rId3"/>
+          <a:stretch>
+            <a:fillRect/>
+          </a:stretch>
+        </p:blipFill>
+        <p:spPr>
+          <a:xfrm>
+            <a:off x="281399" y="3018408"/>
+            <a:ext cx="5121310" cy="1035367"/>
+          </a:xfrm>
+          <a:prstGeom prst="rect">
+            <a:avLst/>
+          </a:prstGeom>
+        </p:spPr>
+      </p:pic>
+      <p:pic>
+        <p:nvPicPr>
+          <p:cNvPr id="7" name="图片 6"/>
+          <p:cNvPicPr>
+            <a:picLocks noChangeAspect="1"/>
+          </p:cNvPicPr>
+          <p:nvPr/>
+        </p:nvPicPr>
+        <p:blipFill>
+          <a:blip r:embed="rId4"/>
+          <a:stretch>
+            <a:fillRect/>
+          </a:stretch>
+        </p:blipFill>
+        <p:spPr>
+          <a:xfrm>
+            <a:off x="585169" y="1175379"/>
+            <a:ext cx="3254344" cy="628200"/>
+          </a:xfrm>
+          <a:prstGeom prst="rect">
+            <a:avLst/>
+          </a:prstGeom>
+        </p:spPr>
+      </p:pic>
+    </p:spTree>
+    <p:extLst>
+      <p:ext uri="{BB962C8B-B14F-4D97-AF65-F5344CB8AC3E}">
+        <p14:creationId xmlns:p14="http://schemas.microsoft.com/office/powerpoint/2010/main" val="1228378749"/>
+      </p:ext>
+    </p:extLst>
+  </p:cSld>
+  <p:clrMapOvr>
+    <a:masterClrMapping/>
+  </p:clrMapOvr>
+</p:sld>
+</file>
+
+<file path=ppt/slides/slide29.xml><?xml version="1.0" encoding="utf-8"?>
+<p:sld xmlns:a="http://schemas.openxmlformats.org/drawingml/2006/main" xmlns:r="http://schemas.openxmlformats.org/officeDocument/2006/relationships" xmlns:p="http://schemas.openxmlformats.org/presentationml/2006/main">
+  <p:cSld>
+    <p:spTree>
+      <p:nvGrpSpPr>
+        <p:cNvPr id="1" name=""/>
+        <p:cNvGrpSpPr/>
+        <p:nvPr/>
+      </p:nvGrpSpPr>
+      <p:grpSpPr>
+        <a:xfrm>
+          <a:off x="0" y="0"/>
+          <a:ext cx="0" cy="0"/>
+          <a:chOff x="0" y="0"/>
+          <a:chExt cx="0" cy="0"/>
+        </a:xfrm>
+      </p:grpSpPr>
+      <p:sp>
+        <p:nvSpPr>
+          <p:cNvPr id="2" name="文本框 1">
+            <a:extLst>
+              <a:ext uri="{FF2B5EF4-FFF2-40B4-BE49-F238E27FC236}">
+                <a16:creationId xmlns="" xmlns:a16="http://schemas.microsoft.com/office/drawing/2014/main" id="{ECD587B2-0662-4350-9ECB-2153752A1222}"/>
+              </a:ext>
+            </a:extLst>
+          </p:cNvPr>
+          <p:cNvSpPr txBox="1"/>
+          <p:nvPr/>
+        </p:nvSpPr>
+        <p:spPr>
+          <a:xfrm>
+            <a:off x="0" y="0"/>
+            <a:ext cx="1620957" cy="584775"/>
+          </a:xfrm>
+          <a:prstGeom prst="rect">
+            <a:avLst/>
+          </a:prstGeom>
+          <a:noFill/>
+        </p:spPr>
+        <p:txBody>
+          <a:bodyPr wrap="none" rtlCol="0" anchor="ctr">
+            <a:spAutoFit/>
+          </a:bodyPr>
+          <a:lstStyle/>
+          <a:p>
+            <a:r>
+              <a:rPr lang="en-US" altLang="zh-CN" sz="3200" dirty="0" err="1"/>
+              <a:t>HashSet</a:t>
+            </a:r>
+            <a:endParaRPr lang="zh-CN" altLang="en-US" sz="3200" dirty="0"/>
+          </a:p>
+        </p:txBody>
+      </p:sp>
+      <p:sp>
+        <p:nvSpPr>
+          <p:cNvPr id="3" name="文本框 2"/>
+          <p:cNvSpPr txBox="1"/>
+          <p:nvPr/>
+        </p:nvSpPr>
+        <p:spPr>
+          <a:xfrm>
+            <a:off x="1252151" y="840259"/>
+            <a:ext cx="5862502" cy="369332"/>
+          </a:xfrm>
+          <a:prstGeom prst="rect">
+            <a:avLst/>
+          </a:prstGeom>
+          <a:noFill/>
+        </p:spPr>
+        <p:txBody>
+          <a:bodyPr wrap="none" rtlCol="0">
+            <a:spAutoFit/>
+          </a:bodyPr>
+          <a:lstStyle/>
+          <a:p>
+            <a:r>
+              <a:rPr lang="zh-CN" altLang="en-US" dirty="0" smtClean="0"/>
+              <a:t>因为</a:t>
+            </a:r>
+            <a:r>
+              <a:rPr lang="en-US" altLang="zh-CN" dirty="0" err="1" smtClean="0"/>
+              <a:t>HashSet</a:t>
+            </a:r>
+            <a:r>
+              <a:rPr lang="zh-CN" altLang="en-US" dirty="0" smtClean="0"/>
+              <a:t>基于</a:t>
+            </a:r>
+            <a:r>
+              <a:rPr lang="en-US" altLang="zh-CN" dirty="0" err="1" smtClean="0"/>
+              <a:t>HashMap</a:t>
+            </a:r>
+            <a:r>
+              <a:rPr lang="zh-CN" altLang="en-US" dirty="0" smtClean="0"/>
+              <a:t>实现，所以，不做详细解释。</a:t>
+            </a:r>
+            <a:endParaRPr lang="zh-CN" altLang="en-US" dirty="0"/>
+          </a:p>
+        </p:txBody>
+      </p:sp>
+      <p:pic>
+        <p:nvPicPr>
+          <p:cNvPr id="8" name="图片 7"/>
+          <p:cNvPicPr>
+            <a:picLocks noChangeAspect="1"/>
+          </p:cNvPicPr>
+          <p:nvPr/>
+        </p:nvPicPr>
+        <p:blipFill>
+          <a:blip r:embed="rId2"/>
+          <a:stretch>
+            <a:fillRect/>
+          </a:stretch>
+        </p:blipFill>
+        <p:spPr>
+          <a:xfrm>
+            <a:off x="2439789" y="1593097"/>
+            <a:ext cx="1512984" cy="628200"/>
+          </a:xfrm>
+          <a:prstGeom prst="rect">
+            <a:avLst/>
+          </a:prstGeom>
+        </p:spPr>
+      </p:pic>
+      <p:pic>
+        <p:nvPicPr>
+          <p:cNvPr id="9" name="图片 8"/>
+          <p:cNvPicPr>
+            <a:picLocks noChangeAspect="1"/>
+          </p:cNvPicPr>
+          <p:nvPr/>
+        </p:nvPicPr>
+        <p:blipFill>
+          <a:blip r:embed="rId3"/>
+          <a:stretch>
+            <a:fillRect/>
+          </a:stretch>
+        </p:blipFill>
+        <p:spPr>
+          <a:xfrm>
+            <a:off x="4283674" y="1574563"/>
+            <a:ext cx="3522685" cy="756167"/>
+          </a:xfrm>
+          <a:prstGeom prst="rect">
+            <a:avLst/>
+          </a:prstGeom>
+        </p:spPr>
+      </p:pic>
+      <p:pic>
+        <p:nvPicPr>
+          <p:cNvPr id="10" name="图片 9"/>
+          <p:cNvPicPr>
+            <a:picLocks noChangeAspect="1"/>
+          </p:cNvPicPr>
+          <p:nvPr/>
+        </p:nvPicPr>
+        <p:blipFill>
+          <a:blip r:embed="rId4"/>
+          <a:stretch>
+            <a:fillRect/>
+          </a:stretch>
+        </p:blipFill>
+        <p:spPr>
+          <a:xfrm>
+            <a:off x="810478" y="3081948"/>
+            <a:ext cx="3027722" cy="962829"/>
+          </a:xfrm>
+          <a:prstGeom prst="rect">
+            <a:avLst/>
+          </a:prstGeom>
+        </p:spPr>
+      </p:pic>
+      <p:pic>
+        <p:nvPicPr>
+          <p:cNvPr id="11" name="图片 10"/>
+          <p:cNvPicPr>
+            <a:picLocks noChangeAspect="1"/>
+          </p:cNvPicPr>
+          <p:nvPr/>
+        </p:nvPicPr>
+        <p:blipFill>
+          <a:blip r:embed="rId5"/>
+          <a:stretch>
+            <a:fillRect/>
+          </a:stretch>
+        </p:blipFill>
+        <p:spPr>
+          <a:xfrm>
+            <a:off x="5054039" y="3114899"/>
+            <a:ext cx="3084672" cy="929877"/>
+          </a:xfrm>
+          <a:prstGeom prst="rect">
+            <a:avLst/>
+          </a:prstGeom>
+        </p:spPr>
+      </p:pic>
+      <p:pic>
+        <p:nvPicPr>
+          <p:cNvPr id="13" name="图片 12"/>
+          <p:cNvPicPr>
+            <a:picLocks noChangeAspect="1"/>
+          </p:cNvPicPr>
+          <p:nvPr/>
+        </p:nvPicPr>
+        <p:blipFill>
+          <a:blip r:embed="rId6"/>
+          <a:stretch>
+            <a:fillRect/>
+          </a:stretch>
+        </p:blipFill>
+        <p:spPr>
+          <a:xfrm>
+            <a:off x="3318790" y="4626477"/>
+            <a:ext cx="1929769" cy="628200"/>
+          </a:xfrm>
+          <a:prstGeom prst="rect">
+            <a:avLst/>
+          </a:prstGeom>
+        </p:spPr>
+      </p:pic>
+    </p:spTree>
+    <p:extLst>
+      <p:ext uri="{BB962C8B-B14F-4D97-AF65-F5344CB8AC3E}">
+        <p14:creationId xmlns:p14="http://schemas.microsoft.com/office/powerpoint/2010/main" val="1532566925"/>
       </p:ext>
     </p:extLst>
   </p:cSld>
@@ -10046,7 +11492,7 @@
           <p:cNvPr id="2" name="矩形 1">
             <a:extLst>
               <a:ext uri="{FF2B5EF4-FFF2-40B4-BE49-F238E27FC236}">
-                <a16:creationId xmlns:a16="http://schemas.microsoft.com/office/drawing/2014/main" xmlns="" id="{0121B0F3-2A2A-456C-B6CB-DC8E6C73E366}"/>
+                <a16:creationId xmlns="" xmlns:a16="http://schemas.microsoft.com/office/drawing/2014/main" id="{0121B0F3-2A2A-456C-B6CB-DC8E6C73E366}"/>
               </a:ext>
             </a:extLst>
           </p:cNvPr>
@@ -10081,7 +11527,7 @@
           <p:cNvPr id="3" name="图片 2">
             <a:extLst>
               <a:ext uri="{FF2B5EF4-FFF2-40B4-BE49-F238E27FC236}">
-                <a16:creationId xmlns:a16="http://schemas.microsoft.com/office/drawing/2014/main" xmlns="" id="{8BE457DB-7447-43BB-A9A3-29E3157B2E94}"/>
+                <a16:creationId xmlns="" xmlns:a16="http://schemas.microsoft.com/office/drawing/2014/main" id="{8BE457DB-7447-43BB-A9A3-29E3157B2E94}"/>
               </a:ext>
             </a:extLst>
           </p:cNvPr>
@@ -10110,6 +11556,65 @@
     <p:extLst>
       <p:ext uri="{BB962C8B-B14F-4D97-AF65-F5344CB8AC3E}">
         <p14:creationId xmlns:p14="http://schemas.microsoft.com/office/powerpoint/2010/main" val="1521443232"/>
+      </p:ext>
+    </p:extLst>
+  </p:cSld>
+  <p:clrMapOvr>
+    <a:masterClrMapping/>
+  </p:clrMapOvr>
+</p:sld>
+</file>
+
+<file path=ppt/slides/slide30.xml><?xml version="1.0" encoding="utf-8"?>
+<p:sld xmlns:a="http://schemas.openxmlformats.org/drawingml/2006/main" xmlns:r="http://schemas.openxmlformats.org/officeDocument/2006/relationships" xmlns:p="http://schemas.openxmlformats.org/presentationml/2006/main">
+  <p:cSld>
+    <p:spTree>
+      <p:nvGrpSpPr>
+        <p:cNvPr id="1" name=""/>
+        <p:cNvGrpSpPr/>
+        <p:nvPr/>
+      </p:nvGrpSpPr>
+      <p:grpSpPr>
+        <a:xfrm>
+          <a:off x="0" y="0"/>
+          <a:ext cx="0" cy="0"/>
+          <a:chOff x="0" y="0"/>
+          <a:chExt cx="0" cy="0"/>
+        </a:xfrm>
+      </p:grpSpPr>
+      <p:sp>
+        <p:nvSpPr>
+          <p:cNvPr id="2" name="文本框 1"/>
+          <p:cNvSpPr txBox="1"/>
+          <p:nvPr/>
+        </p:nvSpPr>
+        <p:spPr>
+          <a:xfrm>
+            <a:off x="5675871" y="2833817"/>
+            <a:ext cx="1031051" cy="1107996"/>
+          </a:xfrm>
+          <a:prstGeom prst="rect">
+            <a:avLst/>
+          </a:prstGeom>
+          <a:noFill/>
+        </p:spPr>
+        <p:txBody>
+          <a:bodyPr wrap="none" rtlCol="0">
+            <a:spAutoFit/>
+          </a:bodyPr>
+          <a:lstStyle/>
+          <a:p>
+            <a:r>
+              <a:rPr lang="zh-CN" altLang="en-US" sz="6600" dirty="0"/>
+              <a:t>完</a:t>
+            </a:r>
+          </a:p>
+        </p:txBody>
+      </p:sp>
+    </p:spTree>
+    <p:extLst>
+      <p:ext uri="{BB962C8B-B14F-4D97-AF65-F5344CB8AC3E}">
+        <p14:creationId xmlns:p14="http://schemas.microsoft.com/office/powerpoint/2010/main" val="3053996283"/>
       </p:ext>
     </p:extLst>
   </p:cSld>
@@ -10141,7 +11646,7 @@
           <p:cNvPr id="2" name="矩形 1">
             <a:extLst>
               <a:ext uri="{FF2B5EF4-FFF2-40B4-BE49-F238E27FC236}">
-                <a16:creationId xmlns:a16="http://schemas.microsoft.com/office/drawing/2014/main" xmlns="" id="{6F83A1AB-83A6-431F-B860-D70267A819A0}"/>
+                <a16:creationId xmlns="" xmlns:a16="http://schemas.microsoft.com/office/drawing/2014/main" id="{6F83A1AB-83A6-431F-B860-D70267A819A0}"/>
               </a:ext>
             </a:extLst>
           </p:cNvPr>
@@ -10176,7 +11681,7 @@
           <p:cNvPr id="4" name="图片 3">
             <a:extLst>
               <a:ext uri="{FF2B5EF4-FFF2-40B4-BE49-F238E27FC236}">
-                <a16:creationId xmlns:a16="http://schemas.microsoft.com/office/drawing/2014/main" xmlns="" id="{4AFAA403-E90F-41E9-B603-8F7FA2C2A409}"/>
+                <a16:creationId xmlns="" xmlns:a16="http://schemas.microsoft.com/office/drawing/2014/main" id="{4AFAA403-E90F-41E9-B603-8F7FA2C2A409}"/>
               </a:ext>
             </a:extLst>
           </p:cNvPr>
@@ -10236,7 +11741,7 @@
           <p:cNvPr id="4" name="图片 3">
             <a:extLst>
               <a:ext uri="{FF2B5EF4-FFF2-40B4-BE49-F238E27FC236}">
-                <a16:creationId xmlns:a16="http://schemas.microsoft.com/office/drawing/2014/main" xmlns="" id="{0E059787-601E-4559-8474-B232F7BF9D06}"/>
+                <a16:creationId xmlns="" xmlns:a16="http://schemas.microsoft.com/office/drawing/2014/main" id="{0E059787-601E-4559-8474-B232F7BF9D06}"/>
               </a:ext>
             </a:extLst>
           </p:cNvPr>
@@ -10266,7 +11771,7 @@
           <p:cNvPr id="5" name="文本框 4">
             <a:extLst>
               <a:ext uri="{FF2B5EF4-FFF2-40B4-BE49-F238E27FC236}">
-                <a16:creationId xmlns:a16="http://schemas.microsoft.com/office/drawing/2014/main" xmlns="" id="{4FD79C78-9900-416A-9B55-E96D493A95D4}"/>
+                <a16:creationId xmlns="" xmlns:a16="http://schemas.microsoft.com/office/drawing/2014/main" id="{4FD79C78-9900-416A-9B55-E96D493A95D4}"/>
               </a:ext>
             </a:extLst>
           </p:cNvPr>
@@ -10305,7 +11810,7 @@
           <p:cNvPr id="7" name="文本框 6">
             <a:extLst>
               <a:ext uri="{FF2B5EF4-FFF2-40B4-BE49-F238E27FC236}">
-                <a16:creationId xmlns:a16="http://schemas.microsoft.com/office/drawing/2014/main" xmlns="" id="{E188D6B1-F65C-4303-B0A1-DB5FD4B5E476}"/>
+                <a16:creationId xmlns="" xmlns:a16="http://schemas.microsoft.com/office/drawing/2014/main" id="{E188D6B1-F65C-4303-B0A1-DB5FD4B5E476}"/>
               </a:ext>
             </a:extLst>
           </p:cNvPr>
@@ -10352,7 +11857,7 @@
           <p:cNvPr id="8" name="图片 7">
             <a:extLst>
               <a:ext uri="{FF2B5EF4-FFF2-40B4-BE49-F238E27FC236}">
-                <a16:creationId xmlns:a16="http://schemas.microsoft.com/office/drawing/2014/main" xmlns="" id="{E87B60D8-FF6C-41F3-BCDD-7E2161F966A6}"/>
+                <a16:creationId xmlns="" xmlns:a16="http://schemas.microsoft.com/office/drawing/2014/main" id="{E87B60D8-FF6C-41F3-BCDD-7E2161F966A6}"/>
               </a:ext>
             </a:extLst>
           </p:cNvPr>
@@ -10412,7 +11917,7 @@
           <p:cNvPr id="2" name="矩形 1">
             <a:extLst>
               <a:ext uri="{FF2B5EF4-FFF2-40B4-BE49-F238E27FC236}">
-                <a16:creationId xmlns:a16="http://schemas.microsoft.com/office/drawing/2014/main" xmlns="" id="{F9AC4A6B-3FE4-4AE7-B564-879E0034C1B8}"/>
+                <a16:creationId xmlns="" xmlns:a16="http://schemas.microsoft.com/office/drawing/2014/main" id="{F9AC4A6B-3FE4-4AE7-B564-879E0034C1B8}"/>
               </a:ext>
             </a:extLst>
           </p:cNvPr>
@@ -10447,7 +11952,7 @@
           <p:cNvPr id="4" name="图片 3">
             <a:extLst>
               <a:ext uri="{FF2B5EF4-FFF2-40B4-BE49-F238E27FC236}">
-                <a16:creationId xmlns:a16="http://schemas.microsoft.com/office/drawing/2014/main" xmlns="" id="{6A4CF27D-28CB-488B-B307-223F682CE2D3}"/>
+                <a16:creationId xmlns="" xmlns:a16="http://schemas.microsoft.com/office/drawing/2014/main" id="{6A4CF27D-28CB-488B-B307-223F682CE2D3}"/>
               </a:ext>
             </a:extLst>
           </p:cNvPr>
@@ -10507,7 +12012,7 @@
           <p:cNvPr id="2" name="矩形 1">
             <a:extLst>
               <a:ext uri="{FF2B5EF4-FFF2-40B4-BE49-F238E27FC236}">
-                <a16:creationId xmlns:a16="http://schemas.microsoft.com/office/drawing/2014/main" xmlns="" id="{36A05B3F-D8BE-4915-A149-396E33D7E183}"/>
+                <a16:creationId xmlns="" xmlns:a16="http://schemas.microsoft.com/office/drawing/2014/main" id="{36A05B3F-D8BE-4915-A149-396E33D7E183}"/>
               </a:ext>
             </a:extLst>
           </p:cNvPr>
@@ -10542,7 +12047,7 @@
           <p:cNvPr id="3" name="矩形 2">
             <a:extLst>
               <a:ext uri="{FF2B5EF4-FFF2-40B4-BE49-F238E27FC236}">
-                <a16:creationId xmlns:a16="http://schemas.microsoft.com/office/drawing/2014/main" xmlns="" id="{1AB84466-254D-47FB-8FA5-B9BC82239344}"/>
+                <a16:creationId xmlns="" xmlns:a16="http://schemas.microsoft.com/office/drawing/2014/main" id="{1AB84466-254D-47FB-8FA5-B9BC82239344}"/>
               </a:ext>
             </a:extLst>
           </p:cNvPr>
@@ -10577,7 +12082,7 @@
           <p:cNvPr id="4" name="矩形 3">
             <a:extLst>
               <a:ext uri="{FF2B5EF4-FFF2-40B4-BE49-F238E27FC236}">
-                <a16:creationId xmlns:a16="http://schemas.microsoft.com/office/drawing/2014/main" xmlns="" id="{992E0B2A-979E-4760-883A-80B884513AC5}"/>
+                <a16:creationId xmlns="" xmlns:a16="http://schemas.microsoft.com/office/drawing/2014/main" id="{992E0B2A-979E-4760-883A-80B884513AC5}"/>
               </a:ext>
             </a:extLst>
           </p:cNvPr>
@@ -10611,7 +12116,7 @@
           <p:cNvPr id="5" name="矩形 4">
             <a:extLst>
               <a:ext uri="{FF2B5EF4-FFF2-40B4-BE49-F238E27FC236}">
-                <a16:creationId xmlns:a16="http://schemas.microsoft.com/office/drawing/2014/main" xmlns="" id="{DC5A2B13-B596-404A-9B2E-AD6E8A6894FF}"/>
+                <a16:creationId xmlns="" xmlns:a16="http://schemas.microsoft.com/office/drawing/2014/main" id="{DC5A2B13-B596-404A-9B2E-AD6E8A6894FF}"/>
               </a:ext>
             </a:extLst>
           </p:cNvPr>
@@ -10645,7 +12150,7 @@
           <p:cNvPr id="6" name="图片 5">
             <a:extLst>
               <a:ext uri="{FF2B5EF4-FFF2-40B4-BE49-F238E27FC236}">
-                <a16:creationId xmlns:a16="http://schemas.microsoft.com/office/drawing/2014/main" xmlns="" id="{A3E24AA1-82A0-44C4-876B-1F3777CDCC2E}"/>
+                <a16:creationId xmlns="" xmlns:a16="http://schemas.microsoft.com/office/drawing/2014/main" id="{A3E24AA1-82A0-44C4-876B-1F3777CDCC2E}"/>
               </a:ext>
             </a:extLst>
           </p:cNvPr>
@@ -10675,7 +12180,7 @@
           <p:cNvPr id="7" name="图片 6">
             <a:extLst>
               <a:ext uri="{FF2B5EF4-FFF2-40B4-BE49-F238E27FC236}">
-                <a16:creationId xmlns:a16="http://schemas.microsoft.com/office/drawing/2014/main" xmlns="" id="{DD6054DB-0352-4A81-8533-6FAD84A1798C}"/>
+                <a16:creationId xmlns="" xmlns:a16="http://schemas.microsoft.com/office/drawing/2014/main" id="{DD6054DB-0352-4A81-8533-6FAD84A1798C}"/>
               </a:ext>
             </a:extLst>
           </p:cNvPr>
@@ -10705,7 +12210,7 @@
           <p:cNvPr id="9" name="图片 8">
             <a:extLst>
               <a:ext uri="{FF2B5EF4-FFF2-40B4-BE49-F238E27FC236}">
-                <a16:creationId xmlns:a16="http://schemas.microsoft.com/office/drawing/2014/main" xmlns="" id="{458F0245-F124-48AF-BFAC-B2AE0E0C9AB2}"/>
+                <a16:creationId xmlns="" xmlns:a16="http://schemas.microsoft.com/office/drawing/2014/main" id="{458F0245-F124-48AF-BFAC-B2AE0E0C9AB2}"/>
               </a:ext>
             </a:extLst>
           </p:cNvPr>
@@ -10765,7 +12270,7 @@
           <p:cNvPr id="2" name="图片 1">
             <a:extLst>
               <a:ext uri="{FF2B5EF4-FFF2-40B4-BE49-F238E27FC236}">
-                <a16:creationId xmlns:a16="http://schemas.microsoft.com/office/drawing/2014/main" xmlns="" id="{1051AF13-2DEB-405A-844C-02CE2F5FA1B3}"/>
+                <a16:creationId xmlns="" xmlns:a16="http://schemas.microsoft.com/office/drawing/2014/main" id="{1051AF13-2DEB-405A-844C-02CE2F5FA1B3}"/>
               </a:ext>
             </a:extLst>
           </p:cNvPr>
@@ -10795,7 +12300,7 @@
           <p:cNvPr id="3" name="矩形 2">
             <a:extLst>
               <a:ext uri="{FF2B5EF4-FFF2-40B4-BE49-F238E27FC236}">
-                <a16:creationId xmlns:a16="http://schemas.microsoft.com/office/drawing/2014/main" xmlns="" id="{9A90253A-0395-4A15-BCC5-BC8BA69D8B8B}"/>
+                <a16:creationId xmlns="" xmlns:a16="http://schemas.microsoft.com/office/drawing/2014/main" id="{9A90253A-0395-4A15-BCC5-BC8BA69D8B8B}"/>
               </a:ext>
             </a:extLst>
           </p:cNvPr>
@@ -10830,7 +12335,7 @@
           <p:cNvPr id="4" name="图片 3">
             <a:extLst>
               <a:ext uri="{FF2B5EF4-FFF2-40B4-BE49-F238E27FC236}">
-                <a16:creationId xmlns:a16="http://schemas.microsoft.com/office/drawing/2014/main" xmlns="" id="{2B15CA16-4656-44B0-8FFB-70C0F95CA91A}"/>
+                <a16:creationId xmlns="" xmlns:a16="http://schemas.microsoft.com/office/drawing/2014/main" id="{2B15CA16-4656-44B0-8FFB-70C0F95CA91A}"/>
               </a:ext>
             </a:extLst>
           </p:cNvPr>
@@ -10860,7 +12365,7 @@
           <p:cNvPr id="5" name="图片 4">
             <a:extLst>
               <a:ext uri="{FF2B5EF4-FFF2-40B4-BE49-F238E27FC236}">
-                <a16:creationId xmlns:a16="http://schemas.microsoft.com/office/drawing/2014/main" xmlns="" id="{B1C1782E-891F-46EA-AB6A-B76410303850}"/>
+                <a16:creationId xmlns="" xmlns:a16="http://schemas.microsoft.com/office/drawing/2014/main" id="{B1C1782E-891F-46EA-AB6A-B76410303850}"/>
               </a:ext>
             </a:extLst>
           </p:cNvPr>
@@ -10920,7 +12425,7 @@
           <p:cNvPr id="2" name="矩形 1">
             <a:extLst>
               <a:ext uri="{FF2B5EF4-FFF2-40B4-BE49-F238E27FC236}">
-                <a16:creationId xmlns:a16="http://schemas.microsoft.com/office/drawing/2014/main" xmlns="" id="{466C6482-9EAB-4617-BAD3-6D0C5FEF2ABC}"/>
+                <a16:creationId xmlns="" xmlns:a16="http://schemas.microsoft.com/office/drawing/2014/main" id="{466C6482-9EAB-4617-BAD3-6D0C5FEF2ABC}"/>
               </a:ext>
             </a:extLst>
           </p:cNvPr>
@@ -10955,7 +12460,7 @@
           <p:cNvPr id="5" name="图片 4">
             <a:extLst>
               <a:ext uri="{FF2B5EF4-FFF2-40B4-BE49-F238E27FC236}">
-                <a16:creationId xmlns:a16="http://schemas.microsoft.com/office/drawing/2014/main" xmlns="" id="{29A83C1B-9158-429B-B468-E619A686248B}"/>
+                <a16:creationId xmlns="" xmlns:a16="http://schemas.microsoft.com/office/drawing/2014/main" id="{29A83C1B-9158-429B-B468-E619A686248B}"/>
               </a:ext>
             </a:extLst>
           </p:cNvPr>

</xml_diff>